<commit_message>
Add history to slides
</commit_message>
<xml_diff>
--- a/Literature-Review/Litature-Review-Slides.pptx
+++ b/Literature-Review/Litature-Review-Slides.pptx
@@ -4,10 +4,15 @@
   <p:sldMasterIdLst>
     <p:sldMasterId id="2147483648" r:id="rId1"/>
   </p:sldMasterIdLst>
+  <p:notesMasterIdLst>
+    <p:notesMasterId r:id="rId7"/>
+  </p:notesMasterIdLst>
   <p:sldIdLst>
     <p:sldId id="256" r:id="rId2"/>
     <p:sldId id="257" r:id="rId3"/>
-    <p:sldId id="258" r:id="rId4"/>
+    <p:sldId id="259" r:id="rId4"/>
+    <p:sldId id="260" r:id="rId5"/>
+    <p:sldId id="258" r:id="rId6"/>
   </p:sldIdLst>
   <p:sldSz cx="12192000" cy="6858000"/>
   <p:notesSz cx="6858000" cy="9144000"/>
@@ -112,6 +117,488 @@
     </p:ext>
   </p:extLst>
 </p:presentation>
+</file>
+
+<file path=ppt/notesMasters/notesMaster1.xml><?xml version="1.0" encoding="utf-8"?>
+<p:notesMaster xmlns:a="http://schemas.openxmlformats.org/drawingml/2006/main" xmlns:r="http://schemas.openxmlformats.org/officeDocument/2006/relationships" xmlns:p="http://schemas.openxmlformats.org/presentationml/2006/main">
+  <p:cSld>
+    <p:bg>
+      <p:bgRef idx="1001">
+        <a:schemeClr val="bg1"/>
+      </p:bgRef>
+    </p:bg>
+    <p:spTree>
+      <p:nvGrpSpPr>
+        <p:cNvPr id="1" name=""/>
+        <p:cNvGrpSpPr/>
+        <p:nvPr/>
+      </p:nvGrpSpPr>
+      <p:grpSpPr>
+        <a:xfrm>
+          <a:off x="0" y="0"/>
+          <a:ext cx="0" cy="0"/>
+          <a:chOff x="0" y="0"/>
+          <a:chExt cx="0" cy="0"/>
+        </a:xfrm>
+      </p:grpSpPr>
+      <p:sp>
+        <p:nvSpPr>
+          <p:cNvPr id="2" name="Header Placeholder 1"/>
+          <p:cNvSpPr>
+            <a:spLocks noGrp="1"/>
+          </p:cNvSpPr>
+          <p:nvPr>
+            <p:ph type="hdr" sz="quarter"/>
+          </p:nvPr>
+        </p:nvSpPr>
+        <p:spPr>
+          <a:xfrm>
+            <a:off x="0" y="0"/>
+            <a:ext cx="2971800" cy="458788"/>
+          </a:xfrm>
+          <a:prstGeom prst="rect">
+            <a:avLst/>
+          </a:prstGeom>
+        </p:spPr>
+        <p:txBody>
+          <a:bodyPr vert="horz" lIns="91440" tIns="45720" rIns="91440" bIns="45720" rtlCol="0"/>
+          <a:lstStyle>
+            <a:lvl1pPr algn="l">
+              <a:defRPr sz="1200"/>
+            </a:lvl1pPr>
+          </a:lstStyle>
+          <a:p>
+            <a:endParaRPr lang="en-US"/>
+          </a:p>
+        </p:txBody>
+      </p:sp>
+      <p:sp>
+        <p:nvSpPr>
+          <p:cNvPr id="3" name="Date Placeholder 2"/>
+          <p:cNvSpPr>
+            <a:spLocks noGrp="1"/>
+          </p:cNvSpPr>
+          <p:nvPr>
+            <p:ph type="dt" idx="1"/>
+          </p:nvPr>
+        </p:nvSpPr>
+        <p:spPr>
+          <a:xfrm>
+            <a:off x="3884613" y="0"/>
+            <a:ext cx="2971800" cy="458788"/>
+          </a:xfrm>
+          <a:prstGeom prst="rect">
+            <a:avLst/>
+          </a:prstGeom>
+        </p:spPr>
+        <p:txBody>
+          <a:bodyPr vert="horz" lIns="91440" tIns="45720" rIns="91440" bIns="45720" rtlCol="0"/>
+          <a:lstStyle>
+            <a:lvl1pPr algn="r">
+              <a:defRPr sz="1200"/>
+            </a:lvl1pPr>
+          </a:lstStyle>
+          <a:p>
+            <a:fld id="{09F10C1A-A1E0-4AD3-B6FA-504261678D90}" type="datetimeFigureOut">
+              <a:rPr lang="en-US" smtClean="0"/>
+              <a:t>2/6/2023</a:t>
+            </a:fld>
+            <a:endParaRPr lang="en-US"/>
+          </a:p>
+        </p:txBody>
+      </p:sp>
+      <p:sp>
+        <p:nvSpPr>
+          <p:cNvPr id="4" name="Slide Image Placeholder 3"/>
+          <p:cNvSpPr>
+            <a:spLocks noGrp="1" noRot="1" noChangeAspect="1"/>
+          </p:cNvSpPr>
+          <p:nvPr>
+            <p:ph type="sldImg" idx="2"/>
+          </p:nvPr>
+        </p:nvSpPr>
+        <p:spPr>
+          <a:xfrm>
+            <a:off x="685800" y="1143000"/>
+            <a:ext cx="5486400" cy="3086100"/>
+          </a:xfrm>
+          <a:prstGeom prst="rect">
+            <a:avLst/>
+          </a:prstGeom>
+          <a:noFill/>
+          <a:ln w="12700">
+            <a:solidFill>
+              <a:prstClr val="black"/>
+            </a:solidFill>
+          </a:ln>
+        </p:spPr>
+        <p:txBody>
+          <a:bodyPr vert="horz" lIns="91440" tIns="45720" rIns="91440" bIns="45720" rtlCol="0" anchor="ctr"/>
+          <a:lstStyle/>
+          <a:p>
+            <a:endParaRPr lang="en-US"/>
+          </a:p>
+        </p:txBody>
+      </p:sp>
+      <p:sp>
+        <p:nvSpPr>
+          <p:cNvPr id="5" name="Notes Placeholder 4"/>
+          <p:cNvSpPr>
+            <a:spLocks noGrp="1"/>
+          </p:cNvSpPr>
+          <p:nvPr>
+            <p:ph type="body" sz="quarter" idx="3"/>
+          </p:nvPr>
+        </p:nvSpPr>
+        <p:spPr>
+          <a:xfrm>
+            <a:off x="685800" y="4400550"/>
+            <a:ext cx="5486400" cy="3600450"/>
+          </a:xfrm>
+          <a:prstGeom prst="rect">
+            <a:avLst/>
+          </a:prstGeom>
+        </p:spPr>
+        <p:txBody>
+          <a:bodyPr vert="horz" lIns="91440" tIns="45720" rIns="91440" bIns="45720" rtlCol="0"/>
+          <a:lstStyle/>
+          <a:p>
+            <a:pPr lvl="0"/>
+            <a:r>
+              <a:rPr lang="en-US"/>
+              <a:t>Click to edit Master text styles</a:t>
+            </a:r>
+          </a:p>
+          <a:p>
+            <a:pPr lvl="1"/>
+            <a:r>
+              <a:rPr lang="en-US"/>
+              <a:t>Second level</a:t>
+            </a:r>
+          </a:p>
+          <a:p>
+            <a:pPr lvl="2"/>
+            <a:r>
+              <a:rPr lang="en-US"/>
+              <a:t>Third level</a:t>
+            </a:r>
+          </a:p>
+          <a:p>
+            <a:pPr lvl="3"/>
+            <a:r>
+              <a:rPr lang="en-US"/>
+              <a:t>Fourth level</a:t>
+            </a:r>
+          </a:p>
+          <a:p>
+            <a:pPr lvl="4"/>
+            <a:r>
+              <a:rPr lang="en-US"/>
+              <a:t>Fifth level</a:t>
+            </a:r>
+          </a:p>
+        </p:txBody>
+      </p:sp>
+      <p:sp>
+        <p:nvSpPr>
+          <p:cNvPr id="6" name="Footer Placeholder 5"/>
+          <p:cNvSpPr>
+            <a:spLocks noGrp="1"/>
+          </p:cNvSpPr>
+          <p:nvPr>
+            <p:ph type="ftr" sz="quarter" idx="4"/>
+          </p:nvPr>
+        </p:nvSpPr>
+        <p:spPr>
+          <a:xfrm>
+            <a:off x="0" y="8685213"/>
+            <a:ext cx="2971800" cy="458787"/>
+          </a:xfrm>
+          <a:prstGeom prst="rect">
+            <a:avLst/>
+          </a:prstGeom>
+        </p:spPr>
+        <p:txBody>
+          <a:bodyPr vert="horz" lIns="91440" tIns="45720" rIns="91440" bIns="45720" rtlCol="0" anchor="b"/>
+          <a:lstStyle>
+            <a:lvl1pPr algn="l">
+              <a:defRPr sz="1200"/>
+            </a:lvl1pPr>
+          </a:lstStyle>
+          <a:p>
+            <a:endParaRPr lang="en-US"/>
+          </a:p>
+        </p:txBody>
+      </p:sp>
+      <p:sp>
+        <p:nvSpPr>
+          <p:cNvPr id="7" name="Slide Number Placeholder 6"/>
+          <p:cNvSpPr>
+            <a:spLocks noGrp="1"/>
+          </p:cNvSpPr>
+          <p:nvPr>
+            <p:ph type="sldNum" sz="quarter" idx="5"/>
+          </p:nvPr>
+        </p:nvSpPr>
+        <p:spPr>
+          <a:xfrm>
+            <a:off x="3884613" y="8685213"/>
+            <a:ext cx="2971800" cy="458787"/>
+          </a:xfrm>
+          <a:prstGeom prst="rect">
+            <a:avLst/>
+          </a:prstGeom>
+        </p:spPr>
+        <p:txBody>
+          <a:bodyPr vert="horz" lIns="91440" tIns="45720" rIns="91440" bIns="45720" rtlCol="0" anchor="b"/>
+          <a:lstStyle>
+            <a:lvl1pPr algn="r">
+              <a:defRPr sz="1200"/>
+            </a:lvl1pPr>
+          </a:lstStyle>
+          <a:p>
+            <a:fld id="{10F4E585-D814-41BA-98FD-6258CE8A4337}" type="slidenum">
+              <a:rPr lang="en-US" smtClean="0"/>
+              <a:t>‹#›</a:t>
+            </a:fld>
+            <a:endParaRPr lang="en-US"/>
+          </a:p>
+        </p:txBody>
+      </p:sp>
+    </p:spTree>
+    <p:extLst>
+      <p:ext uri="{BB962C8B-B14F-4D97-AF65-F5344CB8AC3E}">
+        <p14:creationId xmlns:p14="http://schemas.microsoft.com/office/powerpoint/2010/main" val="1889035956"/>
+      </p:ext>
+    </p:extLst>
+  </p:cSld>
+  <p:clrMap bg1="lt1" tx1="dk1" bg2="lt2" tx2="dk2" accent1="accent1" accent2="accent2" accent3="accent3" accent4="accent4" accent5="accent5" accent6="accent6" hlink="hlink" folHlink="folHlink"/>
+  <p:notesStyle>
+    <a:lvl1pPr marL="0" algn="l" defTabSz="914400" rtl="0" eaLnBrk="1" latinLnBrk="0" hangingPunct="1">
+      <a:defRPr sz="1200" kern="1200">
+        <a:solidFill>
+          <a:schemeClr val="tx1"/>
+        </a:solidFill>
+        <a:latin typeface="+mn-lt"/>
+        <a:ea typeface="+mn-ea"/>
+        <a:cs typeface="+mn-cs"/>
+      </a:defRPr>
+    </a:lvl1pPr>
+    <a:lvl2pPr marL="457200" algn="l" defTabSz="914400" rtl="0" eaLnBrk="1" latinLnBrk="0" hangingPunct="1">
+      <a:defRPr sz="1200" kern="1200">
+        <a:solidFill>
+          <a:schemeClr val="tx1"/>
+        </a:solidFill>
+        <a:latin typeface="+mn-lt"/>
+        <a:ea typeface="+mn-ea"/>
+        <a:cs typeface="+mn-cs"/>
+      </a:defRPr>
+    </a:lvl2pPr>
+    <a:lvl3pPr marL="914400" algn="l" defTabSz="914400" rtl="0" eaLnBrk="1" latinLnBrk="0" hangingPunct="1">
+      <a:defRPr sz="1200" kern="1200">
+        <a:solidFill>
+          <a:schemeClr val="tx1"/>
+        </a:solidFill>
+        <a:latin typeface="+mn-lt"/>
+        <a:ea typeface="+mn-ea"/>
+        <a:cs typeface="+mn-cs"/>
+      </a:defRPr>
+    </a:lvl3pPr>
+    <a:lvl4pPr marL="1371600" algn="l" defTabSz="914400" rtl="0" eaLnBrk="1" latinLnBrk="0" hangingPunct="1">
+      <a:defRPr sz="1200" kern="1200">
+        <a:solidFill>
+          <a:schemeClr val="tx1"/>
+        </a:solidFill>
+        <a:latin typeface="+mn-lt"/>
+        <a:ea typeface="+mn-ea"/>
+        <a:cs typeface="+mn-cs"/>
+      </a:defRPr>
+    </a:lvl4pPr>
+    <a:lvl5pPr marL="1828800" algn="l" defTabSz="914400" rtl="0" eaLnBrk="1" latinLnBrk="0" hangingPunct="1">
+      <a:defRPr sz="1200" kern="1200">
+        <a:solidFill>
+          <a:schemeClr val="tx1"/>
+        </a:solidFill>
+        <a:latin typeface="+mn-lt"/>
+        <a:ea typeface="+mn-ea"/>
+        <a:cs typeface="+mn-cs"/>
+      </a:defRPr>
+    </a:lvl5pPr>
+    <a:lvl6pPr marL="2286000" algn="l" defTabSz="914400" rtl="0" eaLnBrk="1" latinLnBrk="0" hangingPunct="1">
+      <a:defRPr sz="1200" kern="1200">
+        <a:solidFill>
+          <a:schemeClr val="tx1"/>
+        </a:solidFill>
+        <a:latin typeface="+mn-lt"/>
+        <a:ea typeface="+mn-ea"/>
+        <a:cs typeface="+mn-cs"/>
+      </a:defRPr>
+    </a:lvl6pPr>
+    <a:lvl7pPr marL="2743200" algn="l" defTabSz="914400" rtl="0" eaLnBrk="1" latinLnBrk="0" hangingPunct="1">
+      <a:defRPr sz="1200" kern="1200">
+        <a:solidFill>
+          <a:schemeClr val="tx1"/>
+        </a:solidFill>
+        <a:latin typeface="+mn-lt"/>
+        <a:ea typeface="+mn-ea"/>
+        <a:cs typeface="+mn-cs"/>
+      </a:defRPr>
+    </a:lvl7pPr>
+    <a:lvl8pPr marL="3200400" algn="l" defTabSz="914400" rtl="0" eaLnBrk="1" latinLnBrk="0" hangingPunct="1">
+      <a:defRPr sz="1200" kern="1200">
+        <a:solidFill>
+          <a:schemeClr val="tx1"/>
+        </a:solidFill>
+        <a:latin typeface="+mn-lt"/>
+        <a:ea typeface="+mn-ea"/>
+        <a:cs typeface="+mn-cs"/>
+      </a:defRPr>
+    </a:lvl8pPr>
+    <a:lvl9pPr marL="3657600" algn="l" defTabSz="914400" rtl="0" eaLnBrk="1" latinLnBrk="0" hangingPunct="1">
+      <a:defRPr sz="1200" kern="1200">
+        <a:solidFill>
+          <a:schemeClr val="tx1"/>
+        </a:solidFill>
+        <a:latin typeface="+mn-lt"/>
+        <a:ea typeface="+mn-ea"/>
+        <a:cs typeface="+mn-cs"/>
+      </a:defRPr>
+    </a:lvl9pPr>
+  </p:notesStyle>
+</p:notesMaster>
+</file>
+
+<file path=ppt/notesSlides/notesSlide1.xml><?xml version="1.0" encoding="utf-8"?>
+<p:notes xmlns:a="http://schemas.openxmlformats.org/drawingml/2006/main" xmlns:r="http://schemas.openxmlformats.org/officeDocument/2006/relationships" xmlns:p="http://schemas.openxmlformats.org/presentationml/2006/main">
+  <p:cSld>
+    <p:spTree>
+      <p:nvGrpSpPr>
+        <p:cNvPr id="1" name=""/>
+        <p:cNvGrpSpPr/>
+        <p:nvPr/>
+      </p:nvGrpSpPr>
+      <p:grpSpPr>
+        <a:xfrm>
+          <a:off x="0" y="0"/>
+          <a:ext cx="0" cy="0"/>
+          <a:chOff x="0" y="0"/>
+          <a:chExt cx="0" cy="0"/>
+        </a:xfrm>
+      </p:grpSpPr>
+      <p:sp>
+        <p:nvSpPr>
+          <p:cNvPr id="2" name="Slide Image Placeholder 1"/>
+          <p:cNvSpPr>
+            <a:spLocks noGrp="1" noRot="1" noChangeAspect="1"/>
+          </p:cNvSpPr>
+          <p:nvPr>
+            <p:ph type="sldImg"/>
+          </p:nvPr>
+        </p:nvSpPr>
+        <p:spPr/>
+      </p:sp>
+      <p:sp>
+        <p:nvSpPr>
+          <p:cNvPr id="3" name="Notes Placeholder 2"/>
+          <p:cNvSpPr>
+            <a:spLocks noGrp="1"/>
+          </p:cNvSpPr>
+          <p:nvPr>
+            <p:ph type="body" idx="1"/>
+          </p:nvPr>
+        </p:nvSpPr>
+        <p:spPr/>
+        <p:txBody>
+          <a:bodyPr/>
+          <a:lstStyle/>
+          <a:p>
+            <a:pPr algn="l"/>
+            <a:r>
+              <a:rPr lang="en-US" b="0" i="0" dirty="0">
+                <a:solidFill>
+                  <a:srgbClr val="D1D5DB"/>
+                </a:solidFill>
+                <a:effectLst/>
+                <a:latin typeface="Söhne"/>
+              </a:rPr>
+              <a:t>The history of social media can be traced back to the late 1960s with the advent of computer-based communication technologies such as email and bulletin board systems (BBS). These early forms of online communication allowed users to send messages and share information, but they were limited to text-based communication and lacked the multimedia features and user-friendly interfaces that are now common in social media.</a:t>
+            </a:r>
+          </a:p>
+          <a:p>
+            <a:pPr algn="l"/>
+            <a:r>
+              <a:rPr lang="en-US" b="0" i="0" dirty="0">
+                <a:solidFill>
+                  <a:srgbClr val="D1D5DB"/>
+                </a:solidFill>
+                <a:effectLst/>
+                <a:latin typeface="Söhne"/>
+              </a:rPr>
+              <a:t>In 1997, the social networking site Six Degrees was launched, allowing users to create profiles and connect with friends. However, it was not until the launch of Myspace in 2003 and Facebook in 2004 that social media began to gain widespread popularity. Over the next decade, a multitude of new social media platforms emerged, including YouTube, Twitter, Instagram, and Snapchat, among others.</a:t>
+            </a:r>
+          </a:p>
+          <a:p>
+            <a:pPr algn="l"/>
+            <a:r>
+              <a:rPr lang="en-US" b="0" i="0" dirty="0">
+                <a:solidFill>
+                  <a:srgbClr val="D1D5DB"/>
+                </a:solidFill>
+                <a:effectLst/>
+                <a:latin typeface="Söhne"/>
+              </a:rPr>
+              <a:t>Social media has had a profound impact on society, transforming the way people communicate, consume news and information, and engage with brands and businesses. It has also raised important questions about privacy, data protection, and the spread of misinformation. </a:t>
+            </a:r>
+            <a:r>
+              <a:rPr lang="en-US" b="0" i="0">
+                <a:solidFill>
+                  <a:srgbClr val="D1D5DB"/>
+                </a:solidFill>
+                <a:effectLst/>
+                <a:latin typeface="Söhne"/>
+              </a:rPr>
+              <a:t>Despite these challenges, social media continues to grow in popularity and remains an integral part of the modern digital landscape.</a:t>
+            </a:r>
+          </a:p>
+          <a:p>
+            <a:endParaRPr lang="en-US"/>
+          </a:p>
+        </p:txBody>
+      </p:sp>
+      <p:sp>
+        <p:nvSpPr>
+          <p:cNvPr id="4" name="Slide Number Placeholder 3"/>
+          <p:cNvSpPr>
+            <a:spLocks noGrp="1"/>
+          </p:cNvSpPr>
+          <p:nvPr>
+            <p:ph type="sldNum" sz="quarter" idx="5"/>
+          </p:nvPr>
+        </p:nvSpPr>
+        <p:spPr/>
+        <p:txBody>
+          <a:bodyPr/>
+          <a:lstStyle/>
+          <a:p>
+            <a:fld id="{10F4E585-D814-41BA-98FD-6258CE8A4337}" type="slidenum">
+              <a:rPr lang="en-US" smtClean="0"/>
+              <a:t>5</a:t>
+            </a:fld>
+            <a:endParaRPr lang="en-US"/>
+          </a:p>
+        </p:txBody>
+      </p:sp>
+    </p:spTree>
+    <p:extLst>
+      <p:ext uri="{BB962C8B-B14F-4D97-AF65-F5344CB8AC3E}">
+        <p14:creationId xmlns:p14="http://schemas.microsoft.com/office/powerpoint/2010/main" val="1421348559"/>
+      </p:ext>
+    </p:extLst>
+  </p:cSld>
+  <p:clrMapOvr>
+    <a:masterClrMapping/>
+  </p:clrMapOvr>
+</p:notes>
 </file>
 
 <file path=ppt/slideLayouts/slideLayout1.xml><?xml version="1.0" encoding="utf-8"?>
@@ -3839,6 +4326,14 @@
 <file path=ppt/slides/slide2.xml><?xml version="1.0" encoding="utf-8"?>
 <p:sld xmlns:a="http://schemas.openxmlformats.org/drawingml/2006/main" xmlns:r="http://schemas.openxmlformats.org/officeDocument/2006/relationships" xmlns:p="http://schemas.openxmlformats.org/presentationml/2006/main">
   <p:cSld>
+    <p:bg>
+      <p:bgPr>
+        <a:solidFill>
+          <a:schemeClr val="bg1"/>
+        </a:solidFill>
+        <a:effectLst/>
+      </p:bgPr>
+    </p:bg>
     <p:spTree>
       <p:nvGrpSpPr>
         <p:cNvPr id="1" name=""/>
@@ -3853,6 +4348,1031 @@
           <a:chExt cx="0" cy="0"/>
         </a:xfrm>
       </p:grpSpPr>
+      <p:sp useBgFill="1">
+        <p:nvSpPr>
+          <p:cNvPr id="15" name="Rectangle 14">
+            <a:extLst>
+              <a:ext uri="{FF2B5EF4-FFF2-40B4-BE49-F238E27FC236}">
+                <a16:creationId xmlns:a16="http://schemas.microsoft.com/office/drawing/2014/main" id="{17718681-A12E-49D6-9925-DD7C68176D61}"/>
+              </a:ext>
+              <a:ext uri="{C183D7F6-B498-43B3-948B-1728B52AA6E4}">
+                <adec:decorative xmlns:adec="http://schemas.microsoft.com/office/drawing/2017/decorative" val="1"/>
+              </a:ext>
+            </a:extLst>
+          </p:cNvPr>
+          <p:cNvSpPr>
+            <a:spLocks noGrp="1" noRot="1" noChangeAspect="1" noMove="1" noResize="1" noEditPoints="1" noAdjustHandles="1" noChangeArrowheads="1" noChangeShapeType="1" noTextEdit="1"/>
+          </p:cNvSpPr>
+          <p:nvPr>
+            <p:extLst>
+              <p:ext uri="{386F3935-93C4-4BCD-93E2-E3B085C9AB24}">
+                <p16:designElem xmlns:p16="http://schemas.microsoft.com/office/powerpoint/2015/main" val="1"/>
+              </p:ext>
+            </p:extLst>
+          </p:nvPr>
+        </p:nvSpPr>
+        <p:spPr>
+          <a:xfrm>
+            <a:off x="0" y="0"/>
+            <a:ext cx="12188952" cy="6858000"/>
+          </a:xfrm>
+          <a:prstGeom prst="rect">
+            <a:avLst/>
+          </a:prstGeom>
+          <a:ln>
+            <a:noFill/>
+          </a:ln>
+        </p:spPr>
+        <p:style>
+          <a:lnRef idx="2">
+            <a:schemeClr val="accent1">
+              <a:shade val="50000"/>
+            </a:schemeClr>
+          </a:lnRef>
+          <a:fillRef idx="1">
+            <a:schemeClr val="accent1"/>
+          </a:fillRef>
+          <a:effectRef idx="0">
+            <a:schemeClr val="accent1"/>
+          </a:effectRef>
+          <a:fontRef idx="minor">
+            <a:schemeClr val="lt1"/>
+          </a:fontRef>
+        </p:style>
+        <p:txBody>
+          <a:bodyPr rtlCol="0" anchor="ctr"/>
+          <a:lstStyle/>
+          <a:p>
+            <a:pPr algn="ctr"/>
+            <a:endParaRPr lang="en-US"/>
+          </a:p>
+        </p:txBody>
+      </p:sp>
+      <p:sp>
+        <p:nvSpPr>
+          <p:cNvPr id="17" name="Freeform: Shape 16">
+            <a:extLst>
+              <a:ext uri="{FF2B5EF4-FFF2-40B4-BE49-F238E27FC236}">
+                <a16:creationId xmlns:a16="http://schemas.microsoft.com/office/drawing/2014/main" id="{FBD77573-9EF2-4C35-8285-A1CF6FBB0EA5}"/>
+              </a:ext>
+              <a:ext uri="{C183D7F6-B498-43B3-948B-1728B52AA6E4}">
+                <adec:decorative xmlns:adec="http://schemas.microsoft.com/office/drawing/2017/decorative" val="1"/>
+              </a:ext>
+            </a:extLst>
+          </p:cNvPr>
+          <p:cNvSpPr>
+            <a:spLocks noGrp="1" noRot="1" noChangeAspect="1" noMove="1" noResize="1" noEditPoints="1" noAdjustHandles="1" noChangeArrowheads="1" noChangeShapeType="1" noTextEdit="1"/>
+          </p:cNvSpPr>
+          <p:nvPr>
+            <p:extLst>
+              <p:ext uri="{386F3935-93C4-4BCD-93E2-E3B085C9AB24}">
+                <p16:designElem xmlns:p16="http://schemas.microsoft.com/office/powerpoint/2015/main" val="1"/>
+              </p:ext>
+            </p:extLst>
+          </p:nvPr>
+        </p:nvSpPr>
+        <p:spPr>
+          <a:xfrm flipH="1">
+            <a:off x="1" y="0"/>
+            <a:ext cx="5511704" cy="6858000"/>
+          </a:xfrm>
+          <a:custGeom>
+            <a:avLst/>
+            <a:gdLst>
+              <a:gd name="connsiteX0" fmla="*/ 5511704 w 5511704"/>
+              <a:gd name="connsiteY0" fmla="*/ 0 h 6886576"/>
+              <a:gd name="connsiteX1" fmla="*/ 1008599 w 5511704"/>
+              <a:gd name="connsiteY1" fmla="*/ 0 h 6886576"/>
+              <a:gd name="connsiteX2" fmla="*/ 1310975 w 5511704"/>
+              <a:gd name="connsiteY2" fmla="*/ 110728 h 6886576"/>
+              <a:gd name="connsiteX3" fmla="*/ 1267362 w 5511704"/>
+              <a:gd name="connsiteY3" fmla="*/ 135731 h 6886576"/>
+              <a:gd name="connsiteX4" fmla="*/ 1005692 w 5511704"/>
+              <a:gd name="connsiteY4" fmla="*/ 71437 h 6886576"/>
+              <a:gd name="connsiteX5" fmla="*/ 953358 w 5511704"/>
+              <a:gd name="connsiteY5" fmla="*/ 89297 h 6886576"/>
+              <a:gd name="connsiteX6" fmla="*/ 979525 w 5511704"/>
+              <a:gd name="connsiteY6" fmla="*/ 164307 h 6886576"/>
+              <a:gd name="connsiteX7" fmla="*/ 1092915 w 5511704"/>
+              <a:gd name="connsiteY7" fmla="*/ 192882 h 6886576"/>
+              <a:gd name="connsiteX8" fmla="*/ 1270270 w 5511704"/>
+              <a:gd name="connsiteY8" fmla="*/ 375047 h 6886576"/>
+              <a:gd name="connsiteX9" fmla="*/ 1002784 w 5511704"/>
+              <a:gd name="connsiteY9" fmla="*/ 353615 h 6886576"/>
+              <a:gd name="connsiteX10" fmla="*/ 956265 w 5511704"/>
+              <a:gd name="connsiteY10" fmla="*/ 396479 h 6886576"/>
+              <a:gd name="connsiteX11" fmla="*/ 938820 w 5511704"/>
+              <a:gd name="connsiteY11" fmla="*/ 453629 h 6886576"/>
+              <a:gd name="connsiteX12" fmla="*/ 860319 w 5511704"/>
+              <a:gd name="connsiteY12" fmla="*/ 360759 h 6886576"/>
+              <a:gd name="connsiteX13" fmla="*/ 793447 w 5511704"/>
+              <a:gd name="connsiteY13" fmla="*/ 335757 h 6886576"/>
+              <a:gd name="connsiteX14" fmla="*/ 773095 w 5511704"/>
+              <a:gd name="connsiteY14" fmla="*/ 417910 h 6886576"/>
+              <a:gd name="connsiteX15" fmla="*/ 834151 w 5511704"/>
+              <a:gd name="connsiteY15" fmla="*/ 507206 h 6886576"/>
+              <a:gd name="connsiteX16" fmla="*/ 996969 w 5511704"/>
+              <a:gd name="connsiteY16" fmla="*/ 560785 h 6886576"/>
+              <a:gd name="connsiteX17" fmla="*/ 822522 w 5511704"/>
+              <a:gd name="connsiteY17" fmla="*/ 560785 h 6886576"/>
+              <a:gd name="connsiteX18" fmla="*/ 621908 w 5511704"/>
+              <a:gd name="connsiteY18" fmla="*/ 525066 h 6886576"/>
+              <a:gd name="connsiteX19" fmla="*/ 409664 w 5511704"/>
+              <a:gd name="connsiteY19" fmla="*/ 535781 h 6886576"/>
+              <a:gd name="connsiteX20" fmla="*/ 209049 w 5511704"/>
+              <a:gd name="connsiteY20" fmla="*/ 464344 h 6886576"/>
+              <a:gd name="connsiteX21" fmla="*/ 5527 w 5511704"/>
+              <a:gd name="connsiteY21" fmla="*/ 467916 h 6886576"/>
+              <a:gd name="connsiteX22" fmla="*/ 906838 w 5511704"/>
+              <a:gd name="connsiteY22" fmla="*/ 914400 h 6886576"/>
+              <a:gd name="connsiteX23" fmla="*/ 863226 w 5511704"/>
+              <a:gd name="connsiteY23" fmla="*/ 925116 h 6886576"/>
+              <a:gd name="connsiteX24" fmla="*/ 805077 w 5511704"/>
+              <a:gd name="connsiteY24" fmla="*/ 953691 h 6886576"/>
+              <a:gd name="connsiteX25" fmla="*/ 848689 w 5511704"/>
+              <a:gd name="connsiteY25" fmla="*/ 1010841 h 6886576"/>
+              <a:gd name="connsiteX26" fmla="*/ 1084193 w 5511704"/>
+              <a:gd name="connsiteY26" fmla="*/ 1117997 h 6886576"/>
+              <a:gd name="connsiteX27" fmla="*/ 1142342 w 5511704"/>
+              <a:gd name="connsiteY27" fmla="*/ 1225153 h 6886576"/>
+              <a:gd name="connsiteX28" fmla="*/ 1069655 w 5511704"/>
+              <a:gd name="connsiteY28" fmla="*/ 1214438 h 6886576"/>
+              <a:gd name="connsiteX29" fmla="*/ 1005692 w 5511704"/>
+              <a:gd name="connsiteY29" fmla="*/ 1235869 h 6886576"/>
+              <a:gd name="connsiteX30" fmla="*/ 1031858 w 5511704"/>
+              <a:gd name="connsiteY30" fmla="*/ 1371600 h 6886576"/>
+              <a:gd name="connsiteX31" fmla="*/ 1366216 w 5511704"/>
+              <a:gd name="connsiteY31" fmla="*/ 1546622 h 6886576"/>
+              <a:gd name="connsiteX32" fmla="*/ 1395290 w 5511704"/>
+              <a:gd name="connsiteY32" fmla="*/ 1603772 h 6886576"/>
+              <a:gd name="connsiteX33" fmla="*/ 1354586 w 5511704"/>
+              <a:gd name="connsiteY33" fmla="*/ 1643063 h 6886576"/>
+              <a:gd name="connsiteX34" fmla="*/ 1247011 w 5511704"/>
+              <a:gd name="connsiteY34" fmla="*/ 1664494 h 6886576"/>
+              <a:gd name="connsiteX35" fmla="*/ 1398198 w 5511704"/>
+              <a:gd name="connsiteY35" fmla="*/ 1857375 h 6886576"/>
+              <a:gd name="connsiteX36" fmla="*/ 1453440 w 5511704"/>
+              <a:gd name="connsiteY36" fmla="*/ 1910954 h 6886576"/>
+              <a:gd name="connsiteX37" fmla="*/ 1549386 w 5511704"/>
+              <a:gd name="connsiteY37" fmla="*/ 1993106 h 6886576"/>
+              <a:gd name="connsiteX38" fmla="*/ 1549386 w 5511704"/>
+              <a:gd name="connsiteY38" fmla="*/ 2021681 h 6886576"/>
+              <a:gd name="connsiteX39" fmla="*/ 1421458 w 5511704"/>
+              <a:gd name="connsiteY39" fmla="*/ 2110978 h 6886576"/>
+              <a:gd name="connsiteX40" fmla="*/ 1188861 w 5511704"/>
+              <a:gd name="connsiteY40" fmla="*/ 2085976 h 6886576"/>
+              <a:gd name="connsiteX41" fmla="*/ 1531941 w 5511704"/>
+              <a:gd name="connsiteY41" fmla="*/ 2218135 h 6886576"/>
+              <a:gd name="connsiteX42" fmla="*/ 421293 w 5511704"/>
+              <a:gd name="connsiteY42" fmla="*/ 1900238 h 6886576"/>
+              <a:gd name="connsiteX43" fmla="*/ 491072 w 5511704"/>
+              <a:gd name="connsiteY43" fmla="*/ 1982391 h 6886576"/>
+              <a:gd name="connsiteX44" fmla="*/ 880671 w 5511704"/>
+              <a:gd name="connsiteY44" fmla="*/ 2200276 h 6886576"/>
+              <a:gd name="connsiteX45" fmla="*/ 991154 w 5511704"/>
+              <a:gd name="connsiteY45" fmla="*/ 2336007 h 6886576"/>
+              <a:gd name="connsiteX46" fmla="*/ 1107453 w 5511704"/>
+              <a:gd name="connsiteY46" fmla="*/ 2411016 h 6886576"/>
+              <a:gd name="connsiteX47" fmla="*/ 1270270 w 5511704"/>
+              <a:gd name="connsiteY47" fmla="*/ 2411016 h 6886576"/>
+              <a:gd name="connsiteX48" fmla="*/ 1386568 w 5511704"/>
+              <a:gd name="connsiteY48" fmla="*/ 2528889 h 6886576"/>
+              <a:gd name="connsiteX49" fmla="*/ 1267362 w 5511704"/>
+              <a:gd name="connsiteY49" fmla="*/ 2553891 h 6886576"/>
+              <a:gd name="connsiteX50" fmla="*/ 1127805 w 5511704"/>
+              <a:gd name="connsiteY50" fmla="*/ 2536032 h 6886576"/>
+              <a:gd name="connsiteX51" fmla="*/ 970802 w 5511704"/>
+              <a:gd name="connsiteY51" fmla="*/ 2575322 h 6886576"/>
+              <a:gd name="connsiteX52" fmla="*/ 825429 w 5511704"/>
+              <a:gd name="connsiteY52" fmla="*/ 2543176 h 6886576"/>
+              <a:gd name="connsiteX53" fmla="*/ 650982 w 5511704"/>
+              <a:gd name="connsiteY53" fmla="*/ 2564607 h 6886576"/>
+              <a:gd name="connsiteX54" fmla="*/ 595740 w 5511704"/>
+              <a:gd name="connsiteY54" fmla="*/ 2703909 h 6886576"/>
+              <a:gd name="connsiteX55" fmla="*/ 578296 w 5511704"/>
+              <a:gd name="connsiteY55" fmla="*/ 2714626 h 6886576"/>
+              <a:gd name="connsiteX56" fmla="*/ 255568 w 5511704"/>
+              <a:gd name="connsiteY56" fmla="*/ 2936081 h 6886576"/>
+              <a:gd name="connsiteX57" fmla="*/ 165437 w 5511704"/>
+              <a:gd name="connsiteY57" fmla="*/ 2953941 h 6886576"/>
+              <a:gd name="connsiteX58" fmla="*/ 697501 w 5511704"/>
+              <a:gd name="connsiteY58" fmla="*/ 3343275 h 6886576"/>
+              <a:gd name="connsiteX59" fmla="*/ 339884 w 5511704"/>
+              <a:gd name="connsiteY59" fmla="*/ 3243263 h 6886576"/>
+              <a:gd name="connsiteX60" fmla="*/ 290458 w 5511704"/>
+              <a:gd name="connsiteY60" fmla="*/ 3407569 h 6886576"/>
+              <a:gd name="connsiteX61" fmla="*/ 459090 w 5511704"/>
+              <a:gd name="connsiteY61" fmla="*/ 3554016 h 6886576"/>
+              <a:gd name="connsiteX62" fmla="*/ 520147 w 5511704"/>
+              <a:gd name="connsiteY62" fmla="*/ 3843338 h 6886576"/>
+              <a:gd name="connsiteX63" fmla="*/ 491072 w 5511704"/>
+              <a:gd name="connsiteY63" fmla="*/ 4107657 h 6886576"/>
+              <a:gd name="connsiteX64" fmla="*/ 418386 w 5511704"/>
+              <a:gd name="connsiteY64" fmla="*/ 4189810 h 6886576"/>
+              <a:gd name="connsiteX65" fmla="*/ 313718 w 5511704"/>
+              <a:gd name="connsiteY65" fmla="*/ 4339829 h 6886576"/>
+              <a:gd name="connsiteX66" fmla="*/ 249753 w 5511704"/>
+              <a:gd name="connsiteY66" fmla="*/ 4432698 h 6886576"/>
+              <a:gd name="connsiteX67" fmla="*/ 25879 w 5511704"/>
+              <a:gd name="connsiteY67" fmla="*/ 4396979 h 6886576"/>
+              <a:gd name="connsiteX68" fmla="*/ 325347 w 5511704"/>
+              <a:gd name="connsiteY68" fmla="*/ 4632722 h 6886576"/>
+              <a:gd name="connsiteX69" fmla="*/ 84029 w 5511704"/>
+              <a:gd name="connsiteY69" fmla="*/ 4604147 h 6886576"/>
+              <a:gd name="connsiteX70" fmla="*/ 5527 w 5511704"/>
+              <a:gd name="connsiteY70" fmla="*/ 4622007 h 6886576"/>
+              <a:gd name="connsiteX71" fmla="*/ 49139 w 5511704"/>
+              <a:gd name="connsiteY71" fmla="*/ 4697016 h 6886576"/>
+              <a:gd name="connsiteX72" fmla="*/ 226494 w 5511704"/>
+              <a:gd name="connsiteY72" fmla="*/ 4825604 h 6886576"/>
+              <a:gd name="connsiteX73" fmla="*/ 592833 w 5511704"/>
+              <a:gd name="connsiteY73" fmla="*/ 5175647 h 6886576"/>
+              <a:gd name="connsiteX74" fmla="*/ 238123 w 5511704"/>
+              <a:gd name="connsiteY74" fmla="*/ 5014913 h 6886576"/>
+              <a:gd name="connsiteX75" fmla="*/ 610278 w 5511704"/>
+              <a:gd name="connsiteY75" fmla="*/ 5375673 h 6886576"/>
+              <a:gd name="connsiteX76" fmla="*/ 691686 w 5511704"/>
+              <a:gd name="connsiteY76" fmla="*/ 5497116 h 6886576"/>
+              <a:gd name="connsiteX77" fmla="*/ 860319 w 5511704"/>
+              <a:gd name="connsiteY77" fmla="*/ 5793582 h 6886576"/>
+              <a:gd name="connsiteX78" fmla="*/ 851597 w 5511704"/>
+              <a:gd name="connsiteY78" fmla="*/ 5825729 h 6886576"/>
+              <a:gd name="connsiteX79" fmla="*/ 659704 w 5511704"/>
+              <a:gd name="connsiteY79" fmla="*/ 5779295 h 6886576"/>
+              <a:gd name="connsiteX80" fmla="*/ 909746 w 5511704"/>
+              <a:gd name="connsiteY80" fmla="*/ 6029326 h 6886576"/>
+              <a:gd name="connsiteX81" fmla="*/ 1168509 w 5511704"/>
+              <a:gd name="connsiteY81" fmla="*/ 6222207 h 6886576"/>
+              <a:gd name="connsiteX82" fmla="*/ 985339 w 5511704"/>
+              <a:gd name="connsiteY82" fmla="*/ 6193632 h 6886576"/>
+              <a:gd name="connsiteX83" fmla="*/ 732391 w 5511704"/>
+              <a:gd name="connsiteY83" fmla="*/ 6082904 h 6886576"/>
+              <a:gd name="connsiteX84" fmla="*/ 645167 w 5511704"/>
+              <a:gd name="connsiteY84" fmla="*/ 6125766 h 6886576"/>
+              <a:gd name="connsiteX85" fmla="*/ 883579 w 5511704"/>
+              <a:gd name="connsiteY85" fmla="*/ 6307932 h 6886576"/>
+              <a:gd name="connsiteX86" fmla="*/ 1020229 w 5511704"/>
+              <a:gd name="connsiteY86" fmla="*/ 6393657 h 6886576"/>
+              <a:gd name="connsiteX87" fmla="*/ 1075471 w 5511704"/>
+              <a:gd name="connsiteY87" fmla="*/ 6457950 h 6886576"/>
+              <a:gd name="connsiteX88" fmla="*/ 1232473 w 5511704"/>
+              <a:gd name="connsiteY88" fmla="*/ 6686551 h 6886576"/>
+              <a:gd name="connsiteX89" fmla="*/ 1592997 w 5511704"/>
+              <a:gd name="connsiteY89" fmla="*/ 6886576 h 6886576"/>
+              <a:gd name="connsiteX90" fmla="*/ 5511704 w 5511704"/>
+              <a:gd name="connsiteY90" fmla="*/ 6886576 h 6886576"/>
+            </a:gdLst>
+            <a:ahLst/>
+            <a:cxnLst>
+              <a:cxn ang="0">
+                <a:pos x="connsiteX0" y="connsiteY0"/>
+              </a:cxn>
+              <a:cxn ang="0">
+                <a:pos x="connsiteX1" y="connsiteY1"/>
+              </a:cxn>
+              <a:cxn ang="0">
+                <a:pos x="connsiteX2" y="connsiteY2"/>
+              </a:cxn>
+              <a:cxn ang="0">
+                <a:pos x="connsiteX3" y="connsiteY3"/>
+              </a:cxn>
+              <a:cxn ang="0">
+                <a:pos x="connsiteX4" y="connsiteY4"/>
+              </a:cxn>
+              <a:cxn ang="0">
+                <a:pos x="connsiteX5" y="connsiteY5"/>
+              </a:cxn>
+              <a:cxn ang="0">
+                <a:pos x="connsiteX6" y="connsiteY6"/>
+              </a:cxn>
+              <a:cxn ang="0">
+                <a:pos x="connsiteX7" y="connsiteY7"/>
+              </a:cxn>
+              <a:cxn ang="0">
+                <a:pos x="connsiteX8" y="connsiteY8"/>
+              </a:cxn>
+              <a:cxn ang="0">
+                <a:pos x="connsiteX9" y="connsiteY9"/>
+              </a:cxn>
+              <a:cxn ang="0">
+                <a:pos x="connsiteX10" y="connsiteY10"/>
+              </a:cxn>
+              <a:cxn ang="0">
+                <a:pos x="connsiteX11" y="connsiteY11"/>
+              </a:cxn>
+              <a:cxn ang="0">
+                <a:pos x="connsiteX12" y="connsiteY12"/>
+              </a:cxn>
+              <a:cxn ang="0">
+                <a:pos x="connsiteX13" y="connsiteY13"/>
+              </a:cxn>
+              <a:cxn ang="0">
+                <a:pos x="connsiteX14" y="connsiteY14"/>
+              </a:cxn>
+              <a:cxn ang="0">
+                <a:pos x="connsiteX15" y="connsiteY15"/>
+              </a:cxn>
+              <a:cxn ang="0">
+                <a:pos x="connsiteX16" y="connsiteY16"/>
+              </a:cxn>
+              <a:cxn ang="0">
+                <a:pos x="connsiteX17" y="connsiteY17"/>
+              </a:cxn>
+              <a:cxn ang="0">
+                <a:pos x="connsiteX18" y="connsiteY18"/>
+              </a:cxn>
+              <a:cxn ang="0">
+                <a:pos x="connsiteX19" y="connsiteY19"/>
+              </a:cxn>
+              <a:cxn ang="0">
+                <a:pos x="connsiteX20" y="connsiteY20"/>
+              </a:cxn>
+              <a:cxn ang="0">
+                <a:pos x="connsiteX21" y="connsiteY21"/>
+              </a:cxn>
+              <a:cxn ang="0">
+                <a:pos x="connsiteX22" y="connsiteY22"/>
+              </a:cxn>
+              <a:cxn ang="0">
+                <a:pos x="connsiteX23" y="connsiteY23"/>
+              </a:cxn>
+              <a:cxn ang="0">
+                <a:pos x="connsiteX24" y="connsiteY24"/>
+              </a:cxn>
+              <a:cxn ang="0">
+                <a:pos x="connsiteX25" y="connsiteY25"/>
+              </a:cxn>
+              <a:cxn ang="0">
+                <a:pos x="connsiteX26" y="connsiteY26"/>
+              </a:cxn>
+              <a:cxn ang="0">
+                <a:pos x="connsiteX27" y="connsiteY27"/>
+              </a:cxn>
+              <a:cxn ang="0">
+                <a:pos x="connsiteX28" y="connsiteY28"/>
+              </a:cxn>
+              <a:cxn ang="0">
+                <a:pos x="connsiteX29" y="connsiteY29"/>
+              </a:cxn>
+              <a:cxn ang="0">
+                <a:pos x="connsiteX30" y="connsiteY30"/>
+              </a:cxn>
+              <a:cxn ang="0">
+                <a:pos x="connsiteX31" y="connsiteY31"/>
+              </a:cxn>
+              <a:cxn ang="0">
+                <a:pos x="connsiteX32" y="connsiteY32"/>
+              </a:cxn>
+              <a:cxn ang="0">
+                <a:pos x="connsiteX33" y="connsiteY33"/>
+              </a:cxn>
+              <a:cxn ang="0">
+                <a:pos x="connsiteX34" y="connsiteY34"/>
+              </a:cxn>
+              <a:cxn ang="0">
+                <a:pos x="connsiteX35" y="connsiteY35"/>
+              </a:cxn>
+              <a:cxn ang="0">
+                <a:pos x="connsiteX36" y="connsiteY36"/>
+              </a:cxn>
+              <a:cxn ang="0">
+                <a:pos x="connsiteX37" y="connsiteY37"/>
+              </a:cxn>
+              <a:cxn ang="0">
+                <a:pos x="connsiteX38" y="connsiteY38"/>
+              </a:cxn>
+              <a:cxn ang="0">
+                <a:pos x="connsiteX39" y="connsiteY39"/>
+              </a:cxn>
+              <a:cxn ang="0">
+                <a:pos x="connsiteX40" y="connsiteY40"/>
+              </a:cxn>
+              <a:cxn ang="0">
+                <a:pos x="connsiteX41" y="connsiteY41"/>
+              </a:cxn>
+              <a:cxn ang="0">
+                <a:pos x="connsiteX42" y="connsiteY42"/>
+              </a:cxn>
+              <a:cxn ang="0">
+                <a:pos x="connsiteX43" y="connsiteY43"/>
+              </a:cxn>
+              <a:cxn ang="0">
+                <a:pos x="connsiteX44" y="connsiteY44"/>
+              </a:cxn>
+              <a:cxn ang="0">
+                <a:pos x="connsiteX45" y="connsiteY45"/>
+              </a:cxn>
+              <a:cxn ang="0">
+                <a:pos x="connsiteX46" y="connsiteY46"/>
+              </a:cxn>
+              <a:cxn ang="0">
+                <a:pos x="connsiteX47" y="connsiteY47"/>
+              </a:cxn>
+              <a:cxn ang="0">
+                <a:pos x="connsiteX48" y="connsiteY48"/>
+              </a:cxn>
+              <a:cxn ang="0">
+                <a:pos x="connsiteX49" y="connsiteY49"/>
+              </a:cxn>
+              <a:cxn ang="0">
+                <a:pos x="connsiteX50" y="connsiteY50"/>
+              </a:cxn>
+              <a:cxn ang="0">
+                <a:pos x="connsiteX51" y="connsiteY51"/>
+              </a:cxn>
+              <a:cxn ang="0">
+                <a:pos x="connsiteX52" y="connsiteY52"/>
+              </a:cxn>
+              <a:cxn ang="0">
+                <a:pos x="connsiteX53" y="connsiteY53"/>
+              </a:cxn>
+              <a:cxn ang="0">
+                <a:pos x="connsiteX54" y="connsiteY54"/>
+              </a:cxn>
+              <a:cxn ang="0">
+                <a:pos x="connsiteX55" y="connsiteY55"/>
+              </a:cxn>
+              <a:cxn ang="0">
+                <a:pos x="connsiteX56" y="connsiteY56"/>
+              </a:cxn>
+              <a:cxn ang="0">
+                <a:pos x="connsiteX57" y="connsiteY57"/>
+              </a:cxn>
+              <a:cxn ang="0">
+                <a:pos x="connsiteX58" y="connsiteY58"/>
+              </a:cxn>
+              <a:cxn ang="0">
+                <a:pos x="connsiteX59" y="connsiteY59"/>
+              </a:cxn>
+              <a:cxn ang="0">
+                <a:pos x="connsiteX60" y="connsiteY60"/>
+              </a:cxn>
+              <a:cxn ang="0">
+                <a:pos x="connsiteX61" y="connsiteY61"/>
+              </a:cxn>
+              <a:cxn ang="0">
+                <a:pos x="connsiteX62" y="connsiteY62"/>
+              </a:cxn>
+              <a:cxn ang="0">
+                <a:pos x="connsiteX63" y="connsiteY63"/>
+              </a:cxn>
+              <a:cxn ang="0">
+                <a:pos x="connsiteX64" y="connsiteY64"/>
+              </a:cxn>
+              <a:cxn ang="0">
+                <a:pos x="connsiteX65" y="connsiteY65"/>
+              </a:cxn>
+              <a:cxn ang="0">
+                <a:pos x="connsiteX66" y="connsiteY66"/>
+              </a:cxn>
+              <a:cxn ang="0">
+                <a:pos x="connsiteX67" y="connsiteY67"/>
+              </a:cxn>
+              <a:cxn ang="0">
+                <a:pos x="connsiteX68" y="connsiteY68"/>
+              </a:cxn>
+              <a:cxn ang="0">
+                <a:pos x="connsiteX69" y="connsiteY69"/>
+              </a:cxn>
+              <a:cxn ang="0">
+                <a:pos x="connsiteX70" y="connsiteY70"/>
+              </a:cxn>
+              <a:cxn ang="0">
+                <a:pos x="connsiteX71" y="connsiteY71"/>
+              </a:cxn>
+              <a:cxn ang="0">
+                <a:pos x="connsiteX72" y="connsiteY72"/>
+              </a:cxn>
+              <a:cxn ang="0">
+                <a:pos x="connsiteX73" y="connsiteY73"/>
+              </a:cxn>
+              <a:cxn ang="0">
+                <a:pos x="connsiteX74" y="connsiteY74"/>
+              </a:cxn>
+              <a:cxn ang="0">
+                <a:pos x="connsiteX75" y="connsiteY75"/>
+              </a:cxn>
+              <a:cxn ang="0">
+                <a:pos x="connsiteX76" y="connsiteY76"/>
+              </a:cxn>
+              <a:cxn ang="0">
+                <a:pos x="connsiteX77" y="connsiteY77"/>
+              </a:cxn>
+              <a:cxn ang="0">
+                <a:pos x="connsiteX78" y="connsiteY78"/>
+              </a:cxn>
+              <a:cxn ang="0">
+                <a:pos x="connsiteX79" y="connsiteY79"/>
+              </a:cxn>
+              <a:cxn ang="0">
+                <a:pos x="connsiteX80" y="connsiteY80"/>
+              </a:cxn>
+              <a:cxn ang="0">
+                <a:pos x="connsiteX81" y="connsiteY81"/>
+              </a:cxn>
+              <a:cxn ang="0">
+                <a:pos x="connsiteX82" y="connsiteY82"/>
+              </a:cxn>
+              <a:cxn ang="0">
+                <a:pos x="connsiteX83" y="connsiteY83"/>
+              </a:cxn>
+              <a:cxn ang="0">
+                <a:pos x="connsiteX84" y="connsiteY84"/>
+              </a:cxn>
+              <a:cxn ang="0">
+                <a:pos x="connsiteX85" y="connsiteY85"/>
+              </a:cxn>
+              <a:cxn ang="0">
+                <a:pos x="connsiteX86" y="connsiteY86"/>
+              </a:cxn>
+              <a:cxn ang="0">
+                <a:pos x="connsiteX87" y="connsiteY87"/>
+              </a:cxn>
+              <a:cxn ang="0">
+                <a:pos x="connsiteX88" y="connsiteY88"/>
+              </a:cxn>
+              <a:cxn ang="0">
+                <a:pos x="connsiteX89" y="connsiteY89"/>
+              </a:cxn>
+              <a:cxn ang="0">
+                <a:pos x="connsiteX90" y="connsiteY90"/>
+              </a:cxn>
+            </a:cxnLst>
+            <a:rect l="l" t="t" r="r" b="b"/>
+            <a:pathLst>
+              <a:path w="5511704" h="6886576">
+                <a:moveTo>
+                  <a:pt x="5511704" y="0"/>
+                </a:moveTo>
+                <a:lnTo>
+                  <a:pt x="1008599" y="0"/>
+                </a:lnTo>
+                <a:cubicBezTo>
+                  <a:pt x="1110360" y="35719"/>
+                  <a:pt x="1209214" y="78581"/>
+                  <a:pt x="1310975" y="110728"/>
+                </a:cubicBezTo>
+                <a:cubicBezTo>
+                  <a:pt x="1296437" y="146447"/>
+                  <a:pt x="1281900" y="139303"/>
+                  <a:pt x="1267362" y="135731"/>
+                </a:cubicBezTo>
+                <a:cubicBezTo>
+                  <a:pt x="1180139" y="121445"/>
+                  <a:pt x="1090008" y="110728"/>
+                  <a:pt x="1005692" y="71437"/>
+                </a:cubicBezTo>
+                <a:cubicBezTo>
+                  <a:pt x="985339" y="64294"/>
+                  <a:pt x="962080" y="64294"/>
+                  <a:pt x="953358" y="89297"/>
+                </a:cubicBezTo>
+                <a:cubicBezTo>
+                  <a:pt x="938820" y="125016"/>
+                  <a:pt x="959172" y="146447"/>
+                  <a:pt x="979525" y="164307"/>
+                </a:cubicBezTo>
+                <a:cubicBezTo>
+                  <a:pt x="1014414" y="196453"/>
+                  <a:pt x="1055118" y="189310"/>
+                  <a:pt x="1092915" y="192882"/>
+                </a:cubicBezTo>
+                <a:cubicBezTo>
+                  <a:pt x="1197583" y="210741"/>
+                  <a:pt x="1247011" y="260747"/>
+                  <a:pt x="1270270" y="375047"/>
+                </a:cubicBezTo>
+                <a:cubicBezTo>
+                  <a:pt x="1180139" y="328613"/>
+                  <a:pt x="1090008" y="385763"/>
+                  <a:pt x="1002784" y="353615"/>
+                </a:cubicBezTo>
+                <a:cubicBezTo>
+                  <a:pt x="979525" y="346472"/>
+                  <a:pt x="944635" y="357188"/>
+                  <a:pt x="956265" y="396479"/>
+                </a:cubicBezTo>
+                <a:cubicBezTo>
+                  <a:pt x="967894" y="432198"/>
+                  <a:pt x="1005692" y="460772"/>
+                  <a:pt x="938820" y="453629"/>
+                </a:cubicBezTo>
+                <a:cubicBezTo>
+                  <a:pt x="889393" y="450056"/>
+                  <a:pt x="874856" y="407194"/>
+                  <a:pt x="860319" y="360759"/>
+                </a:cubicBezTo>
+                <a:cubicBezTo>
+                  <a:pt x="848689" y="335757"/>
+                  <a:pt x="816707" y="321469"/>
+                  <a:pt x="793447" y="335757"/>
+                </a:cubicBezTo>
+                <a:cubicBezTo>
+                  <a:pt x="764373" y="350044"/>
+                  <a:pt x="773095" y="389335"/>
+                  <a:pt x="773095" y="417910"/>
+                </a:cubicBezTo>
+                <a:cubicBezTo>
+                  <a:pt x="770187" y="471488"/>
+                  <a:pt x="793447" y="496491"/>
+                  <a:pt x="834151" y="507206"/>
+                </a:cubicBezTo>
+                <a:cubicBezTo>
+                  <a:pt x="883579" y="521494"/>
+                  <a:pt x="933005" y="539354"/>
+                  <a:pt x="996969" y="560785"/>
+                </a:cubicBezTo>
+                <a:cubicBezTo>
+                  <a:pt x="927190" y="596503"/>
+                  <a:pt x="874856" y="589360"/>
+                  <a:pt x="822522" y="560785"/>
+                </a:cubicBezTo>
+                <a:cubicBezTo>
+                  <a:pt x="758558" y="528637"/>
+                  <a:pt x="674242" y="485775"/>
+                  <a:pt x="621908" y="525066"/>
+                </a:cubicBezTo>
+                <a:cubicBezTo>
+                  <a:pt x="543407" y="582216"/>
+                  <a:pt x="479443" y="546497"/>
+                  <a:pt x="409664" y="535781"/>
+                </a:cubicBezTo>
+                <a:cubicBezTo>
+                  <a:pt x="264290" y="514350"/>
+                  <a:pt x="354422" y="482204"/>
+                  <a:pt x="209049" y="464344"/>
+                </a:cubicBezTo>
+                <a:cubicBezTo>
+                  <a:pt x="150900" y="457200"/>
+                  <a:pt x="89843" y="428625"/>
+                  <a:pt x="5527" y="467916"/>
+                </a:cubicBezTo>
+                <a:cubicBezTo>
+                  <a:pt x="386404" y="675085"/>
+                  <a:pt x="566666" y="660797"/>
+                  <a:pt x="906838" y="914400"/>
+                </a:cubicBezTo>
+                <a:cubicBezTo>
+                  <a:pt x="892301" y="939404"/>
+                  <a:pt x="877764" y="928688"/>
+                  <a:pt x="863226" y="925116"/>
+                </a:cubicBezTo>
+                <a:cubicBezTo>
+                  <a:pt x="839967" y="921544"/>
+                  <a:pt x="810892" y="907256"/>
+                  <a:pt x="805077" y="953691"/>
+                </a:cubicBezTo>
+                <a:cubicBezTo>
+                  <a:pt x="802169" y="989410"/>
+                  <a:pt x="819615" y="1007269"/>
+                  <a:pt x="848689" y="1010841"/>
+                </a:cubicBezTo>
+                <a:cubicBezTo>
+                  <a:pt x="933005" y="1025129"/>
+                  <a:pt x="1008599" y="1075135"/>
+                  <a:pt x="1084193" y="1117997"/>
+                </a:cubicBezTo>
+                <a:cubicBezTo>
+                  <a:pt x="1119082" y="1135857"/>
+                  <a:pt x="1156879" y="1160860"/>
+                  <a:pt x="1142342" y="1225153"/>
+                </a:cubicBezTo>
+                <a:cubicBezTo>
+                  <a:pt x="1113268" y="1243013"/>
+                  <a:pt x="1092915" y="1218009"/>
+                  <a:pt x="1069655" y="1214438"/>
+                </a:cubicBezTo>
+                <a:cubicBezTo>
+                  <a:pt x="1046396" y="1210866"/>
+                  <a:pt x="991154" y="1225153"/>
+                  <a:pt x="1005692" y="1235869"/>
+                </a:cubicBezTo>
+                <a:cubicBezTo>
+                  <a:pt x="1072563" y="1275159"/>
+                  <a:pt x="950450" y="1371600"/>
+                  <a:pt x="1031858" y="1371600"/>
+                </a:cubicBezTo>
+                <a:cubicBezTo>
+                  <a:pt x="1165601" y="1371600"/>
+                  <a:pt x="1238288" y="1543050"/>
+                  <a:pt x="1366216" y="1546622"/>
+                </a:cubicBezTo>
+                <a:cubicBezTo>
+                  <a:pt x="1386568" y="1546622"/>
+                  <a:pt x="1395290" y="1578770"/>
+                  <a:pt x="1395290" y="1603772"/>
+                </a:cubicBezTo>
+                <a:cubicBezTo>
+                  <a:pt x="1395290" y="1635920"/>
+                  <a:pt x="1374939" y="1639491"/>
+                  <a:pt x="1354586" y="1643063"/>
+                </a:cubicBezTo>
+                <a:cubicBezTo>
+                  <a:pt x="1322604" y="1646635"/>
+                  <a:pt x="1287715" y="1603772"/>
+                  <a:pt x="1247011" y="1664494"/>
+                </a:cubicBezTo>
+                <a:cubicBezTo>
+                  <a:pt x="1322604" y="1700213"/>
+                  <a:pt x="1401105" y="1735932"/>
+                  <a:pt x="1398198" y="1857375"/>
+                </a:cubicBezTo>
+                <a:cubicBezTo>
+                  <a:pt x="1398198" y="1889523"/>
+                  <a:pt x="1430180" y="1903810"/>
+                  <a:pt x="1453440" y="1910954"/>
+                </a:cubicBezTo>
+                <a:cubicBezTo>
+                  <a:pt x="1494144" y="1925241"/>
+                  <a:pt x="1526126" y="1946673"/>
+                  <a:pt x="1549386" y="1993106"/>
+                </a:cubicBezTo>
+                <a:cubicBezTo>
+                  <a:pt x="1549386" y="2003822"/>
+                  <a:pt x="1549386" y="2010966"/>
+                  <a:pt x="1549386" y="2021681"/>
+                </a:cubicBezTo>
+                <a:cubicBezTo>
+                  <a:pt x="1543571" y="2132410"/>
+                  <a:pt x="1485422" y="2128838"/>
+                  <a:pt x="1421458" y="2110978"/>
+                </a:cubicBezTo>
+                <a:cubicBezTo>
+                  <a:pt x="1345864" y="2089547"/>
+                  <a:pt x="1270270" y="2046685"/>
+                  <a:pt x="1188861" y="2085976"/>
+                </a:cubicBezTo>
+                <a:cubicBezTo>
+                  <a:pt x="1302252" y="2139554"/>
+                  <a:pt x="1427272" y="2143126"/>
+                  <a:pt x="1531941" y="2218135"/>
+                </a:cubicBezTo>
+                <a:cubicBezTo>
+                  <a:pt x="1142342" y="2232422"/>
+                  <a:pt x="799262" y="1993106"/>
+                  <a:pt x="421293" y="1900238"/>
+                </a:cubicBezTo>
+                <a:cubicBezTo>
+                  <a:pt x="432923" y="1960960"/>
+                  <a:pt x="464905" y="1975247"/>
+                  <a:pt x="491072" y="1982391"/>
+                </a:cubicBezTo>
+                <a:cubicBezTo>
+                  <a:pt x="630630" y="2028825"/>
+                  <a:pt x="752743" y="2121695"/>
+                  <a:pt x="880671" y="2200276"/>
+                </a:cubicBezTo>
+                <a:cubicBezTo>
+                  <a:pt x="933005" y="2232422"/>
+                  <a:pt x="970802" y="2268142"/>
+                  <a:pt x="991154" y="2336007"/>
+                </a:cubicBezTo>
+                <a:cubicBezTo>
+                  <a:pt x="1008599" y="2400300"/>
+                  <a:pt x="1043489" y="2428875"/>
+                  <a:pt x="1107453" y="2411016"/>
+                </a:cubicBezTo>
+                <a:cubicBezTo>
+                  <a:pt x="1159787" y="2396729"/>
+                  <a:pt x="1215029" y="2403873"/>
+                  <a:pt x="1270270" y="2411016"/>
+                </a:cubicBezTo>
+                <a:cubicBezTo>
+                  <a:pt x="1331326" y="2418160"/>
+                  <a:pt x="1401105" y="2489597"/>
+                  <a:pt x="1386568" y="2528889"/>
+                </a:cubicBezTo>
+                <a:cubicBezTo>
+                  <a:pt x="1357494" y="2593182"/>
+                  <a:pt x="1308067" y="2561035"/>
+                  <a:pt x="1267362" y="2553891"/>
+                </a:cubicBezTo>
+                <a:cubicBezTo>
+                  <a:pt x="1217936" y="2546748"/>
+                  <a:pt x="1127805" y="2528889"/>
+                  <a:pt x="1127805" y="2536032"/>
+                </a:cubicBezTo>
+                <a:cubicBezTo>
+                  <a:pt x="1095822" y="2696766"/>
+                  <a:pt x="1023136" y="2575322"/>
+                  <a:pt x="970802" y="2575322"/>
+                </a:cubicBezTo>
+                <a:cubicBezTo>
+                  <a:pt x="921375" y="2575322"/>
+                  <a:pt x="871949" y="2557463"/>
+                  <a:pt x="825429" y="2543176"/>
+                </a:cubicBezTo>
+                <a:cubicBezTo>
+                  <a:pt x="764373" y="2525316"/>
+                  <a:pt x="709132" y="2557463"/>
+                  <a:pt x="650982" y="2564607"/>
+                </a:cubicBezTo>
+                <a:cubicBezTo>
+                  <a:pt x="598648" y="2571751"/>
+                  <a:pt x="627722" y="2664620"/>
+                  <a:pt x="595740" y="2703909"/>
+                </a:cubicBezTo>
+                <a:cubicBezTo>
+                  <a:pt x="589926" y="2714626"/>
+                  <a:pt x="584111" y="2714626"/>
+                  <a:pt x="578296" y="2714626"/>
+                </a:cubicBezTo>
+                <a:cubicBezTo>
+                  <a:pt x="560851" y="2993232"/>
+                  <a:pt x="255568" y="2925366"/>
+                  <a:pt x="255568" y="2936081"/>
+                </a:cubicBezTo>
+                <a:cubicBezTo>
+                  <a:pt x="229401" y="2953941"/>
+                  <a:pt x="197419" y="2911079"/>
+                  <a:pt x="165437" y="2953941"/>
+                </a:cubicBezTo>
+                <a:cubicBezTo>
+                  <a:pt x="302087" y="3150394"/>
+                  <a:pt x="511425" y="3196828"/>
+                  <a:pt x="697501" y="3343275"/>
+                </a:cubicBezTo>
+                <a:cubicBezTo>
+                  <a:pt x="543407" y="3393282"/>
+                  <a:pt x="453275" y="3221832"/>
+                  <a:pt x="339884" y="3243263"/>
+                </a:cubicBezTo>
+                <a:cubicBezTo>
+                  <a:pt x="284643" y="3296842"/>
+                  <a:pt x="450368" y="3382566"/>
+                  <a:pt x="290458" y="3407569"/>
+                </a:cubicBezTo>
+                <a:cubicBezTo>
+                  <a:pt x="360236" y="3454004"/>
+                  <a:pt x="409664" y="3500439"/>
+                  <a:pt x="459090" y="3554016"/>
+                </a:cubicBezTo>
+                <a:cubicBezTo>
+                  <a:pt x="543407" y="3650457"/>
+                  <a:pt x="560851" y="3714751"/>
+                  <a:pt x="520147" y="3843338"/>
+                </a:cubicBezTo>
+                <a:cubicBezTo>
+                  <a:pt x="493979" y="3929063"/>
+                  <a:pt x="456183" y="4007645"/>
+                  <a:pt x="491072" y="4107657"/>
+                </a:cubicBezTo>
+                <a:cubicBezTo>
+                  <a:pt x="514332" y="4175522"/>
+                  <a:pt x="505609" y="4221957"/>
+                  <a:pt x="418386" y="4189810"/>
+                </a:cubicBezTo>
+                <a:cubicBezTo>
+                  <a:pt x="325347" y="4157663"/>
+                  <a:pt x="290458" y="4218386"/>
+                  <a:pt x="313718" y="4339829"/>
+                </a:cubicBezTo>
+                <a:cubicBezTo>
+                  <a:pt x="328254" y="4418410"/>
+                  <a:pt x="313718" y="4443413"/>
+                  <a:pt x="249753" y="4432698"/>
+                </a:cubicBezTo>
+                <a:cubicBezTo>
+                  <a:pt x="179975" y="4421982"/>
+                  <a:pt x="113103" y="4371976"/>
+                  <a:pt x="25879" y="4396979"/>
+                </a:cubicBezTo>
+                <a:cubicBezTo>
+                  <a:pt x="95658" y="4539854"/>
+                  <a:pt x="243939" y="4496991"/>
+                  <a:pt x="325347" y="4632722"/>
+                </a:cubicBezTo>
+                <a:cubicBezTo>
+                  <a:pt x="229401" y="4632722"/>
+                  <a:pt x="153807" y="4632722"/>
+                  <a:pt x="84029" y="4604147"/>
+                </a:cubicBezTo>
+                <a:cubicBezTo>
+                  <a:pt x="54954" y="4593433"/>
+                  <a:pt x="22972" y="4579145"/>
+                  <a:pt x="5527" y="4622007"/>
+                </a:cubicBezTo>
+                <a:cubicBezTo>
+                  <a:pt x="-14826" y="4672014"/>
+                  <a:pt x="25879" y="4689872"/>
+                  <a:pt x="49139" y="4697016"/>
+                </a:cubicBezTo>
+                <a:cubicBezTo>
+                  <a:pt x="116011" y="4722019"/>
+                  <a:pt x="168344" y="4779170"/>
+                  <a:pt x="226494" y="4825604"/>
+                </a:cubicBezTo>
+                <a:cubicBezTo>
+                  <a:pt x="351514" y="4925616"/>
+                  <a:pt x="488165" y="5011341"/>
+                  <a:pt x="592833" y="5175647"/>
+                </a:cubicBezTo>
+                <a:cubicBezTo>
+                  <a:pt x="461997" y="5132785"/>
+                  <a:pt x="363144" y="5032772"/>
+                  <a:pt x="238123" y="5014913"/>
+                </a:cubicBezTo>
+                <a:cubicBezTo>
+                  <a:pt x="345700" y="5164932"/>
+                  <a:pt x="482350" y="5264944"/>
+                  <a:pt x="610278" y="5375673"/>
+                </a:cubicBezTo>
+                <a:cubicBezTo>
+                  <a:pt x="648075" y="5407819"/>
+                  <a:pt x="685872" y="5429250"/>
+                  <a:pt x="691686" y="5497116"/>
+                </a:cubicBezTo>
+                <a:cubicBezTo>
+                  <a:pt x="709132" y="5629276"/>
+                  <a:pt x="755650" y="5736432"/>
+                  <a:pt x="860319" y="5793582"/>
+                </a:cubicBezTo>
+                <a:cubicBezTo>
+                  <a:pt x="860319" y="5793582"/>
+                  <a:pt x="854504" y="5815013"/>
+                  <a:pt x="851597" y="5825729"/>
+                </a:cubicBezTo>
+                <a:cubicBezTo>
+                  <a:pt x="787632" y="5829301"/>
+                  <a:pt x="738206" y="5750720"/>
+                  <a:pt x="659704" y="5779295"/>
+                </a:cubicBezTo>
+                <a:cubicBezTo>
+                  <a:pt x="738206" y="5886451"/>
+                  <a:pt x="802169" y="5979319"/>
+                  <a:pt x="909746" y="6029326"/>
+                </a:cubicBezTo>
+                <a:cubicBezTo>
+                  <a:pt x="996969" y="6068616"/>
+                  <a:pt x="1104545" y="6093620"/>
+                  <a:pt x="1168509" y="6222207"/>
+                </a:cubicBezTo>
+                <a:cubicBezTo>
+                  <a:pt x="1095822" y="6247210"/>
+                  <a:pt x="1040581" y="6215063"/>
+                  <a:pt x="985339" y="6193632"/>
+                </a:cubicBezTo>
+                <a:cubicBezTo>
+                  <a:pt x="901023" y="6157913"/>
+                  <a:pt x="816707" y="6118623"/>
+                  <a:pt x="732391" y="6082904"/>
+                </a:cubicBezTo>
+                <a:cubicBezTo>
+                  <a:pt x="700408" y="6068616"/>
+                  <a:pt x="665519" y="6061472"/>
+                  <a:pt x="645167" y="6125766"/>
+                </a:cubicBezTo>
+                <a:cubicBezTo>
+                  <a:pt x="752743" y="6140053"/>
+                  <a:pt x="816707" y="6225779"/>
+                  <a:pt x="883579" y="6307932"/>
+                </a:cubicBezTo>
+                <a:cubicBezTo>
+                  <a:pt x="921375" y="6354366"/>
+                  <a:pt x="953358" y="6415088"/>
+                  <a:pt x="1020229" y="6393657"/>
+                </a:cubicBezTo>
+                <a:cubicBezTo>
+                  <a:pt x="1055118" y="6382942"/>
+                  <a:pt x="1078378" y="6415088"/>
+                  <a:pt x="1075471" y="6457950"/>
+                </a:cubicBezTo>
+                <a:cubicBezTo>
+                  <a:pt x="1060933" y="6607970"/>
+                  <a:pt x="1145250" y="6657976"/>
+                  <a:pt x="1232473" y="6686551"/>
+                </a:cubicBezTo>
+                <a:cubicBezTo>
+                  <a:pt x="1360401" y="6729413"/>
+                  <a:pt x="1473792" y="6815138"/>
+                  <a:pt x="1592997" y="6886576"/>
+                </a:cubicBezTo>
+                <a:lnTo>
+                  <a:pt x="5511704" y="6886576"/>
+                </a:lnTo>
+                <a:close/>
+              </a:path>
+            </a:pathLst>
+          </a:custGeom>
+          <a:solidFill>
+            <a:schemeClr val="bg2">
+              <a:alpha val="50000"/>
+            </a:schemeClr>
+          </a:solidFill>
+          <a:ln w="32707" cap="flat">
+            <a:noFill/>
+            <a:prstDash val="solid"/>
+            <a:miter/>
+          </a:ln>
+        </p:spPr>
+        <p:txBody>
+          <a:bodyPr rtlCol="0" anchor="ctr"/>
+          <a:lstStyle/>
+          <a:p>
+            <a:endParaRPr lang="en-US" dirty="0"/>
+          </a:p>
+        </p:txBody>
+      </p:sp>
       <p:sp>
         <p:nvSpPr>
           <p:cNvPr id="2" name="Title 1">
@@ -3869,15 +5389,23 @@
             <p:ph type="title"/>
           </p:nvPr>
         </p:nvSpPr>
-        <p:spPr/>
-        <p:txBody>
-          <a:bodyPr/>
+        <p:spPr>
+          <a:xfrm>
+            <a:off x="838200" y="713312"/>
+            <a:ext cx="4038600" cy="5431376"/>
+          </a:xfrm>
+        </p:spPr>
+        <p:txBody>
+          <a:bodyPr>
+            <a:normAutofit/>
+          </a:bodyPr>
           <a:lstStyle/>
           <a:p>
             <a:r>
               <a:rPr lang="en-US" dirty="0"/>
               <a:t>Research Problem</a:t>
             </a:r>
+            <a:endParaRPr lang="en-US"/>
           </a:p>
         </p:txBody>
       </p:sp>
@@ -3897,16 +5425,23 @@
             <p:ph idx="1"/>
           </p:nvPr>
         </p:nvSpPr>
-        <p:spPr/>
-        <p:txBody>
-          <a:bodyPr/>
+        <p:spPr>
+          <a:xfrm>
+            <a:off x="6095999" y="713313"/>
+            <a:ext cx="5257801" cy="5431376"/>
+          </a:xfrm>
+        </p:spPr>
+        <p:txBody>
+          <a:bodyPr anchor="ctr">
+            <a:normAutofit/>
+          </a:bodyPr>
           <a:lstStyle/>
           <a:p>
             <a:pPr marL="0" indent="0">
               <a:buNone/>
             </a:pPr>
             <a:r>
-              <a:rPr lang="en-US" dirty="0"/>
+              <a:rPr lang="en-US" sz="2000"/>
               <a:t>With the increase of social media usage there is greater concern with knowing the potential effects it has on mental health, especially looking through the lens of COVID-19</a:t>
             </a:r>
           </a:p>
@@ -3928,6 +5463,14 @@
 <file path=ppt/slides/slide3.xml><?xml version="1.0" encoding="utf-8"?>
 <p:sld xmlns:a="http://schemas.openxmlformats.org/drawingml/2006/main" xmlns:r="http://schemas.openxmlformats.org/officeDocument/2006/relationships" xmlns:p="http://schemas.openxmlformats.org/presentationml/2006/main">
   <p:cSld>
+    <p:bg>
+      <p:bgPr>
+        <a:solidFill>
+          <a:schemeClr val="bg1"/>
+        </a:solidFill>
+        <a:effectLst/>
+      </p:bgPr>
+    </p:bg>
     <p:spTree>
       <p:nvGrpSpPr>
         <p:cNvPr id="1" name=""/>
@@ -3942,12 +5485,882 @@
           <a:chExt cx="0" cy="0"/>
         </a:xfrm>
       </p:grpSpPr>
+      <p:sp useBgFill="1">
+        <p:nvSpPr>
+          <p:cNvPr id="8" name="Rectangle 7">
+            <a:extLst>
+              <a:ext uri="{FF2B5EF4-FFF2-40B4-BE49-F238E27FC236}">
+                <a16:creationId xmlns:a16="http://schemas.microsoft.com/office/drawing/2014/main" id="{FEC7823C-FDD6-429C-986C-063FDEBF9EAA}"/>
+              </a:ext>
+              <a:ext uri="{C183D7F6-B498-43B3-948B-1728B52AA6E4}">
+                <adec:decorative xmlns:adec="http://schemas.microsoft.com/office/drawing/2017/decorative" val="1"/>
+              </a:ext>
+            </a:extLst>
+          </p:cNvPr>
+          <p:cNvSpPr>
+            <a:spLocks noGrp="1" noRot="1" noChangeAspect="1" noMove="1" noResize="1" noEditPoints="1" noAdjustHandles="1" noChangeArrowheads="1" noChangeShapeType="1" noTextEdit="1"/>
+          </p:cNvSpPr>
+          <p:nvPr>
+            <p:extLst>
+              <p:ext uri="{386F3935-93C4-4BCD-93E2-E3B085C9AB24}">
+                <p16:designElem xmlns:p16="http://schemas.microsoft.com/office/powerpoint/2015/main" val="1"/>
+              </p:ext>
+            </p:extLst>
+          </p:nvPr>
+        </p:nvSpPr>
+        <p:spPr>
+          <a:xfrm>
+            <a:off x="0" y="0"/>
+            <a:ext cx="12188952" cy="6858000"/>
+          </a:xfrm>
+          <a:prstGeom prst="rect">
+            <a:avLst/>
+          </a:prstGeom>
+          <a:ln>
+            <a:noFill/>
+          </a:ln>
+        </p:spPr>
+        <p:style>
+          <a:lnRef idx="2">
+            <a:schemeClr val="accent1">
+              <a:shade val="50000"/>
+            </a:schemeClr>
+          </a:lnRef>
+          <a:fillRef idx="1">
+            <a:schemeClr val="accent1"/>
+          </a:fillRef>
+          <a:effectRef idx="0">
+            <a:schemeClr val="accent1"/>
+          </a:effectRef>
+          <a:fontRef idx="minor">
+            <a:schemeClr val="lt1"/>
+          </a:fontRef>
+        </p:style>
+        <p:txBody>
+          <a:bodyPr rtlCol="0" anchor="ctr"/>
+          <a:lstStyle/>
+          <a:p>
+            <a:pPr algn="ctr"/>
+            <a:endParaRPr lang="en-US"/>
+          </a:p>
+        </p:txBody>
+      </p:sp>
+      <p:sp>
+        <p:nvSpPr>
+          <p:cNvPr id="10" name="Freeform: Shape 9">
+            <a:extLst>
+              <a:ext uri="{FF2B5EF4-FFF2-40B4-BE49-F238E27FC236}">
+                <a16:creationId xmlns:a16="http://schemas.microsoft.com/office/drawing/2014/main" id="{9CF7FE1C-8BC5-4B0C-A2BC-93AB72C90FDD}"/>
+              </a:ext>
+              <a:ext uri="{C183D7F6-B498-43B3-948B-1728B52AA6E4}">
+                <adec:decorative xmlns:adec="http://schemas.microsoft.com/office/drawing/2017/decorative" val="1"/>
+              </a:ext>
+            </a:extLst>
+          </p:cNvPr>
+          <p:cNvSpPr>
+            <a:spLocks noGrp="1" noRot="1" noChangeAspect="1" noMove="1" noResize="1" noEditPoints="1" noAdjustHandles="1" noChangeArrowheads="1" noChangeShapeType="1" noTextEdit="1"/>
+          </p:cNvSpPr>
+          <p:nvPr>
+            <p:extLst>
+              <p:ext uri="{386F3935-93C4-4BCD-93E2-E3B085C9AB24}">
+                <p16:designElem xmlns:p16="http://schemas.microsoft.com/office/powerpoint/2015/main" val="1"/>
+              </p:ext>
+            </p:extLst>
+          </p:nvPr>
+        </p:nvSpPr>
+        <p:spPr>
+          <a:xfrm>
+            <a:off x="1768100" y="-1"/>
+            <a:ext cx="10423900" cy="5920155"/>
+          </a:xfrm>
+          <a:custGeom>
+            <a:avLst/>
+            <a:gdLst>
+              <a:gd name="connsiteX0" fmla="*/ 10423900 w 10423900"/>
+              <a:gd name="connsiteY0" fmla="*/ 0 h 5491534"/>
+              <a:gd name="connsiteX1" fmla="*/ 3493157 w 10423900"/>
+              <a:gd name="connsiteY1" fmla="*/ 0 h 5491534"/>
+              <a:gd name="connsiteX2" fmla="*/ 3493018 w 10423900"/>
+              <a:gd name="connsiteY2" fmla="*/ 31 h 5491534"/>
+              <a:gd name="connsiteX3" fmla="*/ 3245493 w 10423900"/>
+              <a:gd name="connsiteY3" fmla="*/ 104839 h 5491534"/>
+              <a:gd name="connsiteX4" fmla="*/ 4434802 w 10423900"/>
+              <a:gd name="connsiteY4" fmla="*/ 284558 h 5491534"/>
+              <a:gd name="connsiteX5" fmla="*/ 4011937 w 10423900"/>
+              <a:gd name="connsiteY5" fmla="*/ 395559 h 5491534"/>
+              <a:gd name="connsiteX6" fmla="*/ 3573213 w 10423900"/>
+              <a:gd name="connsiteY6" fmla="*/ 474847 h 5491534"/>
+              <a:gd name="connsiteX7" fmla="*/ 3097489 w 10423900"/>
+              <a:gd name="connsiteY7" fmla="*/ 532990 h 5491534"/>
+              <a:gd name="connsiteX8" fmla="*/ 2664052 w 10423900"/>
+              <a:gd name="connsiteY8" fmla="*/ 649279 h 5491534"/>
+              <a:gd name="connsiteX9" fmla="*/ 3795218 w 10423900"/>
+              <a:gd name="connsiteY9" fmla="*/ 696852 h 5491534"/>
+              <a:gd name="connsiteX10" fmla="*/ 3208492 w 10423900"/>
+              <a:gd name="connsiteY10" fmla="*/ 802568 h 5491534"/>
+              <a:gd name="connsiteX11" fmla="*/ 2727483 w 10423900"/>
+              <a:gd name="connsiteY11" fmla="*/ 939999 h 5491534"/>
+              <a:gd name="connsiteX12" fmla="*/ 2389190 w 10423900"/>
+              <a:gd name="connsiteY12" fmla="*/ 1003429 h 5491534"/>
+              <a:gd name="connsiteX13" fmla="*/ 2029754 w 10423900"/>
+              <a:gd name="connsiteY13" fmla="*/ 1019287 h 5491534"/>
+              <a:gd name="connsiteX14" fmla="*/ 1945181 w 10423900"/>
+              <a:gd name="connsiteY14" fmla="*/ 1119716 h 5491534"/>
+              <a:gd name="connsiteX15" fmla="*/ 2056184 w 10423900"/>
+              <a:gd name="connsiteY15" fmla="*/ 1225434 h 5491534"/>
+              <a:gd name="connsiteX16" fmla="*/ 2225329 w 10423900"/>
+              <a:gd name="connsiteY16" fmla="*/ 1236004 h 5491534"/>
+              <a:gd name="connsiteX17" fmla="*/ 3234920 w 10423900"/>
+              <a:gd name="connsiteY17" fmla="*/ 1262435 h 5491534"/>
+              <a:gd name="connsiteX18" fmla="*/ 0 w 10423900"/>
+              <a:gd name="connsiteY18" fmla="*/ 1495009 h 5491534"/>
+              <a:gd name="connsiteX19" fmla="*/ 438724 w 10423900"/>
+              <a:gd name="connsiteY19" fmla="*/ 1637728 h 5491534"/>
+              <a:gd name="connsiteX20" fmla="*/ 586726 w 10423900"/>
+              <a:gd name="connsiteY20" fmla="*/ 2028877 h 5491534"/>
+              <a:gd name="connsiteX21" fmla="*/ 1125878 w 10423900"/>
+              <a:gd name="connsiteY21" fmla="*/ 2250882 h 5491534"/>
+              <a:gd name="connsiteX22" fmla="*/ 1474744 w 10423900"/>
+              <a:gd name="connsiteY22" fmla="*/ 2330169 h 5491534"/>
+              <a:gd name="connsiteX23" fmla="*/ 2272901 w 10423900"/>
+              <a:gd name="connsiteY23" fmla="*/ 2446458 h 5491534"/>
+              <a:gd name="connsiteX24" fmla="*/ 2389190 w 10423900"/>
+              <a:gd name="connsiteY24" fmla="*/ 2636747 h 5491534"/>
+              <a:gd name="connsiteX25" fmla="*/ 2489621 w 10423900"/>
+              <a:gd name="connsiteY25" fmla="*/ 2848179 h 5491534"/>
+              <a:gd name="connsiteX26" fmla="*/ 2701053 w 10423900"/>
+              <a:gd name="connsiteY26" fmla="*/ 2985611 h 5491534"/>
+              <a:gd name="connsiteX27" fmla="*/ 1057165 w 10423900"/>
+              <a:gd name="connsiteY27" fmla="*/ 2964468 h 5491534"/>
+              <a:gd name="connsiteX28" fmla="*/ 2912485 w 10423900"/>
+              <a:gd name="connsiteY28" fmla="*/ 3408477 h 5491534"/>
+              <a:gd name="connsiteX29" fmla="*/ 2748626 w 10423900"/>
+              <a:gd name="connsiteY29" fmla="*/ 3582909 h 5491534"/>
+              <a:gd name="connsiteX30" fmla="*/ 3763503 w 10423900"/>
+              <a:gd name="connsiteY30" fmla="*/ 3820771 h 5491534"/>
+              <a:gd name="connsiteX31" fmla="*/ 3219063 w 10423900"/>
+              <a:gd name="connsiteY31" fmla="*/ 3847199 h 5491534"/>
+              <a:gd name="connsiteX32" fmla="*/ 6385269 w 10423900"/>
+              <a:gd name="connsiteY32" fmla="*/ 4840933 h 5491534"/>
+              <a:gd name="connsiteX33" fmla="*/ 10285854 w 10423900"/>
+              <a:gd name="connsiteY33" fmla="*/ 5471118 h 5491534"/>
+              <a:gd name="connsiteX34" fmla="*/ 10423900 w 10423900"/>
+              <a:gd name="connsiteY34" fmla="*/ 5491534 h 5491534"/>
+            </a:gdLst>
+            <a:ahLst/>
+            <a:cxnLst>
+              <a:cxn ang="0">
+                <a:pos x="connsiteX0" y="connsiteY0"/>
+              </a:cxn>
+              <a:cxn ang="0">
+                <a:pos x="connsiteX1" y="connsiteY1"/>
+              </a:cxn>
+              <a:cxn ang="0">
+                <a:pos x="connsiteX2" y="connsiteY2"/>
+              </a:cxn>
+              <a:cxn ang="0">
+                <a:pos x="connsiteX3" y="connsiteY3"/>
+              </a:cxn>
+              <a:cxn ang="0">
+                <a:pos x="connsiteX4" y="connsiteY4"/>
+              </a:cxn>
+              <a:cxn ang="0">
+                <a:pos x="connsiteX5" y="connsiteY5"/>
+              </a:cxn>
+              <a:cxn ang="0">
+                <a:pos x="connsiteX6" y="connsiteY6"/>
+              </a:cxn>
+              <a:cxn ang="0">
+                <a:pos x="connsiteX7" y="connsiteY7"/>
+              </a:cxn>
+              <a:cxn ang="0">
+                <a:pos x="connsiteX8" y="connsiteY8"/>
+              </a:cxn>
+              <a:cxn ang="0">
+                <a:pos x="connsiteX9" y="connsiteY9"/>
+              </a:cxn>
+              <a:cxn ang="0">
+                <a:pos x="connsiteX10" y="connsiteY10"/>
+              </a:cxn>
+              <a:cxn ang="0">
+                <a:pos x="connsiteX11" y="connsiteY11"/>
+              </a:cxn>
+              <a:cxn ang="0">
+                <a:pos x="connsiteX12" y="connsiteY12"/>
+              </a:cxn>
+              <a:cxn ang="0">
+                <a:pos x="connsiteX13" y="connsiteY13"/>
+              </a:cxn>
+              <a:cxn ang="0">
+                <a:pos x="connsiteX14" y="connsiteY14"/>
+              </a:cxn>
+              <a:cxn ang="0">
+                <a:pos x="connsiteX15" y="connsiteY15"/>
+              </a:cxn>
+              <a:cxn ang="0">
+                <a:pos x="connsiteX16" y="connsiteY16"/>
+              </a:cxn>
+              <a:cxn ang="0">
+                <a:pos x="connsiteX17" y="connsiteY17"/>
+              </a:cxn>
+              <a:cxn ang="0">
+                <a:pos x="connsiteX18" y="connsiteY18"/>
+              </a:cxn>
+              <a:cxn ang="0">
+                <a:pos x="connsiteX19" y="connsiteY19"/>
+              </a:cxn>
+              <a:cxn ang="0">
+                <a:pos x="connsiteX20" y="connsiteY20"/>
+              </a:cxn>
+              <a:cxn ang="0">
+                <a:pos x="connsiteX21" y="connsiteY21"/>
+              </a:cxn>
+              <a:cxn ang="0">
+                <a:pos x="connsiteX22" y="connsiteY22"/>
+              </a:cxn>
+              <a:cxn ang="0">
+                <a:pos x="connsiteX23" y="connsiteY23"/>
+              </a:cxn>
+              <a:cxn ang="0">
+                <a:pos x="connsiteX24" y="connsiteY24"/>
+              </a:cxn>
+              <a:cxn ang="0">
+                <a:pos x="connsiteX25" y="connsiteY25"/>
+              </a:cxn>
+              <a:cxn ang="0">
+                <a:pos x="connsiteX26" y="connsiteY26"/>
+              </a:cxn>
+              <a:cxn ang="0">
+                <a:pos x="connsiteX27" y="connsiteY27"/>
+              </a:cxn>
+              <a:cxn ang="0">
+                <a:pos x="connsiteX28" y="connsiteY28"/>
+              </a:cxn>
+              <a:cxn ang="0">
+                <a:pos x="connsiteX29" y="connsiteY29"/>
+              </a:cxn>
+              <a:cxn ang="0">
+                <a:pos x="connsiteX30" y="connsiteY30"/>
+              </a:cxn>
+              <a:cxn ang="0">
+                <a:pos x="connsiteX31" y="connsiteY31"/>
+              </a:cxn>
+              <a:cxn ang="0">
+                <a:pos x="connsiteX32" y="connsiteY32"/>
+              </a:cxn>
+              <a:cxn ang="0">
+                <a:pos x="connsiteX33" y="connsiteY33"/>
+              </a:cxn>
+              <a:cxn ang="0">
+                <a:pos x="connsiteX34" y="connsiteY34"/>
+              </a:cxn>
+            </a:cxnLst>
+            <a:rect l="l" t="t" r="r" b="b"/>
+            <a:pathLst>
+              <a:path w="10423900" h="5491534">
+                <a:moveTo>
+                  <a:pt x="10423900" y="0"/>
+                </a:moveTo>
+                <a:lnTo>
+                  <a:pt x="3493157" y="0"/>
+                </a:lnTo>
+                <a:lnTo>
+                  <a:pt x="3493018" y="31"/>
+                </a:lnTo>
+                <a:cubicBezTo>
+                  <a:pt x="3414969" y="12668"/>
+                  <a:pt x="3328744" y="21588"/>
+                  <a:pt x="3245493" y="104839"/>
+                </a:cubicBezTo>
+                <a:cubicBezTo>
+                  <a:pt x="3668357" y="162984"/>
+                  <a:pt x="4075366" y="51981"/>
+                  <a:pt x="4434802" y="284558"/>
+                </a:cubicBezTo>
+                <a:cubicBezTo>
+                  <a:pt x="4302656" y="400846"/>
+                  <a:pt x="4154654" y="374416"/>
+                  <a:pt x="4011937" y="395559"/>
+                </a:cubicBezTo>
+                <a:cubicBezTo>
+                  <a:pt x="3863934" y="416704"/>
+                  <a:pt x="3721217" y="453704"/>
+                  <a:pt x="3573213" y="474847"/>
+                </a:cubicBezTo>
+                <a:cubicBezTo>
+                  <a:pt x="3414639" y="501275"/>
+                  <a:pt x="3256063" y="506562"/>
+                  <a:pt x="3097489" y="532990"/>
+                </a:cubicBezTo>
+                <a:cubicBezTo>
+                  <a:pt x="2965345" y="554135"/>
+                  <a:pt x="2822627" y="517133"/>
+                  <a:pt x="2664052" y="649279"/>
+                </a:cubicBezTo>
+                <a:cubicBezTo>
+                  <a:pt x="3055203" y="744424"/>
+                  <a:pt x="3409352" y="601706"/>
+                  <a:pt x="3795218" y="696852"/>
+                </a:cubicBezTo>
+                <a:cubicBezTo>
+                  <a:pt x="3567928" y="781425"/>
+                  <a:pt x="3382924" y="754995"/>
+                  <a:pt x="3208492" y="802568"/>
+                </a:cubicBezTo>
+                <a:cubicBezTo>
+                  <a:pt x="3049916" y="850140"/>
+                  <a:pt x="2859627" y="797282"/>
+                  <a:pt x="2727483" y="939999"/>
+                </a:cubicBezTo>
+                <a:cubicBezTo>
+                  <a:pt x="2627052" y="1051000"/>
+                  <a:pt x="2521336" y="1066858"/>
+                  <a:pt x="2389190" y="1003429"/>
+                </a:cubicBezTo>
+                <a:cubicBezTo>
+                  <a:pt x="2272901" y="945284"/>
+                  <a:pt x="2146043" y="961142"/>
+                  <a:pt x="2029754" y="1019287"/>
+                </a:cubicBezTo>
+                <a:cubicBezTo>
+                  <a:pt x="1987468" y="1040430"/>
+                  <a:pt x="1945181" y="1066858"/>
+                  <a:pt x="1945181" y="1119716"/>
+                </a:cubicBezTo>
+                <a:cubicBezTo>
+                  <a:pt x="1945181" y="1193719"/>
+                  <a:pt x="1998039" y="1214862"/>
+                  <a:pt x="2056184" y="1225434"/>
+                </a:cubicBezTo>
+                <a:cubicBezTo>
+                  <a:pt x="2109042" y="1236004"/>
+                  <a:pt x="2172471" y="1246577"/>
+                  <a:pt x="2225329" y="1236004"/>
+                </a:cubicBezTo>
+                <a:cubicBezTo>
+                  <a:pt x="2563622" y="1177861"/>
+                  <a:pt x="2896629" y="1273005"/>
+                  <a:pt x="3234920" y="1262435"/>
+                </a:cubicBezTo>
+                <a:cubicBezTo>
+                  <a:pt x="2172471" y="1489724"/>
+                  <a:pt x="1099450" y="1415723"/>
+                  <a:pt x="0" y="1495009"/>
+                </a:cubicBezTo>
+                <a:cubicBezTo>
+                  <a:pt x="142717" y="1653583"/>
+                  <a:pt x="327721" y="1521439"/>
+                  <a:pt x="438724" y="1637728"/>
+                </a:cubicBezTo>
+                <a:cubicBezTo>
+                  <a:pt x="333006" y="1880875"/>
+                  <a:pt x="375293" y="2013020"/>
+                  <a:pt x="586726" y="2028877"/>
+                </a:cubicBezTo>
+                <a:cubicBezTo>
+                  <a:pt x="792873" y="2044734"/>
+                  <a:pt x="1014877" y="1960161"/>
+                  <a:pt x="1125878" y="2250882"/>
+                </a:cubicBezTo>
+                <a:cubicBezTo>
+                  <a:pt x="1157593" y="2340740"/>
+                  <a:pt x="1353170" y="2314312"/>
+                  <a:pt x="1474744" y="2330169"/>
+                </a:cubicBezTo>
+                <a:cubicBezTo>
+                  <a:pt x="1739034" y="2367170"/>
+                  <a:pt x="2019183" y="2330169"/>
+                  <a:pt x="2272901" y="2446458"/>
+                </a:cubicBezTo>
+                <a:cubicBezTo>
+                  <a:pt x="2373332" y="2488744"/>
+                  <a:pt x="2442048" y="2520459"/>
+                  <a:pt x="2389190" y="2636747"/>
+                </a:cubicBezTo>
+                <a:cubicBezTo>
+                  <a:pt x="2336332" y="2758321"/>
+                  <a:pt x="2405048" y="2800607"/>
+                  <a:pt x="2489621" y="2848179"/>
+                </a:cubicBezTo>
+                <a:cubicBezTo>
+                  <a:pt x="2553051" y="2885180"/>
+                  <a:pt x="2648195" y="2874609"/>
+                  <a:pt x="2701053" y="2985611"/>
+                </a:cubicBezTo>
+                <a:cubicBezTo>
+                  <a:pt x="2146043" y="2969753"/>
+                  <a:pt x="1606888" y="2879895"/>
+                  <a:pt x="1057165" y="2964468"/>
+                </a:cubicBezTo>
+                <a:cubicBezTo>
+                  <a:pt x="1659748" y="3175900"/>
+                  <a:pt x="2320474" y="3165328"/>
+                  <a:pt x="2912485" y="3408477"/>
+                </a:cubicBezTo>
+                <a:cubicBezTo>
+                  <a:pt x="2891342" y="3493050"/>
+                  <a:pt x="2753911" y="3456048"/>
+                  <a:pt x="2748626" y="3582909"/>
+                </a:cubicBezTo>
+                <a:cubicBezTo>
+                  <a:pt x="3060489" y="3715055"/>
+                  <a:pt x="3435782" y="3625195"/>
+                  <a:pt x="3763503" y="3820771"/>
+                </a:cubicBezTo>
+                <a:cubicBezTo>
+                  <a:pt x="3573213" y="3910629"/>
+                  <a:pt x="3398782" y="3762626"/>
+                  <a:pt x="3219063" y="3847199"/>
+                </a:cubicBezTo>
+                <a:cubicBezTo>
+                  <a:pt x="3277208" y="3974060"/>
+                  <a:pt x="5909545" y="4756360"/>
+                  <a:pt x="6385269" y="4840933"/>
+                </a:cubicBezTo>
+                <a:cubicBezTo>
+                  <a:pt x="7171204" y="4982659"/>
+                  <a:pt x="9157515" y="5302348"/>
+                  <a:pt x="10285854" y="5471118"/>
+                </a:cubicBezTo>
+                <a:lnTo>
+                  <a:pt x="10423900" y="5491534"/>
+                </a:lnTo>
+                <a:close/>
+              </a:path>
+            </a:pathLst>
+          </a:custGeom>
+          <a:solidFill>
+            <a:schemeClr val="bg2">
+              <a:alpha val="50000"/>
+            </a:schemeClr>
+          </a:solidFill>
+          <a:ln w="32707" cap="flat">
+            <a:noFill/>
+            <a:prstDash val="solid"/>
+            <a:miter/>
+          </a:ln>
+        </p:spPr>
+        <p:txBody>
+          <a:bodyPr rtlCol="0" anchor="ctr"/>
+          <a:lstStyle/>
+          <a:p>
+            <a:endParaRPr lang="en-US"/>
+          </a:p>
+        </p:txBody>
+      </p:sp>
+      <p:sp>
+        <p:nvSpPr>
+          <p:cNvPr id="12" name="Freeform: Shape 11">
+            <a:extLst>
+              <a:ext uri="{FF2B5EF4-FFF2-40B4-BE49-F238E27FC236}">
+                <a16:creationId xmlns:a16="http://schemas.microsoft.com/office/drawing/2014/main" id="{B0651F5E-0457-4065-ACB2-8B81590C204B}"/>
+              </a:ext>
+              <a:ext uri="{C183D7F6-B498-43B3-948B-1728B52AA6E4}">
+                <adec:decorative xmlns:adec="http://schemas.microsoft.com/office/drawing/2017/decorative" val="1"/>
+              </a:ext>
+            </a:extLst>
+          </p:cNvPr>
+          <p:cNvSpPr>
+            <a:spLocks noGrp="1" noRot="1" noChangeAspect="1" noMove="1" noResize="1" noEditPoints="1" noAdjustHandles="1" noChangeArrowheads="1" noChangeShapeType="1" noTextEdit="1"/>
+          </p:cNvSpPr>
+          <p:nvPr>
+            <p:extLst>
+              <p:ext uri="{386F3935-93C4-4BCD-93E2-E3B085C9AB24}">
+                <p16:designElem xmlns:p16="http://schemas.microsoft.com/office/powerpoint/2015/main" val="1"/>
+              </p:ext>
+            </p:extLst>
+          </p:nvPr>
+        </p:nvSpPr>
+        <p:spPr>
+          <a:xfrm rot="21050098" flipH="1" flipV="1">
+            <a:off x="-160709" y="3977842"/>
+            <a:ext cx="7507400" cy="3166385"/>
+          </a:xfrm>
+          <a:custGeom>
+            <a:avLst/>
+            <a:gdLst>
+              <a:gd name="connsiteX0" fmla="*/ 5497485 w 7507400"/>
+              <a:gd name="connsiteY0" fmla="*/ 2912009 h 3166385"/>
+              <a:gd name="connsiteX1" fmla="*/ 7034681 w 7507400"/>
+              <a:gd name="connsiteY1" fmla="*/ 3151263 h 3166385"/>
+              <a:gd name="connsiteX2" fmla="*/ 7137723 w 7507400"/>
+              <a:gd name="connsiteY2" fmla="*/ 3166385 h 3166385"/>
+              <a:gd name="connsiteX3" fmla="*/ 7507400 w 7507400"/>
+              <a:gd name="connsiteY3" fmla="*/ 875071 h 3166385"/>
+              <a:gd name="connsiteX4" fmla="*/ 2083578 w 7507400"/>
+              <a:gd name="connsiteY4" fmla="*/ 0 h 3166385"/>
+              <a:gd name="connsiteX5" fmla="*/ 2023081 w 7507400"/>
+              <a:gd name="connsiteY5" fmla="*/ 5468 h 3166385"/>
+              <a:gd name="connsiteX6" fmla="*/ 1865374 w 7507400"/>
+              <a:gd name="connsiteY6" fmla="*/ 76313 h 3166385"/>
+              <a:gd name="connsiteX7" fmla="*/ 1634010 w 7507400"/>
+              <a:gd name="connsiteY7" fmla="*/ 119359 h 3166385"/>
+              <a:gd name="connsiteX8" fmla="*/ 1388186 w 7507400"/>
+              <a:gd name="connsiteY8" fmla="*/ 130121 h 3166385"/>
+              <a:gd name="connsiteX9" fmla="*/ 1330344 w 7507400"/>
+              <a:gd name="connsiteY9" fmla="*/ 198275 h 3166385"/>
+              <a:gd name="connsiteX10" fmla="*/ 1406262 w 7507400"/>
+              <a:gd name="connsiteY10" fmla="*/ 270018 h 3166385"/>
+              <a:gd name="connsiteX11" fmla="*/ 1521942 w 7507400"/>
+              <a:gd name="connsiteY11" fmla="*/ 277191 h 3166385"/>
+              <a:gd name="connsiteX12" fmla="*/ 2212420 w 7507400"/>
+              <a:gd name="connsiteY12" fmla="*/ 295128 h 3166385"/>
+              <a:gd name="connsiteX13" fmla="*/ 0 w 7507400"/>
+              <a:gd name="connsiteY13" fmla="*/ 452960 h 3166385"/>
+              <a:gd name="connsiteX14" fmla="*/ 300051 w 7507400"/>
+              <a:gd name="connsiteY14" fmla="*/ 549813 h 3166385"/>
+              <a:gd name="connsiteX15" fmla="*/ 401272 w 7507400"/>
+              <a:gd name="connsiteY15" fmla="*/ 815258 h 3166385"/>
+              <a:gd name="connsiteX16" fmla="*/ 770008 w 7507400"/>
+              <a:gd name="connsiteY16" fmla="*/ 965917 h 3166385"/>
+              <a:gd name="connsiteX17" fmla="*/ 1008605 w 7507400"/>
+              <a:gd name="connsiteY17" fmla="*/ 1019724 h 3166385"/>
+              <a:gd name="connsiteX18" fmla="*/ 1554478 w 7507400"/>
+              <a:gd name="connsiteY18" fmla="*/ 1098641 h 3166385"/>
+              <a:gd name="connsiteX19" fmla="*/ 1634010 w 7507400"/>
+              <a:gd name="connsiteY19" fmla="*/ 1227777 h 3166385"/>
+              <a:gd name="connsiteX20" fmla="*/ 1702696 w 7507400"/>
+              <a:gd name="connsiteY20" fmla="*/ 1371261 h 3166385"/>
+              <a:gd name="connsiteX21" fmla="*/ 1847299 w 7507400"/>
+              <a:gd name="connsiteY21" fmla="*/ 1464526 h 3166385"/>
+              <a:gd name="connsiteX22" fmla="*/ 723015 w 7507400"/>
+              <a:gd name="connsiteY22" fmla="*/ 1450177 h 3166385"/>
+              <a:gd name="connsiteX23" fmla="*/ 1991901 w 7507400"/>
+              <a:gd name="connsiteY23" fmla="*/ 1751495 h 3166385"/>
+              <a:gd name="connsiteX24" fmla="*/ 1879835 w 7507400"/>
+              <a:gd name="connsiteY24" fmla="*/ 1869870 h 3166385"/>
+              <a:gd name="connsiteX25" fmla="*/ 2573927 w 7507400"/>
+              <a:gd name="connsiteY25" fmla="*/ 2031290 h 3166385"/>
+              <a:gd name="connsiteX26" fmla="*/ 2201575 w 7507400"/>
+              <a:gd name="connsiteY26" fmla="*/ 2049225 h 3166385"/>
+              <a:gd name="connsiteX27" fmla="*/ 4367000 w 7507400"/>
+              <a:gd name="connsiteY27" fmla="*/ 2723602 h 3166385"/>
+              <a:gd name="connsiteX28" fmla="*/ 5497485 w 7507400"/>
+              <a:gd name="connsiteY28" fmla="*/ 2912009 h 3166385"/>
+            </a:gdLst>
+            <a:ahLst/>
+            <a:cxnLst>
+              <a:cxn ang="0">
+                <a:pos x="connsiteX0" y="connsiteY0"/>
+              </a:cxn>
+              <a:cxn ang="0">
+                <a:pos x="connsiteX1" y="connsiteY1"/>
+              </a:cxn>
+              <a:cxn ang="0">
+                <a:pos x="connsiteX2" y="connsiteY2"/>
+              </a:cxn>
+              <a:cxn ang="0">
+                <a:pos x="connsiteX3" y="connsiteY3"/>
+              </a:cxn>
+              <a:cxn ang="0">
+                <a:pos x="connsiteX4" y="connsiteY4"/>
+              </a:cxn>
+              <a:cxn ang="0">
+                <a:pos x="connsiteX5" y="connsiteY5"/>
+              </a:cxn>
+              <a:cxn ang="0">
+                <a:pos x="connsiteX6" y="connsiteY6"/>
+              </a:cxn>
+              <a:cxn ang="0">
+                <a:pos x="connsiteX7" y="connsiteY7"/>
+              </a:cxn>
+              <a:cxn ang="0">
+                <a:pos x="connsiteX8" y="connsiteY8"/>
+              </a:cxn>
+              <a:cxn ang="0">
+                <a:pos x="connsiteX9" y="connsiteY9"/>
+              </a:cxn>
+              <a:cxn ang="0">
+                <a:pos x="connsiteX10" y="connsiteY10"/>
+              </a:cxn>
+              <a:cxn ang="0">
+                <a:pos x="connsiteX11" y="connsiteY11"/>
+              </a:cxn>
+              <a:cxn ang="0">
+                <a:pos x="connsiteX12" y="connsiteY12"/>
+              </a:cxn>
+              <a:cxn ang="0">
+                <a:pos x="connsiteX13" y="connsiteY13"/>
+              </a:cxn>
+              <a:cxn ang="0">
+                <a:pos x="connsiteX14" y="connsiteY14"/>
+              </a:cxn>
+              <a:cxn ang="0">
+                <a:pos x="connsiteX15" y="connsiteY15"/>
+              </a:cxn>
+              <a:cxn ang="0">
+                <a:pos x="connsiteX16" y="connsiteY16"/>
+              </a:cxn>
+              <a:cxn ang="0">
+                <a:pos x="connsiteX17" y="connsiteY17"/>
+              </a:cxn>
+              <a:cxn ang="0">
+                <a:pos x="connsiteX18" y="connsiteY18"/>
+              </a:cxn>
+              <a:cxn ang="0">
+                <a:pos x="connsiteX19" y="connsiteY19"/>
+              </a:cxn>
+              <a:cxn ang="0">
+                <a:pos x="connsiteX20" y="connsiteY20"/>
+              </a:cxn>
+              <a:cxn ang="0">
+                <a:pos x="connsiteX21" y="connsiteY21"/>
+              </a:cxn>
+              <a:cxn ang="0">
+                <a:pos x="connsiteX22" y="connsiteY22"/>
+              </a:cxn>
+              <a:cxn ang="0">
+                <a:pos x="connsiteX23" y="connsiteY23"/>
+              </a:cxn>
+              <a:cxn ang="0">
+                <a:pos x="connsiteX24" y="connsiteY24"/>
+              </a:cxn>
+              <a:cxn ang="0">
+                <a:pos x="connsiteX25" y="connsiteY25"/>
+              </a:cxn>
+              <a:cxn ang="0">
+                <a:pos x="connsiteX26" y="connsiteY26"/>
+              </a:cxn>
+              <a:cxn ang="0">
+                <a:pos x="connsiteX27" y="connsiteY27"/>
+              </a:cxn>
+              <a:cxn ang="0">
+                <a:pos x="connsiteX28" y="connsiteY28"/>
+              </a:cxn>
+            </a:cxnLst>
+            <a:rect l="l" t="t" r="r" b="b"/>
+            <a:pathLst>
+              <a:path w="7507400" h="3166385">
+                <a:moveTo>
+                  <a:pt x="5497485" y="2912009"/>
+                </a:moveTo>
+                <a:cubicBezTo>
+                  <a:pt x="6033497" y="2998226"/>
+                  <a:pt x="6619155" y="3089592"/>
+                  <a:pt x="7034681" y="3151263"/>
+                </a:cubicBezTo>
+                <a:lnTo>
+                  <a:pt x="7137723" y="3166385"/>
+                </a:lnTo>
+                <a:lnTo>
+                  <a:pt x="7507400" y="875071"/>
+                </a:lnTo>
+                <a:lnTo>
+                  <a:pt x="2083578" y="0"/>
+                </a:lnTo>
+                <a:lnTo>
+                  <a:pt x="2023081" y="5468"/>
+                </a:lnTo>
+                <a:cubicBezTo>
+                  <a:pt x="1965692" y="12642"/>
+                  <a:pt x="1910562" y="27887"/>
+                  <a:pt x="1865374" y="76313"/>
+                </a:cubicBezTo>
+                <a:cubicBezTo>
+                  <a:pt x="1796688" y="151642"/>
+                  <a:pt x="1724387" y="162404"/>
+                  <a:pt x="1634010" y="119359"/>
+                </a:cubicBezTo>
+                <a:cubicBezTo>
+                  <a:pt x="1554478" y="79900"/>
+                  <a:pt x="1467718" y="90662"/>
+                  <a:pt x="1388186" y="130121"/>
+                </a:cubicBezTo>
+                <a:cubicBezTo>
+                  <a:pt x="1359266" y="144469"/>
+                  <a:pt x="1330344" y="162404"/>
+                  <a:pt x="1330344" y="198275"/>
+                </a:cubicBezTo>
+                <a:cubicBezTo>
+                  <a:pt x="1330344" y="248495"/>
+                  <a:pt x="1366496" y="262843"/>
+                  <a:pt x="1406262" y="270018"/>
+                </a:cubicBezTo>
+                <a:cubicBezTo>
+                  <a:pt x="1442412" y="277191"/>
+                  <a:pt x="1485792" y="284366"/>
+                  <a:pt x="1521942" y="277191"/>
+                </a:cubicBezTo>
+                <a:cubicBezTo>
+                  <a:pt x="1753307" y="237734"/>
+                  <a:pt x="1981057" y="302301"/>
+                  <a:pt x="2212420" y="295128"/>
+                </a:cubicBezTo>
+                <a:cubicBezTo>
+                  <a:pt x="1485792" y="449373"/>
+                  <a:pt x="751934" y="399154"/>
+                  <a:pt x="0" y="452960"/>
+                </a:cubicBezTo>
+                <a:cubicBezTo>
+                  <a:pt x="97608" y="560573"/>
+                  <a:pt x="224135" y="470896"/>
+                  <a:pt x="300051" y="549813"/>
+                </a:cubicBezTo>
+                <a:cubicBezTo>
+                  <a:pt x="227750" y="714820"/>
+                  <a:pt x="256671" y="804497"/>
+                  <a:pt x="401272" y="815258"/>
+                </a:cubicBezTo>
+                <a:cubicBezTo>
+                  <a:pt x="542261" y="826019"/>
+                  <a:pt x="694093" y="768625"/>
+                  <a:pt x="770008" y="965917"/>
+                </a:cubicBezTo>
+                <a:cubicBezTo>
+                  <a:pt x="791699" y="1026898"/>
+                  <a:pt x="925458" y="1008963"/>
+                  <a:pt x="1008605" y="1019724"/>
+                </a:cubicBezTo>
+                <a:cubicBezTo>
+                  <a:pt x="1189357" y="1044833"/>
+                  <a:pt x="1380957" y="1019724"/>
+                  <a:pt x="1554478" y="1098641"/>
+                </a:cubicBezTo>
+                <a:cubicBezTo>
+                  <a:pt x="1623165" y="1127337"/>
+                  <a:pt x="1670160" y="1148860"/>
+                  <a:pt x="1634010" y="1227777"/>
+                </a:cubicBezTo>
+                <a:cubicBezTo>
+                  <a:pt x="1597859" y="1310280"/>
+                  <a:pt x="1644855" y="1338976"/>
+                  <a:pt x="1702696" y="1371261"/>
+                </a:cubicBezTo>
+                <a:cubicBezTo>
+                  <a:pt x="1746077" y="1396370"/>
+                  <a:pt x="1811148" y="1389197"/>
+                  <a:pt x="1847299" y="1464526"/>
+                </a:cubicBezTo>
+                <a:cubicBezTo>
+                  <a:pt x="1467717" y="1453764"/>
+                  <a:pt x="1098981" y="1392783"/>
+                  <a:pt x="723015" y="1450177"/>
+                </a:cubicBezTo>
+                <a:cubicBezTo>
+                  <a:pt x="1135131" y="1593662"/>
+                  <a:pt x="1587014" y="1586487"/>
+                  <a:pt x="1991901" y="1751495"/>
+                </a:cubicBezTo>
+                <a:cubicBezTo>
+                  <a:pt x="1977441" y="1808889"/>
+                  <a:pt x="1883449" y="1783778"/>
+                  <a:pt x="1879835" y="1869870"/>
+                </a:cubicBezTo>
+                <a:cubicBezTo>
+                  <a:pt x="2093123" y="1959548"/>
+                  <a:pt x="2349794" y="1898566"/>
+                  <a:pt x="2573927" y="2031290"/>
+                </a:cubicBezTo>
+                <a:cubicBezTo>
+                  <a:pt x="2443785" y="2092271"/>
+                  <a:pt x="2324488" y="1991831"/>
+                  <a:pt x="2201575" y="2049225"/>
+                </a:cubicBezTo>
+                <a:cubicBezTo>
+                  <a:pt x="2241342" y="2135316"/>
+                  <a:pt x="4041644" y="2666208"/>
+                  <a:pt x="4367000" y="2723602"/>
+                </a:cubicBezTo>
+                <a:cubicBezTo>
+                  <a:pt x="4615085" y="2767993"/>
+                  <a:pt x="5038048" y="2838109"/>
+                  <a:pt x="5497485" y="2912009"/>
+                </a:cubicBezTo>
+                <a:close/>
+              </a:path>
+            </a:pathLst>
+          </a:custGeom>
+          <a:solidFill>
+            <a:schemeClr val="bg2">
+              <a:alpha val="50000"/>
+            </a:schemeClr>
+          </a:solidFill>
+          <a:ln w="32707" cap="flat">
+            <a:noFill/>
+            <a:prstDash val="solid"/>
+            <a:miter/>
+          </a:ln>
+        </p:spPr>
+        <p:txBody>
+          <a:bodyPr rtlCol="0" anchor="ctr"/>
+          <a:lstStyle/>
+          <a:p>
+            <a:endParaRPr lang="en-US"/>
+          </a:p>
+        </p:txBody>
+      </p:sp>
       <p:sp>
         <p:nvSpPr>
           <p:cNvPr id="2" name="Title 1">
             <a:extLst>
               <a:ext uri="{FF2B5EF4-FFF2-40B4-BE49-F238E27FC236}">
-                <a16:creationId xmlns:a16="http://schemas.microsoft.com/office/drawing/2014/main" id="{91015A16-2CB8-4252-A3E5-4F77C3FCEB7C}"/>
+                <a16:creationId xmlns:a16="http://schemas.microsoft.com/office/drawing/2014/main" id="{DFFA48B0-B109-3DB8-B29A-F0E11BC3F655}"/>
+              </a:ext>
+            </a:extLst>
+          </p:cNvPr>
+          <p:cNvSpPr>
+            <a:spLocks noGrp="1"/>
+          </p:cNvSpPr>
+          <p:nvPr>
+            <p:ph type="ctrTitle"/>
+          </p:nvPr>
+        </p:nvSpPr>
+        <p:spPr>
+          <a:xfrm>
+            <a:off x="5751094" y="1058780"/>
+            <a:ext cx="5602705" cy="3092116"/>
+          </a:xfrm>
+        </p:spPr>
+        <p:txBody>
+          <a:bodyPr anchor="ctr">
+            <a:normAutofit/>
+          </a:bodyPr>
+          <a:lstStyle/>
+          <a:p>
+            <a:pPr algn="l"/>
+            <a:r>
+              <a:rPr lang="en-US" sz="5200"/>
+              <a:t>Background</a:t>
+            </a:r>
+          </a:p>
+        </p:txBody>
+      </p:sp>
+    </p:spTree>
+    <p:extLst>
+      <p:ext uri="{BB962C8B-B14F-4D97-AF65-F5344CB8AC3E}">
+        <p14:creationId xmlns:p14="http://schemas.microsoft.com/office/powerpoint/2010/main" val="41013224"/>
+      </p:ext>
+    </p:extLst>
+  </p:cSld>
+  <p:clrMapOvr>
+    <a:masterClrMapping/>
+  </p:clrMapOvr>
+</p:sld>
+</file>
+
+<file path=ppt/slides/slide4.xml><?xml version="1.0" encoding="utf-8"?>
+<p:sld xmlns:a="http://schemas.openxmlformats.org/drawingml/2006/main" xmlns:r="http://schemas.openxmlformats.org/officeDocument/2006/relationships" xmlns:p="http://schemas.openxmlformats.org/presentationml/2006/main">
+  <p:cSld>
+    <p:spTree>
+      <p:nvGrpSpPr>
+        <p:cNvPr id="1" name=""/>
+        <p:cNvGrpSpPr/>
+        <p:nvPr/>
+      </p:nvGrpSpPr>
+      <p:grpSpPr>
+        <a:xfrm>
+          <a:off x="0" y="0"/>
+          <a:ext cx="0" cy="0"/>
+          <a:chOff x="0" y="0"/>
+          <a:chExt cx="0" cy="0"/>
+        </a:xfrm>
+      </p:grpSpPr>
+      <p:sp>
+        <p:nvSpPr>
+          <p:cNvPr id="2" name="Title 1">
+            <a:extLst>
+              <a:ext uri="{FF2B5EF4-FFF2-40B4-BE49-F238E27FC236}">
+                <a16:creationId xmlns:a16="http://schemas.microsoft.com/office/drawing/2014/main" id="{F103A08C-47EF-7176-A34D-485EBC8743D9}"/>
               </a:ext>
             </a:extLst>
           </p:cNvPr>
@@ -3965,7 +6378,7 @@
           <a:p>
             <a:r>
               <a:rPr lang="en-US" dirty="0"/>
-              <a:t>Social Media</a:t>
+              <a:t>History</a:t>
             </a:r>
           </a:p>
         </p:txBody>
@@ -3975,7 +6388,7 @@
           <p:cNvPr id="3" name="Content Placeholder 2">
             <a:extLst>
               <a:ext uri="{FF2B5EF4-FFF2-40B4-BE49-F238E27FC236}">
-                <a16:creationId xmlns:a16="http://schemas.microsoft.com/office/drawing/2014/main" id="{AC32B040-A28A-7B85-472A-BF8098601F28}"/>
+                <a16:creationId xmlns:a16="http://schemas.microsoft.com/office/drawing/2014/main" id="{97E6B52A-024B-64C7-482E-FA365D905B04}"/>
               </a:ext>
             </a:extLst>
           </p:cNvPr>
@@ -3993,22 +6406,742 @@
           <a:p>
             <a:r>
               <a:rPr lang="en-US" dirty="0"/>
+              <a:t>Computer based communication technologies, email, bulletin board systems (1960s)</a:t>
+            </a:r>
+          </a:p>
+          <a:p>
+            <a:endParaRPr lang="en-US" dirty="0"/>
+          </a:p>
+          <a:p>
+            <a:r>
+              <a:rPr lang="en-US" dirty="0"/>
+              <a:t>Six Degrees launched a site with users and profiles with friends (1997)</a:t>
+            </a:r>
+          </a:p>
+          <a:p>
+            <a:endParaRPr lang="en-US" dirty="0"/>
+          </a:p>
+          <a:p>
+            <a:r>
+              <a:rPr lang="en-US" dirty="0" err="1"/>
+              <a:t>MySpace</a:t>
+            </a:r>
+            <a:r>
+              <a:rPr lang="en-US" dirty="0"/>
+              <a:t> (2003) Facebook (2004)</a:t>
+            </a:r>
+          </a:p>
+        </p:txBody>
+      </p:sp>
+    </p:spTree>
+    <p:extLst>
+      <p:ext uri="{BB962C8B-B14F-4D97-AF65-F5344CB8AC3E}">
+        <p14:creationId xmlns:p14="http://schemas.microsoft.com/office/powerpoint/2010/main" val="2745756700"/>
+      </p:ext>
+    </p:extLst>
+  </p:cSld>
+  <p:clrMapOvr>
+    <a:masterClrMapping/>
+  </p:clrMapOvr>
+</p:sld>
+</file>
+
+<file path=ppt/slides/slide5.xml><?xml version="1.0" encoding="utf-8"?>
+<p:sld xmlns:a="http://schemas.openxmlformats.org/drawingml/2006/main" xmlns:r="http://schemas.openxmlformats.org/officeDocument/2006/relationships" xmlns:p="http://schemas.openxmlformats.org/presentationml/2006/main">
+  <p:cSld>
+    <p:bg>
+      <p:bgPr>
+        <a:solidFill>
+          <a:schemeClr val="bg1"/>
+        </a:solidFill>
+        <a:effectLst/>
+      </p:bgPr>
+    </p:bg>
+    <p:spTree>
+      <p:nvGrpSpPr>
+        <p:cNvPr id="1" name=""/>
+        <p:cNvGrpSpPr/>
+        <p:nvPr/>
+      </p:nvGrpSpPr>
+      <p:grpSpPr>
+        <a:xfrm>
+          <a:off x="0" y="0"/>
+          <a:ext cx="0" cy="0"/>
+          <a:chOff x="0" y="0"/>
+          <a:chExt cx="0" cy="0"/>
+        </a:xfrm>
+      </p:grpSpPr>
+      <p:sp useBgFill="1">
+        <p:nvSpPr>
+          <p:cNvPr id="8" name="Rectangle 7">
+            <a:extLst>
+              <a:ext uri="{FF2B5EF4-FFF2-40B4-BE49-F238E27FC236}">
+                <a16:creationId xmlns:a16="http://schemas.microsoft.com/office/drawing/2014/main" id="{6A8AAC95-3719-4BCD-B710-4160043D9237}"/>
+              </a:ext>
+              <a:ext uri="{C183D7F6-B498-43B3-948B-1728B52AA6E4}">
+                <adec:decorative xmlns:adec="http://schemas.microsoft.com/office/drawing/2017/decorative" val="1"/>
+              </a:ext>
+            </a:extLst>
+          </p:cNvPr>
+          <p:cNvSpPr>
+            <a:spLocks noGrp="1" noRot="1" noChangeAspect="1" noMove="1" noResize="1" noEditPoints="1" noAdjustHandles="1" noChangeArrowheads="1" noChangeShapeType="1" noTextEdit="1"/>
+          </p:cNvSpPr>
+          <p:nvPr>
+            <p:extLst>
+              <p:ext uri="{386F3935-93C4-4BCD-93E2-E3B085C9AB24}">
+                <p16:designElem xmlns:p16="http://schemas.microsoft.com/office/powerpoint/2015/main" val="1"/>
+              </p:ext>
+            </p:extLst>
+          </p:nvPr>
+        </p:nvSpPr>
+        <p:spPr>
+          <a:xfrm>
+            <a:off x="0" y="0"/>
+            <a:ext cx="12188952" cy="6858000"/>
+          </a:xfrm>
+          <a:prstGeom prst="rect">
+            <a:avLst/>
+          </a:prstGeom>
+          <a:ln>
+            <a:noFill/>
+          </a:ln>
+        </p:spPr>
+        <p:style>
+          <a:lnRef idx="2">
+            <a:schemeClr val="accent1">
+              <a:shade val="50000"/>
+            </a:schemeClr>
+          </a:lnRef>
+          <a:fillRef idx="1">
+            <a:schemeClr val="accent1"/>
+          </a:fillRef>
+          <a:effectRef idx="0">
+            <a:schemeClr val="accent1"/>
+          </a:effectRef>
+          <a:fontRef idx="minor">
+            <a:schemeClr val="lt1"/>
+          </a:fontRef>
+        </p:style>
+        <p:txBody>
+          <a:bodyPr rtlCol="0" anchor="ctr"/>
+          <a:lstStyle/>
+          <a:p>
+            <a:pPr algn="ctr"/>
+            <a:endParaRPr lang="en-US"/>
+          </a:p>
+        </p:txBody>
+      </p:sp>
+      <p:sp>
+        <p:nvSpPr>
+          <p:cNvPr id="10" name="Freeform: Shape 9">
+            <a:extLst>
+              <a:ext uri="{FF2B5EF4-FFF2-40B4-BE49-F238E27FC236}">
+                <a16:creationId xmlns:a16="http://schemas.microsoft.com/office/drawing/2014/main" id="{73A6D7BA-50E4-42FE-A0E3-FC42B7EC4372}"/>
+              </a:ext>
+              <a:ext uri="{C183D7F6-B498-43B3-948B-1728B52AA6E4}">
+                <adec:decorative xmlns:adec="http://schemas.microsoft.com/office/drawing/2017/decorative" val="1"/>
+              </a:ext>
+            </a:extLst>
+          </p:cNvPr>
+          <p:cNvSpPr>
+            <a:spLocks noGrp="1" noRot="1" noChangeAspect="1" noMove="1" noResize="1" noEditPoints="1" noAdjustHandles="1" noChangeArrowheads="1" noChangeShapeType="1" noTextEdit="1"/>
+          </p:cNvSpPr>
+          <p:nvPr>
+            <p:extLst>
+              <p:ext uri="{386F3935-93C4-4BCD-93E2-E3B085C9AB24}">
+                <p16:designElem xmlns:p16="http://schemas.microsoft.com/office/powerpoint/2015/main" val="1"/>
+              </p:ext>
+            </p:extLst>
+          </p:nvPr>
+        </p:nvSpPr>
+        <p:spPr>
+          <a:xfrm flipH="1">
+            <a:off x="1" y="2767722"/>
+            <a:ext cx="3021543" cy="1532055"/>
+          </a:xfrm>
+          <a:custGeom>
+            <a:avLst/>
+            <a:gdLst>
+              <a:gd name="connsiteX0" fmla="*/ 3021543 w 3021543"/>
+              <a:gd name="connsiteY0" fmla="*/ 0 h 1532055"/>
+              <a:gd name="connsiteX1" fmla="*/ 2963800 w 3021543"/>
+              <a:gd name="connsiteY1" fmla="*/ 7730 h 1532055"/>
+              <a:gd name="connsiteX2" fmla="*/ 2793803 w 3021543"/>
+              <a:gd name="connsiteY2" fmla="*/ 25704 h 1532055"/>
+              <a:gd name="connsiteX3" fmla="*/ 2414348 w 3021543"/>
+              <a:gd name="connsiteY3" fmla="*/ 31695 h 1532055"/>
+              <a:gd name="connsiteX4" fmla="*/ 2091558 w 3021543"/>
+              <a:gd name="connsiteY4" fmla="*/ 29298 h 1532055"/>
+              <a:gd name="connsiteX5" fmla="*/ 1645319 w 3021543"/>
+              <a:gd name="connsiteY5" fmla="*/ 30497 h 1532055"/>
+              <a:gd name="connsiteX6" fmla="*/ 1243602 w 3021543"/>
+              <a:gd name="connsiteY6" fmla="*/ 64048 h 1532055"/>
+              <a:gd name="connsiteX7" fmla="*/ 753851 w 3021543"/>
+              <a:gd name="connsiteY7" fmla="*/ 61651 h 1532055"/>
+              <a:gd name="connsiteX8" fmla="*/ 465465 w 3021543"/>
+              <a:gd name="connsiteY8" fmla="*/ 123960 h 1532055"/>
+              <a:gd name="connsiteX9" fmla="*/ 546416 w 3021543"/>
+              <a:gd name="connsiteY9" fmla="*/ 145529 h 1532055"/>
+              <a:gd name="connsiteX10" fmla="*/ 689091 w 3021543"/>
+              <a:gd name="connsiteY10" fmla="*/ 192260 h 1532055"/>
+              <a:gd name="connsiteX11" fmla="*/ 704269 w 3021543"/>
+              <a:gd name="connsiteY11" fmla="*/ 222217 h 1532055"/>
+              <a:gd name="connsiteX12" fmla="*/ 683020 w 3021543"/>
+              <a:gd name="connsiteY12" fmla="*/ 236595 h 1532055"/>
+              <a:gd name="connsiteX13" fmla="*/ 621295 w 3021543"/>
+              <a:gd name="connsiteY13" fmla="*/ 264155 h 1532055"/>
+              <a:gd name="connsiteX14" fmla="*/ 848968 w 3021543"/>
+              <a:gd name="connsiteY14" fmla="*/ 304896 h 1532055"/>
+              <a:gd name="connsiteX15" fmla="*/ 768018 w 3021543"/>
+              <a:gd name="connsiteY15" fmla="*/ 330059 h 1532055"/>
+              <a:gd name="connsiteX16" fmla="*/ 684032 w 3021543"/>
+              <a:gd name="connsiteY16" fmla="*/ 348032 h 1532055"/>
+              <a:gd name="connsiteX17" fmla="*/ 592962 w 3021543"/>
+              <a:gd name="connsiteY17" fmla="*/ 361213 h 1532055"/>
+              <a:gd name="connsiteX18" fmla="*/ 509988 w 3021543"/>
+              <a:gd name="connsiteY18" fmla="*/ 387575 h 1532055"/>
+              <a:gd name="connsiteX19" fmla="*/ 726531 w 3021543"/>
+              <a:gd name="connsiteY19" fmla="*/ 398359 h 1532055"/>
+              <a:gd name="connsiteX20" fmla="*/ 614212 w 3021543"/>
+              <a:gd name="connsiteY20" fmla="*/ 422324 h 1532055"/>
+              <a:gd name="connsiteX21" fmla="*/ 522131 w 3021543"/>
+              <a:gd name="connsiteY21" fmla="*/ 453478 h 1532055"/>
+              <a:gd name="connsiteX22" fmla="*/ 457370 w 3021543"/>
+              <a:gd name="connsiteY22" fmla="*/ 467857 h 1532055"/>
+              <a:gd name="connsiteX23" fmla="*/ 388562 w 3021543"/>
+              <a:gd name="connsiteY23" fmla="*/ 471452 h 1532055"/>
+              <a:gd name="connsiteX24" fmla="*/ 372372 w 3021543"/>
+              <a:gd name="connsiteY24" fmla="*/ 494218 h 1532055"/>
+              <a:gd name="connsiteX25" fmla="*/ 393622 w 3021543"/>
+              <a:gd name="connsiteY25" fmla="*/ 518184 h 1532055"/>
+              <a:gd name="connsiteX26" fmla="*/ 426002 w 3021543"/>
+              <a:gd name="connsiteY26" fmla="*/ 520580 h 1532055"/>
+              <a:gd name="connsiteX27" fmla="*/ 619271 w 3021543"/>
+              <a:gd name="connsiteY27" fmla="*/ 526571 h 1532055"/>
+              <a:gd name="connsiteX28" fmla="*/ 0 w 3021543"/>
+              <a:gd name="connsiteY28" fmla="*/ 579294 h 1532055"/>
+              <a:gd name="connsiteX29" fmla="*/ 83986 w 3021543"/>
+              <a:gd name="connsiteY29" fmla="*/ 611647 h 1532055"/>
+              <a:gd name="connsiteX30" fmla="*/ 112319 w 3021543"/>
+              <a:gd name="connsiteY30" fmla="*/ 700317 h 1532055"/>
+              <a:gd name="connsiteX31" fmla="*/ 215531 w 3021543"/>
+              <a:gd name="connsiteY31" fmla="*/ 750643 h 1532055"/>
+              <a:gd name="connsiteX32" fmla="*/ 282315 w 3021543"/>
+              <a:gd name="connsiteY32" fmla="*/ 768617 h 1532055"/>
+              <a:gd name="connsiteX33" fmla="*/ 435109 w 3021543"/>
+              <a:gd name="connsiteY33" fmla="*/ 794979 h 1532055"/>
+              <a:gd name="connsiteX34" fmla="*/ 457370 w 3021543"/>
+              <a:gd name="connsiteY34" fmla="*/ 838116 h 1532055"/>
+              <a:gd name="connsiteX35" fmla="*/ 476596 w 3021543"/>
+              <a:gd name="connsiteY35" fmla="*/ 886046 h 1532055"/>
+              <a:gd name="connsiteX36" fmla="*/ 517071 w 3021543"/>
+              <a:gd name="connsiteY36" fmla="*/ 917200 h 1532055"/>
+              <a:gd name="connsiteX37" fmla="*/ 202377 w 3021543"/>
+              <a:gd name="connsiteY37" fmla="*/ 912407 h 1532055"/>
+              <a:gd name="connsiteX38" fmla="*/ 557546 w 3021543"/>
+              <a:gd name="connsiteY38" fmla="*/ 1013060 h 1532055"/>
+              <a:gd name="connsiteX39" fmla="*/ 526178 w 3021543"/>
+              <a:gd name="connsiteY39" fmla="*/ 1052602 h 1532055"/>
+              <a:gd name="connsiteX40" fmla="*/ 720459 w 3021543"/>
+              <a:gd name="connsiteY40" fmla="*/ 1106523 h 1532055"/>
+              <a:gd name="connsiteX41" fmla="*/ 616236 w 3021543"/>
+              <a:gd name="connsiteY41" fmla="*/ 1112514 h 1532055"/>
+              <a:gd name="connsiteX42" fmla="*/ 1222353 w 3021543"/>
+              <a:gd name="connsiteY42" fmla="*/ 1337785 h 1532055"/>
+              <a:gd name="connsiteX43" fmla="*/ 2087511 w 3021543"/>
+              <a:gd name="connsiteY43" fmla="*/ 1500747 h 1532055"/>
+              <a:gd name="connsiteX44" fmla="*/ 2425479 w 3021543"/>
+              <a:gd name="connsiteY44" fmla="*/ 1531901 h 1532055"/>
+              <a:gd name="connsiteX45" fmla="*/ 2809994 w 3021543"/>
+              <a:gd name="connsiteY45" fmla="*/ 1522315 h 1532055"/>
+              <a:gd name="connsiteX46" fmla="*/ 2953618 w 3021543"/>
+              <a:gd name="connsiteY46" fmla="*/ 1512448 h 1532055"/>
+              <a:gd name="connsiteX47" fmla="*/ 3021543 w 3021543"/>
+              <a:gd name="connsiteY47" fmla="*/ 1502657 h 1532055"/>
+            </a:gdLst>
+            <a:ahLst/>
+            <a:cxnLst>
+              <a:cxn ang="0">
+                <a:pos x="connsiteX0" y="connsiteY0"/>
+              </a:cxn>
+              <a:cxn ang="0">
+                <a:pos x="connsiteX1" y="connsiteY1"/>
+              </a:cxn>
+              <a:cxn ang="0">
+                <a:pos x="connsiteX2" y="connsiteY2"/>
+              </a:cxn>
+              <a:cxn ang="0">
+                <a:pos x="connsiteX3" y="connsiteY3"/>
+              </a:cxn>
+              <a:cxn ang="0">
+                <a:pos x="connsiteX4" y="connsiteY4"/>
+              </a:cxn>
+              <a:cxn ang="0">
+                <a:pos x="connsiteX5" y="connsiteY5"/>
+              </a:cxn>
+              <a:cxn ang="0">
+                <a:pos x="connsiteX6" y="connsiteY6"/>
+              </a:cxn>
+              <a:cxn ang="0">
+                <a:pos x="connsiteX7" y="connsiteY7"/>
+              </a:cxn>
+              <a:cxn ang="0">
+                <a:pos x="connsiteX8" y="connsiteY8"/>
+              </a:cxn>
+              <a:cxn ang="0">
+                <a:pos x="connsiteX9" y="connsiteY9"/>
+              </a:cxn>
+              <a:cxn ang="0">
+                <a:pos x="connsiteX10" y="connsiteY10"/>
+              </a:cxn>
+              <a:cxn ang="0">
+                <a:pos x="connsiteX11" y="connsiteY11"/>
+              </a:cxn>
+              <a:cxn ang="0">
+                <a:pos x="connsiteX12" y="connsiteY12"/>
+              </a:cxn>
+              <a:cxn ang="0">
+                <a:pos x="connsiteX13" y="connsiteY13"/>
+              </a:cxn>
+              <a:cxn ang="0">
+                <a:pos x="connsiteX14" y="connsiteY14"/>
+              </a:cxn>
+              <a:cxn ang="0">
+                <a:pos x="connsiteX15" y="connsiteY15"/>
+              </a:cxn>
+              <a:cxn ang="0">
+                <a:pos x="connsiteX16" y="connsiteY16"/>
+              </a:cxn>
+              <a:cxn ang="0">
+                <a:pos x="connsiteX17" y="connsiteY17"/>
+              </a:cxn>
+              <a:cxn ang="0">
+                <a:pos x="connsiteX18" y="connsiteY18"/>
+              </a:cxn>
+              <a:cxn ang="0">
+                <a:pos x="connsiteX19" y="connsiteY19"/>
+              </a:cxn>
+              <a:cxn ang="0">
+                <a:pos x="connsiteX20" y="connsiteY20"/>
+              </a:cxn>
+              <a:cxn ang="0">
+                <a:pos x="connsiteX21" y="connsiteY21"/>
+              </a:cxn>
+              <a:cxn ang="0">
+                <a:pos x="connsiteX22" y="connsiteY22"/>
+              </a:cxn>
+              <a:cxn ang="0">
+                <a:pos x="connsiteX23" y="connsiteY23"/>
+              </a:cxn>
+              <a:cxn ang="0">
+                <a:pos x="connsiteX24" y="connsiteY24"/>
+              </a:cxn>
+              <a:cxn ang="0">
+                <a:pos x="connsiteX25" y="connsiteY25"/>
+              </a:cxn>
+              <a:cxn ang="0">
+                <a:pos x="connsiteX26" y="connsiteY26"/>
+              </a:cxn>
+              <a:cxn ang="0">
+                <a:pos x="connsiteX27" y="connsiteY27"/>
+              </a:cxn>
+              <a:cxn ang="0">
+                <a:pos x="connsiteX28" y="connsiteY28"/>
+              </a:cxn>
+              <a:cxn ang="0">
+                <a:pos x="connsiteX29" y="connsiteY29"/>
+              </a:cxn>
+              <a:cxn ang="0">
+                <a:pos x="connsiteX30" y="connsiteY30"/>
+              </a:cxn>
+              <a:cxn ang="0">
+                <a:pos x="connsiteX31" y="connsiteY31"/>
+              </a:cxn>
+              <a:cxn ang="0">
+                <a:pos x="connsiteX32" y="connsiteY32"/>
+              </a:cxn>
+              <a:cxn ang="0">
+                <a:pos x="connsiteX33" y="connsiteY33"/>
+              </a:cxn>
+              <a:cxn ang="0">
+                <a:pos x="connsiteX34" y="connsiteY34"/>
+              </a:cxn>
+              <a:cxn ang="0">
+                <a:pos x="connsiteX35" y="connsiteY35"/>
+              </a:cxn>
+              <a:cxn ang="0">
+                <a:pos x="connsiteX36" y="connsiteY36"/>
+              </a:cxn>
+              <a:cxn ang="0">
+                <a:pos x="connsiteX37" y="connsiteY37"/>
+              </a:cxn>
+              <a:cxn ang="0">
+                <a:pos x="connsiteX38" y="connsiteY38"/>
+              </a:cxn>
+              <a:cxn ang="0">
+                <a:pos x="connsiteX39" y="connsiteY39"/>
+              </a:cxn>
+              <a:cxn ang="0">
+                <a:pos x="connsiteX40" y="connsiteY40"/>
+              </a:cxn>
+              <a:cxn ang="0">
+                <a:pos x="connsiteX41" y="connsiteY41"/>
+              </a:cxn>
+              <a:cxn ang="0">
+                <a:pos x="connsiteX42" y="connsiteY42"/>
+              </a:cxn>
+              <a:cxn ang="0">
+                <a:pos x="connsiteX43" y="connsiteY43"/>
+              </a:cxn>
+              <a:cxn ang="0">
+                <a:pos x="connsiteX44" y="connsiteY44"/>
+              </a:cxn>
+              <a:cxn ang="0">
+                <a:pos x="connsiteX45" y="connsiteY45"/>
+              </a:cxn>
+              <a:cxn ang="0">
+                <a:pos x="connsiteX46" y="connsiteY46"/>
+              </a:cxn>
+              <a:cxn ang="0">
+                <a:pos x="connsiteX47" y="connsiteY47"/>
+              </a:cxn>
+            </a:cxnLst>
+            <a:rect l="l" t="t" r="r" b="b"/>
+            <a:pathLst>
+              <a:path w="3021543" h="1532055">
+                <a:moveTo>
+                  <a:pt x="3021543" y="0"/>
+                </a:moveTo>
+                <a:lnTo>
+                  <a:pt x="2963800" y="7730"/>
+                </a:lnTo>
+                <a:cubicBezTo>
+                  <a:pt x="2907134" y="14919"/>
+                  <a:pt x="2850469" y="24506"/>
+                  <a:pt x="2793803" y="25704"/>
+                </a:cubicBezTo>
+                <a:cubicBezTo>
+                  <a:pt x="2667318" y="29298"/>
+                  <a:pt x="2539821" y="20911"/>
+                  <a:pt x="2414348" y="31695"/>
+                </a:cubicBezTo>
+                <a:cubicBezTo>
+                  <a:pt x="2307089" y="41281"/>
+                  <a:pt x="2198818" y="30497"/>
+                  <a:pt x="2091558" y="29298"/>
+                </a:cubicBezTo>
+                <a:cubicBezTo>
+                  <a:pt x="1942812" y="28100"/>
+                  <a:pt x="1793053" y="19713"/>
+                  <a:pt x="1645319" y="30497"/>
+                </a:cubicBezTo>
+                <a:cubicBezTo>
+                  <a:pt x="1510738" y="38885"/>
+                  <a:pt x="1376158" y="41281"/>
+                  <a:pt x="1243602" y="64048"/>
+                </a:cubicBezTo>
+                <a:cubicBezTo>
+                  <a:pt x="1079677" y="76030"/>
+                  <a:pt x="916765" y="68841"/>
+                  <a:pt x="753851" y="61651"/>
+                </a:cubicBezTo>
+                <a:cubicBezTo>
+                  <a:pt x="653675" y="56858"/>
+                  <a:pt x="554511" y="41281"/>
+                  <a:pt x="465465" y="123960"/>
+                </a:cubicBezTo>
+                <a:cubicBezTo>
+                  <a:pt x="489751" y="143132"/>
+                  <a:pt x="519095" y="139537"/>
+                  <a:pt x="546416" y="145529"/>
+                </a:cubicBezTo>
+                <a:cubicBezTo>
+                  <a:pt x="594986" y="157511"/>
+                  <a:pt x="643557" y="169493"/>
+                  <a:pt x="689091" y="192260"/>
+                </a:cubicBezTo>
+                <a:cubicBezTo>
+                  <a:pt x="699210" y="197053"/>
+                  <a:pt x="708317" y="206639"/>
+                  <a:pt x="704269" y="222217"/>
+                </a:cubicBezTo>
+                <a:cubicBezTo>
+                  <a:pt x="701234" y="234199"/>
+                  <a:pt x="691115" y="234199"/>
+                  <a:pt x="683020" y="236595"/>
+                </a:cubicBezTo>
+                <a:cubicBezTo>
+                  <a:pt x="664806" y="243785"/>
+                  <a:pt x="642545" y="238992"/>
+                  <a:pt x="621295" y="264155"/>
+                </a:cubicBezTo>
+                <a:cubicBezTo>
+                  <a:pt x="702245" y="277336"/>
+                  <a:pt x="780160" y="252172"/>
+                  <a:pt x="848968" y="304896"/>
+                </a:cubicBezTo>
+                <a:cubicBezTo>
+                  <a:pt x="823671" y="331257"/>
+                  <a:pt x="795339" y="325266"/>
+                  <a:pt x="768018" y="330059"/>
+                </a:cubicBezTo>
+                <a:cubicBezTo>
+                  <a:pt x="739685" y="334852"/>
+                  <a:pt x="712365" y="343240"/>
+                  <a:pt x="684032" y="348032"/>
+                </a:cubicBezTo>
+                <a:cubicBezTo>
+                  <a:pt x="653675" y="354023"/>
+                  <a:pt x="623319" y="355222"/>
+                  <a:pt x="592962" y="361213"/>
+                </a:cubicBezTo>
+                <a:cubicBezTo>
+                  <a:pt x="567666" y="366006"/>
+                  <a:pt x="540345" y="357618"/>
+                  <a:pt x="509988" y="387575"/>
+                </a:cubicBezTo>
+                <a:cubicBezTo>
+                  <a:pt x="584867" y="409143"/>
+                  <a:pt x="652663" y="376790"/>
+                  <a:pt x="726531" y="398359"/>
+                </a:cubicBezTo>
+                <a:cubicBezTo>
+                  <a:pt x="683020" y="417531"/>
+                  <a:pt x="647604" y="411539"/>
+                  <a:pt x="614212" y="422324"/>
+                </a:cubicBezTo>
+                <a:cubicBezTo>
+                  <a:pt x="583855" y="433108"/>
+                  <a:pt x="547428" y="421126"/>
+                  <a:pt x="522131" y="453478"/>
+                </a:cubicBezTo>
+                <a:cubicBezTo>
+                  <a:pt x="502905" y="478641"/>
+                  <a:pt x="482668" y="482236"/>
+                  <a:pt x="457370" y="467857"/>
+                </a:cubicBezTo>
+                <a:cubicBezTo>
+                  <a:pt x="435109" y="454676"/>
+                  <a:pt x="410824" y="458271"/>
+                  <a:pt x="388562" y="471452"/>
+                </a:cubicBezTo>
+                <a:cubicBezTo>
+                  <a:pt x="380468" y="476245"/>
+                  <a:pt x="372372" y="482236"/>
+                  <a:pt x="372372" y="494218"/>
+                </a:cubicBezTo>
+                <a:cubicBezTo>
+                  <a:pt x="372372" y="510994"/>
+                  <a:pt x="382491" y="515787"/>
+                  <a:pt x="393622" y="518184"/>
+                </a:cubicBezTo>
+                <a:cubicBezTo>
+                  <a:pt x="403741" y="520580"/>
+                  <a:pt x="415883" y="522977"/>
+                  <a:pt x="426002" y="520580"/>
+                </a:cubicBezTo>
+                <a:cubicBezTo>
+                  <a:pt x="490762" y="507399"/>
+                  <a:pt x="554511" y="528968"/>
+                  <a:pt x="619271" y="526571"/>
+                </a:cubicBezTo>
+                <a:cubicBezTo>
+                  <a:pt x="415883" y="578096"/>
+                  <a:pt x="210471" y="561321"/>
+                  <a:pt x="0" y="579294"/>
+                </a:cubicBezTo>
+                <a:cubicBezTo>
+                  <a:pt x="27321" y="615241"/>
+                  <a:pt x="62737" y="585286"/>
+                  <a:pt x="83986" y="611647"/>
+                </a:cubicBezTo>
+                <a:cubicBezTo>
+                  <a:pt x="63748" y="666766"/>
+                  <a:pt x="71844" y="696722"/>
+                  <a:pt x="112319" y="700317"/>
+                </a:cubicBezTo>
+                <a:cubicBezTo>
+                  <a:pt x="151782" y="703912"/>
+                  <a:pt x="194281" y="684740"/>
+                  <a:pt x="215531" y="750643"/>
+                </a:cubicBezTo>
+                <a:cubicBezTo>
+                  <a:pt x="221602" y="771014"/>
+                  <a:pt x="259042" y="765023"/>
+                  <a:pt x="282315" y="768617"/>
+                </a:cubicBezTo>
+                <a:cubicBezTo>
+                  <a:pt x="332909" y="777005"/>
+                  <a:pt x="386539" y="768617"/>
+                  <a:pt x="435109" y="794979"/>
+                </a:cubicBezTo>
+                <a:cubicBezTo>
+                  <a:pt x="454335" y="804565"/>
+                  <a:pt x="467489" y="811754"/>
+                  <a:pt x="457370" y="838116"/>
+                </a:cubicBezTo>
+                <a:cubicBezTo>
+                  <a:pt x="447252" y="865675"/>
+                  <a:pt x="460406" y="875261"/>
+                  <a:pt x="476596" y="886046"/>
+                </a:cubicBezTo>
+                <a:cubicBezTo>
+                  <a:pt x="488739" y="894433"/>
+                  <a:pt x="506953" y="892037"/>
+                  <a:pt x="517071" y="917200"/>
+                </a:cubicBezTo>
+                <a:cubicBezTo>
+                  <a:pt x="410824" y="913605"/>
+                  <a:pt x="307612" y="893235"/>
+                  <a:pt x="202377" y="912407"/>
+                </a:cubicBezTo>
+                <a:cubicBezTo>
+                  <a:pt x="317731" y="960337"/>
+                  <a:pt x="444216" y="957940"/>
+                  <a:pt x="557546" y="1013060"/>
+                </a:cubicBezTo>
+                <a:cubicBezTo>
+                  <a:pt x="553499" y="1032232"/>
+                  <a:pt x="527190" y="1023844"/>
+                  <a:pt x="526178" y="1052602"/>
+                </a:cubicBezTo>
+                <a:cubicBezTo>
+                  <a:pt x="585879" y="1082558"/>
+                  <a:pt x="657723" y="1062188"/>
+                  <a:pt x="720459" y="1106523"/>
+                </a:cubicBezTo>
+                <a:cubicBezTo>
+                  <a:pt x="684032" y="1126893"/>
+                  <a:pt x="650640" y="1093342"/>
+                  <a:pt x="616236" y="1112514"/>
+                </a:cubicBezTo>
+                <a:cubicBezTo>
+                  <a:pt x="627367" y="1141273"/>
+                  <a:pt x="1131283" y="1318613"/>
+                  <a:pt x="1222353" y="1337785"/>
+                </a:cubicBezTo>
+                <a:cubicBezTo>
+                  <a:pt x="1407527" y="1377327"/>
+                  <a:pt x="1940788" y="1477980"/>
+                  <a:pt x="2087511" y="1500747"/>
+                </a:cubicBezTo>
+                <a:cubicBezTo>
+                  <a:pt x="2200841" y="1517522"/>
+                  <a:pt x="2313160" y="1530703"/>
+                  <a:pt x="2425479" y="1531901"/>
+                </a:cubicBezTo>
+                <a:cubicBezTo>
+                  <a:pt x="2553988" y="1533099"/>
+                  <a:pt x="2681485" y="1527108"/>
+                  <a:pt x="2809994" y="1522315"/>
+                </a:cubicBezTo>
+                <a:cubicBezTo>
+                  <a:pt x="2858058" y="1520518"/>
+                  <a:pt x="2905933" y="1517372"/>
+                  <a:pt x="2953618" y="1512448"/>
+                </a:cubicBezTo>
+                <a:lnTo>
+                  <a:pt x="3021543" y="1502657"/>
+                </a:lnTo>
+                <a:close/>
+              </a:path>
+            </a:pathLst>
+          </a:custGeom>
+          <a:solidFill>
+            <a:schemeClr val="bg2">
+              <a:alpha val="50000"/>
+            </a:schemeClr>
+          </a:solidFill>
+          <a:ln w="32707" cap="flat">
+            <a:noFill/>
+            <a:prstDash val="solid"/>
+            <a:miter/>
+          </a:ln>
+        </p:spPr>
+        <p:txBody>
+          <a:bodyPr rtlCol="0" anchor="ctr"/>
+          <a:lstStyle/>
+          <a:p>
+            <a:endParaRPr lang="en-US" dirty="0"/>
+          </a:p>
+        </p:txBody>
+      </p:sp>
+      <p:sp>
+        <p:nvSpPr>
+          <p:cNvPr id="2" name="Title 1">
+            <a:extLst>
+              <a:ext uri="{FF2B5EF4-FFF2-40B4-BE49-F238E27FC236}">
+                <a16:creationId xmlns:a16="http://schemas.microsoft.com/office/drawing/2014/main" id="{91015A16-2CB8-4252-A3E5-4F77C3FCEB7C}"/>
+              </a:ext>
+            </a:extLst>
+          </p:cNvPr>
+          <p:cNvSpPr>
+            <a:spLocks noGrp="1"/>
+          </p:cNvSpPr>
+          <p:nvPr>
+            <p:ph type="title"/>
+          </p:nvPr>
+        </p:nvSpPr>
+        <p:spPr>
+          <a:xfrm>
+            <a:off x="838200" y="838199"/>
+            <a:ext cx="4191000" cy="5338763"/>
+          </a:xfrm>
+        </p:spPr>
+        <p:txBody>
+          <a:bodyPr>
+            <a:normAutofit/>
+          </a:bodyPr>
+          <a:lstStyle/>
+          <a:p>
+            <a:r>
+              <a:rPr lang="en-US" dirty="0"/>
+              <a:t>Social Media</a:t>
+            </a:r>
+          </a:p>
+        </p:txBody>
+      </p:sp>
+      <p:sp>
+        <p:nvSpPr>
+          <p:cNvPr id="3" name="Content Placeholder 2">
+            <a:extLst>
+              <a:ext uri="{FF2B5EF4-FFF2-40B4-BE49-F238E27FC236}">
+                <a16:creationId xmlns:a16="http://schemas.microsoft.com/office/drawing/2014/main" id="{AC32B040-A28A-7B85-472A-BF8098601F28}"/>
+              </a:ext>
+            </a:extLst>
+          </p:cNvPr>
+          <p:cNvSpPr>
+            <a:spLocks noGrp="1"/>
+          </p:cNvSpPr>
+          <p:nvPr>
+            <p:ph idx="1"/>
+          </p:nvPr>
+        </p:nvSpPr>
+        <p:spPr>
+          <a:xfrm>
+            <a:off x="5302332" y="838199"/>
+            <a:ext cx="6051468" cy="5338763"/>
+          </a:xfrm>
+        </p:spPr>
+        <p:txBody>
+          <a:bodyPr anchor="ctr">
+            <a:normAutofit/>
+          </a:bodyPr>
+          <a:lstStyle/>
+          <a:p>
+            <a:r>
+              <a:rPr lang="en-US" sz="2000"/>
               <a:t>A form of electronic communication that allows users to create online communities to share information, ideas, personal messages, and other content.</a:t>
             </a:r>
           </a:p>
           <a:p>
-            <a:endParaRPr lang="en-US" dirty="0"/>
-          </a:p>
-          <a:p>
-            <a:r>
-              <a:rPr lang="en-US" dirty="0"/>
-              <a:t>Examples: Facebook, Snapchat, LinkedIn, Twitter</a:t>
-            </a:r>
-            <a:r>
-              <a:rPr lang="en-US"/>
-              <a:t>, Instagram</a:t>
-            </a:r>
-            <a:endParaRPr lang="en-US" dirty="0"/>
+            <a:endParaRPr lang="en-US" sz="2000"/>
+          </a:p>
+          <a:p>
+            <a:r>
+              <a:rPr lang="en-US" sz="2000"/>
+              <a:t>Examples: Facebook, Snapchat, LinkedIn, Twitter, Instagram</a:t>
+            </a:r>
           </a:p>
         </p:txBody>
       </p:sp>
@@ -4318,4 +7451,299 @@
     </a:ext>
   </a:extLst>
 </a:theme>
+</file>
+
+<file path=ppt/theme/theme2.xml><?xml version="1.0" encoding="utf-8"?>
+<a:theme xmlns:a="http://schemas.openxmlformats.org/drawingml/2006/main" name="Office Theme">
+  <a:themeElements>
+    <a:clrScheme name="Office">
+      <a:dk1>
+        <a:sysClr val="windowText" lastClr="000000"/>
+      </a:dk1>
+      <a:lt1>
+        <a:sysClr val="window" lastClr="FFFFFF"/>
+      </a:lt1>
+      <a:dk2>
+        <a:srgbClr val="44546A"/>
+      </a:dk2>
+      <a:lt2>
+        <a:srgbClr val="E7E6E6"/>
+      </a:lt2>
+      <a:accent1>
+        <a:srgbClr val="4472C4"/>
+      </a:accent1>
+      <a:accent2>
+        <a:srgbClr val="ED7D31"/>
+      </a:accent2>
+      <a:accent3>
+        <a:srgbClr val="A5A5A5"/>
+      </a:accent3>
+      <a:accent4>
+        <a:srgbClr val="FFC000"/>
+      </a:accent4>
+      <a:accent5>
+        <a:srgbClr val="5B9BD5"/>
+      </a:accent5>
+      <a:accent6>
+        <a:srgbClr val="70AD47"/>
+      </a:accent6>
+      <a:hlink>
+        <a:srgbClr val="0563C1"/>
+      </a:hlink>
+      <a:folHlink>
+        <a:srgbClr val="954F72"/>
+      </a:folHlink>
+    </a:clrScheme>
+    <a:fontScheme name="Office">
+      <a:majorFont>
+        <a:latin typeface="Calibri Light" panose="020F0302020204030204"/>
+        <a:ea typeface=""/>
+        <a:cs typeface=""/>
+        <a:font script="Jpan" typeface="游ゴシック Light"/>
+        <a:font script="Hang" typeface="맑은 고딕"/>
+        <a:font script="Hans" typeface="等线 Light"/>
+        <a:font script="Hant" typeface="新細明體"/>
+        <a:font script="Arab" typeface="Times New Roman"/>
+        <a:font script="Hebr" typeface="Times New Roman"/>
+        <a:font script="Thai" typeface="Angsana New"/>
+        <a:font script="Ethi" typeface="Nyala"/>
+        <a:font script="Beng" typeface="Vrinda"/>
+        <a:font script="Gujr" typeface="Shruti"/>
+        <a:font script="Khmr" typeface="MoolBoran"/>
+        <a:font script="Knda" typeface="Tunga"/>
+        <a:font script="Guru" typeface="Raavi"/>
+        <a:font script="Cans" typeface="Euphemia"/>
+        <a:font script="Cher" typeface="Plantagenet Cherokee"/>
+        <a:font script="Yiii" typeface="Microsoft Yi Baiti"/>
+        <a:font script="Tibt" typeface="Microsoft Himalaya"/>
+        <a:font script="Thaa" typeface="MV Boli"/>
+        <a:font script="Deva" typeface="Mangal"/>
+        <a:font script="Telu" typeface="Gautami"/>
+        <a:font script="Taml" typeface="Latha"/>
+        <a:font script="Syrc" typeface="Estrangelo Edessa"/>
+        <a:font script="Orya" typeface="Kalinga"/>
+        <a:font script="Mlym" typeface="Kartika"/>
+        <a:font script="Laoo" typeface="DokChampa"/>
+        <a:font script="Sinh" typeface="Iskoola Pota"/>
+        <a:font script="Mong" typeface="Mongolian Baiti"/>
+        <a:font script="Viet" typeface="Times New Roman"/>
+        <a:font script="Uigh" typeface="Microsoft Uighur"/>
+        <a:font script="Geor" typeface="Sylfaen"/>
+        <a:font script="Armn" typeface="Arial"/>
+        <a:font script="Bugi" typeface="Leelawadee UI"/>
+        <a:font script="Bopo" typeface="Microsoft JhengHei"/>
+        <a:font script="Java" typeface="Javanese Text"/>
+        <a:font script="Lisu" typeface="Segoe UI"/>
+        <a:font script="Mymr" typeface="Myanmar Text"/>
+        <a:font script="Nkoo" typeface="Ebrima"/>
+        <a:font script="Olck" typeface="Nirmala UI"/>
+        <a:font script="Osma" typeface="Ebrima"/>
+        <a:font script="Phag" typeface="Phagspa"/>
+        <a:font script="Syrn" typeface="Estrangelo Edessa"/>
+        <a:font script="Syrj" typeface="Estrangelo Edessa"/>
+        <a:font script="Syre" typeface="Estrangelo Edessa"/>
+        <a:font script="Sora" typeface="Nirmala UI"/>
+        <a:font script="Tale" typeface="Microsoft Tai Le"/>
+        <a:font script="Talu" typeface="Microsoft New Tai Lue"/>
+        <a:font script="Tfng" typeface="Ebrima"/>
+      </a:majorFont>
+      <a:minorFont>
+        <a:latin typeface="Calibri" panose="020F0502020204030204"/>
+        <a:ea typeface=""/>
+        <a:cs typeface=""/>
+        <a:font script="Jpan" typeface="游ゴシック"/>
+        <a:font script="Hang" typeface="맑은 고딕"/>
+        <a:font script="Hans" typeface="等线"/>
+        <a:font script="Hant" typeface="新細明體"/>
+        <a:font script="Arab" typeface="Arial"/>
+        <a:font script="Hebr" typeface="Arial"/>
+        <a:font script="Thai" typeface="Cordia New"/>
+        <a:font script="Ethi" typeface="Nyala"/>
+        <a:font script="Beng" typeface="Vrinda"/>
+        <a:font script="Gujr" typeface="Shruti"/>
+        <a:font script="Khmr" typeface="DaunPenh"/>
+        <a:font script="Knda" typeface="Tunga"/>
+        <a:font script="Guru" typeface="Raavi"/>
+        <a:font script="Cans" typeface="Euphemia"/>
+        <a:font script="Cher" typeface="Plantagenet Cherokee"/>
+        <a:font script="Yiii" typeface="Microsoft Yi Baiti"/>
+        <a:font script="Tibt" typeface="Microsoft Himalaya"/>
+        <a:font script="Thaa" typeface="MV Boli"/>
+        <a:font script="Deva" typeface="Mangal"/>
+        <a:font script="Telu" typeface="Gautami"/>
+        <a:font script="Taml" typeface="Latha"/>
+        <a:font script="Syrc" typeface="Estrangelo Edessa"/>
+        <a:font script="Orya" typeface="Kalinga"/>
+        <a:font script="Mlym" typeface="Kartika"/>
+        <a:font script="Laoo" typeface="DokChampa"/>
+        <a:font script="Sinh" typeface="Iskoola Pota"/>
+        <a:font script="Mong" typeface="Mongolian Baiti"/>
+        <a:font script="Viet" typeface="Arial"/>
+        <a:font script="Uigh" typeface="Microsoft Uighur"/>
+        <a:font script="Geor" typeface="Sylfaen"/>
+        <a:font script="Armn" typeface="Arial"/>
+        <a:font script="Bugi" typeface="Leelawadee UI"/>
+        <a:font script="Bopo" typeface="Microsoft JhengHei"/>
+        <a:font script="Java" typeface="Javanese Text"/>
+        <a:font script="Lisu" typeface="Segoe UI"/>
+        <a:font script="Mymr" typeface="Myanmar Text"/>
+        <a:font script="Nkoo" typeface="Ebrima"/>
+        <a:font script="Olck" typeface="Nirmala UI"/>
+        <a:font script="Osma" typeface="Ebrima"/>
+        <a:font script="Phag" typeface="Phagspa"/>
+        <a:font script="Syrn" typeface="Estrangelo Edessa"/>
+        <a:font script="Syrj" typeface="Estrangelo Edessa"/>
+        <a:font script="Syre" typeface="Estrangelo Edessa"/>
+        <a:font script="Sora" typeface="Nirmala UI"/>
+        <a:font script="Tale" typeface="Microsoft Tai Le"/>
+        <a:font script="Talu" typeface="Microsoft New Tai Lue"/>
+        <a:font script="Tfng" typeface="Ebrima"/>
+      </a:minorFont>
+    </a:fontScheme>
+    <a:fmtScheme name="Office">
+      <a:fillStyleLst>
+        <a:solidFill>
+          <a:schemeClr val="phClr"/>
+        </a:solidFill>
+        <a:gradFill rotWithShape="1">
+          <a:gsLst>
+            <a:gs pos="0">
+              <a:schemeClr val="phClr">
+                <a:lumMod val="110000"/>
+                <a:satMod val="105000"/>
+                <a:tint val="67000"/>
+              </a:schemeClr>
+            </a:gs>
+            <a:gs pos="50000">
+              <a:schemeClr val="phClr">
+                <a:lumMod val="105000"/>
+                <a:satMod val="103000"/>
+                <a:tint val="73000"/>
+              </a:schemeClr>
+            </a:gs>
+            <a:gs pos="100000">
+              <a:schemeClr val="phClr">
+                <a:lumMod val="105000"/>
+                <a:satMod val="109000"/>
+                <a:tint val="81000"/>
+              </a:schemeClr>
+            </a:gs>
+          </a:gsLst>
+          <a:lin ang="5400000" scaled="0"/>
+        </a:gradFill>
+        <a:gradFill rotWithShape="1">
+          <a:gsLst>
+            <a:gs pos="0">
+              <a:schemeClr val="phClr">
+                <a:satMod val="103000"/>
+                <a:lumMod val="102000"/>
+                <a:tint val="94000"/>
+              </a:schemeClr>
+            </a:gs>
+            <a:gs pos="50000">
+              <a:schemeClr val="phClr">
+                <a:satMod val="110000"/>
+                <a:lumMod val="100000"/>
+                <a:shade val="100000"/>
+              </a:schemeClr>
+            </a:gs>
+            <a:gs pos="100000">
+              <a:schemeClr val="phClr">
+                <a:lumMod val="99000"/>
+                <a:satMod val="120000"/>
+                <a:shade val="78000"/>
+              </a:schemeClr>
+            </a:gs>
+          </a:gsLst>
+          <a:lin ang="5400000" scaled="0"/>
+        </a:gradFill>
+      </a:fillStyleLst>
+      <a:lnStyleLst>
+        <a:ln w="6350" cap="flat" cmpd="sng" algn="ctr">
+          <a:solidFill>
+            <a:schemeClr val="phClr"/>
+          </a:solidFill>
+          <a:prstDash val="solid"/>
+          <a:miter lim="800000"/>
+        </a:ln>
+        <a:ln w="12700" cap="flat" cmpd="sng" algn="ctr">
+          <a:solidFill>
+            <a:schemeClr val="phClr"/>
+          </a:solidFill>
+          <a:prstDash val="solid"/>
+          <a:miter lim="800000"/>
+        </a:ln>
+        <a:ln w="19050" cap="flat" cmpd="sng" algn="ctr">
+          <a:solidFill>
+            <a:schemeClr val="phClr"/>
+          </a:solidFill>
+          <a:prstDash val="solid"/>
+          <a:miter lim="800000"/>
+        </a:ln>
+      </a:lnStyleLst>
+      <a:effectStyleLst>
+        <a:effectStyle>
+          <a:effectLst/>
+        </a:effectStyle>
+        <a:effectStyle>
+          <a:effectLst/>
+        </a:effectStyle>
+        <a:effectStyle>
+          <a:effectLst>
+            <a:outerShdw blurRad="57150" dist="19050" dir="5400000" algn="ctr" rotWithShape="0">
+              <a:srgbClr val="000000">
+                <a:alpha val="63000"/>
+              </a:srgbClr>
+            </a:outerShdw>
+          </a:effectLst>
+        </a:effectStyle>
+      </a:effectStyleLst>
+      <a:bgFillStyleLst>
+        <a:solidFill>
+          <a:schemeClr val="phClr"/>
+        </a:solidFill>
+        <a:solidFill>
+          <a:schemeClr val="phClr">
+            <a:tint val="95000"/>
+            <a:satMod val="170000"/>
+          </a:schemeClr>
+        </a:solidFill>
+        <a:gradFill rotWithShape="1">
+          <a:gsLst>
+            <a:gs pos="0">
+              <a:schemeClr val="phClr">
+                <a:tint val="93000"/>
+                <a:satMod val="150000"/>
+                <a:shade val="98000"/>
+                <a:lumMod val="102000"/>
+              </a:schemeClr>
+            </a:gs>
+            <a:gs pos="50000">
+              <a:schemeClr val="phClr">
+                <a:tint val="98000"/>
+                <a:satMod val="130000"/>
+                <a:shade val="90000"/>
+                <a:lumMod val="103000"/>
+              </a:schemeClr>
+            </a:gs>
+            <a:gs pos="100000">
+              <a:schemeClr val="phClr">
+                <a:shade val="63000"/>
+                <a:satMod val="120000"/>
+              </a:schemeClr>
+            </a:gs>
+          </a:gsLst>
+          <a:lin ang="5400000" scaled="0"/>
+        </a:gradFill>
+      </a:bgFillStyleLst>
+    </a:fmtScheme>
+  </a:themeElements>
+  <a:objectDefaults/>
+  <a:extraClrSchemeLst/>
+  <a:extLst>
+    <a:ext uri="{05A4C25C-085E-4340-85A3-A5531E510DB2}">
+      <thm15:themeFamily xmlns:thm15="http://schemas.microsoft.com/office/thememl/2012/main" name="Office Theme" id="{62F939B6-93AF-4DB8-9C6B-D6C7DFDC589F}" vid="{4A3C46E8-61CC-4603-A589-7422A47A8E4A}"/>
+    </a:ext>
+  </a:extLst>
+</a:theme>
 </file>
</xml_diff>

<commit_message>
edit power point slides
</commit_message>
<xml_diff>
--- a/Literature-Review/Litature-Review-Slides.pptx
+++ b/Literature-Review/Litature-Review-Slides.pptx
@@ -5,14 +5,15 @@
     <p:sldMasterId id="2147483648" r:id="rId1"/>
   </p:sldMasterIdLst>
   <p:notesMasterIdLst>
-    <p:notesMasterId r:id="rId7"/>
+    <p:notesMasterId r:id="rId8"/>
   </p:notesMasterIdLst>
   <p:sldIdLst>
     <p:sldId id="256" r:id="rId2"/>
     <p:sldId id="257" r:id="rId3"/>
-    <p:sldId id="259" r:id="rId4"/>
-    <p:sldId id="260" r:id="rId5"/>
-    <p:sldId id="258" r:id="rId6"/>
+    <p:sldId id="258" r:id="rId4"/>
+    <p:sldId id="259" r:id="rId5"/>
+    <p:sldId id="260" r:id="rId6"/>
+    <p:sldId id="261" r:id="rId7"/>
   </p:sldIdLst>
   <p:sldSz cx="12192000" cy="6858000"/>
   <p:notesSz cx="6858000" cy="9144000"/>
@@ -201,7 +202,7 @@
           <a:p>
             <a:fld id="{09F10C1A-A1E0-4AD3-B6FA-504261678D90}" type="datetimeFigureOut">
               <a:rPr lang="en-US" smtClean="0"/>
-              <a:t>2/6/2023</a:t>
+              <a:t>2/8/2023</a:t>
             </a:fld>
             <a:endParaRPr lang="en-US"/>
           </a:p>
@@ -547,21 +548,11 @@
                 <a:effectLst/>
                 <a:latin typeface="Söhne"/>
               </a:rPr>
-              <a:t>Social media has had a profound impact on society, transforming the way people communicate, consume news and information, and engage with brands and businesses. It has also raised important questions about privacy, data protection, and the spread of misinformation. </a:t>
+              <a:t>Social media has had a profound impact on society, transforming the way people communicate, consume news and information, and engage with brands and businesses. It has also raised important questions about privacy, data protection, and the spread of misinformation. Despite these challenges, social media continues to grow in popularity and remains an integral part of the modern digital landscape.</a:t>
             </a:r>
-            <a:r>
-              <a:rPr lang="en-US" b="0" i="0">
-                <a:solidFill>
-                  <a:srgbClr val="D1D5DB"/>
-                </a:solidFill>
-                <a:effectLst/>
-                <a:latin typeface="Söhne"/>
-              </a:rPr>
-              <a:t>Despite these challenges, social media continues to grow in popularity and remains an integral part of the modern digital landscape.</a:t>
-            </a:r>
-          </a:p>
-          <a:p>
-            <a:endParaRPr lang="en-US"/>
+          </a:p>
+          <a:p>
+            <a:endParaRPr lang="en-US" dirty="0"/>
           </a:p>
         </p:txBody>
       </p:sp>
@@ -582,7 +573,7 @@
           <a:p>
             <a:fld id="{10F4E585-D814-41BA-98FD-6258CE8A4337}" type="slidenum">
               <a:rPr lang="en-US" smtClean="0"/>
-              <a:t>5</a:t>
+              <a:t>3</a:t>
             </a:fld>
             <a:endParaRPr lang="en-US"/>
           </a:p>
@@ -592,6 +583,126 @@
     <p:extLst>
       <p:ext uri="{BB962C8B-B14F-4D97-AF65-F5344CB8AC3E}">
         <p14:creationId xmlns:p14="http://schemas.microsoft.com/office/powerpoint/2010/main" val="1421348559"/>
+      </p:ext>
+    </p:extLst>
+  </p:cSld>
+  <p:clrMapOvr>
+    <a:masterClrMapping/>
+  </p:clrMapOvr>
+</p:notes>
+</file>
+
+<file path=ppt/notesSlides/notesSlide2.xml><?xml version="1.0" encoding="utf-8"?>
+<p:notes xmlns:a="http://schemas.openxmlformats.org/drawingml/2006/main" xmlns:r="http://schemas.openxmlformats.org/officeDocument/2006/relationships" xmlns:p="http://schemas.openxmlformats.org/presentationml/2006/main">
+  <p:cSld>
+    <p:spTree>
+      <p:nvGrpSpPr>
+        <p:cNvPr id="1" name=""/>
+        <p:cNvGrpSpPr/>
+        <p:nvPr/>
+      </p:nvGrpSpPr>
+      <p:grpSpPr>
+        <a:xfrm>
+          <a:off x="0" y="0"/>
+          <a:ext cx="0" cy="0"/>
+          <a:chOff x="0" y="0"/>
+          <a:chExt cx="0" cy="0"/>
+        </a:xfrm>
+      </p:grpSpPr>
+      <p:sp>
+        <p:nvSpPr>
+          <p:cNvPr id="2" name="Slide Image Placeholder 1"/>
+          <p:cNvSpPr>
+            <a:spLocks noGrp="1" noRot="1" noChangeAspect="1"/>
+          </p:cNvSpPr>
+          <p:nvPr>
+            <p:ph type="sldImg"/>
+          </p:nvPr>
+        </p:nvSpPr>
+        <p:spPr/>
+      </p:sp>
+      <p:sp>
+        <p:nvSpPr>
+          <p:cNvPr id="3" name="Notes Placeholder 2"/>
+          <p:cNvSpPr>
+            <a:spLocks noGrp="1"/>
+          </p:cNvSpPr>
+          <p:nvPr>
+            <p:ph type="body" idx="1"/>
+          </p:nvPr>
+        </p:nvSpPr>
+        <p:spPr/>
+        <p:txBody>
+          <a:bodyPr/>
+          <a:lstStyle/>
+          <a:p>
+            <a:pPr algn="l"/>
+            <a:r>
+              <a:rPr lang="en-US" b="0" i="0" dirty="0">
+                <a:solidFill>
+                  <a:srgbClr val="D1D5DB"/>
+                </a:solidFill>
+                <a:effectLst/>
+                <a:latin typeface="Söhne"/>
+              </a:rPr>
+              <a:t>The history of social media can be traced back to the late 1960s with the advent of computer-based communication technologies such as email and bulletin board systems (BBS). These early forms of online communication allowed users to send messages and share information, but they were limited to text-based communication and lacked the multimedia features and user-friendly interfaces that are now common in social media.</a:t>
+            </a:r>
+          </a:p>
+          <a:p>
+            <a:pPr algn="l"/>
+            <a:r>
+              <a:rPr lang="en-US" b="0" i="0" dirty="0">
+                <a:solidFill>
+                  <a:srgbClr val="D1D5DB"/>
+                </a:solidFill>
+                <a:effectLst/>
+                <a:latin typeface="Söhne"/>
+              </a:rPr>
+              <a:t>In 1997, the social networking site Six Degrees was launched, allowing users to create profiles and connect with friends. However, it was not until the launch of Myspace in 2003 and Facebook in 2004 that social media began to gain widespread popularity. Over the next decade, a multitude of new social media platforms emerged, including YouTube, Twitter, Instagram, and Snapchat, among others.</a:t>
+            </a:r>
+          </a:p>
+          <a:p>
+            <a:pPr algn="l"/>
+            <a:r>
+              <a:rPr lang="en-US" b="0" i="0" dirty="0">
+                <a:solidFill>
+                  <a:srgbClr val="D1D5DB"/>
+                </a:solidFill>
+                <a:effectLst/>
+                <a:latin typeface="Söhne"/>
+              </a:rPr>
+              <a:t>Social media has had a profound impact on society, transforming the way people communicate, consume news and information, and engage with brands and businesses. It has also raised important questions about privacy, data protection, and the spread of misinformation. Despite these challenges, social media continues to grow in popularity and remains an integral part of the modern digital landscape.</a:t>
+            </a:r>
+          </a:p>
+        </p:txBody>
+      </p:sp>
+      <p:sp>
+        <p:nvSpPr>
+          <p:cNvPr id="4" name="Slide Number Placeholder 3"/>
+          <p:cNvSpPr>
+            <a:spLocks noGrp="1"/>
+          </p:cNvSpPr>
+          <p:nvPr>
+            <p:ph type="sldNum" sz="quarter" idx="5"/>
+          </p:nvPr>
+        </p:nvSpPr>
+        <p:spPr/>
+        <p:txBody>
+          <a:bodyPr/>
+          <a:lstStyle/>
+          <a:p>
+            <a:fld id="{10F4E585-D814-41BA-98FD-6258CE8A4337}" type="slidenum">
+              <a:rPr lang="en-US" smtClean="0"/>
+              <a:t>5</a:t>
+            </a:fld>
+            <a:endParaRPr lang="en-US"/>
+          </a:p>
+        </p:txBody>
+      </p:sp>
+    </p:spTree>
+    <p:extLst>
+      <p:ext uri="{BB962C8B-B14F-4D97-AF65-F5344CB8AC3E}">
+        <p14:creationId xmlns:p14="http://schemas.microsoft.com/office/powerpoint/2010/main" val="3064445908"/>
       </p:ext>
     </p:extLst>
   </p:cSld>
@@ -748,7 +859,7 @@
           <a:p>
             <a:fld id="{DAF2FE9C-A86B-4318-B442-55DF0CB54599}" type="datetimeFigureOut">
               <a:rPr lang="en-US" smtClean="0"/>
-              <a:t>2/6/2023</a:t>
+              <a:t>2/8/2023</a:t>
             </a:fld>
             <a:endParaRPr lang="en-US"/>
           </a:p>
@@ -946,7 +1057,7 @@
           <a:p>
             <a:fld id="{DAF2FE9C-A86B-4318-B442-55DF0CB54599}" type="datetimeFigureOut">
               <a:rPr lang="en-US" smtClean="0"/>
-              <a:t>2/6/2023</a:t>
+              <a:t>2/8/2023</a:t>
             </a:fld>
             <a:endParaRPr lang="en-US"/>
           </a:p>
@@ -1154,7 +1265,7 @@
           <a:p>
             <a:fld id="{DAF2FE9C-A86B-4318-B442-55DF0CB54599}" type="datetimeFigureOut">
               <a:rPr lang="en-US" smtClean="0"/>
-              <a:t>2/6/2023</a:t>
+              <a:t>2/8/2023</a:t>
             </a:fld>
             <a:endParaRPr lang="en-US"/>
           </a:p>
@@ -1352,7 +1463,7 @@
           <a:p>
             <a:fld id="{DAF2FE9C-A86B-4318-B442-55DF0CB54599}" type="datetimeFigureOut">
               <a:rPr lang="en-US" smtClean="0"/>
-              <a:t>2/6/2023</a:t>
+              <a:t>2/8/2023</a:t>
             </a:fld>
             <a:endParaRPr lang="en-US"/>
           </a:p>
@@ -1627,7 +1738,7 @@
           <a:p>
             <a:fld id="{DAF2FE9C-A86B-4318-B442-55DF0CB54599}" type="datetimeFigureOut">
               <a:rPr lang="en-US" smtClean="0"/>
-              <a:t>2/6/2023</a:t>
+              <a:t>2/8/2023</a:t>
             </a:fld>
             <a:endParaRPr lang="en-US"/>
           </a:p>
@@ -1892,7 +2003,7 @@
           <a:p>
             <a:fld id="{DAF2FE9C-A86B-4318-B442-55DF0CB54599}" type="datetimeFigureOut">
               <a:rPr lang="en-US" smtClean="0"/>
-              <a:t>2/6/2023</a:t>
+              <a:t>2/8/2023</a:t>
             </a:fld>
             <a:endParaRPr lang="en-US"/>
           </a:p>
@@ -2304,7 +2415,7 @@
           <a:p>
             <a:fld id="{DAF2FE9C-A86B-4318-B442-55DF0CB54599}" type="datetimeFigureOut">
               <a:rPr lang="en-US" smtClean="0"/>
-              <a:t>2/6/2023</a:t>
+              <a:t>2/8/2023</a:t>
             </a:fld>
             <a:endParaRPr lang="en-US"/>
           </a:p>
@@ -2445,7 +2556,7 @@
           <a:p>
             <a:fld id="{DAF2FE9C-A86B-4318-B442-55DF0CB54599}" type="datetimeFigureOut">
               <a:rPr lang="en-US" smtClean="0"/>
-              <a:t>2/6/2023</a:t>
+              <a:t>2/8/2023</a:t>
             </a:fld>
             <a:endParaRPr lang="en-US"/>
           </a:p>
@@ -2558,7 +2669,7 @@
           <a:p>
             <a:fld id="{DAF2FE9C-A86B-4318-B442-55DF0CB54599}" type="datetimeFigureOut">
               <a:rPr lang="en-US" smtClean="0"/>
-              <a:t>2/6/2023</a:t>
+              <a:t>2/8/2023</a:t>
             </a:fld>
             <a:endParaRPr lang="en-US"/>
           </a:p>
@@ -2869,7 +2980,7 @@
           <a:p>
             <a:fld id="{DAF2FE9C-A86B-4318-B442-55DF0CB54599}" type="datetimeFigureOut">
               <a:rPr lang="en-US" smtClean="0"/>
-              <a:t>2/6/2023</a:t>
+              <a:t>2/8/2023</a:t>
             </a:fld>
             <a:endParaRPr lang="en-US"/>
           </a:p>
@@ -3157,7 +3268,7 @@
           <a:p>
             <a:fld id="{DAF2FE9C-A86B-4318-B442-55DF0CB54599}" type="datetimeFigureOut">
               <a:rPr lang="en-US" smtClean="0"/>
-              <a:t>2/6/2023</a:t>
+              <a:t>2/8/2023</a:t>
             </a:fld>
             <a:endParaRPr lang="en-US"/>
           </a:p>
@@ -3398,7 +3509,7 @@
           <a:p>
             <a:fld id="{DAF2FE9C-A86B-4318-B442-55DF0CB54599}" type="datetimeFigureOut">
               <a:rPr lang="en-US" smtClean="0"/>
-              <a:t>2/6/2023</a:t>
+              <a:t>2/8/2023</a:t>
             </a:fld>
             <a:endParaRPr lang="en-US"/>
           </a:p>
@@ -5490,992 +5601,6 @@
           <p:cNvPr id="8" name="Rectangle 7">
             <a:extLst>
               <a:ext uri="{FF2B5EF4-FFF2-40B4-BE49-F238E27FC236}">
-                <a16:creationId xmlns:a16="http://schemas.microsoft.com/office/drawing/2014/main" id="{FEC7823C-FDD6-429C-986C-063FDEBF9EAA}"/>
-              </a:ext>
-              <a:ext uri="{C183D7F6-B498-43B3-948B-1728B52AA6E4}">
-                <adec:decorative xmlns:adec="http://schemas.microsoft.com/office/drawing/2017/decorative" val="1"/>
-              </a:ext>
-            </a:extLst>
-          </p:cNvPr>
-          <p:cNvSpPr>
-            <a:spLocks noGrp="1" noRot="1" noChangeAspect="1" noMove="1" noResize="1" noEditPoints="1" noAdjustHandles="1" noChangeArrowheads="1" noChangeShapeType="1" noTextEdit="1"/>
-          </p:cNvSpPr>
-          <p:nvPr>
-            <p:extLst>
-              <p:ext uri="{386F3935-93C4-4BCD-93E2-E3B085C9AB24}">
-                <p16:designElem xmlns:p16="http://schemas.microsoft.com/office/powerpoint/2015/main" val="1"/>
-              </p:ext>
-            </p:extLst>
-          </p:nvPr>
-        </p:nvSpPr>
-        <p:spPr>
-          <a:xfrm>
-            <a:off x="0" y="0"/>
-            <a:ext cx="12188952" cy="6858000"/>
-          </a:xfrm>
-          <a:prstGeom prst="rect">
-            <a:avLst/>
-          </a:prstGeom>
-          <a:ln>
-            <a:noFill/>
-          </a:ln>
-        </p:spPr>
-        <p:style>
-          <a:lnRef idx="2">
-            <a:schemeClr val="accent1">
-              <a:shade val="50000"/>
-            </a:schemeClr>
-          </a:lnRef>
-          <a:fillRef idx="1">
-            <a:schemeClr val="accent1"/>
-          </a:fillRef>
-          <a:effectRef idx="0">
-            <a:schemeClr val="accent1"/>
-          </a:effectRef>
-          <a:fontRef idx="minor">
-            <a:schemeClr val="lt1"/>
-          </a:fontRef>
-        </p:style>
-        <p:txBody>
-          <a:bodyPr rtlCol="0" anchor="ctr"/>
-          <a:lstStyle/>
-          <a:p>
-            <a:pPr algn="ctr"/>
-            <a:endParaRPr lang="en-US"/>
-          </a:p>
-        </p:txBody>
-      </p:sp>
-      <p:sp>
-        <p:nvSpPr>
-          <p:cNvPr id="10" name="Freeform: Shape 9">
-            <a:extLst>
-              <a:ext uri="{FF2B5EF4-FFF2-40B4-BE49-F238E27FC236}">
-                <a16:creationId xmlns:a16="http://schemas.microsoft.com/office/drawing/2014/main" id="{9CF7FE1C-8BC5-4B0C-A2BC-93AB72C90FDD}"/>
-              </a:ext>
-              <a:ext uri="{C183D7F6-B498-43B3-948B-1728B52AA6E4}">
-                <adec:decorative xmlns:adec="http://schemas.microsoft.com/office/drawing/2017/decorative" val="1"/>
-              </a:ext>
-            </a:extLst>
-          </p:cNvPr>
-          <p:cNvSpPr>
-            <a:spLocks noGrp="1" noRot="1" noChangeAspect="1" noMove="1" noResize="1" noEditPoints="1" noAdjustHandles="1" noChangeArrowheads="1" noChangeShapeType="1" noTextEdit="1"/>
-          </p:cNvSpPr>
-          <p:nvPr>
-            <p:extLst>
-              <p:ext uri="{386F3935-93C4-4BCD-93E2-E3B085C9AB24}">
-                <p16:designElem xmlns:p16="http://schemas.microsoft.com/office/powerpoint/2015/main" val="1"/>
-              </p:ext>
-            </p:extLst>
-          </p:nvPr>
-        </p:nvSpPr>
-        <p:spPr>
-          <a:xfrm>
-            <a:off x="1768100" y="-1"/>
-            <a:ext cx="10423900" cy="5920155"/>
-          </a:xfrm>
-          <a:custGeom>
-            <a:avLst/>
-            <a:gdLst>
-              <a:gd name="connsiteX0" fmla="*/ 10423900 w 10423900"/>
-              <a:gd name="connsiteY0" fmla="*/ 0 h 5491534"/>
-              <a:gd name="connsiteX1" fmla="*/ 3493157 w 10423900"/>
-              <a:gd name="connsiteY1" fmla="*/ 0 h 5491534"/>
-              <a:gd name="connsiteX2" fmla="*/ 3493018 w 10423900"/>
-              <a:gd name="connsiteY2" fmla="*/ 31 h 5491534"/>
-              <a:gd name="connsiteX3" fmla="*/ 3245493 w 10423900"/>
-              <a:gd name="connsiteY3" fmla="*/ 104839 h 5491534"/>
-              <a:gd name="connsiteX4" fmla="*/ 4434802 w 10423900"/>
-              <a:gd name="connsiteY4" fmla="*/ 284558 h 5491534"/>
-              <a:gd name="connsiteX5" fmla="*/ 4011937 w 10423900"/>
-              <a:gd name="connsiteY5" fmla="*/ 395559 h 5491534"/>
-              <a:gd name="connsiteX6" fmla="*/ 3573213 w 10423900"/>
-              <a:gd name="connsiteY6" fmla="*/ 474847 h 5491534"/>
-              <a:gd name="connsiteX7" fmla="*/ 3097489 w 10423900"/>
-              <a:gd name="connsiteY7" fmla="*/ 532990 h 5491534"/>
-              <a:gd name="connsiteX8" fmla="*/ 2664052 w 10423900"/>
-              <a:gd name="connsiteY8" fmla="*/ 649279 h 5491534"/>
-              <a:gd name="connsiteX9" fmla="*/ 3795218 w 10423900"/>
-              <a:gd name="connsiteY9" fmla="*/ 696852 h 5491534"/>
-              <a:gd name="connsiteX10" fmla="*/ 3208492 w 10423900"/>
-              <a:gd name="connsiteY10" fmla="*/ 802568 h 5491534"/>
-              <a:gd name="connsiteX11" fmla="*/ 2727483 w 10423900"/>
-              <a:gd name="connsiteY11" fmla="*/ 939999 h 5491534"/>
-              <a:gd name="connsiteX12" fmla="*/ 2389190 w 10423900"/>
-              <a:gd name="connsiteY12" fmla="*/ 1003429 h 5491534"/>
-              <a:gd name="connsiteX13" fmla="*/ 2029754 w 10423900"/>
-              <a:gd name="connsiteY13" fmla="*/ 1019287 h 5491534"/>
-              <a:gd name="connsiteX14" fmla="*/ 1945181 w 10423900"/>
-              <a:gd name="connsiteY14" fmla="*/ 1119716 h 5491534"/>
-              <a:gd name="connsiteX15" fmla="*/ 2056184 w 10423900"/>
-              <a:gd name="connsiteY15" fmla="*/ 1225434 h 5491534"/>
-              <a:gd name="connsiteX16" fmla="*/ 2225329 w 10423900"/>
-              <a:gd name="connsiteY16" fmla="*/ 1236004 h 5491534"/>
-              <a:gd name="connsiteX17" fmla="*/ 3234920 w 10423900"/>
-              <a:gd name="connsiteY17" fmla="*/ 1262435 h 5491534"/>
-              <a:gd name="connsiteX18" fmla="*/ 0 w 10423900"/>
-              <a:gd name="connsiteY18" fmla="*/ 1495009 h 5491534"/>
-              <a:gd name="connsiteX19" fmla="*/ 438724 w 10423900"/>
-              <a:gd name="connsiteY19" fmla="*/ 1637728 h 5491534"/>
-              <a:gd name="connsiteX20" fmla="*/ 586726 w 10423900"/>
-              <a:gd name="connsiteY20" fmla="*/ 2028877 h 5491534"/>
-              <a:gd name="connsiteX21" fmla="*/ 1125878 w 10423900"/>
-              <a:gd name="connsiteY21" fmla="*/ 2250882 h 5491534"/>
-              <a:gd name="connsiteX22" fmla="*/ 1474744 w 10423900"/>
-              <a:gd name="connsiteY22" fmla="*/ 2330169 h 5491534"/>
-              <a:gd name="connsiteX23" fmla="*/ 2272901 w 10423900"/>
-              <a:gd name="connsiteY23" fmla="*/ 2446458 h 5491534"/>
-              <a:gd name="connsiteX24" fmla="*/ 2389190 w 10423900"/>
-              <a:gd name="connsiteY24" fmla="*/ 2636747 h 5491534"/>
-              <a:gd name="connsiteX25" fmla="*/ 2489621 w 10423900"/>
-              <a:gd name="connsiteY25" fmla="*/ 2848179 h 5491534"/>
-              <a:gd name="connsiteX26" fmla="*/ 2701053 w 10423900"/>
-              <a:gd name="connsiteY26" fmla="*/ 2985611 h 5491534"/>
-              <a:gd name="connsiteX27" fmla="*/ 1057165 w 10423900"/>
-              <a:gd name="connsiteY27" fmla="*/ 2964468 h 5491534"/>
-              <a:gd name="connsiteX28" fmla="*/ 2912485 w 10423900"/>
-              <a:gd name="connsiteY28" fmla="*/ 3408477 h 5491534"/>
-              <a:gd name="connsiteX29" fmla="*/ 2748626 w 10423900"/>
-              <a:gd name="connsiteY29" fmla="*/ 3582909 h 5491534"/>
-              <a:gd name="connsiteX30" fmla="*/ 3763503 w 10423900"/>
-              <a:gd name="connsiteY30" fmla="*/ 3820771 h 5491534"/>
-              <a:gd name="connsiteX31" fmla="*/ 3219063 w 10423900"/>
-              <a:gd name="connsiteY31" fmla="*/ 3847199 h 5491534"/>
-              <a:gd name="connsiteX32" fmla="*/ 6385269 w 10423900"/>
-              <a:gd name="connsiteY32" fmla="*/ 4840933 h 5491534"/>
-              <a:gd name="connsiteX33" fmla="*/ 10285854 w 10423900"/>
-              <a:gd name="connsiteY33" fmla="*/ 5471118 h 5491534"/>
-              <a:gd name="connsiteX34" fmla="*/ 10423900 w 10423900"/>
-              <a:gd name="connsiteY34" fmla="*/ 5491534 h 5491534"/>
-            </a:gdLst>
-            <a:ahLst/>
-            <a:cxnLst>
-              <a:cxn ang="0">
-                <a:pos x="connsiteX0" y="connsiteY0"/>
-              </a:cxn>
-              <a:cxn ang="0">
-                <a:pos x="connsiteX1" y="connsiteY1"/>
-              </a:cxn>
-              <a:cxn ang="0">
-                <a:pos x="connsiteX2" y="connsiteY2"/>
-              </a:cxn>
-              <a:cxn ang="0">
-                <a:pos x="connsiteX3" y="connsiteY3"/>
-              </a:cxn>
-              <a:cxn ang="0">
-                <a:pos x="connsiteX4" y="connsiteY4"/>
-              </a:cxn>
-              <a:cxn ang="0">
-                <a:pos x="connsiteX5" y="connsiteY5"/>
-              </a:cxn>
-              <a:cxn ang="0">
-                <a:pos x="connsiteX6" y="connsiteY6"/>
-              </a:cxn>
-              <a:cxn ang="0">
-                <a:pos x="connsiteX7" y="connsiteY7"/>
-              </a:cxn>
-              <a:cxn ang="0">
-                <a:pos x="connsiteX8" y="connsiteY8"/>
-              </a:cxn>
-              <a:cxn ang="0">
-                <a:pos x="connsiteX9" y="connsiteY9"/>
-              </a:cxn>
-              <a:cxn ang="0">
-                <a:pos x="connsiteX10" y="connsiteY10"/>
-              </a:cxn>
-              <a:cxn ang="0">
-                <a:pos x="connsiteX11" y="connsiteY11"/>
-              </a:cxn>
-              <a:cxn ang="0">
-                <a:pos x="connsiteX12" y="connsiteY12"/>
-              </a:cxn>
-              <a:cxn ang="0">
-                <a:pos x="connsiteX13" y="connsiteY13"/>
-              </a:cxn>
-              <a:cxn ang="0">
-                <a:pos x="connsiteX14" y="connsiteY14"/>
-              </a:cxn>
-              <a:cxn ang="0">
-                <a:pos x="connsiteX15" y="connsiteY15"/>
-              </a:cxn>
-              <a:cxn ang="0">
-                <a:pos x="connsiteX16" y="connsiteY16"/>
-              </a:cxn>
-              <a:cxn ang="0">
-                <a:pos x="connsiteX17" y="connsiteY17"/>
-              </a:cxn>
-              <a:cxn ang="0">
-                <a:pos x="connsiteX18" y="connsiteY18"/>
-              </a:cxn>
-              <a:cxn ang="0">
-                <a:pos x="connsiteX19" y="connsiteY19"/>
-              </a:cxn>
-              <a:cxn ang="0">
-                <a:pos x="connsiteX20" y="connsiteY20"/>
-              </a:cxn>
-              <a:cxn ang="0">
-                <a:pos x="connsiteX21" y="connsiteY21"/>
-              </a:cxn>
-              <a:cxn ang="0">
-                <a:pos x="connsiteX22" y="connsiteY22"/>
-              </a:cxn>
-              <a:cxn ang="0">
-                <a:pos x="connsiteX23" y="connsiteY23"/>
-              </a:cxn>
-              <a:cxn ang="0">
-                <a:pos x="connsiteX24" y="connsiteY24"/>
-              </a:cxn>
-              <a:cxn ang="0">
-                <a:pos x="connsiteX25" y="connsiteY25"/>
-              </a:cxn>
-              <a:cxn ang="0">
-                <a:pos x="connsiteX26" y="connsiteY26"/>
-              </a:cxn>
-              <a:cxn ang="0">
-                <a:pos x="connsiteX27" y="connsiteY27"/>
-              </a:cxn>
-              <a:cxn ang="0">
-                <a:pos x="connsiteX28" y="connsiteY28"/>
-              </a:cxn>
-              <a:cxn ang="0">
-                <a:pos x="connsiteX29" y="connsiteY29"/>
-              </a:cxn>
-              <a:cxn ang="0">
-                <a:pos x="connsiteX30" y="connsiteY30"/>
-              </a:cxn>
-              <a:cxn ang="0">
-                <a:pos x="connsiteX31" y="connsiteY31"/>
-              </a:cxn>
-              <a:cxn ang="0">
-                <a:pos x="connsiteX32" y="connsiteY32"/>
-              </a:cxn>
-              <a:cxn ang="0">
-                <a:pos x="connsiteX33" y="connsiteY33"/>
-              </a:cxn>
-              <a:cxn ang="0">
-                <a:pos x="connsiteX34" y="connsiteY34"/>
-              </a:cxn>
-            </a:cxnLst>
-            <a:rect l="l" t="t" r="r" b="b"/>
-            <a:pathLst>
-              <a:path w="10423900" h="5491534">
-                <a:moveTo>
-                  <a:pt x="10423900" y="0"/>
-                </a:moveTo>
-                <a:lnTo>
-                  <a:pt x="3493157" y="0"/>
-                </a:lnTo>
-                <a:lnTo>
-                  <a:pt x="3493018" y="31"/>
-                </a:lnTo>
-                <a:cubicBezTo>
-                  <a:pt x="3414969" y="12668"/>
-                  <a:pt x="3328744" y="21588"/>
-                  <a:pt x="3245493" y="104839"/>
-                </a:cubicBezTo>
-                <a:cubicBezTo>
-                  <a:pt x="3668357" y="162984"/>
-                  <a:pt x="4075366" y="51981"/>
-                  <a:pt x="4434802" y="284558"/>
-                </a:cubicBezTo>
-                <a:cubicBezTo>
-                  <a:pt x="4302656" y="400846"/>
-                  <a:pt x="4154654" y="374416"/>
-                  <a:pt x="4011937" y="395559"/>
-                </a:cubicBezTo>
-                <a:cubicBezTo>
-                  <a:pt x="3863934" y="416704"/>
-                  <a:pt x="3721217" y="453704"/>
-                  <a:pt x="3573213" y="474847"/>
-                </a:cubicBezTo>
-                <a:cubicBezTo>
-                  <a:pt x="3414639" y="501275"/>
-                  <a:pt x="3256063" y="506562"/>
-                  <a:pt x="3097489" y="532990"/>
-                </a:cubicBezTo>
-                <a:cubicBezTo>
-                  <a:pt x="2965345" y="554135"/>
-                  <a:pt x="2822627" y="517133"/>
-                  <a:pt x="2664052" y="649279"/>
-                </a:cubicBezTo>
-                <a:cubicBezTo>
-                  <a:pt x="3055203" y="744424"/>
-                  <a:pt x="3409352" y="601706"/>
-                  <a:pt x="3795218" y="696852"/>
-                </a:cubicBezTo>
-                <a:cubicBezTo>
-                  <a:pt x="3567928" y="781425"/>
-                  <a:pt x="3382924" y="754995"/>
-                  <a:pt x="3208492" y="802568"/>
-                </a:cubicBezTo>
-                <a:cubicBezTo>
-                  <a:pt x="3049916" y="850140"/>
-                  <a:pt x="2859627" y="797282"/>
-                  <a:pt x="2727483" y="939999"/>
-                </a:cubicBezTo>
-                <a:cubicBezTo>
-                  <a:pt x="2627052" y="1051000"/>
-                  <a:pt x="2521336" y="1066858"/>
-                  <a:pt x="2389190" y="1003429"/>
-                </a:cubicBezTo>
-                <a:cubicBezTo>
-                  <a:pt x="2272901" y="945284"/>
-                  <a:pt x="2146043" y="961142"/>
-                  <a:pt x="2029754" y="1019287"/>
-                </a:cubicBezTo>
-                <a:cubicBezTo>
-                  <a:pt x="1987468" y="1040430"/>
-                  <a:pt x="1945181" y="1066858"/>
-                  <a:pt x="1945181" y="1119716"/>
-                </a:cubicBezTo>
-                <a:cubicBezTo>
-                  <a:pt x="1945181" y="1193719"/>
-                  <a:pt x="1998039" y="1214862"/>
-                  <a:pt x="2056184" y="1225434"/>
-                </a:cubicBezTo>
-                <a:cubicBezTo>
-                  <a:pt x="2109042" y="1236004"/>
-                  <a:pt x="2172471" y="1246577"/>
-                  <a:pt x="2225329" y="1236004"/>
-                </a:cubicBezTo>
-                <a:cubicBezTo>
-                  <a:pt x="2563622" y="1177861"/>
-                  <a:pt x="2896629" y="1273005"/>
-                  <a:pt x="3234920" y="1262435"/>
-                </a:cubicBezTo>
-                <a:cubicBezTo>
-                  <a:pt x="2172471" y="1489724"/>
-                  <a:pt x="1099450" y="1415723"/>
-                  <a:pt x="0" y="1495009"/>
-                </a:cubicBezTo>
-                <a:cubicBezTo>
-                  <a:pt x="142717" y="1653583"/>
-                  <a:pt x="327721" y="1521439"/>
-                  <a:pt x="438724" y="1637728"/>
-                </a:cubicBezTo>
-                <a:cubicBezTo>
-                  <a:pt x="333006" y="1880875"/>
-                  <a:pt x="375293" y="2013020"/>
-                  <a:pt x="586726" y="2028877"/>
-                </a:cubicBezTo>
-                <a:cubicBezTo>
-                  <a:pt x="792873" y="2044734"/>
-                  <a:pt x="1014877" y="1960161"/>
-                  <a:pt x="1125878" y="2250882"/>
-                </a:cubicBezTo>
-                <a:cubicBezTo>
-                  <a:pt x="1157593" y="2340740"/>
-                  <a:pt x="1353170" y="2314312"/>
-                  <a:pt x="1474744" y="2330169"/>
-                </a:cubicBezTo>
-                <a:cubicBezTo>
-                  <a:pt x="1739034" y="2367170"/>
-                  <a:pt x="2019183" y="2330169"/>
-                  <a:pt x="2272901" y="2446458"/>
-                </a:cubicBezTo>
-                <a:cubicBezTo>
-                  <a:pt x="2373332" y="2488744"/>
-                  <a:pt x="2442048" y="2520459"/>
-                  <a:pt x="2389190" y="2636747"/>
-                </a:cubicBezTo>
-                <a:cubicBezTo>
-                  <a:pt x="2336332" y="2758321"/>
-                  <a:pt x="2405048" y="2800607"/>
-                  <a:pt x="2489621" y="2848179"/>
-                </a:cubicBezTo>
-                <a:cubicBezTo>
-                  <a:pt x="2553051" y="2885180"/>
-                  <a:pt x="2648195" y="2874609"/>
-                  <a:pt x="2701053" y="2985611"/>
-                </a:cubicBezTo>
-                <a:cubicBezTo>
-                  <a:pt x="2146043" y="2969753"/>
-                  <a:pt x="1606888" y="2879895"/>
-                  <a:pt x="1057165" y="2964468"/>
-                </a:cubicBezTo>
-                <a:cubicBezTo>
-                  <a:pt x="1659748" y="3175900"/>
-                  <a:pt x="2320474" y="3165328"/>
-                  <a:pt x="2912485" y="3408477"/>
-                </a:cubicBezTo>
-                <a:cubicBezTo>
-                  <a:pt x="2891342" y="3493050"/>
-                  <a:pt x="2753911" y="3456048"/>
-                  <a:pt x="2748626" y="3582909"/>
-                </a:cubicBezTo>
-                <a:cubicBezTo>
-                  <a:pt x="3060489" y="3715055"/>
-                  <a:pt x="3435782" y="3625195"/>
-                  <a:pt x="3763503" y="3820771"/>
-                </a:cubicBezTo>
-                <a:cubicBezTo>
-                  <a:pt x="3573213" y="3910629"/>
-                  <a:pt x="3398782" y="3762626"/>
-                  <a:pt x="3219063" y="3847199"/>
-                </a:cubicBezTo>
-                <a:cubicBezTo>
-                  <a:pt x="3277208" y="3974060"/>
-                  <a:pt x="5909545" y="4756360"/>
-                  <a:pt x="6385269" y="4840933"/>
-                </a:cubicBezTo>
-                <a:cubicBezTo>
-                  <a:pt x="7171204" y="4982659"/>
-                  <a:pt x="9157515" y="5302348"/>
-                  <a:pt x="10285854" y="5471118"/>
-                </a:cubicBezTo>
-                <a:lnTo>
-                  <a:pt x="10423900" y="5491534"/>
-                </a:lnTo>
-                <a:close/>
-              </a:path>
-            </a:pathLst>
-          </a:custGeom>
-          <a:solidFill>
-            <a:schemeClr val="bg2">
-              <a:alpha val="50000"/>
-            </a:schemeClr>
-          </a:solidFill>
-          <a:ln w="32707" cap="flat">
-            <a:noFill/>
-            <a:prstDash val="solid"/>
-            <a:miter/>
-          </a:ln>
-        </p:spPr>
-        <p:txBody>
-          <a:bodyPr rtlCol="0" anchor="ctr"/>
-          <a:lstStyle/>
-          <a:p>
-            <a:endParaRPr lang="en-US"/>
-          </a:p>
-        </p:txBody>
-      </p:sp>
-      <p:sp>
-        <p:nvSpPr>
-          <p:cNvPr id="12" name="Freeform: Shape 11">
-            <a:extLst>
-              <a:ext uri="{FF2B5EF4-FFF2-40B4-BE49-F238E27FC236}">
-                <a16:creationId xmlns:a16="http://schemas.microsoft.com/office/drawing/2014/main" id="{B0651F5E-0457-4065-ACB2-8B81590C204B}"/>
-              </a:ext>
-              <a:ext uri="{C183D7F6-B498-43B3-948B-1728B52AA6E4}">
-                <adec:decorative xmlns:adec="http://schemas.microsoft.com/office/drawing/2017/decorative" val="1"/>
-              </a:ext>
-            </a:extLst>
-          </p:cNvPr>
-          <p:cNvSpPr>
-            <a:spLocks noGrp="1" noRot="1" noChangeAspect="1" noMove="1" noResize="1" noEditPoints="1" noAdjustHandles="1" noChangeArrowheads="1" noChangeShapeType="1" noTextEdit="1"/>
-          </p:cNvSpPr>
-          <p:nvPr>
-            <p:extLst>
-              <p:ext uri="{386F3935-93C4-4BCD-93E2-E3B085C9AB24}">
-                <p16:designElem xmlns:p16="http://schemas.microsoft.com/office/powerpoint/2015/main" val="1"/>
-              </p:ext>
-            </p:extLst>
-          </p:nvPr>
-        </p:nvSpPr>
-        <p:spPr>
-          <a:xfrm rot="21050098" flipH="1" flipV="1">
-            <a:off x="-160709" y="3977842"/>
-            <a:ext cx="7507400" cy="3166385"/>
-          </a:xfrm>
-          <a:custGeom>
-            <a:avLst/>
-            <a:gdLst>
-              <a:gd name="connsiteX0" fmla="*/ 5497485 w 7507400"/>
-              <a:gd name="connsiteY0" fmla="*/ 2912009 h 3166385"/>
-              <a:gd name="connsiteX1" fmla="*/ 7034681 w 7507400"/>
-              <a:gd name="connsiteY1" fmla="*/ 3151263 h 3166385"/>
-              <a:gd name="connsiteX2" fmla="*/ 7137723 w 7507400"/>
-              <a:gd name="connsiteY2" fmla="*/ 3166385 h 3166385"/>
-              <a:gd name="connsiteX3" fmla="*/ 7507400 w 7507400"/>
-              <a:gd name="connsiteY3" fmla="*/ 875071 h 3166385"/>
-              <a:gd name="connsiteX4" fmla="*/ 2083578 w 7507400"/>
-              <a:gd name="connsiteY4" fmla="*/ 0 h 3166385"/>
-              <a:gd name="connsiteX5" fmla="*/ 2023081 w 7507400"/>
-              <a:gd name="connsiteY5" fmla="*/ 5468 h 3166385"/>
-              <a:gd name="connsiteX6" fmla="*/ 1865374 w 7507400"/>
-              <a:gd name="connsiteY6" fmla="*/ 76313 h 3166385"/>
-              <a:gd name="connsiteX7" fmla="*/ 1634010 w 7507400"/>
-              <a:gd name="connsiteY7" fmla="*/ 119359 h 3166385"/>
-              <a:gd name="connsiteX8" fmla="*/ 1388186 w 7507400"/>
-              <a:gd name="connsiteY8" fmla="*/ 130121 h 3166385"/>
-              <a:gd name="connsiteX9" fmla="*/ 1330344 w 7507400"/>
-              <a:gd name="connsiteY9" fmla="*/ 198275 h 3166385"/>
-              <a:gd name="connsiteX10" fmla="*/ 1406262 w 7507400"/>
-              <a:gd name="connsiteY10" fmla="*/ 270018 h 3166385"/>
-              <a:gd name="connsiteX11" fmla="*/ 1521942 w 7507400"/>
-              <a:gd name="connsiteY11" fmla="*/ 277191 h 3166385"/>
-              <a:gd name="connsiteX12" fmla="*/ 2212420 w 7507400"/>
-              <a:gd name="connsiteY12" fmla="*/ 295128 h 3166385"/>
-              <a:gd name="connsiteX13" fmla="*/ 0 w 7507400"/>
-              <a:gd name="connsiteY13" fmla="*/ 452960 h 3166385"/>
-              <a:gd name="connsiteX14" fmla="*/ 300051 w 7507400"/>
-              <a:gd name="connsiteY14" fmla="*/ 549813 h 3166385"/>
-              <a:gd name="connsiteX15" fmla="*/ 401272 w 7507400"/>
-              <a:gd name="connsiteY15" fmla="*/ 815258 h 3166385"/>
-              <a:gd name="connsiteX16" fmla="*/ 770008 w 7507400"/>
-              <a:gd name="connsiteY16" fmla="*/ 965917 h 3166385"/>
-              <a:gd name="connsiteX17" fmla="*/ 1008605 w 7507400"/>
-              <a:gd name="connsiteY17" fmla="*/ 1019724 h 3166385"/>
-              <a:gd name="connsiteX18" fmla="*/ 1554478 w 7507400"/>
-              <a:gd name="connsiteY18" fmla="*/ 1098641 h 3166385"/>
-              <a:gd name="connsiteX19" fmla="*/ 1634010 w 7507400"/>
-              <a:gd name="connsiteY19" fmla="*/ 1227777 h 3166385"/>
-              <a:gd name="connsiteX20" fmla="*/ 1702696 w 7507400"/>
-              <a:gd name="connsiteY20" fmla="*/ 1371261 h 3166385"/>
-              <a:gd name="connsiteX21" fmla="*/ 1847299 w 7507400"/>
-              <a:gd name="connsiteY21" fmla="*/ 1464526 h 3166385"/>
-              <a:gd name="connsiteX22" fmla="*/ 723015 w 7507400"/>
-              <a:gd name="connsiteY22" fmla="*/ 1450177 h 3166385"/>
-              <a:gd name="connsiteX23" fmla="*/ 1991901 w 7507400"/>
-              <a:gd name="connsiteY23" fmla="*/ 1751495 h 3166385"/>
-              <a:gd name="connsiteX24" fmla="*/ 1879835 w 7507400"/>
-              <a:gd name="connsiteY24" fmla="*/ 1869870 h 3166385"/>
-              <a:gd name="connsiteX25" fmla="*/ 2573927 w 7507400"/>
-              <a:gd name="connsiteY25" fmla="*/ 2031290 h 3166385"/>
-              <a:gd name="connsiteX26" fmla="*/ 2201575 w 7507400"/>
-              <a:gd name="connsiteY26" fmla="*/ 2049225 h 3166385"/>
-              <a:gd name="connsiteX27" fmla="*/ 4367000 w 7507400"/>
-              <a:gd name="connsiteY27" fmla="*/ 2723602 h 3166385"/>
-              <a:gd name="connsiteX28" fmla="*/ 5497485 w 7507400"/>
-              <a:gd name="connsiteY28" fmla="*/ 2912009 h 3166385"/>
-            </a:gdLst>
-            <a:ahLst/>
-            <a:cxnLst>
-              <a:cxn ang="0">
-                <a:pos x="connsiteX0" y="connsiteY0"/>
-              </a:cxn>
-              <a:cxn ang="0">
-                <a:pos x="connsiteX1" y="connsiteY1"/>
-              </a:cxn>
-              <a:cxn ang="0">
-                <a:pos x="connsiteX2" y="connsiteY2"/>
-              </a:cxn>
-              <a:cxn ang="0">
-                <a:pos x="connsiteX3" y="connsiteY3"/>
-              </a:cxn>
-              <a:cxn ang="0">
-                <a:pos x="connsiteX4" y="connsiteY4"/>
-              </a:cxn>
-              <a:cxn ang="0">
-                <a:pos x="connsiteX5" y="connsiteY5"/>
-              </a:cxn>
-              <a:cxn ang="0">
-                <a:pos x="connsiteX6" y="connsiteY6"/>
-              </a:cxn>
-              <a:cxn ang="0">
-                <a:pos x="connsiteX7" y="connsiteY7"/>
-              </a:cxn>
-              <a:cxn ang="0">
-                <a:pos x="connsiteX8" y="connsiteY8"/>
-              </a:cxn>
-              <a:cxn ang="0">
-                <a:pos x="connsiteX9" y="connsiteY9"/>
-              </a:cxn>
-              <a:cxn ang="0">
-                <a:pos x="connsiteX10" y="connsiteY10"/>
-              </a:cxn>
-              <a:cxn ang="0">
-                <a:pos x="connsiteX11" y="connsiteY11"/>
-              </a:cxn>
-              <a:cxn ang="0">
-                <a:pos x="connsiteX12" y="connsiteY12"/>
-              </a:cxn>
-              <a:cxn ang="0">
-                <a:pos x="connsiteX13" y="connsiteY13"/>
-              </a:cxn>
-              <a:cxn ang="0">
-                <a:pos x="connsiteX14" y="connsiteY14"/>
-              </a:cxn>
-              <a:cxn ang="0">
-                <a:pos x="connsiteX15" y="connsiteY15"/>
-              </a:cxn>
-              <a:cxn ang="0">
-                <a:pos x="connsiteX16" y="connsiteY16"/>
-              </a:cxn>
-              <a:cxn ang="0">
-                <a:pos x="connsiteX17" y="connsiteY17"/>
-              </a:cxn>
-              <a:cxn ang="0">
-                <a:pos x="connsiteX18" y="connsiteY18"/>
-              </a:cxn>
-              <a:cxn ang="0">
-                <a:pos x="connsiteX19" y="connsiteY19"/>
-              </a:cxn>
-              <a:cxn ang="0">
-                <a:pos x="connsiteX20" y="connsiteY20"/>
-              </a:cxn>
-              <a:cxn ang="0">
-                <a:pos x="connsiteX21" y="connsiteY21"/>
-              </a:cxn>
-              <a:cxn ang="0">
-                <a:pos x="connsiteX22" y="connsiteY22"/>
-              </a:cxn>
-              <a:cxn ang="0">
-                <a:pos x="connsiteX23" y="connsiteY23"/>
-              </a:cxn>
-              <a:cxn ang="0">
-                <a:pos x="connsiteX24" y="connsiteY24"/>
-              </a:cxn>
-              <a:cxn ang="0">
-                <a:pos x="connsiteX25" y="connsiteY25"/>
-              </a:cxn>
-              <a:cxn ang="0">
-                <a:pos x="connsiteX26" y="connsiteY26"/>
-              </a:cxn>
-              <a:cxn ang="0">
-                <a:pos x="connsiteX27" y="connsiteY27"/>
-              </a:cxn>
-              <a:cxn ang="0">
-                <a:pos x="connsiteX28" y="connsiteY28"/>
-              </a:cxn>
-            </a:cxnLst>
-            <a:rect l="l" t="t" r="r" b="b"/>
-            <a:pathLst>
-              <a:path w="7507400" h="3166385">
-                <a:moveTo>
-                  <a:pt x="5497485" y="2912009"/>
-                </a:moveTo>
-                <a:cubicBezTo>
-                  <a:pt x="6033497" y="2998226"/>
-                  <a:pt x="6619155" y="3089592"/>
-                  <a:pt x="7034681" y="3151263"/>
-                </a:cubicBezTo>
-                <a:lnTo>
-                  <a:pt x="7137723" y="3166385"/>
-                </a:lnTo>
-                <a:lnTo>
-                  <a:pt x="7507400" y="875071"/>
-                </a:lnTo>
-                <a:lnTo>
-                  <a:pt x="2083578" y="0"/>
-                </a:lnTo>
-                <a:lnTo>
-                  <a:pt x="2023081" y="5468"/>
-                </a:lnTo>
-                <a:cubicBezTo>
-                  <a:pt x="1965692" y="12642"/>
-                  <a:pt x="1910562" y="27887"/>
-                  <a:pt x="1865374" y="76313"/>
-                </a:cubicBezTo>
-                <a:cubicBezTo>
-                  <a:pt x="1796688" y="151642"/>
-                  <a:pt x="1724387" y="162404"/>
-                  <a:pt x="1634010" y="119359"/>
-                </a:cubicBezTo>
-                <a:cubicBezTo>
-                  <a:pt x="1554478" y="79900"/>
-                  <a:pt x="1467718" y="90662"/>
-                  <a:pt x="1388186" y="130121"/>
-                </a:cubicBezTo>
-                <a:cubicBezTo>
-                  <a:pt x="1359266" y="144469"/>
-                  <a:pt x="1330344" y="162404"/>
-                  <a:pt x="1330344" y="198275"/>
-                </a:cubicBezTo>
-                <a:cubicBezTo>
-                  <a:pt x="1330344" y="248495"/>
-                  <a:pt x="1366496" y="262843"/>
-                  <a:pt x="1406262" y="270018"/>
-                </a:cubicBezTo>
-                <a:cubicBezTo>
-                  <a:pt x="1442412" y="277191"/>
-                  <a:pt x="1485792" y="284366"/>
-                  <a:pt x="1521942" y="277191"/>
-                </a:cubicBezTo>
-                <a:cubicBezTo>
-                  <a:pt x="1753307" y="237734"/>
-                  <a:pt x="1981057" y="302301"/>
-                  <a:pt x="2212420" y="295128"/>
-                </a:cubicBezTo>
-                <a:cubicBezTo>
-                  <a:pt x="1485792" y="449373"/>
-                  <a:pt x="751934" y="399154"/>
-                  <a:pt x="0" y="452960"/>
-                </a:cubicBezTo>
-                <a:cubicBezTo>
-                  <a:pt x="97608" y="560573"/>
-                  <a:pt x="224135" y="470896"/>
-                  <a:pt x="300051" y="549813"/>
-                </a:cubicBezTo>
-                <a:cubicBezTo>
-                  <a:pt x="227750" y="714820"/>
-                  <a:pt x="256671" y="804497"/>
-                  <a:pt x="401272" y="815258"/>
-                </a:cubicBezTo>
-                <a:cubicBezTo>
-                  <a:pt x="542261" y="826019"/>
-                  <a:pt x="694093" y="768625"/>
-                  <a:pt x="770008" y="965917"/>
-                </a:cubicBezTo>
-                <a:cubicBezTo>
-                  <a:pt x="791699" y="1026898"/>
-                  <a:pt x="925458" y="1008963"/>
-                  <a:pt x="1008605" y="1019724"/>
-                </a:cubicBezTo>
-                <a:cubicBezTo>
-                  <a:pt x="1189357" y="1044833"/>
-                  <a:pt x="1380957" y="1019724"/>
-                  <a:pt x="1554478" y="1098641"/>
-                </a:cubicBezTo>
-                <a:cubicBezTo>
-                  <a:pt x="1623165" y="1127337"/>
-                  <a:pt x="1670160" y="1148860"/>
-                  <a:pt x="1634010" y="1227777"/>
-                </a:cubicBezTo>
-                <a:cubicBezTo>
-                  <a:pt x="1597859" y="1310280"/>
-                  <a:pt x="1644855" y="1338976"/>
-                  <a:pt x="1702696" y="1371261"/>
-                </a:cubicBezTo>
-                <a:cubicBezTo>
-                  <a:pt x="1746077" y="1396370"/>
-                  <a:pt x="1811148" y="1389197"/>
-                  <a:pt x="1847299" y="1464526"/>
-                </a:cubicBezTo>
-                <a:cubicBezTo>
-                  <a:pt x="1467717" y="1453764"/>
-                  <a:pt x="1098981" y="1392783"/>
-                  <a:pt x="723015" y="1450177"/>
-                </a:cubicBezTo>
-                <a:cubicBezTo>
-                  <a:pt x="1135131" y="1593662"/>
-                  <a:pt x="1587014" y="1586487"/>
-                  <a:pt x="1991901" y="1751495"/>
-                </a:cubicBezTo>
-                <a:cubicBezTo>
-                  <a:pt x="1977441" y="1808889"/>
-                  <a:pt x="1883449" y="1783778"/>
-                  <a:pt x="1879835" y="1869870"/>
-                </a:cubicBezTo>
-                <a:cubicBezTo>
-                  <a:pt x="2093123" y="1959548"/>
-                  <a:pt x="2349794" y="1898566"/>
-                  <a:pt x="2573927" y="2031290"/>
-                </a:cubicBezTo>
-                <a:cubicBezTo>
-                  <a:pt x="2443785" y="2092271"/>
-                  <a:pt x="2324488" y="1991831"/>
-                  <a:pt x="2201575" y="2049225"/>
-                </a:cubicBezTo>
-                <a:cubicBezTo>
-                  <a:pt x="2241342" y="2135316"/>
-                  <a:pt x="4041644" y="2666208"/>
-                  <a:pt x="4367000" y="2723602"/>
-                </a:cubicBezTo>
-                <a:cubicBezTo>
-                  <a:pt x="4615085" y="2767993"/>
-                  <a:pt x="5038048" y="2838109"/>
-                  <a:pt x="5497485" y="2912009"/>
-                </a:cubicBezTo>
-                <a:close/>
-              </a:path>
-            </a:pathLst>
-          </a:custGeom>
-          <a:solidFill>
-            <a:schemeClr val="bg2">
-              <a:alpha val="50000"/>
-            </a:schemeClr>
-          </a:solidFill>
-          <a:ln w="32707" cap="flat">
-            <a:noFill/>
-            <a:prstDash val="solid"/>
-            <a:miter/>
-          </a:ln>
-        </p:spPr>
-        <p:txBody>
-          <a:bodyPr rtlCol="0" anchor="ctr"/>
-          <a:lstStyle/>
-          <a:p>
-            <a:endParaRPr lang="en-US"/>
-          </a:p>
-        </p:txBody>
-      </p:sp>
-      <p:sp>
-        <p:nvSpPr>
-          <p:cNvPr id="2" name="Title 1">
-            <a:extLst>
-              <a:ext uri="{FF2B5EF4-FFF2-40B4-BE49-F238E27FC236}">
-                <a16:creationId xmlns:a16="http://schemas.microsoft.com/office/drawing/2014/main" id="{DFFA48B0-B109-3DB8-B29A-F0E11BC3F655}"/>
-              </a:ext>
-            </a:extLst>
-          </p:cNvPr>
-          <p:cNvSpPr>
-            <a:spLocks noGrp="1"/>
-          </p:cNvSpPr>
-          <p:nvPr>
-            <p:ph type="ctrTitle"/>
-          </p:nvPr>
-        </p:nvSpPr>
-        <p:spPr>
-          <a:xfrm>
-            <a:off x="5751094" y="1058780"/>
-            <a:ext cx="5602705" cy="3092116"/>
-          </a:xfrm>
-        </p:spPr>
-        <p:txBody>
-          <a:bodyPr anchor="ctr">
-            <a:normAutofit/>
-          </a:bodyPr>
-          <a:lstStyle/>
-          <a:p>
-            <a:pPr algn="l"/>
-            <a:r>
-              <a:rPr lang="en-US" sz="5200"/>
-              <a:t>Background</a:t>
-            </a:r>
-          </a:p>
-        </p:txBody>
-      </p:sp>
-    </p:spTree>
-    <p:extLst>
-      <p:ext uri="{BB962C8B-B14F-4D97-AF65-F5344CB8AC3E}">
-        <p14:creationId xmlns:p14="http://schemas.microsoft.com/office/powerpoint/2010/main" val="41013224"/>
-      </p:ext>
-    </p:extLst>
-  </p:cSld>
-  <p:clrMapOvr>
-    <a:masterClrMapping/>
-  </p:clrMapOvr>
-</p:sld>
-</file>
-
-<file path=ppt/slides/slide4.xml><?xml version="1.0" encoding="utf-8"?>
-<p:sld xmlns:a="http://schemas.openxmlformats.org/drawingml/2006/main" xmlns:r="http://schemas.openxmlformats.org/officeDocument/2006/relationships" xmlns:p="http://schemas.openxmlformats.org/presentationml/2006/main">
-  <p:cSld>
-    <p:spTree>
-      <p:nvGrpSpPr>
-        <p:cNvPr id="1" name=""/>
-        <p:cNvGrpSpPr/>
-        <p:nvPr/>
-      </p:nvGrpSpPr>
-      <p:grpSpPr>
-        <a:xfrm>
-          <a:off x="0" y="0"/>
-          <a:ext cx="0" cy="0"/>
-          <a:chOff x="0" y="0"/>
-          <a:chExt cx="0" cy="0"/>
-        </a:xfrm>
-      </p:grpSpPr>
-      <p:sp>
-        <p:nvSpPr>
-          <p:cNvPr id="2" name="Title 1">
-            <a:extLst>
-              <a:ext uri="{FF2B5EF4-FFF2-40B4-BE49-F238E27FC236}">
-                <a16:creationId xmlns:a16="http://schemas.microsoft.com/office/drawing/2014/main" id="{F103A08C-47EF-7176-A34D-485EBC8743D9}"/>
-              </a:ext>
-            </a:extLst>
-          </p:cNvPr>
-          <p:cNvSpPr>
-            <a:spLocks noGrp="1"/>
-          </p:cNvSpPr>
-          <p:nvPr>
-            <p:ph type="title"/>
-          </p:nvPr>
-        </p:nvSpPr>
-        <p:spPr/>
-        <p:txBody>
-          <a:bodyPr/>
-          <a:lstStyle/>
-          <a:p>
-            <a:r>
-              <a:rPr lang="en-US" dirty="0"/>
-              <a:t>History</a:t>
-            </a:r>
-          </a:p>
-        </p:txBody>
-      </p:sp>
-      <p:sp>
-        <p:nvSpPr>
-          <p:cNvPr id="3" name="Content Placeholder 2">
-            <a:extLst>
-              <a:ext uri="{FF2B5EF4-FFF2-40B4-BE49-F238E27FC236}">
-                <a16:creationId xmlns:a16="http://schemas.microsoft.com/office/drawing/2014/main" id="{97E6B52A-024B-64C7-482E-FA365D905B04}"/>
-              </a:ext>
-            </a:extLst>
-          </p:cNvPr>
-          <p:cNvSpPr>
-            <a:spLocks noGrp="1"/>
-          </p:cNvSpPr>
-          <p:nvPr>
-            <p:ph idx="1"/>
-          </p:nvPr>
-        </p:nvSpPr>
-        <p:spPr/>
-        <p:txBody>
-          <a:bodyPr/>
-          <a:lstStyle/>
-          <a:p>
-            <a:r>
-              <a:rPr lang="en-US" dirty="0"/>
-              <a:t>Computer based communication technologies, email, bulletin board systems (1960s)</a:t>
-            </a:r>
-          </a:p>
-          <a:p>
-            <a:endParaRPr lang="en-US" dirty="0"/>
-          </a:p>
-          <a:p>
-            <a:r>
-              <a:rPr lang="en-US" dirty="0"/>
-              <a:t>Six Degrees launched a site with users and profiles with friends (1997)</a:t>
-            </a:r>
-          </a:p>
-          <a:p>
-            <a:endParaRPr lang="en-US" dirty="0"/>
-          </a:p>
-          <a:p>
-            <a:r>
-              <a:rPr lang="en-US" dirty="0" err="1"/>
-              <a:t>MySpace</a:t>
-            </a:r>
-            <a:r>
-              <a:rPr lang="en-US" dirty="0"/>
-              <a:t> (2003) Facebook (2004)</a:t>
-            </a:r>
-          </a:p>
-        </p:txBody>
-      </p:sp>
-    </p:spTree>
-    <p:extLst>
-      <p:ext uri="{BB962C8B-B14F-4D97-AF65-F5344CB8AC3E}">
-        <p14:creationId xmlns:p14="http://schemas.microsoft.com/office/powerpoint/2010/main" val="2745756700"/>
-      </p:ext>
-    </p:extLst>
-  </p:cSld>
-  <p:clrMapOvr>
-    <a:masterClrMapping/>
-  </p:clrMapOvr>
-</p:sld>
-</file>
-
-<file path=ppt/slides/slide5.xml><?xml version="1.0" encoding="utf-8"?>
-<p:sld xmlns:a="http://schemas.openxmlformats.org/drawingml/2006/main" xmlns:r="http://schemas.openxmlformats.org/officeDocument/2006/relationships" xmlns:p="http://schemas.openxmlformats.org/presentationml/2006/main">
-  <p:cSld>
-    <p:bg>
-      <p:bgPr>
-        <a:solidFill>
-          <a:schemeClr val="bg1"/>
-        </a:solidFill>
-        <a:effectLst/>
-      </p:bgPr>
-    </p:bg>
-    <p:spTree>
-      <p:nvGrpSpPr>
-        <p:cNvPr id="1" name=""/>
-        <p:cNvGrpSpPr/>
-        <p:nvPr/>
-      </p:nvGrpSpPr>
-      <p:grpSpPr>
-        <a:xfrm>
-          <a:off x="0" y="0"/>
-          <a:ext cx="0" cy="0"/>
-          <a:chOff x="0" y="0"/>
-          <a:chExt cx="0" cy="0"/>
-        </a:xfrm>
-      </p:grpSpPr>
-      <p:sp useBgFill="1">
-        <p:nvSpPr>
-          <p:cNvPr id="8" name="Rectangle 7">
-            <a:extLst>
-              <a:ext uri="{FF2B5EF4-FFF2-40B4-BE49-F238E27FC236}">
                 <a16:creationId xmlns:a16="http://schemas.microsoft.com/office/drawing/2014/main" id="{6A8AAC95-3719-4BCD-B710-4160043D9237}"/>
               </a:ext>
               <a:ext uri="{C183D7F6-B498-43B3-948B-1728B52AA6E4}">
@@ -7149,6 +6274,3195 @@
     <p:extLst>
       <p:ext uri="{BB962C8B-B14F-4D97-AF65-F5344CB8AC3E}">
         <p14:creationId xmlns:p14="http://schemas.microsoft.com/office/powerpoint/2010/main" val="2613768748"/>
+      </p:ext>
+    </p:extLst>
+  </p:cSld>
+  <p:clrMapOvr>
+    <a:masterClrMapping/>
+  </p:clrMapOvr>
+</p:sld>
+</file>
+
+<file path=ppt/slides/slide4.xml><?xml version="1.0" encoding="utf-8"?>
+<p:sld xmlns:a="http://schemas.openxmlformats.org/drawingml/2006/main" xmlns:r="http://schemas.openxmlformats.org/officeDocument/2006/relationships" xmlns:p="http://schemas.openxmlformats.org/presentationml/2006/main">
+  <p:cSld>
+    <p:bg>
+      <p:bgPr>
+        <a:solidFill>
+          <a:schemeClr val="bg1"/>
+        </a:solidFill>
+        <a:effectLst/>
+      </p:bgPr>
+    </p:bg>
+    <p:spTree>
+      <p:nvGrpSpPr>
+        <p:cNvPr id="1" name=""/>
+        <p:cNvGrpSpPr/>
+        <p:nvPr/>
+      </p:nvGrpSpPr>
+      <p:grpSpPr>
+        <a:xfrm>
+          <a:off x="0" y="0"/>
+          <a:ext cx="0" cy="0"/>
+          <a:chOff x="0" y="0"/>
+          <a:chExt cx="0" cy="0"/>
+        </a:xfrm>
+      </p:grpSpPr>
+      <p:sp useBgFill="1">
+        <p:nvSpPr>
+          <p:cNvPr id="8" name="Rectangle 7">
+            <a:extLst>
+              <a:ext uri="{FF2B5EF4-FFF2-40B4-BE49-F238E27FC236}">
+                <a16:creationId xmlns:a16="http://schemas.microsoft.com/office/drawing/2014/main" id="{FEC7823C-FDD6-429C-986C-063FDEBF9EAA}"/>
+              </a:ext>
+              <a:ext uri="{C183D7F6-B498-43B3-948B-1728B52AA6E4}">
+                <adec:decorative xmlns:adec="http://schemas.microsoft.com/office/drawing/2017/decorative" val="1"/>
+              </a:ext>
+            </a:extLst>
+          </p:cNvPr>
+          <p:cNvSpPr>
+            <a:spLocks noGrp="1" noRot="1" noChangeAspect="1" noMove="1" noResize="1" noEditPoints="1" noAdjustHandles="1" noChangeArrowheads="1" noChangeShapeType="1" noTextEdit="1"/>
+          </p:cNvSpPr>
+          <p:nvPr>
+            <p:extLst>
+              <p:ext uri="{386F3935-93C4-4BCD-93E2-E3B085C9AB24}">
+                <p16:designElem xmlns:p16="http://schemas.microsoft.com/office/powerpoint/2015/main" val="1"/>
+              </p:ext>
+            </p:extLst>
+          </p:nvPr>
+        </p:nvSpPr>
+        <p:spPr>
+          <a:xfrm>
+            <a:off x="0" y="0"/>
+            <a:ext cx="12188952" cy="6858000"/>
+          </a:xfrm>
+          <a:prstGeom prst="rect">
+            <a:avLst/>
+          </a:prstGeom>
+          <a:ln>
+            <a:noFill/>
+          </a:ln>
+        </p:spPr>
+        <p:style>
+          <a:lnRef idx="2">
+            <a:schemeClr val="accent1">
+              <a:shade val="50000"/>
+            </a:schemeClr>
+          </a:lnRef>
+          <a:fillRef idx="1">
+            <a:schemeClr val="accent1"/>
+          </a:fillRef>
+          <a:effectRef idx="0">
+            <a:schemeClr val="accent1"/>
+          </a:effectRef>
+          <a:fontRef idx="minor">
+            <a:schemeClr val="lt1"/>
+          </a:fontRef>
+        </p:style>
+        <p:txBody>
+          <a:bodyPr rtlCol="0" anchor="ctr"/>
+          <a:lstStyle/>
+          <a:p>
+            <a:pPr algn="ctr"/>
+            <a:endParaRPr lang="en-US"/>
+          </a:p>
+        </p:txBody>
+      </p:sp>
+      <p:sp>
+        <p:nvSpPr>
+          <p:cNvPr id="10" name="Freeform: Shape 9">
+            <a:extLst>
+              <a:ext uri="{FF2B5EF4-FFF2-40B4-BE49-F238E27FC236}">
+                <a16:creationId xmlns:a16="http://schemas.microsoft.com/office/drawing/2014/main" id="{9CF7FE1C-8BC5-4B0C-A2BC-93AB72C90FDD}"/>
+              </a:ext>
+              <a:ext uri="{C183D7F6-B498-43B3-948B-1728B52AA6E4}">
+                <adec:decorative xmlns:adec="http://schemas.microsoft.com/office/drawing/2017/decorative" val="1"/>
+              </a:ext>
+            </a:extLst>
+          </p:cNvPr>
+          <p:cNvSpPr>
+            <a:spLocks noGrp="1" noRot="1" noChangeAspect="1" noMove="1" noResize="1" noEditPoints="1" noAdjustHandles="1" noChangeArrowheads="1" noChangeShapeType="1" noTextEdit="1"/>
+          </p:cNvSpPr>
+          <p:nvPr>
+            <p:extLst>
+              <p:ext uri="{386F3935-93C4-4BCD-93E2-E3B085C9AB24}">
+                <p16:designElem xmlns:p16="http://schemas.microsoft.com/office/powerpoint/2015/main" val="1"/>
+              </p:ext>
+            </p:extLst>
+          </p:nvPr>
+        </p:nvSpPr>
+        <p:spPr>
+          <a:xfrm>
+            <a:off x="1768100" y="-1"/>
+            <a:ext cx="10423900" cy="5920155"/>
+          </a:xfrm>
+          <a:custGeom>
+            <a:avLst/>
+            <a:gdLst>
+              <a:gd name="connsiteX0" fmla="*/ 10423900 w 10423900"/>
+              <a:gd name="connsiteY0" fmla="*/ 0 h 5491534"/>
+              <a:gd name="connsiteX1" fmla="*/ 3493157 w 10423900"/>
+              <a:gd name="connsiteY1" fmla="*/ 0 h 5491534"/>
+              <a:gd name="connsiteX2" fmla="*/ 3493018 w 10423900"/>
+              <a:gd name="connsiteY2" fmla="*/ 31 h 5491534"/>
+              <a:gd name="connsiteX3" fmla="*/ 3245493 w 10423900"/>
+              <a:gd name="connsiteY3" fmla="*/ 104839 h 5491534"/>
+              <a:gd name="connsiteX4" fmla="*/ 4434802 w 10423900"/>
+              <a:gd name="connsiteY4" fmla="*/ 284558 h 5491534"/>
+              <a:gd name="connsiteX5" fmla="*/ 4011937 w 10423900"/>
+              <a:gd name="connsiteY5" fmla="*/ 395559 h 5491534"/>
+              <a:gd name="connsiteX6" fmla="*/ 3573213 w 10423900"/>
+              <a:gd name="connsiteY6" fmla="*/ 474847 h 5491534"/>
+              <a:gd name="connsiteX7" fmla="*/ 3097489 w 10423900"/>
+              <a:gd name="connsiteY7" fmla="*/ 532990 h 5491534"/>
+              <a:gd name="connsiteX8" fmla="*/ 2664052 w 10423900"/>
+              <a:gd name="connsiteY8" fmla="*/ 649279 h 5491534"/>
+              <a:gd name="connsiteX9" fmla="*/ 3795218 w 10423900"/>
+              <a:gd name="connsiteY9" fmla="*/ 696852 h 5491534"/>
+              <a:gd name="connsiteX10" fmla="*/ 3208492 w 10423900"/>
+              <a:gd name="connsiteY10" fmla="*/ 802568 h 5491534"/>
+              <a:gd name="connsiteX11" fmla="*/ 2727483 w 10423900"/>
+              <a:gd name="connsiteY11" fmla="*/ 939999 h 5491534"/>
+              <a:gd name="connsiteX12" fmla="*/ 2389190 w 10423900"/>
+              <a:gd name="connsiteY12" fmla="*/ 1003429 h 5491534"/>
+              <a:gd name="connsiteX13" fmla="*/ 2029754 w 10423900"/>
+              <a:gd name="connsiteY13" fmla="*/ 1019287 h 5491534"/>
+              <a:gd name="connsiteX14" fmla="*/ 1945181 w 10423900"/>
+              <a:gd name="connsiteY14" fmla="*/ 1119716 h 5491534"/>
+              <a:gd name="connsiteX15" fmla="*/ 2056184 w 10423900"/>
+              <a:gd name="connsiteY15" fmla="*/ 1225434 h 5491534"/>
+              <a:gd name="connsiteX16" fmla="*/ 2225329 w 10423900"/>
+              <a:gd name="connsiteY16" fmla="*/ 1236004 h 5491534"/>
+              <a:gd name="connsiteX17" fmla="*/ 3234920 w 10423900"/>
+              <a:gd name="connsiteY17" fmla="*/ 1262435 h 5491534"/>
+              <a:gd name="connsiteX18" fmla="*/ 0 w 10423900"/>
+              <a:gd name="connsiteY18" fmla="*/ 1495009 h 5491534"/>
+              <a:gd name="connsiteX19" fmla="*/ 438724 w 10423900"/>
+              <a:gd name="connsiteY19" fmla="*/ 1637728 h 5491534"/>
+              <a:gd name="connsiteX20" fmla="*/ 586726 w 10423900"/>
+              <a:gd name="connsiteY20" fmla="*/ 2028877 h 5491534"/>
+              <a:gd name="connsiteX21" fmla="*/ 1125878 w 10423900"/>
+              <a:gd name="connsiteY21" fmla="*/ 2250882 h 5491534"/>
+              <a:gd name="connsiteX22" fmla="*/ 1474744 w 10423900"/>
+              <a:gd name="connsiteY22" fmla="*/ 2330169 h 5491534"/>
+              <a:gd name="connsiteX23" fmla="*/ 2272901 w 10423900"/>
+              <a:gd name="connsiteY23" fmla="*/ 2446458 h 5491534"/>
+              <a:gd name="connsiteX24" fmla="*/ 2389190 w 10423900"/>
+              <a:gd name="connsiteY24" fmla="*/ 2636747 h 5491534"/>
+              <a:gd name="connsiteX25" fmla="*/ 2489621 w 10423900"/>
+              <a:gd name="connsiteY25" fmla="*/ 2848179 h 5491534"/>
+              <a:gd name="connsiteX26" fmla="*/ 2701053 w 10423900"/>
+              <a:gd name="connsiteY26" fmla="*/ 2985611 h 5491534"/>
+              <a:gd name="connsiteX27" fmla="*/ 1057165 w 10423900"/>
+              <a:gd name="connsiteY27" fmla="*/ 2964468 h 5491534"/>
+              <a:gd name="connsiteX28" fmla="*/ 2912485 w 10423900"/>
+              <a:gd name="connsiteY28" fmla="*/ 3408477 h 5491534"/>
+              <a:gd name="connsiteX29" fmla="*/ 2748626 w 10423900"/>
+              <a:gd name="connsiteY29" fmla="*/ 3582909 h 5491534"/>
+              <a:gd name="connsiteX30" fmla="*/ 3763503 w 10423900"/>
+              <a:gd name="connsiteY30" fmla="*/ 3820771 h 5491534"/>
+              <a:gd name="connsiteX31" fmla="*/ 3219063 w 10423900"/>
+              <a:gd name="connsiteY31" fmla="*/ 3847199 h 5491534"/>
+              <a:gd name="connsiteX32" fmla="*/ 6385269 w 10423900"/>
+              <a:gd name="connsiteY32" fmla="*/ 4840933 h 5491534"/>
+              <a:gd name="connsiteX33" fmla="*/ 10285854 w 10423900"/>
+              <a:gd name="connsiteY33" fmla="*/ 5471118 h 5491534"/>
+              <a:gd name="connsiteX34" fmla="*/ 10423900 w 10423900"/>
+              <a:gd name="connsiteY34" fmla="*/ 5491534 h 5491534"/>
+            </a:gdLst>
+            <a:ahLst/>
+            <a:cxnLst>
+              <a:cxn ang="0">
+                <a:pos x="connsiteX0" y="connsiteY0"/>
+              </a:cxn>
+              <a:cxn ang="0">
+                <a:pos x="connsiteX1" y="connsiteY1"/>
+              </a:cxn>
+              <a:cxn ang="0">
+                <a:pos x="connsiteX2" y="connsiteY2"/>
+              </a:cxn>
+              <a:cxn ang="0">
+                <a:pos x="connsiteX3" y="connsiteY3"/>
+              </a:cxn>
+              <a:cxn ang="0">
+                <a:pos x="connsiteX4" y="connsiteY4"/>
+              </a:cxn>
+              <a:cxn ang="0">
+                <a:pos x="connsiteX5" y="connsiteY5"/>
+              </a:cxn>
+              <a:cxn ang="0">
+                <a:pos x="connsiteX6" y="connsiteY6"/>
+              </a:cxn>
+              <a:cxn ang="0">
+                <a:pos x="connsiteX7" y="connsiteY7"/>
+              </a:cxn>
+              <a:cxn ang="0">
+                <a:pos x="connsiteX8" y="connsiteY8"/>
+              </a:cxn>
+              <a:cxn ang="0">
+                <a:pos x="connsiteX9" y="connsiteY9"/>
+              </a:cxn>
+              <a:cxn ang="0">
+                <a:pos x="connsiteX10" y="connsiteY10"/>
+              </a:cxn>
+              <a:cxn ang="0">
+                <a:pos x="connsiteX11" y="connsiteY11"/>
+              </a:cxn>
+              <a:cxn ang="0">
+                <a:pos x="connsiteX12" y="connsiteY12"/>
+              </a:cxn>
+              <a:cxn ang="0">
+                <a:pos x="connsiteX13" y="connsiteY13"/>
+              </a:cxn>
+              <a:cxn ang="0">
+                <a:pos x="connsiteX14" y="connsiteY14"/>
+              </a:cxn>
+              <a:cxn ang="0">
+                <a:pos x="connsiteX15" y="connsiteY15"/>
+              </a:cxn>
+              <a:cxn ang="0">
+                <a:pos x="connsiteX16" y="connsiteY16"/>
+              </a:cxn>
+              <a:cxn ang="0">
+                <a:pos x="connsiteX17" y="connsiteY17"/>
+              </a:cxn>
+              <a:cxn ang="0">
+                <a:pos x="connsiteX18" y="connsiteY18"/>
+              </a:cxn>
+              <a:cxn ang="0">
+                <a:pos x="connsiteX19" y="connsiteY19"/>
+              </a:cxn>
+              <a:cxn ang="0">
+                <a:pos x="connsiteX20" y="connsiteY20"/>
+              </a:cxn>
+              <a:cxn ang="0">
+                <a:pos x="connsiteX21" y="connsiteY21"/>
+              </a:cxn>
+              <a:cxn ang="0">
+                <a:pos x="connsiteX22" y="connsiteY22"/>
+              </a:cxn>
+              <a:cxn ang="0">
+                <a:pos x="connsiteX23" y="connsiteY23"/>
+              </a:cxn>
+              <a:cxn ang="0">
+                <a:pos x="connsiteX24" y="connsiteY24"/>
+              </a:cxn>
+              <a:cxn ang="0">
+                <a:pos x="connsiteX25" y="connsiteY25"/>
+              </a:cxn>
+              <a:cxn ang="0">
+                <a:pos x="connsiteX26" y="connsiteY26"/>
+              </a:cxn>
+              <a:cxn ang="0">
+                <a:pos x="connsiteX27" y="connsiteY27"/>
+              </a:cxn>
+              <a:cxn ang="0">
+                <a:pos x="connsiteX28" y="connsiteY28"/>
+              </a:cxn>
+              <a:cxn ang="0">
+                <a:pos x="connsiteX29" y="connsiteY29"/>
+              </a:cxn>
+              <a:cxn ang="0">
+                <a:pos x="connsiteX30" y="connsiteY30"/>
+              </a:cxn>
+              <a:cxn ang="0">
+                <a:pos x="connsiteX31" y="connsiteY31"/>
+              </a:cxn>
+              <a:cxn ang="0">
+                <a:pos x="connsiteX32" y="connsiteY32"/>
+              </a:cxn>
+              <a:cxn ang="0">
+                <a:pos x="connsiteX33" y="connsiteY33"/>
+              </a:cxn>
+              <a:cxn ang="0">
+                <a:pos x="connsiteX34" y="connsiteY34"/>
+              </a:cxn>
+            </a:cxnLst>
+            <a:rect l="l" t="t" r="r" b="b"/>
+            <a:pathLst>
+              <a:path w="10423900" h="5491534">
+                <a:moveTo>
+                  <a:pt x="10423900" y="0"/>
+                </a:moveTo>
+                <a:lnTo>
+                  <a:pt x="3493157" y="0"/>
+                </a:lnTo>
+                <a:lnTo>
+                  <a:pt x="3493018" y="31"/>
+                </a:lnTo>
+                <a:cubicBezTo>
+                  <a:pt x="3414969" y="12668"/>
+                  <a:pt x="3328744" y="21588"/>
+                  <a:pt x="3245493" y="104839"/>
+                </a:cubicBezTo>
+                <a:cubicBezTo>
+                  <a:pt x="3668357" y="162984"/>
+                  <a:pt x="4075366" y="51981"/>
+                  <a:pt x="4434802" y="284558"/>
+                </a:cubicBezTo>
+                <a:cubicBezTo>
+                  <a:pt x="4302656" y="400846"/>
+                  <a:pt x="4154654" y="374416"/>
+                  <a:pt x="4011937" y="395559"/>
+                </a:cubicBezTo>
+                <a:cubicBezTo>
+                  <a:pt x="3863934" y="416704"/>
+                  <a:pt x="3721217" y="453704"/>
+                  <a:pt x="3573213" y="474847"/>
+                </a:cubicBezTo>
+                <a:cubicBezTo>
+                  <a:pt x="3414639" y="501275"/>
+                  <a:pt x="3256063" y="506562"/>
+                  <a:pt x="3097489" y="532990"/>
+                </a:cubicBezTo>
+                <a:cubicBezTo>
+                  <a:pt x="2965345" y="554135"/>
+                  <a:pt x="2822627" y="517133"/>
+                  <a:pt x="2664052" y="649279"/>
+                </a:cubicBezTo>
+                <a:cubicBezTo>
+                  <a:pt x="3055203" y="744424"/>
+                  <a:pt x="3409352" y="601706"/>
+                  <a:pt x="3795218" y="696852"/>
+                </a:cubicBezTo>
+                <a:cubicBezTo>
+                  <a:pt x="3567928" y="781425"/>
+                  <a:pt x="3382924" y="754995"/>
+                  <a:pt x="3208492" y="802568"/>
+                </a:cubicBezTo>
+                <a:cubicBezTo>
+                  <a:pt x="3049916" y="850140"/>
+                  <a:pt x="2859627" y="797282"/>
+                  <a:pt x="2727483" y="939999"/>
+                </a:cubicBezTo>
+                <a:cubicBezTo>
+                  <a:pt x="2627052" y="1051000"/>
+                  <a:pt x="2521336" y="1066858"/>
+                  <a:pt x="2389190" y="1003429"/>
+                </a:cubicBezTo>
+                <a:cubicBezTo>
+                  <a:pt x="2272901" y="945284"/>
+                  <a:pt x="2146043" y="961142"/>
+                  <a:pt x="2029754" y="1019287"/>
+                </a:cubicBezTo>
+                <a:cubicBezTo>
+                  <a:pt x="1987468" y="1040430"/>
+                  <a:pt x="1945181" y="1066858"/>
+                  <a:pt x="1945181" y="1119716"/>
+                </a:cubicBezTo>
+                <a:cubicBezTo>
+                  <a:pt x="1945181" y="1193719"/>
+                  <a:pt x="1998039" y="1214862"/>
+                  <a:pt x="2056184" y="1225434"/>
+                </a:cubicBezTo>
+                <a:cubicBezTo>
+                  <a:pt x="2109042" y="1236004"/>
+                  <a:pt x="2172471" y="1246577"/>
+                  <a:pt x="2225329" y="1236004"/>
+                </a:cubicBezTo>
+                <a:cubicBezTo>
+                  <a:pt x="2563622" y="1177861"/>
+                  <a:pt x="2896629" y="1273005"/>
+                  <a:pt x="3234920" y="1262435"/>
+                </a:cubicBezTo>
+                <a:cubicBezTo>
+                  <a:pt x="2172471" y="1489724"/>
+                  <a:pt x="1099450" y="1415723"/>
+                  <a:pt x="0" y="1495009"/>
+                </a:cubicBezTo>
+                <a:cubicBezTo>
+                  <a:pt x="142717" y="1653583"/>
+                  <a:pt x="327721" y="1521439"/>
+                  <a:pt x="438724" y="1637728"/>
+                </a:cubicBezTo>
+                <a:cubicBezTo>
+                  <a:pt x="333006" y="1880875"/>
+                  <a:pt x="375293" y="2013020"/>
+                  <a:pt x="586726" y="2028877"/>
+                </a:cubicBezTo>
+                <a:cubicBezTo>
+                  <a:pt x="792873" y="2044734"/>
+                  <a:pt x="1014877" y="1960161"/>
+                  <a:pt x="1125878" y="2250882"/>
+                </a:cubicBezTo>
+                <a:cubicBezTo>
+                  <a:pt x="1157593" y="2340740"/>
+                  <a:pt x="1353170" y="2314312"/>
+                  <a:pt x="1474744" y="2330169"/>
+                </a:cubicBezTo>
+                <a:cubicBezTo>
+                  <a:pt x="1739034" y="2367170"/>
+                  <a:pt x="2019183" y="2330169"/>
+                  <a:pt x="2272901" y="2446458"/>
+                </a:cubicBezTo>
+                <a:cubicBezTo>
+                  <a:pt x="2373332" y="2488744"/>
+                  <a:pt x="2442048" y="2520459"/>
+                  <a:pt x="2389190" y="2636747"/>
+                </a:cubicBezTo>
+                <a:cubicBezTo>
+                  <a:pt x="2336332" y="2758321"/>
+                  <a:pt x="2405048" y="2800607"/>
+                  <a:pt x="2489621" y="2848179"/>
+                </a:cubicBezTo>
+                <a:cubicBezTo>
+                  <a:pt x="2553051" y="2885180"/>
+                  <a:pt x="2648195" y="2874609"/>
+                  <a:pt x="2701053" y="2985611"/>
+                </a:cubicBezTo>
+                <a:cubicBezTo>
+                  <a:pt x="2146043" y="2969753"/>
+                  <a:pt x="1606888" y="2879895"/>
+                  <a:pt x="1057165" y="2964468"/>
+                </a:cubicBezTo>
+                <a:cubicBezTo>
+                  <a:pt x="1659748" y="3175900"/>
+                  <a:pt x="2320474" y="3165328"/>
+                  <a:pt x="2912485" y="3408477"/>
+                </a:cubicBezTo>
+                <a:cubicBezTo>
+                  <a:pt x="2891342" y="3493050"/>
+                  <a:pt x="2753911" y="3456048"/>
+                  <a:pt x="2748626" y="3582909"/>
+                </a:cubicBezTo>
+                <a:cubicBezTo>
+                  <a:pt x="3060489" y="3715055"/>
+                  <a:pt x="3435782" y="3625195"/>
+                  <a:pt x="3763503" y="3820771"/>
+                </a:cubicBezTo>
+                <a:cubicBezTo>
+                  <a:pt x="3573213" y="3910629"/>
+                  <a:pt x="3398782" y="3762626"/>
+                  <a:pt x="3219063" y="3847199"/>
+                </a:cubicBezTo>
+                <a:cubicBezTo>
+                  <a:pt x="3277208" y="3974060"/>
+                  <a:pt x="5909545" y="4756360"/>
+                  <a:pt x="6385269" y="4840933"/>
+                </a:cubicBezTo>
+                <a:cubicBezTo>
+                  <a:pt x="7171204" y="4982659"/>
+                  <a:pt x="9157515" y="5302348"/>
+                  <a:pt x="10285854" y="5471118"/>
+                </a:cubicBezTo>
+                <a:lnTo>
+                  <a:pt x="10423900" y="5491534"/>
+                </a:lnTo>
+                <a:close/>
+              </a:path>
+            </a:pathLst>
+          </a:custGeom>
+          <a:solidFill>
+            <a:schemeClr val="bg2">
+              <a:alpha val="50000"/>
+            </a:schemeClr>
+          </a:solidFill>
+          <a:ln w="32707" cap="flat">
+            <a:noFill/>
+            <a:prstDash val="solid"/>
+            <a:miter/>
+          </a:ln>
+        </p:spPr>
+        <p:txBody>
+          <a:bodyPr rtlCol="0" anchor="ctr"/>
+          <a:lstStyle/>
+          <a:p>
+            <a:endParaRPr lang="en-US"/>
+          </a:p>
+        </p:txBody>
+      </p:sp>
+      <p:sp>
+        <p:nvSpPr>
+          <p:cNvPr id="12" name="Freeform: Shape 11">
+            <a:extLst>
+              <a:ext uri="{FF2B5EF4-FFF2-40B4-BE49-F238E27FC236}">
+                <a16:creationId xmlns:a16="http://schemas.microsoft.com/office/drawing/2014/main" id="{B0651F5E-0457-4065-ACB2-8B81590C204B}"/>
+              </a:ext>
+              <a:ext uri="{C183D7F6-B498-43B3-948B-1728B52AA6E4}">
+                <adec:decorative xmlns:adec="http://schemas.microsoft.com/office/drawing/2017/decorative" val="1"/>
+              </a:ext>
+            </a:extLst>
+          </p:cNvPr>
+          <p:cNvSpPr>
+            <a:spLocks noGrp="1" noRot="1" noChangeAspect="1" noMove="1" noResize="1" noEditPoints="1" noAdjustHandles="1" noChangeArrowheads="1" noChangeShapeType="1" noTextEdit="1"/>
+          </p:cNvSpPr>
+          <p:nvPr>
+            <p:extLst>
+              <p:ext uri="{386F3935-93C4-4BCD-93E2-E3B085C9AB24}">
+                <p16:designElem xmlns:p16="http://schemas.microsoft.com/office/powerpoint/2015/main" val="1"/>
+              </p:ext>
+            </p:extLst>
+          </p:nvPr>
+        </p:nvSpPr>
+        <p:spPr>
+          <a:xfrm rot="21050098" flipH="1" flipV="1">
+            <a:off x="-160709" y="3977842"/>
+            <a:ext cx="7507400" cy="3166385"/>
+          </a:xfrm>
+          <a:custGeom>
+            <a:avLst/>
+            <a:gdLst>
+              <a:gd name="connsiteX0" fmla="*/ 5497485 w 7507400"/>
+              <a:gd name="connsiteY0" fmla="*/ 2912009 h 3166385"/>
+              <a:gd name="connsiteX1" fmla="*/ 7034681 w 7507400"/>
+              <a:gd name="connsiteY1" fmla="*/ 3151263 h 3166385"/>
+              <a:gd name="connsiteX2" fmla="*/ 7137723 w 7507400"/>
+              <a:gd name="connsiteY2" fmla="*/ 3166385 h 3166385"/>
+              <a:gd name="connsiteX3" fmla="*/ 7507400 w 7507400"/>
+              <a:gd name="connsiteY3" fmla="*/ 875071 h 3166385"/>
+              <a:gd name="connsiteX4" fmla="*/ 2083578 w 7507400"/>
+              <a:gd name="connsiteY4" fmla="*/ 0 h 3166385"/>
+              <a:gd name="connsiteX5" fmla="*/ 2023081 w 7507400"/>
+              <a:gd name="connsiteY5" fmla="*/ 5468 h 3166385"/>
+              <a:gd name="connsiteX6" fmla="*/ 1865374 w 7507400"/>
+              <a:gd name="connsiteY6" fmla="*/ 76313 h 3166385"/>
+              <a:gd name="connsiteX7" fmla="*/ 1634010 w 7507400"/>
+              <a:gd name="connsiteY7" fmla="*/ 119359 h 3166385"/>
+              <a:gd name="connsiteX8" fmla="*/ 1388186 w 7507400"/>
+              <a:gd name="connsiteY8" fmla="*/ 130121 h 3166385"/>
+              <a:gd name="connsiteX9" fmla="*/ 1330344 w 7507400"/>
+              <a:gd name="connsiteY9" fmla="*/ 198275 h 3166385"/>
+              <a:gd name="connsiteX10" fmla="*/ 1406262 w 7507400"/>
+              <a:gd name="connsiteY10" fmla="*/ 270018 h 3166385"/>
+              <a:gd name="connsiteX11" fmla="*/ 1521942 w 7507400"/>
+              <a:gd name="connsiteY11" fmla="*/ 277191 h 3166385"/>
+              <a:gd name="connsiteX12" fmla="*/ 2212420 w 7507400"/>
+              <a:gd name="connsiteY12" fmla="*/ 295128 h 3166385"/>
+              <a:gd name="connsiteX13" fmla="*/ 0 w 7507400"/>
+              <a:gd name="connsiteY13" fmla="*/ 452960 h 3166385"/>
+              <a:gd name="connsiteX14" fmla="*/ 300051 w 7507400"/>
+              <a:gd name="connsiteY14" fmla="*/ 549813 h 3166385"/>
+              <a:gd name="connsiteX15" fmla="*/ 401272 w 7507400"/>
+              <a:gd name="connsiteY15" fmla="*/ 815258 h 3166385"/>
+              <a:gd name="connsiteX16" fmla="*/ 770008 w 7507400"/>
+              <a:gd name="connsiteY16" fmla="*/ 965917 h 3166385"/>
+              <a:gd name="connsiteX17" fmla="*/ 1008605 w 7507400"/>
+              <a:gd name="connsiteY17" fmla="*/ 1019724 h 3166385"/>
+              <a:gd name="connsiteX18" fmla="*/ 1554478 w 7507400"/>
+              <a:gd name="connsiteY18" fmla="*/ 1098641 h 3166385"/>
+              <a:gd name="connsiteX19" fmla="*/ 1634010 w 7507400"/>
+              <a:gd name="connsiteY19" fmla="*/ 1227777 h 3166385"/>
+              <a:gd name="connsiteX20" fmla="*/ 1702696 w 7507400"/>
+              <a:gd name="connsiteY20" fmla="*/ 1371261 h 3166385"/>
+              <a:gd name="connsiteX21" fmla="*/ 1847299 w 7507400"/>
+              <a:gd name="connsiteY21" fmla="*/ 1464526 h 3166385"/>
+              <a:gd name="connsiteX22" fmla="*/ 723015 w 7507400"/>
+              <a:gd name="connsiteY22" fmla="*/ 1450177 h 3166385"/>
+              <a:gd name="connsiteX23" fmla="*/ 1991901 w 7507400"/>
+              <a:gd name="connsiteY23" fmla="*/ 1751495 h 3166385"/>
+              <a:gd name="connsiteX24" fmla="*/ 1879835 w 7507400"/>
+              <a:gd name="connsiteY24" fmla="*/ 1869870 h 3166385"/>
+              <a:gd name="connsiteX25" fmla="*/ 2573927 w 7507400"/>
+              <a:gd name="connsiteY25" fmla="*/ 2031290 h 3166385"/>
+              <a:gd name="connsiteX26" fmla="*/ 2201575 w 7507400"/>
+              <a:gd name="connsiteY26" fmla="*/ 2049225 h 3166385"/>
+              <a:gd name="connsiteX27" fmla="*/ 4367000 w 7507400"/>
+              <a:gd name="connsiteY27" fmla="*/ 2723602 h 3166385"/>
+              <a:gd name="connsiteX28" fmla="*/ 5497485 w 7507400"/>
+              <a:gd name="connsiteY28" fmla="*/ 2912009 h 3166385"/>
+            </a:gdLst>
+            <a:ahLst/>
+            <a:cxnLst>
+              <a:cxn ang="0">
+                <a:pos x="connsiteX0" y="connsiteY0"/>
+              </a:cxn>
+              <a:cxn ang="0">
+                <a:pos x="connsiteX1" y="connsiteY1"/>
+              </a:cxn>
+              <a:cxn ang="0">
+                <a:pos x="connsiteX2" y="connsiteY2"/>
+              </a:cxn>
+              <a:cxn ang="0">
+                <a:pos x="connsiteX3" y="connsiteY3"/>
+              </a:cxn>
+              <a:cxn ang="0">
+                <a:pos x="connsiteX4" y="connsiteY4"/>
+              </a:cxn>
+              <a:cxn ang="0">
+                <a:pos x="connsiteX5" y="connsiteY5"/>
+              </a:cxn>
+              <a:cxn ang="0">
+                <a:pos x="connsiteX6" y="connsiteY6"/>
+              </a:cxn>
+              <a:cxn ang="0">
+                <a:pos x="connsiteX7" y="connsiteY7"/>
+              </a:cxn>
+              <a:cxn ang="0">
+                <a:pos x="connsiteX8" y="connsiteY8"/>
+              </a:cxn>
+              <a:cxn ang="0">
+                <a:pos x="connsiteX9" y="connsiteY9"/>
+              </a:cxn>
+              <a:cxn ang="0">
+                <a:pos x="connsiteX10" y="connsiteY10"/>
+              </a:cxn>
+              <a:cxn ang="0">
+                <a:pos x="connsiteX11" y="connsiteY11"/>
+              </a:cxn>
+              <a:cxn ang="0">
+                <a:pos x="connsiteX12" y="connsiteY12"/>
+              </a:cxn>
+              <a:cxn ang="0">
+                <a:pos x="connsiteX13" y="connsiteY13"/>
+              </a:cxn>
+              <a:cxn ang="0">
+                <a:pos x="connsiteX14" y="connsiteY14"/>
+              </a:cxn>
+              <a:cxn ang="0">
+                <a:pos x="connsiteX15" y="connsiteY15"/>
+              </a:cxn>
+              <a:cxn ang="0">
+                <a:pos x="connsiteX16" y="connsiteY16"/>
+              </a:cxn>
+              <a:cxn ang="0">
+                <a:pos x="connsiteX17" y="connsiteY17"/>
+              </a:cxn>
+              <a:cxn ang="0">
+                <a:pos x="connsiteX18" y="connsiteY18"/>
+              </a:cxn>
+              <a:cxn ang="0">
+                <a:pos x="connsiteX19" y="connsiteY19"/>
+              </a:cxn>
+              <a:cxn ang="0">
+                <a:pos x="connsiteX20" y="connsiteY20"/>
+              </a:cxn>
+              <a:cxn ang="0">
+                <a:pos x="connsiteX21" y="connsiteY21"/>
+              </a:cxn>
+              <a:cxn ang="0">
+                <a:pos x="connsiteX22" y="connsiteY22"/>
+              </a:cxn>
+              <a:cxn ang="0">
+                <a:pos x="connsiteX23" y="connsiteY23"/>
+              </a:cxn>
+              <a:cxn ang="0">
+                <a:pos x="connsiteX24" y="connsiteY24"/>
+              </a:cxn>
+              <a:cxn ang="0">
+                <a:pos x="connsiteX25" y="connsiteY25"/>
+              </a:cxn>
+              <a:cxn ang="0">
+                <a:pos x="connsiteX26" y="connsiteY26"/>
+              </a:cxn>
+              <a:cxn ang="0">
+                <a:pos x="connsiteX27" y="connsiteY27"/>
+              </a:cxn>
+              <a:cxn ang="0">
+                <a:pos x="connsiteX28" y="connsiteY28"/>
+              </a:cxn>
+            </a:cxnLst>
+            <a:rect l="l" t="t" r="r" b="b"/>
+            <a:pathLst>
+              <a:path w="7507400" h="3166385">
+                <a:moveTo>
+                  <a:pt x="5497485" y="2912009"/>
+                </a:moveTo>
+                <a:cubicBezTo>
+                  <a:pt x="6033497" y="2998226"/>
+                  <a:pt x="6619155" y="3089592"/>
+                  <a:pt x="7034681" y="3151263"/>
+                </a:cubicBezTo>
+                <a:lnTo>
+                  <a:pt x="7137723" y="3166385"/>
+                </a:lnTo>
+                <a:lnTo>
+                  <a:pt x="7507400" y="875071"/>
+                </a:lnTo>
+                <a:lnTo>
+                  <a:pt x="2083578" y="0"/>
+                </a:lnTo>
+                <a:lnTo>
+                  <a:pt x="2023081" y="5468"/>
+                </a:lnTo>
+                <a:cubicBezTo>
+                  <a:pt x="1965692" y="12642"/>
+                  <a:pt x="1910562" y="27887"/>
+                  <a:pt x="1865374" y="76313"/>
+                </a:cubicBezTo>
+                <a:cubicBezTo>
+                  <a:pt x="1796688" y="151642"/>
+                  <a:pt x="1724387" y="162404"/>
+                  <a:pt x="1634010" y="119359"/>
+                </a:cubicBezTo>
+                <a:cubicBezTo>
+                  <a:pt x="1554478" y="79900"/>
+                  <a:pt x="1467718" y="90662"/>
+                  <a:pt x="1388186" y="130121"/>
+                </a:cubicBezTo>
+                <a:cubicBezTo>
+                  <a:pt x="1359266" y="144469"/>
+                  <a:pt x="1330344" y="162404"/>
+                  <a:pt x="1330344" y="198275"/>
+                </a:cubicBezTo>
+                <a:cubicBezTo>
+                  <a:pt x="1330344" y="248495"/>
+                  <a:pt x="1366496" y="262843"/>
+                  <a:pt x="1406262" y="270018"/>
+                </a:cubicBezTo>
+                <a:cubicBezTo>
+                  <a:pt x="1442412" y="277191"/>
+                  <a:pt x="1485792" y="284366"/>
+                  <a:pt x="1521942" y="277191"/>
+                </a:cubicBezTo>
+                <a:cubicBezTo>
+                  <a:pt x="1753307" y="237734"/>
+                  <a:pt x="1981057" y="302301"/>
+                  <a:pt x="2212420" y="295128"/>
+                </a:cubicBezTo>
+                <a:cubicBezTo>
+                  <a:pt x="1485792" y="449373"/>
+                  <a:pt x="751934" y="399154"/>
+                  <a:pt x="0" y="452960"/>
+                </a:cubicBezTo>
+                <a:cubicBezTo>
+                  <a:pt x="97608" y="560573"/>
+                  <a:pt x="224135" y="470896"/>
+                  <a:pt x="300051" y="549813"/>
+                </a:cubicBezTo>
+                <a:cubicBezTo>
+                  <a:pt x="227750" y="714820"/>
+                  <a:pt x="256671" y="804497"/>
+                  <a:pt x="401272" y="815258"/>
+                </a:cubicBezTo>
+                <a:cubicBezTo>
+                  <a:pt x="542261" y="826019"/>
+                  <a:pt x="694093" y="768625"/>
+                  <a:pt x="770008" y="965917"/>
+                </a:cubicBezTo>
+                <a:cubicBezTo>
+                  <a:pt x="791699" y="1026898"/>
+                  <a:pt x="925458" y="1008963"/>
+                  <a:pt x="1008605" y="1019724"/>
+                </a:cubicBezTo>
+                <a:cubicBezTo>
+                  <a:pt x="1189357" y="1044833"/>
+                  <a:pt x="1380957" y="1019724"/>
+                  <a:pt x="1554478" y="1098641"/>
+                </a:cubicBezTo>
+                <a:cubicBezTo>
+                  <a:pt x="1623165" y="1127337"/>
+                  <a:pt x="1670160" y="1148860"/>
+                  <a:pt x="1634010" y="1227777"/>
+                </a:cubicBezTo>
+                <a:cubicBezTo>
+                  <a:pt x="1597859" y="1310280"/>
+                  <a:pt x="1644855" y="1338976"/>
+                  <a:pt x="1702696" y="1371261"/>
+                </a:cubicBezTo>
+                <a:cubicBezTo>
+                  <a:pt x="1746077" y="1396370"/>
+                  <a:pt x="1811148" y="1389197"/>
+                  <a:pt x="1847299" y="1464526"/>
+                </a:cubicBezTo>
+                <a:cubicBezTo>
+                  <a:pt x="1467717" y="1453764"/>
+                  <a:pt x="1098981" y="1392783"/>
+                  <a:pt x="723015" y="1450177"/>
+                </a:cubicBezTo>
+                <a:cubicBezTo>
+                  <a:pt x="1135131" y="1593662"/>
+                  <a:pt x="1587014" y="1586487"/>
+                  <a:pt x="1991901" y="1751495"/>
+                </a:cubicBezTo>
+                <a:cubicBezTo>
+                  <a:pt x="1977441" y="1808889"/>
+                  <a:pt x="1883449" y="1783778"/>
+                  <a:pt x="1879835" y="1869870"/>
+                </a:cubicBezTo>
+                <a:cubicBezTo>
+                  <a:pt x="2093123" y="1959548"/>
+                  <a:pt x="2349794" y="1898566"/>
+                  <a:pt x="2573927" y="2031290"/>
+                </a:cubicBezTo>
+                <a:cubicBezTo>
+                  <a:pt x="2443785" y="2092271"/>
+                  <a:pt x="2324488" y="1991831"/>
+                  <a:pt x="2201575" y="2049225"/>
+                </a:cubicBezTo>
+                <a:cubicBezTo>
+                  <a:pt x="2241342" y="2135316"/>
+                  <a:pt x="4041644" y="2666208"/>
+                  <a:pt x="4367000" y="2723602"/>
+                </a:cubicBezTo>
+                <a:cubicBezTo>
+                  <a:pt x="4615085" y="2767993"/>
+                  <a:pt x="5038048" y="2838109"/>
+                  <a:pt x="5497485" y="2912009"/>
+                </a:cubicBezTo>
+                <a:close/>
+              </a:path>
+            </a:pathLst>
+          </a:custGeom>
+          <a:solidFill>
+            <a:schemeClr val="bg2">
+              <a:alpha val="50000"/>
+            </a:schemeClr>
+          </a:solidFill>
+          <a:ln w="32707" cap="flat">
+            <a:noFill/>
+            <a:prstDash val="solid"/>
+            <a:miter/>
+          </a:ln>
+        </p:spPr>
+        <p:txBody>
+          <a:bodyPr rtlCol="0" anchor="ctr"/>
+          <a:lstStyle/>
+          <a:p>
+            <a:endParaRPr lang="en-US"/>
+          </a:p>
+        </p:txBody>
+      </p:sp>
+      <p:sp>
+        <p:nvSpPr>
+          <p:cNvPr id="2" name="Title 1">
+            <a:extLst>
+              <a:ext uri="{FF2B5EF4-FFF2-40B4-BE49-F238E27FC236}">
+                <a16:creationId xmlns:a16="http://schemas.microsoft.com/office/drawing/2014/main" id="{DFFA48B0-B109-3DB8-B29A-F0E11BC3F655}"/>
+              </a:ext>
+            </a:extLst>
+          </p:cNvPr>
+          <p:cNvSpPr>
+            <a:spLocks noGrp="1"/>
+          </p:cNvSpPr>
+          <p:nvPr>
+            <p:ph type="ctrTitle"/>
+          </p:nvPr>
+        </p:nvSpPr>
+        <p:spPr>
+          <a:xfrm>
+            <a:off x="5751094" y="1058780"/>
+            <a:ext cx="5602705" cy="3092116"/>
+          </a:xfrm>
+        </p:spPr>
+        <p:txBody>
+          <a:bodyPr anchor="ctr">
+            <a:normAutofit/>
+          </a:bodyPr>
+          <a:lstStyle/>
+          <a:p>
+            <a:pPr algn="l"/>
+            <a:r>
+              <a:rPr lang="en-US" sz="5200"/>
+              <a:t>Background</a:t>
+            </a:r>
+          </a:p>
+        </p:txBody>
+      </p:sp>
+    </p:spTree>
+    <p:extLst>
+      <p:ext uri="{BB962C8B-B14F-4D97-AF65-F5344CB8AC3E}">
+        <p14:creationId xmlns:p14="http://schemas.microsoft.com/office/powerpoint/2010/main" val="41013224"/>
+      </p:ext>
+    </p:extLst>
+  </p:cSld>
+  <p:clrMapOvr>
+    <a:masterClrMapping/>
+  </p:clrMapOvr>
+</p:sld>
+</file>
+
+<file path=ppt/slides/slide5.xml><?xml version="1.0" encoding="utf-8"?>
+<p:sld xmlns:a="http://schemas.openxmlformats.org/drawingml/2006/main" xmlns:r="http://schemas.openxmlformats.org/officeDocument/2006/relationships" xmlns:p="http://schemas.openxmlformats.org/presentationml/2006/main">
+  <p:cSld>
+    <p:bg>
+      <p:bgPr>
+        <a:solidFill>
+          <a:schemeClr val="bg1"/>
+        </a:solidFill>
+        <a:effectLst/>
+      </p:bgPr>
+    </p:bg>
+    <p:spTree>
+      <p:nvGrpSpPr>
+        <p:cNvPr id="1" name=""/>
+        <p:cNvGrpSpPr/>
+        <p:nvPr/>
+      </p:nvGrpSpPr>
+      <p:grpSpPr>
+        <a:xfrm>
+          <a:off x="0" y="0"/>
+          <a:ext cx="0" cy="0"/>
+          <a:chOff x="0" y="0"/>
+          <a:chExt cx="0" cy="0"/>
+        </a:xfrm>
+      </p:grpSpPr>
+      <p:sp useBgFill="1">
+        <p:nvSpPr>
+          <p:cNvPr id="8" name="Rectangle 7">
+            <a:extLst>
+              <a:ext uri="{FF2B5EF4-FFF2-40B4-BE49-F238E27FC236}">
+                <a16:creationId xmlns:a16="http://schemas.microsoft.com/office/drawing/2014/main" id="{17718681-A12E-49D6-9925-DD7C68176D61}"/>
+              </a:ext>
+              <a:ext uri="{C183D7F6-B498-43B3-948B-1728B52AA6E4}">
+                <adec:decorative xmlns:adec="http://schemas.microsoft.com/office/drawing/2017/decorative" val="1"/>
+              </a:ext>
+            </a:extLst>
+          </p:cNvPr>
+          <p:cNvSpPr>
+            <a:spLocks noGrp="1" noRot="1" noChangeAspect="1" noMove="1" noResize="1" noEditPoints="1" noAdjustHandles="1" noChangeArrowheads="1" noChangeShapeType="1" noTextEdit="1"/>
+          </p:cNvSpPr>
+          <p:nvPr>
+            <p:extLst>
+              <p:ext uri="{386F3935-93C4-4BCD-93E2-E3B085C9AB24}">
+                <p16:designElem xmlns:p16="http://schemas.microsoft.com/office/powerpoint/2015/main" val="1"/>
+              </p:ext>
+            </p:extLst>
+          </p:nvPr>
+        </p:nvSpPr>
+        <p:spPr>
+          <a:xfrm>
+            <a:off x="0" y="0"/>
+            <a:ext cx="12188952" cy="6858000"/>
+          </a:xfrm>
+          <a:prstGeom prst="rect">
+            <a:avLst/>
+          </a:prstGeom>
+          <a:ln>
+            <a:noFill/>
+          </a:ln>
+        </p:spPr>
+        <p:style>
+          <a:lnRef idx="2">
+            <a:schemeClr val="accent1">
+              <a:shade val="50000"/>
+            </a:schemeClr>
+          </a:lnRef>
+          <a:fillRef idx="1">
+            <a:schemeClr val="accent1"/>
+          </a:fillRef>
+          <a:effectRef idx="0">
+            <a:schemeClr val="accent1"/>
+          </a:effectRef>
+          <a:fontRef idx="minor">
+            <a:schemeClr val="lt1"/>
+          </a:fontRef>
+        </p:style>
+        <p:txBody>
+          <a:bodyPr rtlCol="0" anchor="ctr"/>
+          <a:lstStyle/>
+          <a:p>
+            <a:pPr algn="ctr"/>
+            <a:endParaRPr lang="en-US"/>
+          </a:p>
+        </p:txBody>
+      </p:sp>
+      <p:sp>
+        <p:nvSpPr>
+          <p:cNvPr id="10" name="Freeform: Shape 9">
+            <a:extLst>
+              <a:ext uri="{FF2B5EF4-FFF2-40B4-BE49-F238E27FC236}">
+                <a16:creationId xmlns:a16="http://schemas.microsoft.com/office/drawing/2014/main" id="{FBD77573-9EF2-4C35-8285-A1CF6FBB0EA5}"/>
+              </a:ext>
+              <a:ext uri="{C183D7F6-B498-43B3-948B-1728B52AA6E4}">
+                <adec:decorative xmlns:adec="http://schemas.microsoft.com/office/drawing/2017/decorative" val="1"/>
+              </a:ext>
+            </a:extLst>
+          </p:cNvPr>
+          <p:cNvSpPr>
+            <a:spLocks noGrp="1" noRot="1" noChangeAspect="1" noMove="1" noResize="1" noEditPoints="1" noAdjustHandles="1" noChangeArrowheads="1" noChangeShapeType="1" noTextEdit="1"/>
+          </p:cNvSpPr>
+          <p:nvPr>
+            <p:extLst>
+              <p:ext uri="{386F3935-93C4-4BCD-93E2-E3B085C9AB24}">
+                <p16:designElem xmlns:p16="http://schemas.microsoft.com/office/powerpoint/2015/main" val="1"/>
+              </p:ext>
+            </p:extLst>
+          </p:nvPr>
+        </p:nvSpPr>
+        <p:spPr>
+          <a:xfrm flipH="1">
+            <a:off x="1" y="0"/>
+            <a:ext cx="5511704" cy="6858000"/>
+          </a:xfrm>
+          <a:custGeom>
+            <a:avLst/>
+            <a:gdLst>
+              <a:gd name="connsiteX0" fmla="*/ 5511704 w 5511704"/>
+              <a:gd name="connsiteY0" fmla="*/ 0 h 6886576"/>
+              <a:gd name="connsiteX1" fmla="*/ 1008599 w 5511704"/>
+              <a:gd name="connsiteY1" fmla="*/ 0 h 6886576"/>
+              <a:gd name="connsiteX2" fmla="*/ 1310975 w 5511704"/>
+              <a:gd name="connsiteY2" fmla="*/ 110728 h 6886576"/>
+              <a:gd name="connsiteX3" fmla="*/ 1267362 w 5511704"/>
+              <a:gd name="connsiteY3" fmla="*/ 135731 h 6886576"/>
+              <a:gd name="connsiteX4" fmla="*/ 1005692 w 5511704"/>
+              <a:gd name="connsiteY4" fmla="*/ 71437 h 6886576"/>
+              <a:gd name="connsiteX5" fmla="*/ 953358 w 5511704"/>
+              <a:gd name="connsiteY5" fmla="*/ 89297 h 6886576"/>
+              <a:gd name="connsiteX6" fmla="*/ 979525 w 5511704"/>
+              <a:gd name="connsiteY6" fmla="*/ 164307 h 6886576"/>
+              <a:gd name="connsiteX7" fmla="*/ 1092915 w 5511704"/>
+              <a:gd name="connsiteY7" fmla="*/ 192882 h 6886576"/>
+              <a:gd name="connsiteX8" fmla="*/ 1270270 w 5511704"/>
+              <a:gd name="connsiteY8" fmla="*/ 375047 h 6886576"/>
+              <a:gd name="connsiteX9" fmla="*/ 1002784 w 5511704"/>
+              <a:gd name="connsiteY9" fmla="*/ 353615 h 6886576"/>
+              <a:gd name="connsiteX10" fmla="*/ 956265 w 5511704"/>
+              <a:gd name="connsiteY10" fmla="*/ 396479 h 6886576"/>
+              <a:gd name="connsiteX11" fmla="*/ 938820 w 5511704"/>
+              <a:gd name="connsiteY11" fmla="*/ 453629 h 6886576"/>
+              <a:gd name="connsiteX12" fmla="*/ 860319 w 5511704"/>
+              <a:gd name="connsiteY12" fmla="*/ 360759 h 6886576"/>
+              <a:gd name="connsiteX13" fmla="*/ 793447 w 5511704"/>
+              <a:gd name="connsiteY13" fmla="*/ 335757 h 6886576"/>
+              <a:gd name="connsiteX14" fmla="*/ 773095 w 5511704"/>
+              <a:gd name="connsiteY14" fmla="*/ 417910 h 6886576"/>
+              <a:gd name="connsiteX15" fmla="*/ 834151 w 5511704"/>
+              <a:gd name="connsiteY15" fmla="*/ 507206 h 6886576"/>
+              <a:gd name="connsiteX16" fmla="*/ 996969 w 5511704"/>
+              <a:gd name="connsiteY16" fmla="*/ 560785 h 6886576"/>
+              <a:gd name="connsiteX17" fmla="*/ 822522 w 5511704"/>
+              <a:gd name="connsiteY17" fmla="*/ 560785 h 6886576"/>
+              <a:gd name="connsiteX18" fmla="*/ 621908 w 5511704"/>
+              <a:gd name="connsiteY18" fmla="*/ 525066 h 6886576"/>
+              <a:gd name="connsiteX19" fmla="*/ 409664 w 5511704"/>
+              <a:gd name="connsiteY19" fmla="*/ 535781 h 6886576"/>
+              <a:gd name="connsiteX20" fmla="*/ 209049 w 5511704"/>
+              <a:gd name="connsiteY20" fmla="*/ 464344 h 6886576"/>
+              <a:gd name="connsiteX21" fmla="*/ 5527 w 5511704"/>
+              <a:gd name="connsiteY21" fmla="*/ 467916 h 6886576"/>
+              <a:gd name="connsiteX22" fmla="*/ 906838 w 5511704"/>
+              <a:gd name="connsiteY22" fmla="*/ 914400 h 6886576"/>
+              <a:gd name="connsiteX23" fmla="*/ 863226 w 5511704"/>
+              <a:gd name="connsiteY23" fmla="*/ 925116 h 6886576"/>
+              <a:gd name="connsiteX24" fmla="*/ 805077 w 5511704"/>
+              <a:gd name="connsiteY24" fmla="*/ 953691 h 6886576"/>
+              <a:gd name="connsiteX25" fmla="*/ 848689 w 5511704"/>
+              <a:gd name="connsiteY25" fmla="*/ 1010841 h 6886576"/>
+              <a:gd name="connsiteX26" fmla="*/ 1084193 w 5511704"/>
+              <a:gd name="connsiteY26" fmla="*/ 1117997 h 6886576"/>
+              <a:gd name="connsiteX27" fmla="*/ 1142342 w 5511704"/>
+              <a:gd name="connsiteY27" fmla="*/ 1225153 h 6886576"/>
+              <a:gd name="connsiteX28" fmla="*/ 1069655 w 5511704"/>
+              <a:gd name="connsiteY28" fmla="*/ 1214438 h 6886576"/>
+              <a:gd name="connsiteX29" fmla="*/ 1005692 w 5511704"/>
+              <a:gd name="connsiteY29" fmla="*/ 1235869 h 6886576"/>
+              <a:gd name="connsiteX30" fmla="*/ 1031858 w 5511704"/>
+              <a:gd name="connsiteY30" fmla="*/ 1371600 h 6886576"/>
+              <a:gd name="connsiteX31" fmla="*/ 1366216 w 5511704"/>
+              <a:gd name="connsiteY31" fmla="*/ 1546622 h 6886576"/>
+              <a:gd name="connsiteX32" fmla="*/ 1395290 w 5511704"/>
+              <a:gd name="connsiteY32" fmla="*/ 1603772 h 6886576"/>
+              <a:gd name="connsiteX33" fmla="*/ 1354586 w 5511704"/>
+              <a:gd name="connsiteY33" fmla="*/ 1643063 h 6886576"/>
+              <a:gd name="connsiteX34" fmla="*/ 1247011 w 5511704"/>
+              <a:gd name="connsiteY34" fmla="*/ 1664494 h 6886576"/>
+              <a:gd name="connsiteX35" fmla="*/ 1398198 w 5511704"/>
+              <a:gd name="connsiteY35" fmla="*/ 1857375 h 6886576"/>
+              <a:gd name="connsiteX36" fmla="*/ 1453440 w 5511704"/>
+              <a:gd name="connsiteY36" fmla="*/ 1910954 h 6886576"/>
+              <a:gd name="connsiteX37" fmla="*/ 1549386 w 5511704"/>
+              <a:gd name="connsiteY37" fmla="*/ 1993106 h 6886576"/>
+              <a:gd name="connsiteX38" fmla="*/ 1549386 w 5511704"/>
+              <a:gd name="connsiteY38" fmla="*/ 2021681 h 6886576"/>
+              <a:gd name="connsiteX39" fmla="*/ 1421458 w 5511704"/>
+              <a:gd name="connsiteY39" fmla="*/ 2110978 h 6886576"/>
+              <a:gd name="connsiteX40" fmla="*/ 1188861 w 5511704"/>
+              <a:gd name="connsiteY40" fmla="*/ 2085976 h 6886576"/>
+              <a:gd name="connsiteX41" fmla="*/ 1531941 w 5511704"/>
+              <a:gd name="connsiteY41" fmla="*/ 2218135 h 6886576"/>
+              <a:gd name="connsiteX42" fmla="*/ 421293 w 5511704"/>
+              <a:gd name="connsiteY42" fmla="*/ 1900238 h 6886576"/>
+              <a:gd name="connsiteX43" fmla="*/ 491072 w 5511704"/>
+              <a:gd name="connsiteY43" fmla="*/ 1982391 h 6886576"/>
+              <a:gd name="connsiteX44" fmla="*/ 880671 w 5511704"/>
+              <a:gd name="connsiteY44" fmla="*/ 2200276 h 6886576"/>
+              <a:gd name="connsiteX45" fmla="*/ 991154 w 5511704"/>
+              <a:gd name="connsiteY45" fmla="*/ 2336007 h 6886576"/>
+              <a:gd name="connsiteX46" fmla="*/ 1107453 w 5511704"/>
+              <a:gd name="connsiteY46" fmla="*/ 2411016 h 6886576"/>
+              <a:gd name="connsiteX47" fmla="*/ 1270270 w 5511704"/>
+              <a:gd name="connsiteY47" fmla="*/ 2411016 h 6886576"/>
+              <a:gd name="connsiteX48" fmla="*/ 1386568 w 5511704"/>
+              <a:gd name="connsiteY48" fmla="*/ 2528889 h 6886576"/>
+              <a:gd name="connsiteX49" fmla="*/ 1267362 w 5511704"/>
+              <a:gd name="connsiteY49" fmla="*/ 2553891 h 6886576"/>
+              <a:gd name="connsiteX50" fmla="*/ 1127805 w 5511704"/>
+              <a:gd name="connsiteY50" fmla="*/ 2536032 h 6886576"/>
+              <a:gd name="connsiteX51" fmla="*/ 970802 w 5511704"/>
+              <a:gd name="connsiteY51" fmla="*/ 2575322 h 6886576"/>
+              <a:gd name="connsiteX52" fmla="*/ 825429 w 5511704"/>
+              <a:gd name="connsiteY52" fmla="*/ 2543176 h 6886576"/>
+              <a:gd name="connsiteX53" fmla="*/ 650982 w 5511704"/>
+              <a:gd name="connsiteY53" fmla="*/ 2564607 h 6886576"/>
+              <a:gd name="connsiteX54" fmla="*/ 595740 w 5511704"/>
+              <a:gd name="connsiteY54" fmla="*/ 2703909 h 6886576"/>
+              <a:gd name="connsiteX55" fmla="*/ 578296 w 5511704"/>
+              <a:gd name="connsiteY55" fmla="*/ 2714626 h 6886576"/>
+              <a:gd name="connsiteX56" fmla="*/ 255568 w 5511704"/>
+              <a:gd name="connsiteY56" fmla="*/ 2936081 h 6886576"/>
+              <a:gd name="connsiteX57" fmla="*/ 165437 w 5511704"/>
+              <a:gd name="connsiteY57" fmla="*/ 2953941 h 6886576"/>
+              <a:gd name="connsiteX58" fmla="*/ 697501 w 5511704"/>
+              <a:gd name="connsiteY58" fmla="*/ 3343275 h 6886576"/>
+              <a:gd name="connsiteX59" fmla="*/ 339884 w 5511704"/>
+              <a:gd name="connsiteY59" fmla="*/ 3243263 h 6886576"/>
+              <a:gd name="connsiteX60" fmla="*/ 290458 w 5511704"/>
+              <a:gd name="connsiteY60" fmla="*/ 3407569 h 6886576"/>
+              <a:gd name="connsiteX61" fmla="*/ 459090 w 5511704"/>
+              <a:gd name="connsiteY61" fmla="*/ 3554016 h 6886576"/>
+              <a:gd name="connsiteX62" fmla="*/ 520147 w 5511704"/>
+              <a:gd name="connsiteY62" fmla="*/ 3843338 h 6886576"/>
+              <a:gd name="connsiteX63" fmla="*/ 491072 w 5511704"/>
+              <a:gd name="connsiteY63" fmla="*/ 4107657 h 6886576"/>
+              <a:gd name="connsiteX64" fmla="*/ 418386 w 5511704"/>
+              <a:gd name="connsiteY64" fmla="*/ 4189810 h 6886576"/>
+              <a:gd name="connsiteX65" fmla="*/ 313718 w 5511704"/>
+              <a:gd name="connsiteY65" fmla="*/ 4339829 h 6886576"/>
+              <a:gd name="connsiteX66" fmla="*/ 249753 w 5511704"/>
+              <a:gd name="connsiteY66" fmla="*/ 4432698 h 6886576"/>
+              <a:gd name="connsiteX67" fmla="*/ 25879 w 5511704"/>
+              <a:gd name="connsiteY67" fmla="*/ 4396979 h 6886576"/>
+              <a:gd name="connsiteX68" fmla="*/ 325347 w 5511704"/>
+              <a:gd name="connsiteY68" fmla="*/ 4632722 h 6886576"/>
+              <a:gd name="connsiteX69" fmla="*/ 84029 w 5511704"/>
+              <a:gd name="connsiteY69" fmla="*/ 4604147 h 6886576"/>
+              <a:gd name="connsiteX70" fmla="*/ 5527 w 5511704"/>
+              <a:gd name="connsiteY70" fmla="*/ 4622007 h 6886576"/>
+              <a:gd name="connsiteX71" fmla="*/ 49139 w 5511704"/>
+              <a:gd name="connsiteY71" fmla="*/ 4697016 h 6886576"/>
+              <a:gd name="connsiteX72" fmla="*/ 226494 w 5511704"/>
+              <a:gd name="connsiteY72" fmla="*/ 4825604 h 6886576"/>
+              <a:gd name="connsiteX73" fmla="*/ 592833 w 5511704"/>
+              <a:gd name="connsiteY73" fmla="*/ 5175647 h 6886576"/>
+              <a:gd name="connsiteX74" fmla="*/ 238123 w 5511704"/>
+              <a:gd name="connsiteY74" fmla="*/ 5014913 h 6886576"/>
+              <a:gd name="connsiteX75" fmla="*/ 610278 w 5511704"/>
+              <a:gd name="connsiteY75" fmla="*/ 5375673 h 6886576"/>
+              <a:gd name="connsiteX76" fmla="*/ 691686 w 5511704"/>
+              <a:gd name="connsiteY76" fmla="*/ 5497116 h 6886576"/>
+              <a:gd name="connsiteX77" fmla="*/ 860319 w 5511704"/>
+              <a:gd name="connsiteY77" fmla="*/ 5793582 h 6886576"/>
+              <a:gd name="connsiteX78" fmla="*/ 851597 w 5511704"/>
+              <a:gd name="connsiteY78" fmla="*/ 5825729 h 6886576"/>
+              <a:gd name="connsiteX79" fmla="*/ 659704 w 5511704"/>
+              <a:gd name="connsiteY79" fmla="*/ 5779295 h 6886576"/>
+              <a:gd name="connsiteX80" fmla="*/ 909746 w 5511704"/>
+              <a:gd name="connsiteY80" fmla="*/ 6029326 h 6886576"/>
+              <a:gd name="connsiteX81" fmla="*/ 1168509 w 5511704"/>
+              <a:gd name="connsiteY81" fmla="*/ 6222207 h 6886576"/>
+              <a:gd name="connsiteX82" fmla="*/ 985339 w 5511704"/>
+              <a:gd name="connsiteY82" fmla="*/ 6193632 h 6886576"/>
+              <a:gd name="connsiteX83" fmla="*/ 732391 w 5511704"/>
+              <a:gd name="connsiteY83" fmla="*/ 6082904 h 6886576"/>
+              <a:gd name="connsiteX84" fmla="*/ 645167 w 5511704"/>
+              <a:gd name="connsiteY84" fmla="*/ 6125766 h 6886576"/>
+              <a:gd name="connsiteX85" fmla="*/ 883579 w 5511704"/>
+              <a:gd name="connsiteY85" fmla="*/ 6307932 h 6886576"/>
+              <a:gd name="connsiteX86" fmla="*/ 1020229 w 5511704"/>
+              <a:gd name="connsiteY86" fmla="*/ 6393657 h 6886576"/>
+              <a:gd name="connsiteX87" fmla="*/ 1075471 w 5511704"/>
+              <a:gd name="connsiteY87" fmla="*/ 6457950 h 6886576"/>
+              <a:gd name="connsiteX88" fmla="*/ 1232473 w 5511704"/>
+              <a:gd name="connsiteY88" fmla="*/ 6686551 h 6886576"/>
+              <a:gd name="connsiteX89" fmla="*/ 1592997 w 5511704"/>
+              <a:gd name="connsiteY89" fmla="*/ 6886576 h 6886576"/>
+              <a:gd name="connsiteX90" fmla="*/ 5511704 w 5511704"/>
+              <a:gd name="connsiteY90" fmla="*/ 6886576 h 6886576"/>
+            </a:gdLst>
+            <a:ahLst/>
+            <a:cxnLst>
+              <a:cxn ang="0">
+                <a:pos x="connsiteX0" y="connsiteY0"/>
+              </a:cxn>
+              <a:cxn ang="0">
+                <a:pos x="connsiteX1" y="connsiteY1"/>
+              </a:cxn>
+              <a:cxn ang="0">
+                <a:pos x="connsiteX2" y="connsiteY2"/>
+              </a:cxn>
+              <a:cxn ang="0">
+                <a:pos x="connsiteX3" y="connsiteY3"/>
+              </a:cxn>
+              <a:cxn ang="0">
+                <a:pos x="connsiteX4" y="connsiteY4"/>
+              </a:cxn>
+              <a:cxn ang="0">
+                <a:pos x="connsiteX5" y="connsiteY5"/>
+              </a:cxn>
+              <a:cxn ang="0">
+                <a:pos x="connsiteX6" y="connsiteY6"/>
+              </a:cxn>
+              <a:cxn ang="0">
+                <a:pos x="connsiteX7" y="connsiteY7"/>
+              </a:cxn>
+              <a:cxn ang="0">
+                <a:pos x="connsiteX8" y="connsiteY8"/>
+              </a:cxn>
+              <a:cxn ang="0">
+                <a:pos x="connsiteX9" y="connsiteY9"/>
+              </a:cxn>
+              <a:cxn ang="0">
+                <a:pos x="connsiteX10" y="connsiteY10"/>
+              </a:cxn>
+              <a:cxn ang="0">
+                <a:pos x="connsiteX11" y="connsiteY11"/>
+              </a:cxn>
+              <a:cxn ang="0">
+                <a:pos x="connsiteX12" y="connsiteY12"/>
+              </a:cxn>
+              <a:cxn ang="0">
+                <a:pos x="connsiteX13" y="connsiteY13"/>
+              </a:cxn>
+              <a:cxn ang="0">
+                <a:pos x="connsiteX14" y="connsiteY14"/>
+              </a:cxn>
+              <a:cxn ang="0">
+                <a:pos x="connsiteX15" y="connsiteY15"/>
+              </a:cxn>
+              <a:cxn ang="0">
+                <a:pos x="connsiteX16" y="connsiteY16"/>
+              </a:cxn>
+              <a:cxn ang="0">
+                <a:pos x="connsiteX17" y="connsiteY17"/>
+              </a:cxn>
+              <a:cxn ang="0">
+                <a:pos x="connsiteX18" y="connsiteY18"/>
+              </a:cxn>
+              <a:cxn ang="0">
+                <a:pos x="connsiteX19" y="connsiteY19"/>
+              </a:cxn>
+              <a:cxn ang="0">
+                <a:pos x="connsiteX20" y="connsiteY20"/>
+              </a:cxn>
+              <a:cxn ang="0">
+                <a:pos x="connsiteX21" y="connsiteY21"/>
+              </a:cxn>
+              <a:cxn ang="0">
+                <a:pos x="connsiteX22" y="connsiteY22"/>
+              </a:cxn>
+              <a:cxn ang="0">
+                <a:pos x="connsiteX23" y="connsiteY23"/>
+              </a:cxn>
+              <a:cxn ang="0">
+                <a:pos x="connsiteX24" y="connsiteY24"/>
+              </a:cxn>
+              <a:cxn ang="0">
+                <a:pos x="connsiteX25" y="connsiteY25"/>
+              </a:cxn>
+              <a:cxn ang="0">
+                <a:pos x="connsiteX26" y="connsiteY26"/>
+              </a:cxn>
+              <a:cxn ang="0">
+                <a:pos x="connsiteX27" y="connsiteY27"/>
+              </a:cxn>
+              <a:cxn ang="0">
+                <a:pos x="connsiteX28" y="connsiteY28"/>
+              </a:cxn>
+              <a:cxn ang="0">
+                <a:pos x="connsiteX29" y="connsiteY29"/>
+              </a:cxn>
+              <a:cxn ang="0">
+                <a:pos x="connsiteX30" y="connsiteY30"/>
+              </a:cxn>
+              <a:cxn ang="0">
+                <a:pos x="connsiteX31" y="connsiteY31"/>
+              </a:cxn>
+              <a:cxn ang="0">
+                <a:pos x="connsiteX32" y="connsiteY32"/>
+              </a:cxn>
+              <a:cxn ang="0">
+                <a:pos x="connsiteX33" y="connsiteY33"/>
+              </a:cxn>
+              <a:cxn ang="0">
+                <a:pos x="connsiteX34" y="connsiteY34"/>
+              </a:cxn>
+              <a:cxn ang="0">
+                <a:pos x="connsiteX35" y="connsiteY35"/>
+              </a:cxn>
+              <a:cxn ang="0">
+                <a:pos x="connsiteX36" y="connsiteY36"/>
+              </a:cxn>
+              <a:cxn ang="0">
+                <a:pos x="connsiteX37" y="connsiteY37"/>
+              </a:cxn>
+              <a:cxn ang="0">
+                <a:pos x="connsiteX38" y="connsiteY38"/>
+              </a:cxn>
+              <a:cxn ang="0">
+                <a:pos x="connsiteX39" y="connsiteY39"/>
+              </a:cxn>
+              <a:cxn ang="0">
+                <a:pos x="connsiteX40" y="connsiteY40"/>
+              </a:cxn>
+              <a:cxn ang="0">
+                <a:pos x="connsiteX41" y="connsiteY41"/>
+              </a:cxn>
+              <a:cxn ang="0">
+                <a:pos x="connsiteX42" y="connsiteY42"/>
+              </a:cxn>
+              <a:cxn ang="0">
+                <a:pos x="connsiteX43" y="connsiteY43"/>
+              </a:cxn>
+              <a:cxn ang="0">
+                <a:pos x="connsiteX44" y="connsiteY44"/>
+              </a:cxn>
+              <a:cxn ang="0">
+                <a:pos x="connsiteX45" y="connsiteY45"/>
+              </a:cxn>
+              <a:cxn ang="0">
+                <a:pos x="connsiteX46" y="connsiteY46"/>
+              </a:cxn>
+              <a:cxn ang="0">
+                <a:pos x="connsiteX47" y="connsiteY47"/>
+              </a:cxn>
+              <a:cxn ang="0">
+                <a:pos x="connsiteX48" y="connsiteY48"/>
+              </a:cxn>
+              <a:cxn ang="0">
+                <a:pos x="connsiteX49" y="connsiteY49"/>
+              </a:cxn>
+              <a:cxn ang="0">
+                <a:pos x="connsiteX50" y="connsiteY50"/>
+              </a:cxn>
+              <a:cxn ang="0">
+                <a:pos x="connsiteX51" y="connsiteY51"/>
+              </a:cxn>
+              <a:cxn ang="0">
+                <a:pos x="connsiteX52" y="connsiteY52"/>
+              </a:cxn>
+              <a:cxn ang="0">
+                <a:pos x="connsiteX53" y="connsiteY53"/>
+              </a:cxn>
+              <a:cxn ang="0">
+                <a:pos x="connsiteX54" y="connsiteY54"/>
+              </a:cxn>
+              <a:cxn ang="0">
+                <a:pos x="connsiteX55" y="connsiteY55"/>
+              </a:cxn>
+              <a:cxn ang="0">
+                <a:pos x="connsiteX56" y="connsiteY56"/>
+              </a:cxn>
+              <a:cxn ang="0">
+                <a:pos x="connsiteX57" y="connsiteY57"/>
+              </a:cxn>
+              <a:cxn ang="0">
+                <a:pos x="connsiteX58" y="connsiteY58"/>
+              </a:cxn>
+              <a:cxn ang="0">
+                <a:pos x="connsiteX59" y="connsiteY59"/>
+              </a:cxn>
+              <a:cxn ang="0">
+                <a:pos x="connsiteX60" y="connsiteY60"/>
+              </a:cxn>
+              <a:cxn ang="0">
+                <a:pos x="connsiteX61" y="connsiteY61"/>
+              </a:cxn>
+              <a:cxn ang="0">
+                <a:pos x="connsiteX62" y="connsiteY62"/>
+              </a:cxn>
+              <a:cxn ang="0">
+                <a:pos x="connsiteX63" y="connsiteY63"/>
+              </a:cxn>
+              <a:cxn ang="0">
+                <a:pos x="connsiteX64" y="connsiteY64"/>
+              </a:cxn>
+              <a:cxn ang="0">
+                <a:pos x="connsiteX65" y="connsiteY65"/>
+              </a:cxn>
+              <a:cxn ang="0">
+                <a:pos x="connsiteX66" y="connsiteY66"/>
+              </a:cxn>
+              <a:cxn ang="0">
+                <a:pos x="connsiteX67" y="connsiteY67"/>
+              </a:cxn>
+              <a:cxn ang="0">
+                <a:pos x="connsiteX68" y="connsiteY68"/>
+              </a:cxn>
+              <a:cxn ang="0">
+                <a:pos x="connsiteX69" y="connsiteY69"/>
+              </a:cxn>
+              <a:cxn ang="0">
+                <a:pos x="connsiteX70" y="connsiteY70"/>
+              </a:cxn>
+              <a:cxn ang="0">
+                <a:pos x="connsiteX71" y="connsiteY71"/>
+              </a:cxn>
+              <a:cxn ang="0">
+                <a:pos x="connsiteX72" y="connsiteY72"/>
+              </a:cxn>
+              <a:cxn ang="0">
+                <a:pos x="connsiteX73" y="connsiteY73"/>
+              </a:cxn>
+              <a:cxn ang="0">
+                <a:pos x="connsiteX74" y="connsiteY74"/>
+              </a:cxn>
+              <a:cxn ang="0">
+                <a:pos x="connsiteX75" y="connsiteY75"/>
+              </a:cxn>
+              <a:cxn ang="0">
+                <a:pos x="connsiteX76" y="connsiteY76"/>
+              </a:cxn>
+              <a:cxn ang="0">
+                <a:pos x="connsiteX77" y="connsiteY77"/>
+              </a:cxn>
+              <a:cxn ang="0">
+                <a:pos x="connsiteX78" y="connsiteY78"/>
+              </a:cxn>
+              <a:cxn ang="0">
+                <a:pos x="connsiteX79" y="connsiteY79"/>
+              </a:cxn>
+              <a:cxn ang="0">
+                <a:pos x="connsiteX80" y="connsiteY80"/>
+              </a:cxn>
+              <a:cxn ang="0">
+                <a:pos x="connsiteX81" y="connsiteY81"/>
+              </a:cxn>
+              <a:cxn ang="0">
+                <a:pos x="connsiteX82" y="connsiteY82"/>
+              </a:cxn>
+              <a:cxn ang="0">
+                <a:pos x="connsiteX83" y="connsiteY83"/>
+              </a:cxn>
+              <a:cxn ang="0">
+                <a:pos x="connsiteX84" y="connsiteY84"/>
+              </a:cxn>
+              <a:cxn ang="0">
+                <a:pos x="connsiteX85" y="connsiteY85"/>
+              </a:cxn>
+              <a:cxn ang="0">
+                <a:pos x="connsiteX86" y="connsiteY86"/>
+              </a:cxn>
+              <a:cxn ang="0">
+                <a:pos x="connsiteX87" y="connsiteY87"/>
+              </a:cxn>
+              <a:cxn ang="0">
+                <a:pos x="connsiteX88" y="connsiteY88"/>
+              </a:cxn>
+              <a:cxn ang="0">
+                <a:pos x="connsiteX89" y="connsiteY89"/>
+              </a:cxn>
+              <a:cxn ang="0">
+                <a:pos x="connsiteX90" y="connsiteY90"/>
+              </a:cxn>
+            </a:cxnLst>
+            <a:rect l="l" t="t" r="r" b="b"/>
+            <a:pathLst>
+              <a:path w="5511704" h="6886576">
+                <a:moveTo>
+                  <a:pt x="5511704" y="0"/>
+                </a:moveTo>
+                <a:lnTo>
+                  <a:pt x="1008599" y="0"/>
+                </a:lnTo>
+                <a:cubicBezTo>
+                  <a:pt x="1110360" y="35719"/>
+                  <a:pt x="1209214" y="78581"/>
+                  <a:pt x="1310975" y="110728"/>
+                </a:cubicBezTo>
+                <a:cubicBezTo>
+                  <a:pt x="1296437" y="146447"/>
+                  <a:pt x="1281900" y="139303"/>
+                  <a:pt x="1267362" y="135731"/>
+                </a:cubicBezTo>
+                <a:cubicBezTo>
+                  <a:pt x="1180139" y="121445"/>
+                  <a:pt x="1090008" y="110728"/>
+                  <a:pt x="1005692" y="71437"/>
+                </a:cubicBezTo>
+                <a:cubicBezTo>
+                  <a:pt x="985339" y="64294"/>
+                  <a:pt x="962080" y="64294"/>
+                  <a:pt x="953358" y="89297"/>
+                </a:cubicBezTo>
+                <a:cubicBezTo>
+                  <a:pt x="938820" y="125016"/>
+                  <a:pt x="959172" y="146447"/>
+                  <a:pt x="979525" y="164307"/>
+                </a:cubicBezTo>
+                <a:cubicBezTo>
+                  <a:pt x="1014414" y="196453"/>
+                  <a:pt x="1055118" y="189310"/>
+                  <a:pt x="1092915" y="192882"/>
+                </a:cubicBezTo>
+                <a:cubicBezTo>
+                  <a:pt x="1197583" y="210741"/>
+                  <a:pt x="1247011" y="260747"/>
+                  <a:pt x="1270270" y="375047"/>
+                </a:cubicBezTo>
+                <a:cubicBezTo>
+                  <a:pt x="1180139" y="328613"/>
+                  <a:pt x="1090008" y="385763"/>
+                  <a:pt x="1002784" y="353615"/>
+                </a:cubicBezTo>
+                <a:cubicBezTo>
+                  <a:pt x="979525" y="346472"/>
+                  <a:pt x="944635" y="357188"/>
+                  <a:pt x="956265" y="396479"/>
+                </a:cubicBezTo>
+                <a:cubicBezTo>
+                  <a:pt x="967894" y="432198"/>
+                  <a:pt x="1005692" y="460772"/>
+                  <a:pt x="938820" y="453629"/>
+                </a:cubicBezTo>
+                <a:cubicBezTo>
+                  <a:pt x="889393" y="450056"/>
+                  <a:pt x="874856" y="407194"/>
+                  <a:pt x="860319" y="360759"/>
+                </a:cubicBezTo>
+                <a:cubicBezTo>
+                  <a:pt x="848689" y="335757"/>
+                  <a:pt x="816707" y="321469"/>
+                  <a:pt x="793447" y="335757"/>
+                </a:cubicBezTo>
+                <a:cubicBezTo>
+                  <a:pt x="764373" y="350044"/>
+                  <a:pt x="773095" y="389335"/>
+                  <a:pt x="773095" y="417910"/>
+                </a:cubicBezTo>
+                <a:cubicBezTo>
+                  <a:pt x="770187" y="471488"/>
+                  <a:pt x="793447" y="496491"/>
+                  <a:pt x="834151" y="507206"/>
+                </a:cubicBezTo>
+                <a:cubicBezTo>
+                  <a:pt x="883579" y="521494"/>
+                  <a:pt x="933005" y="539354"/>
+                  <a:pt x="996969" y="560785"/>
+                </a:cubicBezTo>
+                <a:cubicBezTo>
+                  <a:pt x="927190" y="596503"/>
+                  <a:pt x="874856" y="589360"/>
+                  <a:pt x="822522" y="560785"/>
+                </a:cubicBezTo>
+                <a:cubicBezTo>
+                  <a:pt x="758558" y="528637"/>
+                  <a:pt x="674242" y="485775"/>
+                  <a:pt x="621908" y="525066"/>
+                </a:cubicBezTo>
+                <a:cubicBezTo>
+                  <a:pt x="543407" y="582216"/>
+                  <a:pt x="479443" y="546497"/>
+                  <a:pt x="409664" y="535781"/>
+                </a:cubicBezTo>
+                <a:cubicBezTo>
+                  <a:pt x="264290" y="514350"/>
+                  <a:pt x="354422" y="482204"/>
+                  <a:pt x="209049" y="464344"/>
+                </a:cubicBezTo>
+                <a:cubicBezTo>
+                  <a:pt x="150900" y="457200"/>
+                  <a:pt x="89843" y="428625"/>
+                  <a:pt x="5527" y="467916"/>
+                </a:cubicBezTo>
+                <a:cubicBezTo>
+                  <a:pt x="386404" y="675085"/>
+                  <a:pt x="566666" y="660797"/>
+                  <a:pt x="906838" y="914400"/>
+                </a:cubicBezTo>
+                <a:cubicBezTo>
+                  <a:pt x="892301" y="939404"/>
+                  <a:pt x="877764" y="928688"/>
+                  <a:pt x="863226" y="925116"/>
+                </a:cubicBezTo>
+                <a:cubicBezTo>
+                  <a:pt x="839967" y="921544"/>
+                  <a:pt x="810892" y="907256"/>
+                  <a:pt x="805077" y="953691"/>
+                </a:cubicBezTo>
+                <a:cubicBezTo>
+                  <a:pt x="802169" y="989410"/>
+                  <a:pt x="819615" y="1007269"/>
+                  <a:pt x="848689" y="1010841"/>
+                </a:cubicBezTo>
+                <a:cubicBezTo>
+                  <a:pt x="933005" y="1025129"/>
+                  <a:pt x="1008599" y="1075135"/>
+                  <a:pt x="1084193" y="1117997"/>
+                </a:cubicBezTo>
+                <a:cubicBezTo>
+                  <a:pt x="1119082" y="1135857"/>
+                  <a:pt x="1156879" y="1160860"/>
+                  <a:pt x="1142342" y="1225153"/>
+                </a:cubicBezTo>
+                <a:cubicBezTo>
+                  <a:pt x="1113268" y="1243013"/>
+                  <a:pt x="1092915" y="1218009"/>
+                  <a:pt x="1069655" y="1214438"/>
+                </a:cubicBezTo>
+                <a:cubicBezTo>
+                  <a:pt x="1046396" y="1210866"/>
+                  <a:pt x="991154" y="1225153"/>
+                  <a:pt x="1005692" y="1235869"/>
+                </a:cubicBezTo>
+                <a:cubicBezTo>
+                  <a:pt x="1072563" y="1275159"/>
+                  <a:pt x="950450" y="1371600"/>
+                  <a:pt x="1031858" y="1371600"/>
+                </a:cubicBezTo>
+                <a:cubicBezTo>
+                  <a:pt x="1165601" y="1371600"/>
+                  <a:pt x="1238288" y="1543050"/>
+                  <a:pt x="1366216" y="1546622"/>
+                </a:cubicBezTo>
+                <a:cubicBezTo>
+                  <a:pt x="1386568" y="1546622"/>
+                  <a:pt x="1395290" y="1578770"/>
+                  <a:pt x="1395290" y="1603772"/>
+                </a:cubicBezTo>
+                <a:cubicBezTo>
+                  <a:pt x="1395290" y="1635920"/>
+                  <a:pt x="1374939" y="1639491"/>
+                  <a:pt x="1354586" y="1643063"/>
+                </a:cubicBezTo>
+                <a:cubicBezTo>
+                  <a:pt x="1322604" y="1646635"/>
+                  <a:pt x="1287715" y="1603772"/>
+                  <a:pt x="1247011" y="1664494"/>
+                </a:cubicBezTo>
+                <a:cubicBezTo>
+                  <a:pt x="1322604" y="1700213"/>
+                  <a:pt x="1401105" y="1735932"/>
+                  <a:pt x="1398198" y="1857375"/>
+                </a:cubicBezTo>
+                <a:cubicBezTo>
+                  <a:pt x="1398198" y="1889523"/>
+                  <a:pt x="1430180" y="1903810"/>
+                  <a:pt x="1453440" y="1910954"/>
+                </a:cubicBezTo>
+                <a:cubicBezTo>
+                  <a:pt x="1494144" y="1925241"/>
+                  <a:pt x="1526126" y="1946673"/>
+                  <a:pt x="1549386" y="1993106"/>
+                </a:cubicBezTo>
+                <a:cubicBezTo>
+                  <a:pt x="1549386" y="2003822"/>
+                  <a:pt x="1549386" y="2010966"/>
+                  <a:pt x="1549386" y="2021681"/>
+                </a:cubicBezTo>
+                <a:cubicBezTo>
+                  <a:pt x="1543571" y="2132410"/>
+                  <a:pt x="1485422" y="2128838"/>
+                  <a:pt x="1421458" y="2110978"/>
+                </a:cubicBezTo>
+                <a:cubicBezTo>
+                  <a:pt x="1345864" y="2089547"/>
+                  <a:pt x="1270270" y="2046685"/>
+                  <a:pt x="1188861" y="2085976"/>
+                </a:cubicBezTo>
+                <a:cubicBezTo>
+                  <a:pt x="1302252" y="2139554"/>
+                  <a:pt x="1427272" y="2143126"/>
+                  <a:pt x="1531941" y="2218135"/>
+                </a:cubicBezTo>
+                <a:cubicBezTo>
+                  <a:pt x="1142342" y="2232422"/>
+                  <a:pt x="799262" y="1993106"/>
+                  <a:pt x="421293" y="1900238"/>
+                </a:cubicBezTo>
+                <a:cubicBezTo>
+                  <a:pt x="432923" y="1960960"/>
+                  <a:pt x="464905" y="1975247"/>
+                  <a:pt x="491072" y="1982391"/>
+                </a:cubicBezTo>
+                <a:cubicBezTo>
+                  <a:pt x="630630" y="2028825"/>
+                  <a:pt x="752743" y="2121695"/>
+                  <a:pt x="880671" y="2200276"/>
+                </a:cubicBezTo>
+                <a:cubicBezTo>
+                  <a:pt x="933005" y="2232422"/>
+                  <a:pt x="970802" y="2268142"/>
+                  <a:pt x="991154" y="2336007"/>
+                </a:cubicBezTo>
+                <a:cubicBezTo>
+                  <a:pt x="1008599" y="2400300"/>
+                  <a:pt x="1043489" y="2428875"/>
+                  <a:pt x="1107453" y="2411016"/>
+                </a:cubicBezTo>
+                <a:cubicBezTo>
+                  <a:pt x="1159787" y="2396729"/>
+                  <a:pt x="1215029" y="2403873"/>
+                  <a:pt x="1270270" y="2411016"/>
+                </a:cubicBezTo>
+                <a:cubicBezTo>
+                  <a:pt x="1331326" y="2418160"/>
+                  <a:pt x="1401105" y="2489597"/>
+                  <a:pt x="1386568" y="2528889"/>
+                </a:cubicBezTo>
+                <a:cubicBezTo>
+                  <a:pt x="1357494" y="2593182"/>
+                  <a:pt x="1308067" y="2561035"/>
+                  <a:pt x="1267362" y="2553891"/>
+                </a:cubicBezTo>
+                <a:cubicBezTo>
+                  <a:pt x="1217936" y="2546748"/>
+                  <a:pt x="1127805" y="2528889"/>
+                  <a:pt x="1127805" y="2536032"/>
+                </a:cubicBezTo>
+                <a:cubicBezTo>
+                  <a:pt x="1095822" y="2696766"/>
+                  <a:pt x="1023136" y="2575322"/>
+                  <a:pt x="970802" y="2575322"/>
+                </a:cubicBezTo>
+                <a:cubicBezTo>
+                  <a:pt x="921375" y="2575322"/>
+                  <a:pt x="871949" y="2557463"/>
+                  <a:pt x="825429" y="2543176"/>
+                </a:cubicBezTo>
+                <a:cubicBezTo>
+                  <a:pt x="764373" y="2525316"/>
+                  <a:pt x="709132" y="2557463"/>
+                  <a:pt x="650982" y="2564607"/>
+                </a:cubicBezTo>
+                <a:cubicBezTo>
+                  <a:pt x="598648" y="2571751"/>
+                  <a:pt x="627722" y="2664620"/>
+                  <a:pt x="595740" y="2703909"/>
+                </a:cubicBezTo>
+                <a:cubicBezTo>
+                  <a:pt x="589926" y="2714626"/>
+                  <a:pt x="584111" y="2714626"/>
+                  <a:pt x="578296" y="2714626"/>
+                </a:cubicBezTo>
+                <a:cubicBezTo>
+                  <a:pt x="560851" y="2993232"/>
+                  <a:pt x="255568" y="2925366"/>
+                  <a:pt x="255568" y="2936081"/>
+                </a:cubicBezTo>
+                <a:cubicBezTo>
+                  <a:pt x="229401" y="2953941"/>
+                  <a:pt x="197419" y="2911079"/>
+                  <a:pt x="165437" y="2953941"/>
+                </a:cubicBezTo>
+                <a:cubicBezTo>
+                  <a:pt x="302087" y="3150394"/>
+                  <a:pt x="511425" y="3196828"/>
+                  <a:pt x="697501" y="3343275"/>
+                </a:cubicBezTo>
+                <a:cubicBezTo>
+                  <a:pt x="543407" y="3393282"/>
+                  <a:pt x="453275" y="3221832"/>
+                  <a:pt x="339884" y="3243263"/>
+                </a:cubicBezTo>
+                <a:cubicBezTo>
+                  <a:pt x="284643" y="3296842"/>
+                  <a:pt x="450368" y="3382566"/>
+                  <a:pt x="290458" y="3407569"/>
+                </a:cubicBezTo>
+                <a:cubicBezTo>
+                  <a:pt x="360236" y="3454004"/>
+                  <a:pt x="409664" y="3500439"/>
+                  <a:pt x="459090" y="3554016"/>
+                </a:cubicBezTo>
+                <a:cubicBezTo>
+                  <a:pt x="543407" y="3650457"/>
+                  <a:pt x="560851" y="3714751"/>
+                  <a:pt x="520147" y="3843338"/>
+                </a:cubicBezTo>
+                <a:cubicBezTo>
+                  <a:pt x="493979" y="3929063"/>
+                  <a:pt x="456183" y="4007645"/>
+                  <a:pt x="491072" y="4107657"/>
+                </a:cubicBezTo>
+                <a:cubicBezTo>
+                  <a:pt x="514332" y="4175522"/>
+                  <a:pt x="505609" y="4221957"/>
+                  <a:pt x="418386" y="4189810"/>
+                </a:cubicBezTo>
+                <a:cubicBezTo>
+                  <a:pt x="325347" y="4157663"/>
+                  <a:pt x="290458" y="4218386"/>
+                  <a:pt x="313718" y="4339829"/>
+                </a:cubicBezTo>
+                <a:cubicBezTo>
+                  <a:pt x="328254" y="4418410"/>
+                  <a:pt x="313718" y="4443413"/>
+                  <a:pt x="249753" y="4432698"/>
+                </a:cubicBezTo>
+                <a:cubicBezTo>
+                  <a:pt x="179975" y="4421982"/>
+                  <a:pt x="113103" y="4371976"/>
+                  <a:pt x="25879" y="4396979"/>
+                </a:cubicBezTo>
+                <a:cubicBezTo>
+                  <a:pt x="95658" y="4539854"/>
+                  <a:pt x="243939" y="4496991"/>
+                  <a:pt x="325347" y="4632722"/>
+                </a:cubicBezTo>
+                <a:cubicBezTo>
+                  <a:pt x="229401" y="4632722"/>
+                  <a:pt x="153807" y="4632722"/>
+                  <a:pt x="84029" y="4604147"/>
+                </a:cubicBezTo>
+                <a:cubicBezTo>
+                  <a:pt x="54954" y="4593433"/>
+                  <a:pt x="22972" y="4579145"/>
+                  <a:pt x="5527" y="4622007"/>
+                </a:cubicBezTo>
+                <a:cubicBezTo>
+                  <a:pt x="-14826" y="4672014"/>
+                  <a:pt x="25879" y="4689872"/>
+                  <a:pt x="49139" y="4697016"/>
+                </a:cubicBezTo>
+                <a:cubicBezTo>
+                  <a:pt x="116011" y="4722019"/>
+                  <a:pt x="168344" y="4779170"/>
+                  <a:pt x="226494" y="4825604"/>
+                </a:cubicBezTo>
+                <a:cubicBezTo>
+                  <a:pt x="351514" y="4925616"/>
+                  <a:pt x="488165" y="5011341"/>
+                  <a:pt x="592833" y="5175647"/>
+                </a:cubicBezTo>
+                <a:cubicBezTo>
+                  <a:pt x="461997" y="5132785"/>
+                  <a:pt x="363144" y="5032772"/>
+                  <a:pt x="238123" y="5014913"/>
+                </a:cubicBezTo>
+                <a:cubicBezTo>
+                  <a:pt x="345700" y="5164932"/>
+                  <a:pt x="482350" y="5264944"/>
+                  <a:pt x="610278" y="5375673"/>
+                </a:cubicBezTo>
+                <a:cubicBezTo>
+                  <a:pt x="648075" y="5407819"/>
+                  <a:pt x="685872" y="5429250"/>
+                  <a:pt x="691686" y="5497116"/>
+                </a:cubicBezTo>
+                <a:cubicBezTo>
+                  <a:pt x="709132" y="5629276"/>
+                  <a:pt x="755650" y="5736432"/>
+                  <a:pt x="860319" y="5793582"/>
+                </a:cubicBezTo>
+                <a:cubicBezTo>
+                  <a:pt x="860319" y="5793582"/>
+                  <a:pt x="854504" y="5815013"/>
+                  <a:pt x="851597" y="5825729"/>
+                </a:cubicBezTo>
+                <a:cubicBezTo>
+                  <a:pt x="787632" y="5829301"/>
+                  <a:pt x="738206" y="5750720"/>
+                  <a:pt x="659704" y="5779295"/>
+                </a:cubicBezTo>
+                <a:cubicBezTo>
+                  <a:pt x="738206" y="5886451"/>
+                  <a:pt x="802169" y="5979319"/>
+                  <a:pt x="909746" y="6029326"/>
+                </a:cubicBezTo>
+                <a:cubicBezTo>
+                  <a:pt x="996969" y="6068616"/>
+                  <a:pt x="1104545" y="6093620"/>
+                  <a:pt x="1168509" y="6222207"/>
+                </a:cubicBezTo>
+                <a:cubicBezTo>
+                  <a:pt x="1095822" y="6247210"/>
+                  <a:pt x="1040581" y="6215063"/>
+                  <a:pt x="985339" y="6193632"/>
+                </a:cubicBezTo>
+                <a:cubicBezTo>
+                  <a:pt x="901023" y="6157913"/>
+                  <a:pt x="816707" y="6118623"/>
+                  <a:pt x="732391" y="6082904"/>
+                </a:cubicBezTo>
+                <a:cubicBezTo>
+                  <a:pt x="700408" y="6068616"/>
+                  <a:pt x="665519" y="6061472"/>
+                  <a:pt x="645167" y="6125766"/>
+                </a:cubicBezTo>
+                <a:cubicBezTo>
+                  <a:pt x="752743" y="6140053"/>
+                  <a:pt x="816707" y="6225779"/>
+                  <a:pt x="883579" y="6307932"/>
+                </a:cubicBezTo>
+                <a:cubicBezTo>
+                  <a:pt x="921375" y="6354366"/>
+                  <a:pt x="953358" y="6415088"/>
+                  <a:pt x="1020229" y="6393657"/>
+                </a:cubicBezTo>
+                <a:cubicBezTo>
+                  <a:pt x="1055118" y="6382942"/>
+                  <a:pt x="1078378" y="6415088"/>
+                  <a:pt x="1075471" y="6457950"/>
+                </a:cubicBezTo>
+                <a:cubicBezTo>
+                  <a:pt x="1060933" y="6607970"/>
+                  <a:pt x="1145250" y="6657976"/>
+                  <a:pt x="1232473" y="6686551"/>
+                </a:cubicBezTo>
+                <a:cubicBezTo>
+                  <a:pt x="1360401" y="6729413"/>
+                  <a:pt x="1473792" y="6815138"/>
+                  <a:pt x="1592997" y="6886576"/>
+                </a:cubicBezTo>
+                <a:lnTo>
+                  <a:pt x="5511704" y="6886576"/>
+                </a:lnTo>
+                <a:close/>
+              </a:path>
+            </a:pathLst>
+          </a:custGeom>
+          <a:solidFill>
+            <a:schemeClr val="bg2">
+              <a:alpha val="50000"/>
+            </a:schemeClr>
+          </a:solidFill>
+          <a:ln w="32707" cap="flat">
+            <a:noFill/>
+            <a:prstDash val="solid"/>
+            <a:miter/>
+          </a:ln>
+        </p:spPr>
+        <p:txBody>
+          <a:bodyPr rtlCol="0" anchor="ctr"/>
+          <a:lstStyle/>
+          <a:p>
+            <a:endParaRPr lang="en-US" dirty="0"/>
+          </a:p>
+        </p:txBody>
+      </p:sp>
+      <p:sp>
+        <p:nvSpPr>
+          <p:cNvPr id="2" name="Title 1">
+            <a:extLst>
+              <a:ext uri="{FF2B5EF4-FFF2-40B4-BE49-F238E27FC236}">
+                <a16:creationId xmlns:a16="http://schemas.microsoft.com/office/drawing/2014/main" id="{F103A08C-47EF-7176-A34D-485EBC8743D9}"/>
+              </a:ext>
+            </a:extLst>
+          </p:cNvPr>
+          <p:cNvSpPr>
+            <a:spLocks noGrp="1"/>
+          </p:cNvSpPr>
+          <p:nvPr>
+            <p:ph type="title"/>
+          </p:nvPr>
+        </p:nvSpPr>
+        <p:spPr>
+          <a:xfrm>
+            <a:off x="838200" y="713312"/>
+            <a:ext cx="4038600" cy="5431376"/>
+          </a:xfrm>
+        </p:spPr>
+        <p:txBody>
+          <a:bodyPr>
+            <a:normAutofit/>
+          </a:bodyPr>
+          <a:lstStyle/>
+          <a:p>
+            <a:r>
+              <a:rPr lang="en-US" dirty="0"/>
+              <a:t>History</a:t>
+            </a:r>
+          </a:p>
+        </p:txBody>
+      </p:sp>
+      <p:sp>
+        <p:nvSpPr>
+          <p:cNvPr id="3" name="Content Placeholder 2">
+            <a:extLst>
+              <a:ext uri="{FF2B5EF4-FFF2-40B4-BE49-F238E27FC236}">
+                <a16:creationId xmlns:a16="http://schemas.microsoft.com/office/drawing/2014/main" id="{97E6B52A-024B-64C7-482E-FA365D905B04}"/>
+              </a:ext>
+            </a:extLst>
+          </p:cNvPr>
+          <p:cNvSpPr>
+            <a:spLocks noGrp="1"/>
+          </p:cNvSpPr>
+          <p:nvPr>
+            <p:ph idx="1"/>
+          </p:nvPr>
+        </p:nvSpPr>
+        <p:spPr>
+          <a:xfrm>
+            <a:off x="6095999" y="713313"/>
+            <a:ext cx="5257801" cy="5431376"/>
+          </a:xfrm>
+        </p:spPr>
+        <p:txBody>
+          <a:bodyPr anchor="ctr">
+            <a:normAutofit/>
+          </a:bodyPr>
+          <a:lstStyle/>
+          <a:p>
+            <a:r>
+              <a:rPr lang="en-US" sz="2000"/>
+              <a:t>Computer based communication technologies, email, bulletin board systems (1960s)</a:t>
+            </a:r>
+          </a:p>
+          <a:p>
+            <a:endParaRPr lang="en-US" sz="2000"/>
+          </a:p>
+          <a:p>
+            <a:r>
+              <a:rPr lang="en-US" sz="2000"/>
+              <a:t>Six Degrees launched a site with users and profiles with friends (1997)</a:t>
+            </a:r>
+          </a:p>
+          <a:p>
+            <a:endParaRPr lang="en-US" sz="2000"/>
+          </a:p>
+          <a:p>
+            <a:r>
+              <a:rPr lang="en-US" sz="2000"/>
+              <a:t>MySpace (2003) Facebook (2004)</a:t>
+            </a:r>
+          </a:p>
+        </p:txBody>
+      </p:sp>
+    </p:spTree>
+    <p:extLst>
+      <p:ext uri="{BB962C8B-B14F-4D97-AF65-F5344CB8AC3E}">
+        <p14:creationId xmlns:p14="http://schemas.microsoft.com/office/powerpoint/2010/main" val="2745756700"/>
+      </p:ext>
+    </p:extLst>
+  </p:cSld>
+  <p:clrMapOvr>
+    <a:masterClrMapping/>
+  </p:clrMapOvr>
+</p:sld>
+</file>
+
+<file path=ppt/slides/slide6.xml><?xml version="1.0" encoding="utf-8"?>
+<p:sld xmlns:a="http://schemas.openxmlformats.org/drawingml/2006/main" xmlns:r="http://schemas.openxmlformats.org/officeDocument/2006/relationships" xmlns:p="http://schemas.openxmlformats.org/presentationml/2006/main">
+  <p:cSld>
+    <p:bg>
+      <p:bgPr>
+        <a:solidFill>
+          <a:schemeClr val="bg1"/>
+        </a:solidFill>
+        <a:effectLst/>
+      </p:bgPr>
+    </p:bg>
+    <p:spTree>
+      <p:nvGrpSpPr>
+        <p:cNvPr id="1" name=""/>
+        <p:cNvGrpSpPr/>
+        <p:nvPr/>
+      </p:nvGrpSpPr>
+      <p:grpSpPr>
+        <a:xfrm>
+          <a:off x="0" y="0"/>
+          <a:ext cx="0" cy="0"/>
+          <a:chOff x="0" y="0"/>
+          <a:chExt cx="0" cy="0"/>
+        </a:xfrm>
+      </p:grpSpPr>
+      <p:sp useBgFill="1">
+        <p:nvSpPr>
+          <p:cNvPr id="8" name="Rectangle 7">
+            <a:extLst>
+              <a:ext uri="{FF2B5EF4-FFF2-40B4-BE49-F238E27FC236}">
+                <a16:creationId xmlns:a16="http://schemas.microsoft.com/office/drawing/2014/main" id="{17718681-A12E-49D6-9925-DD7C68176D61}"/>
+              </a:ext>
+              <a:ext uri="{C183D7F6-B498-43B3-948B-1728B52AA6E4}">
+                <adec:decorative xmlns:adec="http://schemas.microsoft.com/office/drawing/2017/decorative" val="1"/>
+              </a:ext>
+            </a:extLst>
+          </p:cNvPr>
+          <p:cNvSpPr>
+            <a:spLocks noGrp="1" noRot="1" noChangeAspect="1" noMove="1" noResize="1" noEditPoints="1" noAdjustHandles="1" noChangeArrowheads="1" noChangeShapeType="1" noTextEdit="1"/>
+          </p:cNvSpPr>
+          <p:nvPr>
+            <p:extLst>
+              <p:ext uri="{386F3935-93C4-4BCD-93E2-E3B085C9AB24}">
+                <p16:designElem xmlns:p16="http://schemas.microsoft.com/office/powerpoint/2015/main" val="1"/>
+              </p:ext>
+            </p:extLst>
+          </p:nvPr>
+        </p:nvSpPr>
+        <p:spPr>
+          <a:xfrm>
+            <a:off x="0" y="0"/>
+            <a:ext cx="12188952" cy="6858000"/>
+          </a:xfrm>
+          <a:prstGeom prst="rect">
+            <a:avLst/>
+          </a:prstGeom>
+          <a:ln>
+            <a:noFill/>
+          </a:ln>
+        </p:spPr>
+        <p:style>
+          <a:lnRef idx="2">
+            <a:schemeClr val="accent1">
+              <a:shade val="50000"/>
+            </a:schemeClr>
+          </a:lnRef>
+          <a:fillRef idx="1">
+            <a:schemeClr val="accent1"/>
+          </a:fillRef>
+          <a:effectRef idx="0">
+            <a:schemeClr val="accent1"/>
+          </a:effectRef>
+          <a:fontRef idx="minor">
+            <a:schemeClr val="lt1"/>
+          </a:fontRef>
+        </p:style>
+        <p:txBody>
+          <a:bodyPr rtlCol="0" anchor="ctr"/>
+          <a:lstStyle/>
+          <a:p>
+            <a:pPr algn="ctr"/>
+            <a:endParaRPr lang="en-US"/>
+          </a:p>
+        </p:txBody>
+      </p:sp>
+      <p:sp>
+        <p:nvSpPr>
+          <p:cNvPr id="10" name="Freeform: Shape 9">
+            <a:extLst>
+              <a:ext uri="{FF2B5EF4-FFF2-40B4-BE49-F238E27FC236}">
+                <a16:creationId xmlns:a16="http://schemas.microsoft.com/office/drawing/2014/main" id="{FBD77573-9EF2-4C35-8285-A1CF6FBB0EA5}"/>
+              </a:ext>
+              <a:ext uri="{C183D7F6-B498-43B3-948B-1728B52AA6E4}">
+                <adec:decorative xmlns:adec="http://schemas.microsoft.com/office/drawing/2017/decorative" val="1"/>
+              </a:ext>
+            </a:extLst>
+          </p:cNvPr>
+          <p:cNvSpPr>
+            <a:spLocks noGrp="1" noRot="1" noChangeAspect="1" noMove="1" noResize="1" noEditPoints="1" noAdjustHandles="1" noChangeArrowheads="1" noChangeShapeType="1" noTextEdit="1"/>
+          </p:cNvSpPr>
+          <p:nvPr>
+            <p:extLst>
+              <p:ext uri="{386F3935-93C4-4BCD-93E2-E3B085C9AB24}">
+                <p16:designElem xmlns:p16="http://schemas.microsoft.com/office/powerpoint/2015/main" val="1"/>
+              </p:ext>
+            </p:extLst>
+          </p:nvPr>
+        </p:nvSpPr>
+        <p:spPr>
+          <a:xfrm flipH="1">
+            <a:off x="1" y="0"/>
+            <a:ext cx="5511704" cy="6858000"/>
+          </a:xfrm>
+          <a:custGeom>
+            <a:avLst/>
+            <a:gdLst>
+              <a:gd name="connsiteX0" fmla="*/ 5511704 w 5511704"/>
+              <a:gd name="connsiteY0" fmla="*/ 0 h 6886576"/>
+              <a:gd name="connsiteX1" fmla="*/ 1008599 w 5511704"/>
+              <a:gd name="connsiteY1" fmla="*/ 0 h 6886576"/>
+              <a:gd name="connsiteX2" fmla="*/ 1310975 w 5511704"/>
+              <a:gd name="connsiteY2" fmla="*/ 110728 h 6886576"/>
+              <a:gd name="connsiteX3" fmla="*/ 1267362 w 5511704"/>
+              <a:gd name="connsiteY3" fmla="*/ 135731 h 6886576"/>
+              <a:gd name="connsiteX4" fmla="*/ 1005692 w 5511704"/>
+              <a:gd name="connsiteY4" fmla="*/ 71437 h 6886576"/>
+              <a:gd name="connsiteX5" fmla="*/ 953358 w 5511704"/>
+              <a:gd name="connsiteY5" fmla="*/ 89297 h 6886576"/>
+              <a:gd name="connsiteX6" fmla="*/ 979525 w 5511704"/>
+              <a:gd name="connsiteY6" fmla="*/ 164307 h 6886576"/>
+              <a:gd name="connsiteX7" fmla="*/ 1092915 w 5511704"/>
+              <a:gd name="connsiteY7" fmla="*/ 192882 h 6886576"/>
+              <a:gd name="connsiteX8" fmla="*/ 1270270 w 5511704"/>
+              <a:gd name="connsiteY8" fmla="*/ 375047 h 6886576"/>
+              <a:gd name="connsiteX9" fmla="*/ 1002784 w 5511704"/>
+              <a:gd name="connsiteY9" fmla="*/ 353615 h 6886576"/>
+              <a:gd name="connsiteX10" fmla="*/ 956265 w 5511704"/>
+              <a:gd name="connsiteY10" fmla="*/ 396479 h 6886576"/>
+              <a:gd name="connsiteX11" fmla="*/ 938820 w 5511704"/>
+              <a:gd name="connsiteY11" fmla="*/ 453629 h 6886576"/>
+              <a:gd name="connsiteX12" fmla="*/ 860319 w 5511704"/>
+              <a:gd name="connsiteY12" fmla="*/ 360759 h 6886576"/>
+              <a:gd name="connsiteX13" fmla="*/ 793447 w 5511704"/>
+              <a:gd name="connsiteY13" fmla="*/ 335757 h 6886576"/>
+              <a:gd name="connsiteX14" fmla="*/ 773095 w 5511704"/>
+              <a:gd name="connsiteY14" fmla="*/ 417910 h 6886576"/>
+              <a:gd name="connsiteX15" fmla="*/ 834151 w 5511704"/>
+              <a:gd name="connsiteY15" fmla="*/ 507206 h 6886576"/>
+              <a:gd name="connsiteX16" fmla="*/ 996969 w 5511704"/>
+              <a:gd name="connsiteY16" fmla="*/ 560785 h 6886576"/>
+              <a:gd name="connsiteX17" fmla="*/ 822522 w 5511704"/>
+              <a:gd name="connsiteY17" fmla="*/ 560785 h 6886576"/>
+              <a:gd name="connsiteX18" fmla="*/ 621908 w 5511704"/>
+              <a:gd name="connsiteY18" fmla="*/ 525066 h 6886576"/>
+              <a:gd name="connsiteX19" fmla="*/ 409664 w 5511704"/>
+              <a:gd name="connsiteY19" fmla="*/ 535781 h 6886576"/>
+              <a:gd name="connsiteX20" fmla="*/ 209049 w 5511704"/>
+              <a:gd name="connsiteY20" fmla="*/ 464344 h 6886576"/>
+              <a:gd name="connsiteX21" fmla="*/ 5527 w 5511704"/>
+              <a:gd name="connsiteY21" fmla="*/ 467916 h 6886576"/>
+              <a:gd name="connsiteX22" fmla="*/ 906838 w 5511704"/>
+              <a:gd name="connsiteY22" fmla="*/ 914400 h 6886576"/>
+              <a:gd name="connsiteX23" fmla="*/ 863226 w 5511704"/>
+              <a:gd name="connsiteY23" fmla="*/ 925116 h 6886576"/>
+              <a:gd name="connsiteX24" fmla="*/ 805077 w 5511704"/>
+              <a:gd name="connsiteY24" fmla="*/ 953691 h 6886576"/>
+              <a:gd name="connsiteX25" fmla="*/ 848689 w 5511704"/>
+              <a:gd name="connsiteY25" fmla="*/ 1010841 h 6886576"/>
+              <a:gd name="connsiteX26" fmla="*/ 1084193 w 5511704"/>
+              <a:gd name="connsiteY26" fmla="*/ 1117997 h 6886576"/>
+              <a:gd name="connsiteX27" fmla="*/ 1142342 w 5511704"/>
+              <a:gd name="connsiteY27" fmla="*/ 1225153 h 6886576"/>
+              <a:gd name="connsiteX28" fmla="*/ 1069655 w 5511704"/>
+              <a:gd name="connsiteY28" fmla="*/ 1214438 h 6886576"/>
+              <a:gd name="connsiteX29" fmla="*/ 1005692 w 5511704"/>
+              <a:gd name="connsiteY29" fmla="*/ 1235869 h 6886576"/>
+              <a:gd name="connsiteX30" fmla="*/ 1031858 w 5511704"/>
+              <a:gd name="connsiteY30" fmla="*/ 1371600 h 6886576"/>
+              <a:gd name="connsiteX31" fmla="*/ 1366216 w 5511704"/>
+              <a:gd name="connsiteY31" fmla="*/ 1546622 h 6886576"/>
+              <a:gd name="connsiteX32" fmla="*/ 1395290 w 5511704"/>
+              <a:gd name="connsiteY32" fmla="*/ 1603772 h 6886576"/>
+              <a:gd name="connsiteX33" fmla="*/ 1354586 w 5511704"/>
+              <a:gd name="connsiteY33" fmla="*/ 1643063 h 6886576"/>
+              <a:gd name="connsiteX34" fmla="*/ 1247011 w 5511704"/>
+              <a:gd name="connsiteY34" fmla="*/ 1664494 h 6886576"/>
+              <a:gd name="connsiteX35" fmla="*/ 1398198 w 5511704"/>
+              <a:gd name="connsiteY35" fmla="*/ 1857375 h 6886576"/>
+              <a:gd name="connsiteX36" fmla="*/ 1453440 w 5511704"/>
+              <a:gd name="connsiteY36" fmla="*/ 1910954 h 6886576"/>
+              <a:gd name="connsiteX37" fmla="*/ 1549386 w 5511704"/>
+              <a:gd name="connsiteY37" fmla="*/ 1993106 h 6886576"/>
+              <a:gd name="connsiteX38" fmla="*/ 1549386 w 5511704"/>
+              <a:gd name="connsiteY38" fmla="*/ 2021681 h 6886576"/>
+              <a:gd name="connsiteX39" fmla="*/ 1421458 w 5511704"/>
+              <a:gd name="connsiteY39" fmla="*/ 2110978 h 6886576"/>
+              <a:gd name="connsiteX40" fmla="*/ 1188861 w 5511704"/>
+              <a:gd name="connsiteY40" fmla="*/ 2085976 h 6886576"/>
+              <a:gd name="connsiteX41" fmla="*/ 1531941 w 5511704"/>
+              <a:gd name="connsiteY41" fmla="*/ 2218135 h 6886576"/>
+              <a:gd name="connsiteX42" fmla="*/ 421293 w 5511704"/>
+              <a:gd name="connsiteY42" fmla="*/ 1900238 h 6886576"/>
+              <a:gd name="connsiteX43" fmla="*/ 491072 w 5511704"/>
+              <a:gd name="connsiteY43" fmla="*/ 1982391 h 6886576"/>
+              <a:gd name="connsiteX44" fmla="*/ 880671 w 5511704"/>
+              <a:gd name="connsiteY44" fmla="*/ 2200276 h 6886576"/>
+              <a:gd name="connsiteX45" fmla="*/ 991154 w 5511704"/>
+              <a:gd name="connsiteY45" fmla="*/ 2336007 h 6886576"/>
+              <a:gd name="connsiteX46" fmla="*/ 1107453 w 5511704"/>
+              <a:gd name="connsiteY46" fmla="*/ 2411016 h 6886576"/>
+              <a:gd name="connsiteX47" fmla="*/ 1270270 w 5511704"/>
+              <a:gd name="connsiteY47" fmla="*/ 2411016 h 6886576"/>
+              <a:gd name="connsiteX48" fmla="*/ 1386568 w 5511704"/>
+              <a:gd name="connsiteY48" fmla="*/ 2528889 h 6886576"/>
+              <a:gd name="connsiteX49" fmla="*/ 1267362 w 5511704"/>
+              <a:gd name="connsiteY49" fmla="*/ 2553891 h 6886576"/>
+              <a:gd name="connsiteX50" fmla="*/ 1127805 w 5511704"/>
+              <a:gd name="connsiteY50" fmla="*/ 2536032 h 6886576"/>
+              <a:gd name="connsiteX51" fmla="*/ 970802 w 5511704"/>
+              <a:gd name="connsiteY51" fmla="*/ 2575322 h 6886576"/>
+              <a:gd name="connsiteX52" fmla="*/ 825429 w 5511704"/>
+              <a:gd name="connsiteY52" fmla="*/ 2543176 h 6886576"/>
+              <a:gd name="connsiteX53" fmla="*/ 650982 w 5511704"/>
+              <a:gd name="connsiteY53" fmla="*/ 2564607 h 6886576"/>
+              <a:gd name="connsiteX54" fmla="*/ 595740 w 5511704"/>
+              <a:gd name="connsiteY54" fmla="*/ 2703909 h 6886576"/>
+              <a:gd name="connsiteX55" fmla="*/ 578296 w 5511704"/>
+              <a:gd name="connsiteY55" fmla="*/ 2714626 h 6886576"/>
+              <a:gd name="connsiteX56" fmla="*/ 255568 w 5511704"/>
+              <a:gd name="connsiteY56" fmla="*/ 2936081 h 6886576"/>
+              <a:gd name="connsiteX57" fmla="*/ 165437 w 5511704"/>
+              <a:gd name="connsiteY57" fmla="*/ 2953941 h 6886576"/>
+              <a:gd name="connsiteX58" fmla="*/ 697501 w 5511704"/>
+              <a:gd name="connsiteY58" fmla="*/ 3343275 h 6886576"/>
+              <a:gd name="connsiteX59" fmla="*/ 339884 w 5511704"/>
+              <a:gd name="connsiteY59" fmla="*/ 3243263 h 6886576"/>
+              <a:gd name="connsiteX60" fmla="*/ 290458 w 5511704"/>
+              <a:gd name="connsiteY60" fmla="*/ 3407569 h 6886576"/>
+              <a:gd name="connsiteX61" fmla="*/ 459090 w 5511704"/>
+              <a:gd name="connsiteY61" fmla="*/ 3554016 h 6886576"/>
+              <a:gd name="connsiteX62" fmla="*/ 520147 w 5511704"/>
+              <a:gd name="connsiteY62" fmla="*/ 3843338 h 6886576"/>
+              <a:gd name="connsiteX63" fmla="*/ 491072 w 5511704"/>
+              <a:gd name="connsiteY63" fmla="*/ 4107657 h 6886576"/>
+              <a:gd name="connsiteX64" fmla="*/ 418386 w 5511704"/>
+              <a:gd name="connsiteY64" fmla="*/ 4189810 h 6886576"/>
+              <a:gd name="connsiteX65" fmla="*/ 313718 w 5511704"/>
+              <a:gd name="connsiteY65" fmla="*/ 4339829 h 6886576"/>
+              <a:gd name="connsiteX66" fmla="*/ 249753 w 5511704"/>
+              <a:gd name="connsiteY66" fmla="*/ 4432698 h 6886576"/>
+              <a:gd name="connsiteX67" fmla="*/ 25879 w 5511704"/>
+              <a:gd name="connsiteY67" fmla="*/ 4396979 h 6886576"/>
+              <a:gd name="connsiteX68" fmla="*/ 325347 w 5511704"/>
+              <a:gd name="connsiteY68" fmla="*/ 4632722 h 6886576"/>
+              <a:gd name="connsiteX69" fmla="*/ 84029 w 5511704"/>
+              <a:gd name="connsiteY69" fmla="*/ 4604147 h 6886576"/>
+              <a:gd name="connsiteX70" fmla="*/ 5527 w 5511704"/>
+              <a:gd name="connsiteY70" fmla="*/ 4622007 h 6886576"/>
+              <a:gd name="connsiteX71" fmla="*/ 49139 w 5511704"/>
+              <a:gd name="connsiteY71" fmla="*/ 4697016 h 6886576"/>
+              <a:gd name="connsiteX72" fmla="*/ 226494 w 5511704"/>
+              <a:gd name="connsiteY72" fmla="*/ 4825604 h 6886576"/>
+              <a:gd name="connsiteX73" fmla="*/ 592833 w 5511704"/>
+              <a:gd name="connsiteY73" fmla="*/ 5175647 h 6886576"/>
+              <a:gd name="connsiteX74" fmla="*/ 238123 w 5511704"/>
+              <a:gd name="connsiteY74" fmla="*/ 5014913 h 6886576"/>
+              <a:gd name="connsiteX75" fmla="*/ 610278 w 5511704"/>
+              <a:gd name="connsiteY75" fmla="*/ 5375673 h 6886576"/>
+              <a:gd name="connsiteX76" fmla="*/ 691686 w 5511704"/>
+              <a:gd name="connsiteY76" fmla="*/ 5497116 h 6886576"/>
+              <a:gd name="connsiteX77" fmla="*/ 860319 w 5511704"/>
+              <a:gd name="connsiteY77" fmla="*/ 5793582 h 6886576"/>
+              <a:gd name="connsiteX78" fmla="*/ 851597 w 5511704"/>
+              <a:gd name="connsiteY78" fmla="*/ 5825729 h 6886576"/>
+              <a:gd name="connsiteX79" fmla="*/ 659704 w 5511704"/>
+              <a:gd name="connsiteY79" fmla="*/ 5779295 h 6886576"/>
+              <a:gd name="connsiteX80" fmla="*/ 909746 w 5511704"/>
+              <a:gd name="connsiteY80" fmla="*/ 6029326 h 6886576"/>
+              <a:gd name="connsiteX81" fmla="*/ 1168509 w 5511704"/>
+              <a:gd name="connsiteY81" fmla="*/ 6222207 h 6886576"/>
+              <a:gd name="connsiteX82" fmla="*/ 985339 w 5511704"/>
+              <a:gd name="connsiteY82" fmla="*/ 6193632 h 6886576"/>
+              <a:gd name="connsiteX83" fmla="*/ 732391 w 5511704"/>
+              <a:gd name="connsiteY83" fmla="*/ 6082904 h 6886576"/>
+              <a:gd name="connsiteX84" fmla="*/ 645167 w 5511704"/>
+              <a:gd name="connsiteY84" fmla="*/ 6125766 h 6886576"/>
+              <a:gd name="connsiteX85" fmla="*/ 883579 w 5511704"/>
+              <a:gd name="connsiteY85" fmla="*/ 6307932 h 6886576"/>
+              <a:gd name="connsiteX86" fmla="*/ 1020229 w 5511704"/>
+              <a:gd name="connsiteY86" fmla="*/ 6393657 h 6886576"/>
+              <a:gd name="connsiteX87" fmla="*/ 1075471 w 5511704"/>
+              <a:gd name="connsiteY87" fmla="*/ 6457950 h 6886576"/>
+              <a:gd name="connsiteX88" fmla="*/ 1232473 w 5511704"/>
+              <a:gd name="connsiteY88" fmla="*/ 6686551 h 6886576"/>
+              <a:gd name="connsiteX89" fmla="*/ 1592997 w 5511704"/>
+              <a:gd name="connsiteY89" fmla="*/ 6886576 h 6886576"/>
+              <a:gd name="connsiteX90" fmla="*/ 5511704 w 5511704"/>
+              <a:gd name="connsiteY90" fmla="*/ 6886576 h 6886576"/>
+            </a:gdLst>
+            <a:ahLst/>
+            <a:cxnLst>
+              <a:cxn ang="0">
+                <a:pos x="connsiteX0" y="connsiteY0"/>
+              </a:cxn>
+              <a:cxn ang="0">
+                <a:pos x="connsiteX1" y="connsiteY1"/>
+              </a:cxn>
+              <a:cxn ang="0">
+                <a:pos x="connsiteX2" y="connsiteY2"/>
+              </a:cxn>
+              <a:cxn ang="0">
+                <a:pos x="connsiteX3" y="connsiteY3"/>
+              </a:cxn>
+              <a:cxn ang="0">
+                <a:pos x="connsiteX4" y="connsiteY4"/>
+              </a:cxn>
+              <a:cxn ang="0">
+                <a:pos x="connsiteX5" y="connsiteY5"/>
+              </a:cxn>
+              <a:cxn ang="0">
+                <a:pos x="connsiteX6" y="connsiteY6"/>
+              </a:cxn>
+              <a:cxn ang="0">
+                <a:pos x="connsiteX7" y="connsiteY7"/>
+              </a:cxn>
+              <a:cxn ang="0">
+                <a:pos x="connsiteX8" y="connsiteY8"/>
+              </a:cxn>
+              <a:cxn ang="0">
+                <a:pos x="connsiteX9" y="connsiteY9"/>
+              </a:cxn>
+              <a:cxn ang="0">
+                <a:pos x="connsiteX10" y="connsiteY10"/>
+              </a:cxn>
+              <a:cxn ang="0">
+                <a:pos x="connsiteX11" y="connsiteY11"/>
+              </a:cxn>
+              <a:cxn ang="0">
+                <a:pos x="connsiteX12" y="connsiteY12"/>
+              </a:cxn>
+              <a:cxn ang="0">
+                <a:pos x="connsiteX13" y="connsiteY13"/>
+              </a:cxn>
+              <a:cxn ang="0">
+                <a:pos x="connsiteX14" y="connsiteY14"/>
+              </a:cxn>
+              <a:cxn ang="0">
+                <a:pos x="connsiteX15" y="connsiteY15"/>
+              </a:cxn>
+              <a:cxn ang="0">
+                <a:pos x="connsiteX16" y="connsiteY16"/>
+              </a:cxn>
+              <a:cxn ang="0">
+                <a:pos x="connsiteX17" y="connsiteY17"/>
+              </a:cxn>
+              <a:cxn ang="0">
+                <a:pos x="connsiteX18" y="connsiteY18"/>
+              </a:cxn>
+              <a:cxn ang="0">
+                <a:pos x="connsiteX19" y="connsiteY19"/>
+              </a:cxn>
+              <a:cxn ang="0">
+                <a:pos x="connsiteX20" y="connsiteY20"/>
+              </a:cxn>
+              <a:cxn ang="0">
+                <a:pos x="connsiteX21" y="connsiteY21"/>
+              </a:cxn>
+              <a:cxn ang="0">
+                <a:pos x="connsiteX22" y="connsiteY22"/>
+              </a:cxn>
+              <a:cxn ang="0">
+                <a:pos x="connsiteX23" y="connsiteY23"/>
+              </a:cxn>
+              <a:cxn ang="0">
+                <a:pos x="connsiteX24" y="connsiteY24"/>
+              </a:cxn>
+              <a:cxn ang="0">
+                <a:pos x="connsiteX25" y="connsiteY25"/>
+              </a:cxn>
+              <a:cxn ang="0">
+                <a:pos x="connsiteX26" y="connsiteY26"/>
+              </a:cxn>
+              <a:cxn ang="0">
+                <a:pos x="connsiteX27" y="connsiteY27"/>
+              </a:cxn>
+              <a:cxn ang="0">
+                <a:pos x="connsiteX28" y="connsiteY28"/>
+              </a:cxn>
+              <a:cxn ang="0">
+                <a:pos x="connsiteX29" y="connsiteY29"/>
+              </a:cxn>
+              <a:cxn ang="0">
+                <a:pos x="connsiteX30" y="connsiteY30"/>
+              </a:cxn>
+              <a:cxn ang="0">
+                <a:pos x="connsiteX31" y="connsiteY31"/>
+              </a:cxn>
+              <a:cxn ang="0">
+                <a:pos x="connsiteX32" y="connsiteY32"/>
+              </a:cxn>
+              <a:cxn ang="0">
+                <a:pos x="connsiteX33" y="connsiteY33"/>
+              </a:cxn>
+              <a:cxn ang="0">
+                <a:pos x="connsiteX34" y="connsiteY34"/>
+              </a:cxn>
+              <a:cxn ang="0">
+                <a:pos x="connsiteX35" y="connsiteY35"/>
+              </a:cxn>
+              <a:cxn ang="0">
+                <a:pos x="connsiteX36" y="connsiteY36"/>
+              </a:cxn>
+              <a:cxn ang="0">
+                <a:pos x="connsiteX37" y="connsiteY37"/>
+              </a:cxn>
+              <a:cxn ang="0">
+                <a:pos x="connsiteX38" y="connsiteY38"/>
+              </a:cxn>
+              <a:cxn ang="0">
+                <a:pos x="connsiteX39" y="connsiteY39"/>
+              </a:cxn>
+              <a:cxn ang="0">
+                <a:pos x="connsiteX40" y="connsiteY40"/>
+              </a:cxn>
+              <a:cxn ang="0">
+                <a:pos x="connsiteX41" y="connsiteY41"/>
+              </a:cxn>
+              <a:cxn ang="0">
+                <a:pos x="connsiteX42" y="connsiteY42"/>
+              </a:cxn>
+              <a:cxn ang="0">
+                <a:pos x="connsiteX43" y="connsiteY43"/>
+              </a:cxn>
+              <a:cxn ang="0">
+                <a:pos x="connsiteX44" y="connsiteY44"/>
+              </a:cxn>
+              <a:cxn ang="0">
+                <a:pos x="connsiteX45" y="connsiteY45"/>
+              </a:cxn>
+              <a:cxn ang="0">
+                <a:pos x="connsiteX46" y="connsiteY46"/>
+              </a:cxn>
+              <a:cxn ang="0">
+                <a:pos x="connsiteX47" y="connsiteY47"/>
+              </a:cxn>
+              <a:cxn ang="0">
+                <a:pos x="connsiteX48" y="connsiteY48"/>
+              </a:cxn>
+              <a:cxn ang="0">
+                <a:pos x="connsiteX49" y="connsiteY49"/>
+              </a:cxn>
+              <a:cxn ang="0">
+                <a:pos x="connsiteX50" y="connsiteY50"/>
+              </a:cxn>
+              <a:cxn ang="0">
+                <a:pos x="connsiteX51" y="connsiteY51"/>
+              </a:cxn>
+              <a:cxn ang="0">
+                <a:pos x="connsiteX52" y="connsiteY52"/>
+              </a:cxn>
+              <a:cxn ang="0">
+                <a:pos x="connsiteX53" y="connsiteY53"/>
+              </a:cxn>
+              <a:cxn ang="0">
+                <a:pos x="connsiteX54" y="connsiteY54"/>
+              </a:cxn>
+              <a:cxn ang="0">
+                <a:pos x="connsiteX55" y="connsiteY55"/>
+              </a:cxn>
+              <a:cxn ang="0">
+                <a:pos x="connsiteX56" y="connsiteY56"/>
+              </a:cxn>
+              <a:cxn ang="0">
+                <a:pos x="connsiteX57" y="connsiteY57"/>
+              </a:cxn>
+              <a:cxn ang="0">
+                <a:pos x="connsiteX58" y="connsiteY58"/>
+              </a:cxn>
+              <a:cxn ang="0">
+                <a:pos x="connsiteX59" y="connsiteY59"/>
+              </a:cxn>
+              <a:cxn ang="0">
+                <a:pos x="connsiteX60" y="connsiteY60"/>
+              </a:cxn>
+              <a:cxn ang="0">
+                <a:pos x="connsiteX61" y="connsiteY61"/>
+              </a:cxn>
+              <a:cxn ang="0">
+                <a:pos x="connsiteX62" y="connsiteY62"/>
+              </a:cxn>
+              <a:cxn ang="0">
+                <a:pos x="connsiteX63" y="connsiteY63"/>
+              </a:cxn>
+              <a:cxn ang="0">
+                <a:pos x="connsiteX64" y="connsiteY64"/>
+              </a:cxn>
+              <a:cxn ang="0">
+                <a:pos x="connsiteX65" y="connsiteY65"/>
+              </a:cxn>
+              <a:cxn ang="0">
+                <a:pos x="connsiteX66" y="connsiteY66"/>
+              </a:cxn>
+              <a:cxn ang="0">
+                <a:pos x="connsiteX67" y="connsiteY67"/>
+              </a:cxn>
+              <a:cxn ang="0">
+                <a:pos x="connsiteX68" y="connsiteY68"/>
+              </a:cxn>
+              <a:cxn ang="0">
+                <a:pos x="connsiteX69" y="connsiteY69"/>
+              </a:cxn>
+              <a:cxn ang="0">
+                <a:pos x="connsiteX70" y="connsiteY70"/>
+              </a:cxn>
+              <a:cxn ang="0">
+                <a:pos x="connsiteX71" y="connsiteY71"/>
+              </a:cxn>
+              <a:cxn ang="0">
+                <a:pos x="connsiteX72" y="connsiteY72"/>
+              </a:cxn>
+              <a:cxn ang="0">
+                <a:pos x="connsiteX73" y="connsiteY73"/>
+              </a:cxn>
+              <a:cxn ang="0">
+                <a:pos x="connsiteX74" y="connsiteY74"/>
+              </a:cxn>
+              <a:cxn ang="0">
+                <a:pos x="connsiteX75" y="connsiteY75"/>
+              </a:cxn>
+              <a:cxn ang="0">
+                <a:pos x="connsiteX76" y="connsiteY76"/>
+              </a:cxn>
+              <a:cxn ang="0">
+                <a:pos x="connsiteX77" y="connsiteY77"/>
+              </a:cxn>
+              <a:cxn ang="0">
+                <a:pos x="connsiteX78" y="connsiteY78"/>
+              </a:cxn>
+              <a:cxn ang="0">
+                <a:pos x="connsiteX79" y="connsiteY79"/>
+              </a:cxn>
+              <a:cxn ang="0">
+                <a:pos x="connsiteX80" y="connsiteY80"/>
+              </a:cxn>
+              <a:cxn ang="0">
+                <a:pos x="connsiteX81" y="connsiteY81"/>
+              </a:cxn>
+              <a:cxn ang="0">
+                <a:pos x="connsiteX82" y="connsiteY82"/>
+              </a:cxn>
+              <a:cxn ang="0">
+                <a:pos x="connsiteX83" y="connsiteY83"/>
+              </a:cxn>
+              <a:cxn ang="0">
+                <a:pos x="connsiteX84" y="connsiteY84"/>
+              </a:cxn>
+              <a:cxn ang="0">
+                <a:pos x="connsiteX85" y="connsiteY85"/>
+              </a:cxn>
+              <a:cxn ang="0">
+                <a:pos x="connsiteX86" y="connsiteY86"/>
+              </a:cxn>
+              <a:cxn ang="0">
+                <a:pos x="connsiteX87" y="connsiteY87"/>
+              </a:cxn>
+              <a:cxn ang="0">
+                <a:pos x="connsiteX88" y="connsiteY88"/>
+              </a:cxn>
+              <a:cxn ang="0">
+                <a:pos x="connsiteX89" y="connsiteY89"/>
+              </a:cxn>
+              <a:cxn ang="0">
+                <a:pos x="connsiteX90" y="connsiteY90"/>
+              </a:cxn>
+            </a:cxnLst>
+            <a:rect l="l" t="t" r="r" b="b"/>
+            <a:pathLst>
+              <a:path w="5511704" h="6886576">
+                <a:moveTo>
+                  <a:pt x="5511704" y="0"/>
+                </a:moveTo>
+                <a:lnTo>
+                  <a:pt x="1008599" y="0"/>
+                </a:lnTo>
+                <a:cubicBezTo>
+                  <a:pt x="1110360" y="35719"/>
+                  <a:pt x="1209214" y="78581"/>
+                  <a:pt x="1310975" y="110728"/>
+                </a:cubicBezTo>
+                <a:cubicBezTo>
+                  <a:pt x="1296437" y="146447"/>
+                  <a:pt x="1281900" y="139303"/>
+                  <a:pt x="1267362" y="135731"/>
+                </a:cubicBezTo>
+                <a:cubicBezTo>
+                  <a:pt x="1180139" y="121445"/>
+                  <a:pt x="1090008" y="110728"/>
+                  <a:pt x="1005692" y="71437"/>
+                </a:cubicBezTo>
+                <a:cubicBezTo>
+                  <a:pt x="985339" y="64294"/>
+                  <a:pt x="962080" y="64294"/>
+                  <a:pt x="953358" y="89297"/>
+                </a:cubicBezTo>
+                <a:cubicBezTo>
+                  <a:pt x="938820" y="125016"/>
+                  <a:pt x="959172" y="146447"/>
+                  <a:pt x="979525" y="164307"/>
+                </a:cubicBezTo>
+                <a:cubicBezTo>
+                  <a:pt x="1014414" y="196453"/>
+                  <a:pt x="1055118" y="189310"/>
+                  <a:pt x="1092915" y="192882"/>
+                </a:cubicBezTo>
+                <a:cubicBezTo>
+                  <a:pt x="1197583" y="210741"/>
+                  <a:pt x="1247011" y="260747"/>
+                  <a:pt x="1270270" y="375047"/>
+                </a:cubicBezTo>
+                <a:cubicBezTo>
+                  <a:pt x="1180139" y="328613"/>
+                  <a:pt x="1090008" y="385763"/>
+                  <a:pt x="1002784" y="353615"/>
+                </a:cubicBezTo>
+                <a:cubicBezTo>
+                  <a:pt x="979525" y="346472"/>
+                  <a:pt x="944635" y="357188"/>
+                  <a:pt x="956265" y="396479"/>
+                </a:cubicBezTo>
+                <a:cubicBezTo>
+                  <a:pt x="967894" y="432198"/>
+                  <a:pt x="1005692" y="460772"/>
+                  <a:pt x="938820" y="453629"/>
+                </a:cubicBezTo>
+                <a:cubicBezTo>
+                  <a:pt x="889393" y="450056"/>
+                  <a:pt x="874856" y="407194"/>
+                  <a:pt x="860319" y="360759"/>
+                </a:cubicBezTo>
+                <a:cubicBezTo>
+                  <a:pt x="848689" y="335757"/>
+                  <a:pt x="816707" y="321469"/>
+                  <a:pt x="793447" y="335757"/>
+                </a:cubicBezTo>
+                <a:cubicBezTo>
+                  <a:pt x="764373" y="350044"/>
+                  <a:pt x="773095" y="389335"/>
+                  <a:pt x="773095" y="417910"/>
+                </a:cubicBezTo>
+                <a:cubicBezTo>
+                  <a:pt x="770187" y="471488"/>
+                  <a:pt x="793447" y="496491"/>
+                  <a:pt x="834151" y="507206"/>
+                </a:cubicBezTo>
+                <a:cubicBezTo>
+                  <a:pt x="883579" y="521494"/>
+                  <a:pt x="933005" y="539354"/>
+                  <a:pt x="996969" y="560785"/>
+                </a:cubicBezTo>
+                <a:cubicBezTo>
+                  <a:pt x="927190" y="596503"/>
+                  <a:pt x="874856" y="589360"/>
+                  <a:pt x="822522" y="560785"/>
+                </a:cubicBezTo>
+                <a:cubicBezTo>
+                  <a:pt x="758558" y="528637"/>
+                  <a:pt x="674242" y="485775"/>
+                  <a:pt x="621908" y="525066"/>
+                </a:cubicBezTo>
+                <a:cubicBezTo>
+                  <a:pt x="543407" y="582216"/>
+                  <a:pt x="479443" y="546497"/>
+                  <a:pt x="409664" y="535781"/>
+                </a:cubicBezTo>
+                <a:cubicBezTo>
+                  <a:pt x="264290" y="514350"/>
+                  <a:pt x="354422" y="482204"/>
+                  <a:pt x="209049" y="464344"/>
+                </a:cubicBezTo>
+                <a:cubicBezTo>
+                  <a:pt x="150900" y="457200"/>
+                  <a:pt x="89843" y="428625"/>
+                  <a:pt x="5527" y="467916"/>
+                </a:cubicBezTo>
+                <a:cubicBezTo>
+                  <a:pt x="386404" y="675085"/>
+                  <a:pt x="566666" y="660797"/>
+                  <a:pt x="906838" y="914400"/>
+                </a:cubicBezTo>
+                <a:cubicBezTo>
+                  <a:pt x="892301" y="939404"/>
+                  <a:pt x="877764" y="928688"/>
+                  <a:pt x="863226" y="925116"/>
+                </a:cubicBezTo>
+                <a:cubicBezTo>
+                  <a:pt x="839967" y="921544"/>
+                  <a:pt x="810892" y="907256"/>
+                  <a:pt x="805077" y="953691"/>
+                </a:cubicBezTo>
+                <a:cubicBezTo>
+                  <a:pt x="802169" y="989410"/>
+                  <a:pt x="819615" y="1007269"/>
+                  <a:pt x="848689" y="1010841"/>
+                </a:cubicBezTo>
+                <a:cubicBezTo>
+                  <a:pt x="933005" y="1025129"/>
+                  <a:pt x="1008599" y="1075135"/>
+                  <a:pt x="1084193" y="1117997"/>
+                </a:cubicBezTo>
+                <a:cubicBezTo>
+                  <a:pt x="1119082" y="1135857"/>
+                  <a:pt x="1156879" y="1160860"/>
+                  <a:pt x="1142342" y="1225153"/>
+                </a:cubicBezTo>
+                <a:cubicBezTo>
+                  <a:pt x="1113268" y="1243013"/>
+                  <a:pt x="1092915" y="1218009"/>
+                  <a:pt x="1069655" y="1214438"/>
+                </a:cubicBezTo>
+                <a:cubicBezTo>
+                  <a:pt x="1046396" y="1210866"/>
+                  <a:pt x="991154" y="1225153"/>
+                  <a:pt x="1005692" y="1235869"/>
+                </a:cubicBezTo>
+                <a:cubicBezTo>
+                  <a:pt x="1072563" y="1275159"/>
+                  <a:pt x="950450" y="1371600"/>
+                  <a:pt x="1031858" y="1371600"/>
+                </a:cubicBezTo>
+                <a:cubicBezTo>
+                  <a:pt x="1165601" y="1371600"/>
+                  <a:pt x="1238288" y="1543050"/>
+                  <a:pt x="1366216" y="1546622"/>
+                </a:cubicBezTo>
+                <a:cubicBezTo>
+                  <a:pt x="1386568" y="1546622"/>
+                  <a:pt x="1395290" y="1578770"/>
+                  <a:pt x="1395290" y="1603772"/>
+                </a:cubicBezTo>
+                <a:cubicBezTo>
+                  <a:pt x="1395290" y="1635920"/>
+                  <a:pt x="1374939" y="1639491"/>
+                  <a:pt x="1354586" y="1643063"/>
+                </a:cubicBezTo>
+                <a:cubicBezTo>
+                  <a:pt x="1322604" y="1646635"/>
+                  <a:pt x="1287715" y="1603772"/>
+                  <a:pt x="1247011" y="1664494"/>
+                </a:cubicBezTo>
+                <a:cubicBezTo>
+                  <a:pt x="1322604" y="1700213"/>
+                  <a:pt x="1401105" y="1735932"/>
+                  <a:pt x="1398198" y="1857375"/>
+                </a:cubicBezTo>
+                <a:cubicBezTo>
+                  <a:pt x="1398198" y="1889523"/>
+                  <a:pt x="1430180" y="1903810"/>
+                  <a:pt x="1453440" y="1910954"/>
+                </a:cubicBezTo>
+                <a:cubicBezTo>
+                  <a:pt x="1494144" y="1925241"/>
+                  <a:pt x="1526126" y="1946673"/>
+                  <a:pt x="1549386" y="1993106"/>
+                </a:cubicBezTo>
+                <a:cubicBezTo>
+                  <a:pt x="1549386" y="2003822"/>
+                  <a:pt x="1549386" y="2010966"/>
+                  <a:pt x="1549386" y="2021681"/>
+                </a:cubicBezTo>
+                <a:cubicBezTo>
+                  <a:pt x="1543571" y="2132410"/>
+                  <a:pt x="1485422" y="2128838"/>
+                  <a:pt x="1421458" y="2110978"/>
+                </a:cubicBezTo>
+                <a:cubicBezTo>
+                  <a:pt x="1345864" y="2089547"/>
+                  <a:pt x="1270270" y="2046685"/>
+                  <a:pt x="1188861" y="2085976"/>
+                </a:cubicBezTo>
+                <a:cubicBezTo>
+                  <a:pt x="1302252" y="2139554"/>
+                  <a:pt x="1427272" y="2143126"/>
+                  <a:pt x="1531941" y="2218135"/>
+                </a:cubicBezTo>
+                <a:cubicBezTo>
+                  <a:pt x="1142342" y="2232422"/>
+                  <a:pt x="799262" y="1993106"/>
+                  <a:pt x="421293" y="1900238"/>
+                </a:cubicBezTo>
+                <a:cubicBezTo>
+                  <a:pt x="432923" y="1960960"/>
+                  <a:pt x="464905" y="1975247"/>
+                  <a:pt x="491072" y="1982391"/>
+                </a:cubicBezTo>
+                <a:cubicBezTo>
+                  <a:pt x="630630" y="2028825"/>
+                  <a:pt x="752743" y="2121695"/>
+                  <a:pt x="880671" y="2200276"/>
+                </a:cubicBezTo>
+                <a:cubicBezTo>
+                  <a:pt x="933005" y="2232422"/>
+                  <a:pt x="970802" y="2268142"/>
+                  <a:pt x="991154" y="2336007"/>
+                </a:cubicBezTo>
+                <a:cubicBezTo>
+                  <a:pt x="1008599" y="2400300"/>
+                  <a:pt x="1043489" y="2428875"/>
+                  <a:pt x="1107453" y="2411016"/>
+                </a:cubicBezTo>
+                <a:cubicBezTo>
+                  <a:pt x="1159787" y="2396729"/>
+                  <a:pt x="1215029" y="2403873"/>
+                  <a:pt x="1270270" y="2411016"/>
+                </a:cubicBezTo>
+                <a:cubicBezTo>
+                  <a:pt x="1331326" y="2418160"/>
+                  <a:pt x="1401105" y="2489597"/>
+                  <a:pt x="1386568" y="2528889"/>
+                </a:cubicBezTo>
+                <a:cubicBezTo>
+                  <a:pt x="1357494" y="2593182"/>
+                  <a:pt x="1308067" y="2561035"/>
+                  <a:pt x="1267362" y="2553891"/>
+                </a:cubicBezTo>
+                <a:cubicBezTo>
+                  <a:pt x="1217936" y="2546748"/>
+                  <a:pt x="1127805" y="2528889"/>
+                  <a:pt x="1127805" y="2536032"/>
+                </a:cubicBezTo>
+                <a:cubicBezTo>
+                  <a:pt x="1095822" y="2696766"/>
+                  <a:pt x="1023136" y="2575322"/>
+                  <a:pt x="970802" y="2575322"/>
+                </a:cubicBezTo>
+                <a:cubicBezTo>
+                  <a:pt x="921375" y="2575322"/>
+                  <a:pt x="871949" y="2557463"/>
+                  <a:pt x="825429" y="2543176"/>
+                </a:cubicBezTo>
+                <a:cubicBezTo>
+                  <a:pt x="764373" y="2525316"/>
+                  <a:pt x="709132" y="2557463"/>
+                  <a:pt x="650982" y="2564607"/>
+                </a:cubicBezTo>
+                <a:cubicBezTo>
+                  <a:pt x="598648" y="2571751"/>
+                  <a:pt x="627722" y="2664620"/>
+                  <a:pt x="595740" y="2703909"/>
+                </a:cubicBezTo>
+                <a:cubicBezTo>
+                  <a:pt x="589926" y="2714626"/>
+                  <a:pt x="584111" y="2714626"/>
+                  <a:pt x="578296" y="2714626"/>
+                </a:cubicBezTo>
+                <a:cubicBezTo>
+                  <a:pt x="560851" y="2993232"/>
+                  <a:pt x="255568" y="2925366"/>
+                  <a:pt x="255568" y="2936081"/>
+                </a:cubicBezTo>
+                <a:cubicBezTo>
+                  <a:pt x="229401" y="2953941"/>
+                  <a:pt x="197419" y="2911079"/>
+                  <a:pt x="165437" y="2953941"/>
+                </a:cubicBezTo>
+                <a:cubicBezTo>
+                  <a:pt x="302087" y="3150394"/>
+                  <a:pt x="511425" y="3196828"/>
+                  <a:pt x="697501" y="3343275"/>
+                </a:cubicBezTo>
+                <a:cubicBezTo>
+                  <a:pt x="543407" y="3393282"/>
+                  <a:pt x="453275" y="3221832"/>
+                  <a:pt x="339884" y="3243263"/>
+                </a:cubicBezTo>
+                <a:cubicBezTo>
+                  <a:pt x="284643" y="3296842"/>
+                  <a:pt x="450368" y="3382566"/>
+                  <a:pt x="290458" y="3407569"/>
+                </a:cubicBezTo>
+                <a:cubicBezTo>
+                  <a:pt x="360236" y="3454004"/>
+                  <a:pt x="409664" y="3500439"/>
+                  <a:pt x="459090" y="3554016"/>
+                </a:cubicBezTo>
+                <a:cubicBezTo>
+                  <a:pt x="543407" y="3650457"/>
+                  <a:pt x="560851" y="3714751"/>
+                  <a:pt x="520147" y="3843338"/>
+                </a:cubicBezTo>
+                <a:cubicBezTo>
+                  <a:pt x="493979" y="3929063"/>
+                  <a:pt x="456183" y="4007645"/>
+                  <a:pt x="491072" y="4107657"/>
+                </a:cubicBezTo>
+                <a:cubicBezTo>
+                  <a:pt x="514332" y="4175522"/>
+                  <a:pt x="505609" y="4221957"/>
+                  <a:pt x="418386" y="4189810"/>
+                </a:cubicBezTo>
+                <a:cubicBezTo>
+                  <a:pt x="325347" y="4157663"/>
+                  <a:pt x="290458" y="4218386"/>
+                  <a:pt x="313718" y="4339829"/>
+                </a:cubicBezTo>
+                <a:cubicBezTo>
+                  <a:pt x="328254" y="4418410"/>
+                  <a:pt x="313718" y="4443413"/>
+                  <a:pt x="249753" y="4432698"/>
+                </a:cubicBezTo>
+                <a:cubicBezTo>
+                  <a:pt x="179975" y="4421982"/>
+                  <a:pt x="113103" y="4371976"/>
+                  <a:pt x="25879" y="4396979"/>
+                </a:cubicBezTo>
+                <a:cubicBezTo>
+                  <a:pt x="95658" y="4539854"/>
+                  <a:pt x="243939" y="4496991"/>
+                  <a:pt x="325347" y="4632722"/>
+                </a:cubicBezTo>
+                <a:cubicBezTo>
+                  <a:pt x="229401" y="4632722"/>
+                  <a:pt x="153807" y="4632722"/>
+                  <a:pt x="84029" y="4604147"/>
+                </a:cubicBezTo>
+                <a:cubicBezTo>
+                  <a:pt x="54954" y="4593433"/>
+                  <a:pt x="22972" y="4579145"/>
+                  <a:pt x="5527" y="4622007"/>
+                </a:cubicBezTo>
+                <a:cubicBezTo>
+                  <a:pt x="-14826" y="4672014"/>
+                  <a:pt x="25879" y="4689872"/>
+                  <a:pt x="49139" y="4697016"/>
+                </a:cubicBezTo>
+                <a:cubicBezTo>
+                  <a:pt x="116011" y="4722019"/>
+                  <a:pt x="168344" y="4779170"/>
+                  <a:pt x="226494" y="4825604"/>
+                </a:cubicBezTo>
+                <a:cubicBezTo>
+                  <a:pt x="351514" y="4925616"/>
+                  <a:pt x="488165" y="5011341"/>
+                  <a:pt x="592833" y="5175647"/>
+                </a:cubicBezTo>
+                <a:cubicBezTo>
+                  <a:pt x="461997" y="5132785"/>
+                  <a:pt x="363144" y="5032772"/>
+                  <a:pt x="238123" y="5014913"/>
+                </a:cubicBezTo>
+                <a:cubicBezTo>
+                  <a:pt x="345700" y="5164932"/>
+                  <a:pt x="482350" y="5264944"/>
+                  <a:pt x="610278" y="5375673"/>
+                </a:cubicBezTo>
+                <a:cubicBezTo>
+                  <a:pt x="648075" y="5407819"/>
+                  <a:pt x="685872" y="5429250"/>
+                  <a:pt x="691686" y="5497116"/>
+                </a:cubicBezTo>
+                <a:cubicBezTo>
+                  <a:pt x="709132" y="5629276"/>
+                  <a:pt x="755650" y="5736432"/>
+                  <a:pt x="860319" y="5793582"/>
+                </a:cubicBezTo>
+                <a:cubicBezTo>
+                  <a:pt x="860319" y="5793582"/>
+                  <a:pt x="854504" y="5815013"/>
+                  <a:pt x="851597" y="5825729"/>
+                </a:cubicBezTo>
+                <a:cubicBezTo>
+                  <a:pt x="787632" y="5829301"/>
+                  <a:pt x="738206" y="5750720"/>
+                  <a:pt x="659704" y="5779295"/>
+                </a:cubicBezTo>
+                <a:cubicBezTo>
+                  <a:pt x="738206" y="5886451"/>
+                  <a:pt x="802169" y="5979319"/>
+                  <a:pt x="909746" y="6029326"/>
+                </a:cubicBezTo>
+                <a:cubicBezTo>
+                  <a:pt x="996969" y="6068616"/>
+                  <a:pt x="1104545" y="6093620"/>
+                  <a:pt x="1168509" y="6222207"/>
+                </a:cubicBezTo>
+                <a:cubicBezTo>
+                  <a:pt x="1095822" y="6247210"/>
+                  <a:pt x="1040581" y="6215063"/>
+                  <a:pt x="985339" y="6193632"/>
+                </a:cubicBezTo>
+                <a:cubicBezTo>
+                  <a:pt x="901023" y="6157913"/>
+                  <a:pt x="816707" y="6118623"/>
+                  <a:pt x="732391" y="6082904"/>
+                </a:cubicBezTo>
+                <a:cubicBezTo>
+                  <a:pt x="700408" y="6068616"/>
+                  <a:pt x="665519" y="6061472"/>
+                  <a:pt x="645167" y="6125766"/>
+                </a:cubicBezTo>
+                <a:cubicBezTo>
+                  <a:pt x="752743" y="6140053"/>
+                  <a:pt x="816707" y="6225779"/>
+                  <a:pt x="883579" y="6307932"/>
+                </a:cubicBezTo>
+                <a:cubicBezTo>
+                  <a:pt x="921375" y="6354366"/>
+                  <a:pt x="953358" y="6415088"/>
+                  <a:pt x="1020229" y="6393657"/>
+                </a:cubicBezTo>
+                <a:cubicBezTo>
+                  <a:pt x="1055118" y="6382942"/>
+                  <a:pt x="1078378" y="6415088"/>
+                  <a:pt x="1075471" y="6457950"/>
+                </a:cubicBezTo>
+                <a:cubicBezTo>
+                  <a:pt x="1060933" y="6607970"/>
+                  <a:pt x="1145250" y="6657976"/>
+                  <a:pt x="1232473" y="6686551"/>
+                </a:cubicBezTo>
+                <a:cubicBezTo>
+                  <a:pt x="1360401" y="6729413"/>
+                  <a:pt x="1473792" y="6815138"/>
+                  <a:pt x="1592997" y="6886576"/>
+                </a:cubicBezTo>
+                <a:lnTo>
+                  <a:pt x="5511704" y="6886576"/>
+                </a:lnTo>
+                <a:close/>
+              </a:path>
+            </a:pathLst>
+          </a:custGeom>
+          <a:solidFill>
+            <a:schemeClr val="bg2">
+              <a:alpha val="50000"/>
+            </a:schemeClr>
+          </a:solidFill>
+          <a:ln w="32707" cap="flat">
+            <a:noFill/>
+            <a:prstDash val="solid"/>
+            <a:miter/>
+          </a:ln>
+        </p:spPr>
+        <p:txBody>
+          <a:bodyPr rtlCol="0" anchor="ctr"/>
+          <a:lstStyle/>
+          <a:p>
+            <a:endParaRPr lang="en-US" dirty="0"/>
+          </a:p>
+        </p:txBody>
+      </p:sp>
+      <p:sp>
+        <p:nvSpPr>
+          <p:cNvPr id="2" name="Title 1">
+            <a:extLst>
+              <a:ext uri="{FF2B5EF4-FFF2-40B4-BE49-F238E27FC236}">
+                <a16:creationId xmlns:a16="http://schemas.microsoft.com/office/drawing/2014/main" id="{D9557D4F-0C22-C6D3-4022-B9160A55B235}"/>
+              </a:ext>
+            </a:extLst>
+          </p:cNvPr>
+          <p:cNvSpPr>
+            <a:spLocks noGrp="1"/>
+          </p:cNvSpPr>
+          <p:nvPr>
+            <p:ph type="title"/>
+          </p:nvPr>
+        </p:nvSpPr>
+        <p:spPr>
+          <a:xfrm>
+            <a:off x="838200" y="713312"/>
+            <a:ext cx="4038600" cy="5431376"/>
+          </a:xfrm>
+        </p:spPr>
+        <p:txBody>
+          <a:bodyPr>
+            <a:normAutofit/>
+          </a:bodyPr>
+          <a:lstStyle/>
+          <a:p>
+            <a:r>
+              <a:rPr lang="en-US" dirty="0"/>
+              <a:t>General Statistics of Social Media</a:t>
+            </a:r>
+          </a:p>
+        </p:txBody>
+      </p:sp>
+      <p:sp>
+        <p:nvSpPr>
+          <p:cNvPr id="3" name="Content Placeholder 2">
+            <a:extLst>
+              <a:ext uri="{FF2B5EF4-FFF2-40B4-BE49-F238E27FC236}">
+                <a16:creationId xmlns:a16="http://schemas.microsoft.com/office/drawing/2014/main" id="{68F9F809-5509-3561-0C8C-AD43AA22A22D}"/>
+              </a:ext>
+            </a:extLst>
+          </p:cNvPr>
+          <p:cNvSpPr>
+            <a:spLocks noGrp="1"/>
+          </p:cNvSpPr>
+          <p:nvPr>
+            <p:ph idx="1"/>
+          </p:nvPr>
+        </p:nvSpPr>
+        <p:spPr>
+          <a:xfrm>
+            <a:off x="6095999" y="713313"/>
+            <a:ext cx="5257801" cy="5431376"/>
+          </a:xfrm>
+        </p:spPr>
+        <p:txBody>
+          <a:bodyPr anchor="ctr">
+            <a:normAutofit/>
+          </a:bodyPr>
+          <a:lstStyle/>
+          <a:p>
+            <a:r>
+              <a:rPr lang="en-US" sz="2000"/>
+              <a:t>As of 2021, over 4.9 billion active users in social media</a:t>
+            </a:r>
+          </a:p>
+          <a:p>
+            <a:endParaRPr lang="en-US" sz="2000"/>
+          </a:p>
+          <a:p>
+            <a:r>
+              <a:rPr lang="en-US" sz="2000"/>
+              <a:t>Facebook is the largest platform, 2.8 billion users</a:t>
+            </a:r>
+          </a:p>
+          <a:p>
+            <a:endParaRPr lang="en-US" sz="2000"/>
+          </a:p>
+          <a:p>
+            <a:r>
+              <a:rPr lang="en-US" sz="2000"/>
+              <a:t>Youtube is the second largest platform </a:t>
+            </a:r>
+          </a:p>
+          <a:p>
+            <a:endParaRPr lang="en-US" sz="2000"/>
+          </a:p>
+          <a:p>
+            <a:r>
+              <a:rPr lang="en-US" sz="2000"/>
+              <a:t>The fastest growing platform is Tiktok</a:t>
+            </a:r>
+          </a:p>
+        </p:txBody>
+      </p:sp>
+    </p:spTree>
+    <p:extLst>
+      <p:ext uri="{BB962C8B-B14F-4D97-AF65-F5344CB8AC3E}">
+        <p14:creationId xmlns:p14="http://schemas.microsoft.com/office/powerpoint/2010/main" val="1756961915"/>
       </p:ext>
     </p:extLst>
   </p:cSld>

</xml_diff>

<commit_message>
finish slides and found a good data set
</commit_message>
<xml_diff>
--- a/Literature-Review/Litature-Review-Slides.pptx
+++ b/Literature-Review/Litature-Review-Slides.pptx
@@ -5,7 +5,7 @@
     <p:sldMasterId id="2147483648" r:id="rId1"/>
   </p:sldMasterIdLst>
   <p:notesMasterIdLst>
-    <p:notesMasterId r:id="rId10"/>
+    <p:notesMasterId r:id="rId13"/>
   </p:notesMasterIdLst>
   <p:sldIdLst>
     <p:sldId id="256" r:id="rId2"/>
@@ -16,6 +16,9 @@
     <p:sldId id="261" r:id="rId7"/>
     <p:sldId id="263" r:id="rId8"/>
     <p:sldId id="265" r:id="rId9"/>
+    <p:sldId id="267" r:id="rId10"/>
+    <p:sldId id="268" r:id="rId11"/>
+    <p:sldId id="269" r:id="rId12"/>
   </p:sldIdLst>
   <p:sldSz cx="12192000" cy="6858000"/>
   <p:notesSz cx="6858000" cy="9144000"/>
@@ -877,6 +880,167 @@
     <p:extLst>
       <p:ext uri="{BB962C8B-B14F-4D97-AF65-F5344CB8AC3E}">
         <p14:creationId xmlns:p14="http://schemas.microsoft.com/office/powerpoint/2010/main" val="1970065619"/>
+      </p:ext>
+    </p:extLst>
+  </p:cSld>
+  <p:clrMapOvr>
+    <a:masterClrMapping/>
+  </p:clrMapOvr>
+</p:notes>
+</file>
+
+<file path=ppt/notesSlides/notesSlide4.xml><?xml version="1.0" encoding="utf-8"?>
+<p:notes xmlns:a="http://schemas.openxmlformats.org/drawingml/2006/main" xmlns:r="http://schemas.openxmlformats.org/officeDocument/2006/relationships" xmlns:p="http://schemas.openxmlformats.org/presentationml/2006/main">
+  <p:cSld>
+    <p:spTree>
+      <p:nvGrpSpPr>
+        <p:cNvPr id="1" name=""/>
+        <p:cNvGrpSpPr/>
+        <p:nvPr/>
+      </p:nvGrpSpPr>
+      <p:grpSpPr>
+        <a:xfrm>
+          <a:off x="0" y="0"/>
+          <a:ext cx="0" cy="0"/>
+          <a:chOff x="0" y="0"/>
+          <a:chExt cx="0" cy="0"/>
+        </a:xfrm>
+      </p:grpSpPr>
+      <p:sp>
+        <p:nvSpPr>
+          <p:cNvPr id="2" name="Slide Image Placeholder 1"/>
+          <p:cNvSpPr>
+            <a:spLocks noGrp="1" noRot="1" noChangeAspect="1"/>
+          </p:cNvSpPr>
+          <p:nvPr>
+            <p:ph type="sldImg"/>
+          </p:nvPr>
+        </p:nvSpPr>
+        <p:spPr/>
+      </p:sp>
+      <p:sp>
+        <p:nvSpPr>
+          <p:cNvPr id="3" name="Notes Placeholder 2"/>
+          <p:cNvSpPr>
+            <a:spLocks noGrp="1"/>
+          </p:cNvSpPr>
+          <p:nvPr>
+            <p:ph type="body" idx="1"/>
+          </p:nvPr>
+        </p:nvSpPr>
+        <p:spPr/>
+        <p:txBody>
+          <a:bodyPr/>
+          <a:lstStyle/>
+          <a:p>
+            <a:pPr marL="0" marR="0" lvl="0" indent="0" algn="l" defTabSz="914400" rtl="0" eaLnBrk="1" fontAlgn="auto" latinLnBrk="0" hangingPunct="1">
+              <a:lnSpc>
+                <a:spcPct val="100000"/>
+              </a:lnSpc>
+              <a:spcBef>
+                <a:spcPts val="0"/>
+              </a:spcBef>
+              <a:spcAft>
+                <a:spcPts val="0"/>
+              </a:spcAft>
+              <a:buClrTx/>
+              <a:buSzTx/>
+              <a:buFontTx/>
+              <a:buNone/>
+              <a:tabLst/>
+              <a:defRPr/>
+            </a:pPr>
+            <a:endParaRPr lang="en-US" dirty="0"/>
+          </a:p>
+        </p:txBody>
+      </p:sp>
+      <p:sp>
+        <p:nvSpPr>
+          <p:cNvPr id="4" name="Slide Number Placeholder 3"/>
+          <p:cNvSpPr>
+            <a:spLocks noGrp="1"/>
+          </p:cNvSpPr>
+          <p:nvPr>
+            <p:ph type="sldNum" sz="quarter" idx="5"/>
+          </p:nvPr>
+        </p:nvSpPr>
+        <p:spPr/>
+        <p:txBody>
+          <a:bodyPr/>
+          <a:lstStyle/>
+          <a:p>
+            <a:pPr marL="0" marR="0" lvl="0" indent="0" algn="r" defTabSz="914400" rtl="0" eaLnBrk="1" fontAlgn="auto" latinLnBrk="0" hangingPunct="1">
+              <a:lnSpc>
+                <a:spcPct val="100000"/>
+              </a:lnSpc>
+              <a:spcBef>
+                <a:spcPts val="0"/>
+              </a:spcBef>
+              <a:spcAft>
+                <a:spcPts val="0"/>
+              </a:spcAft>
+              <a:buClrTx/>
+              <a:buSzTx/>
+              <a:buFontTx/>
+              <a:buNone/>
+              <a:tabLst/>
+              <a:defRPr/>
+            </a:pPr>
+            <a:fld id="{10F4E585-D814-41BA-98FD-6258CE8A4337}" type="slidenum">
+              <a:rPr kumimoji="0" lang="en-US" sz="1200" b="0" i="0" u="none" strike="noStrike" kern="1200" cap="none" spc="0" normalizeH="0" baseline="0" noProof="0" smtClean="0">
+                <a:ln>
+                  <a:noFill/>
+                </a:ln>
+                <a:solidFill>
+                  <a:prstClr val="black"/>
+                </a:solidFill>
+                <a:effectLst/>
+                <a:uLnTx/>
+                <a:uFillTx/>
+                <a:latin typeface="Calibri" panose="020F0502020204030204"/>
+                <a:ea typeface="+mn-ea"/>
+                <a:cs typeface="+mn-cs"/>
+              </a:rPr>
+              <a:pPr marL="0" marR="0" lvl="0" indent="0" algn="r" defTabSz="914400" rtl="0" eaLnBrk="1" fontAlgn="auto" latinLnBrk="0" hangingPunct="1">
+                <a:lnSpc>
+                  <a:spcPct val="100000"/>
+                </a:lnSpc>
+                <a:spcBef>
+                  <a:spcPts val="0"/>
+                </a:spcBef>
+                <a:spcAft>
+                  <a:spcPts val="0"/>
+                </a:spcAft>
+                <a:buClrTx/>
+                <a:buSzTx/>
+                <a:buFontTx/>
+                <a:buNone/>
+                <a:tabLst/>
+                <a:defRPr/>
+              </a:pPr>
+              <a:t>10</a:t>
+            </a:fld>
+            <a:endParaRPr kumimoji="0" lang="en-US" sz="1200" b="0" i="0" u="none" strike="noStrike" kern="1200" cap="none" spc="0" normalizeH="0" baseline="0" noProof="0">
+              <a:ln>
+                <a:noFill/>
+              </a:ln>
+              <a:solidFill>
+                <a:prstClr val="black"/>
+              </a:solidFill>
+              <a:effectLst/>
+              <a:uLnTx/>
+              <a:uFillTx/>
+              <a:latin typeface="Calibri" panose="020F0502020204030204"/>
+              <a:ea typeface="+mn-ea"/>
+              <a:cs typeface="+mn-cs"/>
+            </a:endParaRPr>
+          </a:p>
+        </p:txBody>
+      </p:sp>
+    </p:spTree>
+    <p:extLst>
+      <p:ext uri="{BB962C8B-B14F-4D97-AF65-F5344CB8AC3E}">
+        <p14:creationId xmlns:p14="http://schemas.microsoft.com/office/powerpoint/2010/main" val="197638506"/>
       </p:ext>
     </p:extLst>
   </p:cSld>
@@ -4589,7 +4753,7 @@
           <a:p>
             <a:pPr algn="l"/>
             <a:r>
-              <a:rPr lang="en-US" sz="5400"/>
+              <a:rPr lang="en-US" sz="5400" dirty="0"/>
               <a:t>Effects of Social Media on Mental Health during COVID-19</a:t>
             </a:r>
           </a:p>
@@ -4599,6 +4763,1293 @@
     <p:extLst>
       <p:ext uri="{BB962C8B-B14F-4D97-AF65-F5344CB8AC3E}">
         <p14:creationId xmlns:p14="http://schemas.microsoft.com/office/powerpoint/2010/main" val="2683044238"/>
+      </p:ext>
+    </p:extLst>
+  </p:cSld>
+  <p:clrMapOvr>
+    <a:overrideClrMapping bg1="dk1" tx1="lt1" bg2="dk2" tx2="lt2" accent1="accent1" accent2="accent2" accent3="accent3" accent4="accent4" accent5="accent5" accent6="accent6" hlink="hlink" folHlink="folHlink"/>
+  </p:clrMapOvr>
+</p:sld>
+</file>
+
+<file path=ppt/slides/slide10.xml><?xml version="1.0" encoding="utf-8"?>
+<p:sld xmlns:a="http://schemas.openxmlformats.org/drawingml/2006/main" xmlns:r="http://schemas.openxmlformats.org/officeDocument/2006/relationships" xmlns:p="http://schemas.openxmlformats.org/presentationml/2006/main">
+  <p:cSld>
+    <p:bg>
+      <p:bgPr>
+        <a:solidFill>
+          <a:schemeClr val="bg1"/>
+        </a:solidFill>
+        <a:effectLst/>
+      </p:bgPr>
+    </p:bg>
+    <p:spTree>
+      <p:nvGrpSpPr>
+        <p:cNvPr id="1" name=""/>
+        <p:cNvGrpSpPr/>
+        <p:nvPr/>
+      </p:nvGrpSpPr>
+      <p:grpSpPr>
+        <a:xfrm>
+          <a:off x="0" y="0"/>
+          <a:ext cx="0" cy="0"/>
+          <a:chOff x="0" y="0"/>
+          <a:chExt cx="0" cy="0"/>
+        </a:xfrm>
+      </p:grpSpPr>
+      <p:sp useBgFill="1">
+        <p:nvSpPr>
+          <p:cNvPr id="8" name="Rectangle 7">
+            <a:extLst>
+              <a:ext uri="{FF2B5EF4-FFF2-40B4-BE49-F238E27FC236}">
+                <a16:creationId xmlns:a16="http://schemas.microsoft.com/office/drawing/2014/main" id="{6A8AAC95-3719-4BCD-B710-4160043D9237}"/>
+              </a:ext>
+              <a:ext uri="{C183D7F6-B498-43B3-948B-1728B52AA6E4}">
+                <adec:decorative xmlns:adec="http://schemas.microsoft.com/office/drawing/2017/decorative" val="1"/>
+              </a:ext>
+            </a:extLst>
+          </p:cNvPr>
+          <p:cNvSpPr>
+            <a:spLocks noGrp="1" noRot="1" noChangeAspect="1" noMove="1" noResize="1" noEditPoints="1" noAdjustHandles="1" noChangeArrowheads="1" noChangeShapeType="1" noTextEdit="1"/>
+          </p:cNvSpPr>
+          <p:nvPr>
+            <p:extLst>
+              <p:ext uri="{386F3935-93C4-4BCD-93E2-E3B085C9AB24}">
+                <p16:designElem xmlns:p16="http://schemas.microsoft.com/office/powerpoint/2015/main" val="1"/>
+              </p:ext>
+            </p:extLst>
+          </p:nvPr>
+        </p:nvSpPr>
+        <p:spPr>
+          <a:xfrm>
+            <a:off x="0" y="0"/>
+            <a:ext cx="12188952" cy="6858000"/>
+          </a:xfrm>
+          <a:prstGeom prst="rect">
+            <a:avLst/>
+          </a:prstGeom>
+          <a:ln>
+            <a:noFill/>
+          </a:ln>
+        </p:spPr>
+        <p:style>
+          <a:lnRef idx="2">
+            <a:schemeClr val="accent1">
+              <a:shade val="50000"/>
+            </a:schemeClr>
+          </a:lnRef>
+          <a:fillRef idx="1">
+            <a:schemeClr val="accent1"/>
+          </a:fillRef>
+          <a:effectRef idx="0">
+            <a:schemeClr val="accent1"/>
+          </a:effectRef>
+          <a:fontRef idx="minor">
+            <a:schemeClr val="lt1"/>
+          </a:fontRef>
+        </p:style>
+        <p:txBody>
+          <a:bodyPr rtlCol="0" anchor="ctr"/>
+          <a:lstStyle/>
+          <a:p>
+            <a:pPr marL="0" marR="0" lvl="0" indent="0" algn="ctr" defTabSz="914400" rtl="0" eaLnBrk="1" fontAlgn="auto" latinLnBrk="0" hangingPunct="1">
+              <a:lnSpc>
+                <a:spcPct val="100000"/>
+              </a:lnSpc>
+              <a:spcBef>
+                <a:spcPts val="0"/>
+              </a:spcBef>
+              <a:spcAft>
+                <a:spcPts val="0"/>
+              </a:spcAft>
+              <a:buClrTx/>
+              <a:buSzTx/>
+              <a:buFontTx/>
+              <a:buNone/>
+              <a:tabLst/>
+              <a:defRPr/>
+            </a:pPr>
+            <a:endParaRPr kumimoji="0" lang="en-US" sz="1800" b="0" i="0" u="none" strike="noStrike" kern="1200" cap="none" spc="0" normalizeH="0" baseline="0" noProof="0">
+              <a:ln>
+                <a:noFill/>
+              </a:ln>
+              <a:solidFill>
+                <a:prstClr val="white"/>
+              </a:solidFill>
+              <a:effectLst/>
+              <a:uLnTx/>
+              <a:uFillTx/>
+              <a:latin typeface="Calibri" panose="020F0502020204030204"/>
+              <a:ea typeface="+mn-ea"/>
+              <a:cs typeface="+mn-cs"/>
+            </a:endParaRPr>
+          </a:p>
+        </p:txBody>
+      </p:sp>
+      <p:sp>
+        <p:nvSpPr>
+          <p:cNvPr id="10" name="Freeform: Shape 9">
+            <a:extLst>
+              <a:ext uri="{FF2B5EF4-FFF2-40B4-BE49-F238E27FC236}">
+                <a16:creationId xmlns:a16="http://schemas.microsoft.com/office/drawing/2014/main" id="{73A6D7BA-50E4-42FE-A0E3-FC42B7EC4372}"/>
+              </a:ext>
+              <a:ext uri="{C183D7F6-B498-43B3-948B-1728B52AA6E4}">
+                <adec:decorative xmlns:adec="http://schemas.microsoft.com/office/drawing/2017/decorative" val="1"/>
+              </a:ext>
+            </a:extLst>
+          </p:cNvPr>
+          <p:cNvSpPr>
+            <a:spLocks noGrp="1" noRot="1" noChangeAspect="1" noMove="1" noResize="1" noEditPoints="1" noAdjustHandles="1" noChangeArrowheads="1" noChangeShapeType="1" noTextEdit="1"/>
+          </p:cNvSpPr>
+          <p:nvPr>
+            <p:extLst>
+              <p:ext uri="{386F3935-93C4-4BCD-93E2-E3B085C9AB24}">
+                <p16:designElem xmlns:p16="http://schemas.microsoft.com/office/powerpoint/2015/main" val="1"/>
+              </p:ext>
+            </p:extLst>
+          </p:nvPr>
+        </p:nvSpPr>
+        <p:spPr>
+          <a:xfrm flipH="1">
+            <a:off x="1" y="2767722"/>
+            <a:ext cx="3021543" cy="1532055"/>
+          </a:xfrm>
+          <a:custGeom>
+            <a:avLst/>
+            <a:gdLst>
+              <a:gd name="connsiteX0" fmla="*/ 3021543 w 3021543"/>
+              <a:gd name="connsiteY0" fmla="*/ 0 h 1532055"/>
+              <a:gd name="connsiteX1" fmla="*/ 2963800 w 3021543"/>
+              <a:gd name="connsiteY1" fmla="*/ 7730 h 1532055"/>
+              <a:gd name="connsiteX2" fmla="*/ 2793803 w 3021543"/>
+              <a:gd name="connsiteY2" fmla="*/ 25704 h 1532055"/>
+              <a:gd name="connsiteX3" fmla="*/ 2414348 w 3021543"/>
+              <a:gd name="connsiteY3" fmla="*/ 31695 h 1532055"/>
+              <a:gd name="connsiteX4" fmla="*/ 2091558 w 3021543"/>
+              <a:gd name="connsiteY4" fmla="*/ 29298 h 1532055"/>
+              <a:gd name="connsiteX5" fmla="*/ 1645319 w 3021543"/>
+              <a:gd name="connsiteY5" fmla="*/ 30497 h 1532055"/>
+              <a:gd name="connsiteX6" fmla="*/ 1243602 w 3021543"/>
+              <a:gd name="connsiteY6" fmla="*/ 64048 h 1532055"/>
+              <a:gd name="connsiteX7" fmla="*/ 753851 w 3021543"/>
+              <a:gd name="connsiteY7" fmla="*/ 61651 h 1532055"/>
+              <a:gd name="connsiteX8" fmla="*/ 465465 w 3021543"/>
+              <a:gd name="connsiteY8" fmla="*/ 123960 h 1532055"/>
+              <a:gd name="connsiteX9" fmla="*/ 546416 w 3021543"/>
+              <a:gd name="connsiteY9" fmla="*/ 145529 h 1532055"/>
+              <a:gd name="connsiteX10" fmla="*/ 689091 w 3021543"/>
+              <a:gd name="connsiteY10" fmla="*/ 192260 h 1532055"/>
+              <a:gd name="connsiteX11" fmla="*/ 704269 w 3021543"/>
+              <a:gd name="connsiteY11" fmla="*/ 222217 h 1532055"/>
+              <a:gd name="connsiteX12" fmla="*/ 683020 w 3021543"/>
+              <a:gd name="connsiteY12" fmla="*/ 236595 h 1532055"/>
+              <a:gd name="connsiteX13" fmla="*/ 621295 w 3021543"/>
+              <a:gd name="connsiteY13" fmla="*/ 264155 h 1532055"/>
+              <a:gd name="connsiteX14" fmla="*/ 848968 w 3021543"/>
+              <a:gd name="connsiteY14" fmla="*/ 304896 h 1532055"/>
+              <a:gd name="connsiteX15" fmla="*/ 768018 w 3021543"/>
+              <a:gd name="connsiteY15" fmla="*/ 330059 h 1532055"/>
+              <a:gd name="connsiteX16" fmla="*/ 684032 w 3021543"/>
+              <a:gd name="connsiteY16" fmla="*/ 348032 h 1532055"/>
+              <a:gd name="connsiteX17" fmla="*/ 592962 w 3021543"/>
+              <a:gd name="connsiteY17" fmla="*/ 361213 h 1532055"/>
+              <a:gd name="connsiteX18" fmla="*/ 509988 w 3021543"/>
+              <a:gd name="connsiteY18" fmla="*/ 387575 h 1532055"/>
+              <a:gd name="connsiteX19" fmla="*/ 726531 w 3021543"/>
+              <a:gd name="connsiteY19" fmla="*/ 398359 h 1532055"/>
+              <a:gd name="connsiteX20" fmla="*/ 614212 w 3021543"/>
+              <a:gd name="connsiteY20" fmla="*/ 422324 h 1532055"/>
+              <a:gd name="connsiteX21" fmla="*/ 522131 w 3021543"/>
+              <a:gd name="connsiteY21" fmla="*/ 453478 h 1532055"/>
+              <a:gd name="connsiteX22" fmla="*/ 457370 w 3021543"/>
+              <a:gd name="connsiteY22" fmla="*/ 467857 h 1532055"/>
+              <a:gd name="connsiteX23" fmla="*/ 388562 w 3021543"/>
+              <a:gd name="connsiteY23" fmla="*/ 471452 h 1532055"/>
+              <a:gd name="connsiteX24" fmla="*/ 372372 w 3021543"/>
+              <a:gd name="connsiteY24" fmla="*/ 494218 h 1532055"/>
+              <a:gd name="connsiteX25" fmla="*/ 393622 w 3021543"/>
+              <a:gd name="connsiteY25" fmla="*/ 518184 h 1532055"/>
+              <a:gd name="connsiteX26" fmla="*/ 426002 w 3021543"/>
+              <a:gd name="connsiteY26" fmla="*/ 520580 h 1532055"/>
+              <a:gd name="connsiteX27" fmla="*/ 619271 w 3021543"/>
+              <a:gd name="connsiteY27" fmla="*/ 526571 h 1532055"/>
+              <a:gd name="connsiteX28" fmla="*/ 0 w 3021543"/>
+              <a:gd name="connsiteY28" fmla="*/ 579294 h 1532055"/>
+              <a:gd name="connsiteX29" fmla="*/ 83986 w 3021543"/>
+              <a:gd name="connsiteY29" fmla="*/ 611647 h 1532055"/>
+              <a:gd name="connsiteX30" fmla="*/ 112319 w 3021543"/>
+              <a:gd name="connsiteY30" fmla="*/ 700317 h 1532055"/>
+              <a:gd name="connsiteX31" fmla="*/ 215531 w 3021543"/>
+              <a:gd name="connsiteY31" fmla="*/ 750643 h 1532055"/>
+              <a:gd name="connsiteX32" fmla="*/ 282315 w 3021543"/>
+              <a:gd name="connsiteY32" fmla="*/ 768617 h 1532055"/>
+              <a:gd name="connsiteX33" fmla="*/ 435109 w 3021543"/>
+              <a:gd name="connsiteY33" fmla="*/ 794979 h 1532055"/>
+              <a:gd name="connsiteX34" fmla="*/ 457370 w 3021543"/>
+              <a:gd name="connsiteY34" fmla="*/ 838116 h 1532055"/>
+              <a:gd name="connsiteX35" fmla="*/ 476596 w 3021543"/>
+              <a:gd name="connsiteY35" fmla="*/ 886046 h 1532055"/>
+              <a:gd name="connsiteX36" fmla="*/ 517071 w 3021543"/>
+              <a:gd name="connsiteY36" fmla="*/ 917200 h 1532055"/>
+              <a:gd name="connsiteX37" fmla="*/ 202377 w 3021543"/>
+              <a:gd name="connsiteY37" fmla="*/ 912407 h 1532055"/>
+              <a:gd name="connsiteX38" fmla="*/ 557546 w 3021543"/>
+              <a:gd name="connsiteY38" fmla="*/ 1013060 h 1532055"/>
+              <a:gd name="connsiteX39" fmla="*/ 526178 w 3021543"/>
+              <a:gd name="connsiteY39" fmla="*/ 1052602 h 1532055"/>
+              <a:gd name="connsiteX40" fmla="*/ 720459 w 3021543"/>
+              <a:gd name="connsiteY40" fmla="*/ 1106523 h 1532055"/>
+              <a:gd name="connsiteX41" fmla="*/ 616236 w 3021543"/>
+              <a:gd name="connsiteY41" fmla="*/ 1112514 h 1532055"/>
+              <a:gd name="connsiteX42" fmla="*/ 1222353 w 3021543"/>
+              <a:gd name="connsiteY42" fmla="*/ 1337785 h 1532055"/>
+              <a:gd name="connsiteX43" fmla="*/ 2087511 w 3021543"/>
+              <a:gd name="connsiteY43" fmla="*/ 1500747 h 1532055"/>
+              <a:gd name="connsiteX44" fmla="*/ 2425479 w 3021543"/>
+              <a:gd name="connsiteY44" fmla="*/ 1531901 h 1532055"/>
+              <a:gd name="connsiteX45" fmla="*/ 2809994 w 3021543"/>
+              <a:gd name="connsiteY45" fmla="*/ 1522315 h 1532055"/>
+              <a:gd name="connsiteX46" fmla="*/ 2953618 w 3021543"/>
+              <a:gd name="connsiteY46" fmla="*/ 1512448 h 1532055"/>
+              <a:gd name="connsiteX47" fmla="*/ 3021543 w 3021543"/>
+              <a:gd name="connsiteY47" fmla="*/ 1502657 h 1532055"/>
+            </a:gdLst>
+            <a:ahLst/>
+            <a:cxnLst>
+              <a:cxn ang="0">
+                <a:pos x="connsiteX0" y="connsiteY0"/>
+              </a:cxn>
+              <a:cxn ang="0">
+                <a:pos x="connsiteX1" y="connsiteY1"/>
+              </a:cxn>
+              <a:cxn ang="0">
+                <a:pos x="connsiteX2" y="connsiteY2"/>
+              </a:cxn>
+              <a:cxn ang="0">
+                <a:pos x="connsiteX3" y="connsiteY3"/>
+              </a:cxn>
+              <a:cxn ang="0">
+                <a:pos x="connsiteX4" y="connsiteY4"/>
+              </a:cxn>
+              <a:cxn ang="0">
+                <a:pos x="connsiteX5" y="connsiteY5"/>
+              </a:cxn>
+              <a:cxn ang="0">
+                <a:pos x="connsiteX6" y="connsiteY6"/>
+              </a:cxn>
+              <a:cxn ang="0">
+                <a:pos x="connsiteX7" y="connsiteY7"/>
+              </a:cxn>
+              <a:cxn ang="0">
+                <a:pos x="connsiteX8" y="connsiteY8"/>
+              </a:cxn>
+              <a:cxn ang="0">
+                <a:pos x="connsiteX9" y="connsiteY9"/>
+              </a:cxn>
+              <a:cxn ang="0">
+                <a:pos x="connsiteX10" y="connsiteY10"/>
+              </a:cxn>
+              <a:cxn ang="0">
+                <a:pos x="connsiteX11" y="connsiteY11"/>
+              </a:cxn>
+              <a:cxn ang="0">
+                <a:pos x="connsiteX12" y="connsiteY12"/>
+              </a:cxn>
+              <a:cxn ang="0">
+                <a:pos x="connsiteX13" y="connsiteY13"/>
+              </a:cxn>
+              <a:cxn ang="0">
+                <a:pos x="connsiteX14" y="connsiteY14"/>
+              </a:cxn>
+              <a:cxn ang="0">
+                <a:pos x="connsiteX15" y="connsiteY15"/>
+              </a:cxn>
+              <a:cxn ang="0">
+                <a:pos x="connsiteX16" y="connsiteY16"/>
+              </a:cxn>
+              <a:cxn ang="0">
+                <a:pos x="connsiteX17" y="connsiteY17"/>
+              </a:cxn>
+              <a:cxn ang="0">
+                <a:pos x="connsiteX18" y="connsiteY18"/>
+              </a:cxn>
+              <a:cxn ang="0">
+                <a:pos x="connsiteX19" y="connsiteY19"/>
+              </a:cxn>
+              <a:cxn ang="0">
+                <a:pos x="connsiteX20" y="connsiteY20"/>
+              </a:cxn>
+              <a:cxn ang="0">
+                <a:pos x="connsiteX21" y="connsiteY21"/>
+              </a:cxn>
+              <a:cxn ang="0">
+                <a:pos x="connsiteX22" y="connsiteY22"/>
+              </a:cxn>
+              <a:cxn ang="0">
+                <a:pos x="connsiteX23" y="connsiteY23"/>
+              </a:cxn>
+              <a:cxn ang="0">
+                <a:pos x="connsiteX24" y="connsiteY24"/>
+              </a:cxn>
+              <a:cxn ang="0">
+                <a:pos x="connsiteX25" y="connsiteY25"/>
+              </a:cxn>
+              <a:cxn ang="0">
+                <a:pos x="connsiteX26" y="connsiteY26"/>
+              </a:cxn>
+              <a:cxn ang="0">
+                <a:pos x="connsiteX27" y="connsiteY27"/>
+              </a:cxn>
+              <a:cxn ang="0">
+                <a:pos x="connsiteX28" y="connsiteY28"/>
+              </a:cxn>
+              <a:cxn ang="0">
+                <a:pos x="connsiteX29" y="connsiteY29"/>
+              </a:cxn>
+              <a:cxn ang="0">
+                <a:pos x="connsiteX30" y="connsiteY30"/>
+              </a:cxn>
+              <a:cxn ang="0">
+                <a:pos x="connsiteX31" y="connsiteY31"/>
+              </a:cxn>
+              <a:cxn ang="0">
+                <a:pos x="connsiteX32" y="connsiteY32"/>
+              </a:cxn>
+              <a:cxn ang="0">
+                <a:pos x="connsiteX33" y="connsiteY33"/>
+              </a:cxn>
+              <a:cxn ang="0">
+                <a:pos x="connsiteX34" y="connsiteY34"/>
+              </a:cxn>
+              <a:cxn ang="0">
+                <a:pos x="connsiteX35" y="connsiteY35"/>
+              </a:cxn>
+              <a:cxn ang="0">
+                <a:pos x="connsiteX36" y="connsiteY36"/>
+              </a:cxn>
+              <a:cxn ang="0">
+                <a:pos x="connsiteX37" y="connsiteY37"/>
+              </a:cxn>
+              <a:cxn ang="0">
+                <a:pos x="connsiteX38" y="connsiteY38"/>
+              </a:cxn>
+              <a:cxn ang="0">
+                <a:pos x="connsiteX39" y="connsiteY39"/>
+              </a:cxn>
+              <a:cxn ang="0">
+                <a:pos x="connsiteX40" y="connsiteY40"/>
+              </a:cxn>
+              <a:cxn ang="0">
+                <a:pos x="connsiteX41" y="connsiteY41"/>
+              </a:cxn>
+              <a:cxn ang="0">
+                <a:pos x="connsiteX42" y="connsiteY42"/>
+              </a:cxn>
+              <a:cxn ang="0">
+                <a:pos x="connsiteX43" y="connsiteY43"/>
+              </a:cxn>
+              <a:cxn ang="0">
+                <a:pos x="connsiteX44" y="connsiteY44"/>
+              </a:cxn>
+              <a:cxn ang="0">
+                <a:pos x="connsiteX45" y="connsiteY45"/>
+              </a:cxn>
+              <a:cxn ang="0">
+                <a:pos x="connsiteX46" y="connsiteY46"/>
+              </a:cxn>
+              <a:cxn ang="0">
+                <a:pos x="connsiteX47" y="connsiteY47"/>
+              </a:cxn>
+            </a:cxnLst>
+            <a:rect l="l" t="t" r="r" b="b"/>
+            <a:pathLst>
+              <a:path w="3021543" h="1532055">
+                <a:moveTo>
+                  <a:pt x="3021543" y="0"/>
+                </a:moveTo>
+                <a:lnTo>
+                  <a:pt x="2963800" y="7730"/>
+                </a:lnTo>
+                <a:cubicBezTo>
+                  <a:pt x="2907134" y="14919"/>
+                  <a:pt x="2850469" y="24506"/>
+                  <a:pt x="2793803" y="25704"/>
+                </a:cubicBezTo>
+                <a:cubicBezTo>
+                  <a:pt x="2667318" y="29298"/>
+                  <a:pt x="2539821" y="20911"/>
+                  <a:pt x="2414348" y="31695"/>
+                </a:cubicBezTo>
+                <a:cubicBezTo>
+                  <a:pt x="2307089" y="41281"/>
+                  <a:pt x="2198818" y="30497"/>
+                  <a:pt x="2091558" y="29298"/>
+                </a:cubicBezTo>
+                <a:cubicBezTo>
+                  <a:pt x="1942812" y="28100"/>
+                  <a:pt x="1793053" y="19713"/>
+                  <a:pt x="1645319" y="30497"/>
+                </a:cubicBezTo>
+                <a:cubicBezTo>
+                  <a:pt x="1510738" y="38885"/>
+                  <a:pt x="1376158" y="41281"/>
+                  <a:pt x="1243602" y="64048"/>
+                </a:cubicBezTo>
+                <a:cubicBezTo>
+                  <a:pt x="1079677" y="76030"/>
+                  <a:pt x="916765" y="68841"/>
+                  <a:pt x="753851" y="61651"/>
+                </a:cubicBezTo>
+                <a:cubicBezTo>
+                  <a:pt x="653675" y="56858"/>
+                  <a:pt x="554511" y="41281"/>
+                  <a:pt x="465465" y="123960"/>
+                </a:cubicBezTo>
+                <a:cubicBezTo>
+                  <a:pt x="489751" y="143132"/>
+                  <a:pt x="519095" y="139537"/>
+                  <a:pt x="546416" y="145529"/>
+                </a:cubicBezTo>
+                <a:cubicBezTo>
+                  <a:pt x="594986" y="157511"/>
+                  <a:pt x="643557" y="169493"/>
+                  <a:pt x="689091" y="192260"/>
+                </a:cubicBezTo>
+                <a:cubicBezTo>
+                  <a:pt x="699210" y="197053"/>
+                  <a:pt x="708317" y="206639"/>
+                  <a:pt x="704269" y="222217"/>
+                </a:cubicBezTo>
+                <a:cubicBezTo>
+                  <a:pt x="701234" y="234199"/>
+                  <a:pt x="691115" y="234199"/>
+                  <a:pt x="683020" y="236595"/>
+                </a:cubicBezTo>
+                <a:cubicBezTo>
+                  <a:pt x="664806" y="243785"/>
+                  <a:pt x="642545" y="238992"/>
+                  <a:pt x="621295" y="264155"/>
+                </a:cubicBezTo>
+                <a:cubicBezTo>
+                  <a:pt x="702245" y="277336"/>
+                  <a:pt x="780160" y="252172"/>
+                  <a:pt x="848968" y="304896"/>
+                </a:cubicBezTo>
+                <a:cubicBezTo>
+                  <a:pt x="823671" y="331257"/>
+                  <a:pt x="795339" y="325266"/>
+                  <a:pt x="768018" y="330059"/>
+                </a:cubicBezTo>
+                <a:cubicBezTo>
+                  <a:pt x="739685" y="334852"/>
+                  <a:pt x="712365" y="343240"/>
+                  <a:pt x="684032" y="348032"/>
+                </a:cubicBezTo>
+                <a:cubicBezTo>
+                  <a:pt x="653675" y="354023"/>
+                  <a:pt x="623319" y="355222"/>
+                  <a:pt x="592962" y="361213"/>
+                </a:cubicBezTo>
+                <a:cubicBezTo>
+                  <a:pt x="567666" y="366006"/>
+                  <a:pt x="540345" y="357618"/>
+                  <a:pt x="509988" y="387575"/>
+                </a:cubicBezTo>
+                <a:cubicBezTo>
+                  <a:pt x="584867" y="409143"/>
+                  <a:pt x="652663" y="376790"/>
+                  <a:pt x="726531" y="398359"/>
+                </a:cubicBezTo>
+                <a:cubicBezTo>
+                  <a:pt x="683020" y="417531"/>
+                  <a:pt x="647604" y="411539"/>
+                  <a:pt x="614212" y="422324"/>
+                </a:cubicBezTo>
+                <a:cubicBezTo>
+                  <a:pt x="583855" y="433108"/>
+                  <a:pt x="547428" y="421126"/>
+                  <a:pt x="522131" y="453478"/>
+                </a:cubicBezTo>
+                <a:cubicBezTo>
+                  <a:pt x="502905" y="478641"/>
+                  <a:pt x="482668" y="482236"/>
+                  <a:pt x="457370" y="467857"/>
+                </a:cubicBezTo>
+                <a:cubicBezTo>
+                  <a:pt x="435109" y="454676"/>
+                  <a:pt x="410824" y="458271"/>
+                  <a:pt x="388562" y="471452"/>
+                </a:cubicBezTo>
+                <a:cubicBezTo>
+                  <a:pt x="380468" y="476245"/>
+                  <a:pt x="372372" y="482236"/>
+                  <a:pt x="372372" y="494218"/>
+                </a:cubicBezTo>
+                <a:cubicBezTo>
+                  <a:pt x="372372" y="510994"/>
+                  <a:pt x="382491" y="515787"/>
+                  <a:pt x="393622" y="518184"/>
+                </a:cubicBezTo>
+                <a:cubicBezTo>
+                  <a:pt x="403741" y="520580"/>
+                  <a:pt x="415883" y="522977"/>
+                  <a:pt x="426002" y="520580"/>
+                </a:cubicBezTo>
+                <a:cubicBezTo>
+                  <a:pt x="490762" y="507399"/>
+                  <a:pt x="554511" y="528968"/>
+                  <a:pt x="619271" y="526571"/>
+                </a:cubicBezTo>
+                <a:cubicBezTo>
+                  <a:pt x="415883" y="578096"/>
+                  <a:pt x="210471" y="561321"/>
+                  <a:pt x="0" y="579294"/>
+                </a:cubicBezTo>
+                <a:cubicBezTo>
+                  <a:pt x="27321" y="615241"/>
+                  <a:pt x="62737" y="585286"/>
+                  <a:pt x="83986" y="611647"/>
+                </a:cubicBezTo>
+                <a:cubicBezTo>
+                  <a:pt x="63748" y="666766"/>
+                  <a:pt x="71844" y="696722"/>
+                  <a:pt x="112319" y="700317"/>
+                </a:cubicBezTo>
+                <a:cubicBezTo>
+                  <a:pt x="151782" y="703912"/>
+                  <a:pt x="194281" y="684740"/>
+                  <a:pt x="215531" y="750643"/>
+                </a:cubicBezTo>
+                <a:cubicBezTo>
+                  <a:pt x="221602" y="771014"/>
+                  <a:pt x="259042" y="765023"/>
+                  <a:pt x="282315" y="768617"/>
+                </a:cubicBezTo>
+                <a:cubicBezTo>
+                  <a:pt x="332909" y="777005"/>
+                  <a:pt x="386539" y="768617"/>
+                  <a:pt x="435109" y="794979"/>
+                </a:cubicBezTo>
+                <a:cubicBezTo>
+                  <a:pt x="454335" y="804565"/>
+                  <a:pt x="467489" y="811754"/>
+                  <a:pt x="457370" y="838116"/>
+                </a:cubicBezTo>
+                <a:cubicBezTo>
+                  <a:pt x="447252" y="865675"/>
+                  <a:pt x="460406" y="875261"/>
+                  <a:pt x="476596" y="886046"/>
+                </a:cubicBezTo>
+                <a:cubicBezTo>
+                  <a:pt x="488739" y="894433"/>
+                  <a:pt x="506953" y="892037"/>
+                  <a:pt x="517071" y="917200"/>
+                </a:cubicBezTo>
+                <a:cubicBezTo>
+                  <a:pt x="410824" y="913605"/>
+                  <a:pt x="307612" y="893235"/>
+                  <a:pt x="202377" y="912407"/>
+                </a:cubicBezTo>
+                <a:cubicBezTo>
+                  <a:pt x="317731" y="960337"/>
+                  <a:pt x="444216" y="957940"/>
+                  <a:pt x="557546" y="1013060"/>
+                </a:cubicBezTo>
+                <a:cubicBezTo>
+                  <a:pt x="553499" y="1032232"/>
+                  <a:pt x="527190" y="1023844"/>
+                  <a:pt x="526178" y="1052602"/>
+                </a:cubicBezTo>
+                <a:cubicBezTo>
+                  <a:pt x="585879" y="1082558"/>
+                  <a:pt x="657723" y="1062188"/>
+                  <a:pt x="720459" y="1106523"/>
+                </a:cubicBezTo>
+                <a:cubicBezTo>
+                  <a:pt x="684032" y="1126893"/>
+                  <a:pt x="650640" y="1093342"/>
+                  <a:pt x="616236" y="1112514"/>
+                </a:cubicBezTo>
+                <a:cubicBezTo>
+                  <a:pt x="627367" y="1141273"/>
+                  <a:pt x="1131283" y="1318613"/>
+                  <a:pt x="1222353" y="1337785"/>
+                </a:cubicBezTo>
+                <a:cubicBezTo>
+                  <a:pt x="1407527" y="1377327"/>
+                  <a:pt x="1940788" y="1477980"/>
+                  <a:pt x="2087511" y="1500747"/>
+                </a:cubicBezTo>
+                <a:cubicBezTo>
+                  <a:pt x="2200841" y="1517522"/>
+                  <a:pt x="2313160" y="1530703"/>
+                  <a:pt x="2425479" y="1531901"/>
+                </a:cubicBezTo>
+                <a:cubicBezTo>
+                  <a:pt x="2553988" y="1533099"/>
+                  <a:pt x="2681485" y="1527108"/>
+                  <a:pt x="2809994" y="1522315"/>
+                </a:cubicBezTo>
+                <a:cubicBezTo>
+                  <a:pt x="2858058" y="1520518"/>
+                  <a:pt x="2905933" y="1517372"/>
+                  <a:pt x="2953618" y="1512448"/>
+                </a:cubicBezTo>
+                <a:lnTo>
+                  <a:pt x="3021543" y="1502657"/>
+                </a:lnTo>
+                <a:close/>
+              </a:path>
+            </a:pathLst>
+          </a:custGeom>
+          <a:solidFill>
+            <a:schemeClr val="bg2">
+              <a:alpha val="50000"/>
+            </a:schemeClr>
+          </a:solidFill>
+          <a:ln w="32707" cap="flat">
+            <a:noFill/>
+            <a:prstDash val="solid"/>
+            <a:miter/>
+          </a:ln>
+        </p:spPr>
+        <p:txBody>
+          <a:bodyPr rtlCol="0" anchor="ctr"/>
+          <a:lstStyle/>
+          <a:p>
+            <a:pPr marL="0" marR="0" lvl="0" indent="0" algn="l" defTabSz="914400" rtl="0" eaLnBrk="1" fontAlgn="auto" latinLnBrk="0" hangingPunct="1">
+              <a:lnSpc>
+                <a:spcPct val="100000"/>
+              </a:lnSpc>
+              <a:spcBef>
+                <a:spcPts val="0"/>
+              </a:spcBef>
+              <a:spcAft>
+                <a:spcPts val="0"/>
+              </a:spcAft>
+              <a:buClrTx/>
+              <a:buSzTx/>
+              <a:buFontTx/>
+              <a:buNone/>
+              <a:tabLst/>
+              <a:defRPr/>
+            </a:pPr>
+            <a:endParaRPr kumimoji="0" lang="en-US" sz="1800" b="0" i="0" u="none" strike="noStrike" kern="1200" cap="none" spc="0" normalizeH="0" baseline="0" noProof="0" dirty="0">
+              <a:ln>
+                <a:noFill/>
+              </a:ln>
+              <a:solidFill>
+                <a:prstClr val="black"/>
+              </a:solidFill>
+              <a:effectLst/>
+              <a:uLnTx/>
+              <a:uFillTx/>
+              <a:latin typeface="Calibri" panose="020F0502020204030204"/>
+              <a:ea typeface="+mn-ea"/>
+              <a:cs typeface="+mn-cs"/>
+            </a:endParaRPr>
+          </a:p>
+        </p:txBody>
+      </p:sp>
+      <p:sp>
+        <p:nvSpPr>
+          <p:cNvPr id="2" name="Title 1">
+            <a:extLst>
+              <a:ext uri="{FF2B5EF4-FFF2-40B4-BE49-F238E27FC236}">
+                <a16:creationId xmlns:a16="http://schemas.microsoft.com/office/drawing/2014/main" id="{91015A16-2CB8-4252-A3E5-4F77C3FCEB7C}"/>
+              </a:ext>
+            </a:extLst>
+          </p:cNvPr>
+          <p:cNvSpPr>
+            <a:spLocks noGrp="1"/>
+          </p:cNvSpPr>
+          <p:nvPr>
+            <p:ph type="title"/>
+          </p:nvPr>
+        </p:nvSpPr>
+        <p:spPr>
+          <a:xfrm>
+            <a:off x="838200" y="838199"/>
+            <a:ext cx="4191000" cy="5338763"/>
+          </a:xfrm>
+        </p:spPr>
+        <p:txBody>
+          <a:bodyPr>
+            <a:normAutofit/>
+          </a:bodyPr>
+          <a:lstStyle/>
+          <a:p>
+            <a:r>
+              <a:rPr lang="en-US" dirty="0"/>
+              <a:t>Moving forward</a:t>
+            </a:r>
+          </a:p>
+        </p:txBody>
+      </p:sp>
+      <p:sp>
+        <p:nvSpPr>
+          <p:cNvPr id="3" name="Content Placeholder 2">
+            <a:extLst>
+              <a:ext uri="{FF2B5EF4-FFF2-40B4-BE49-F238E27FC236}">
+                <a16:creationId xmlns:a16="http://schemas.microsoft.com/office/drawing/2014/main" id="{AC32B040-A28A-7B85-472A-BF8098601F28}"/>
+              </a:ext>
+            </a:extLst>
+          </p:cNvPr>
+          <p:cNvSpPr>
+            <a:spLocks noGrp="1"/>
+          </p:cNvSpPr>
+          <p:nvPr>
+            <p:ph idx="1"/>
+          </p:nvPr>
+        </p:nvSpPr>
+        <p:spPr>
+          <a:xfrm>
+            <a:off x="5302332" y="838199"/>
+            <a:ext cx="6051468" cy="5338763"/>
+          </a:xfrm>
+        </p:spPr>
+        <p:txBody>
+          <a:bodyPr anchor="ctr">
+            <a:normAutofit/>
+          </a:bodyPr>
+          <a:lstStyle/>
+          <a:p>
+            <a:r>
+              <a:rPr lang="en-US" sz="2000" dirty="0"/>
+              <a:t>I would like to take a deeper dive and see the correlation between social media and mental health during COVID-19 specifically looking at college students vs non college students</a:t>
+            </a:r>
+          </a:p>
+        </p:txBody>
+      </p:sp>
+    </p:spTree>
+    <p:extLst>
+      <p:ext uri="{BB962C8B-B14F-4D97-AF65-F5344CB8AC3E}">
+        <p14:creationId xmlns:p14="http://schemas.microsoft.com/office/powerpoint/2010/main" val="2038403954"/>
+      </p:ext>
+    </p:extLst>
+  </p:cSld>
+  <p:clrMapOvr>
+    <a:masterClrMapping/>
+  </p:clrMapOvr>
+</p:sld>
+</file>
+
+<file path=ppt/slides/slide11.xml><?xml version="1.0" encoding="utf-8"?>
+<p:sld xmlns:a="http://schemas.openxmlformats.org/drawingml/2006/main" xmlns:r="http://schemas.openxmlformats.org/officeDocument/2006/relationships" xmlns:p="http://schemas.openxmlformats.org/presentationml/2006/main">
+  <p:cSld>
+    <p:bg>
+      <p:bgPr>
+        <a:solidFill>
+          <a:schemeClr val="accent3">
+            <a:lumMod val="75000"/>
+          </a:schemeClr>
+        </a:solidFill>
+        <a:effectLst/>
+      </p:bgPr>
+    </p:bg>
+    <p:spTree>
+      <p:nvGrpSpPr>
+        <p:cNvPr id="1" name=""/>
+        <p:cNvGrpSpPr/>
+        <p:nvPr/>
+      </p:nvGrpSpPr>
+      <p:grpSpPr>
+        <a:xfrm>
+          <a:off x="0" y="0"/>
+          <a:ext cx="0" cy="0"/>
+          <a:chOff x="0" y="0"/>
+          <a:chExt cx="0" cy="0"/>
+        </a:xfrm>
+      </p:grpSpPr>
+      <p:sp>
+        <p:nvSpPr>
+          <p:cNvPr id="7" name="Rectangle 6">
+            <a:extLst>
+              <a:ext uri="{FF2B5EF4-FFF2-40B4-BE49-F238E27FC236}">
+                <a16:creationId xmlns:a16="http://schemas.microsoft.com/office/drawing/2014/main" id="{DA3C47C2-33A2-44B2-BEAB-FEB679075C24}"/>
+              </a:ext>
+              <a:ext uri="{C183D7F6-B498-43B3-948B-1728B52AA6E4}">
+                <adec:decorative xmlns:adec="http://schemas.microsoft.com/office/drawing/2017/decorative" val="1"/>
+              </a:ext>
+            </a:extLst>
+          </p:cNvPr>
+          <p:cNvSpPr>
+            <a:spLocks noGrp="1" noRot="1" noChangeAspect="1" noMove="1" noResize="1" noEditPoints="1" noAdjustHandles="1" noChangeArrowheads="1" noChangeShapeType="1" noTextEdit="1"/>
+          </p:cNvSpPr>
+          <p:nvPr>
+            <p:extLst>
+              <p:ext uri="{386F3935-93C4-4BCD-93E2-E3B085C9AB24}">
+                <p16:designElem xmlns:p16="http://schemas.microsoft.com/office/powerpoint/2015/main" val="1"/>
+              </p:ext>
+            </p:extLst>
+          </p:nvPr>
+        </p:nvSpPr>
+        <p:spPr>
+          <a:xfrm flipV="1">
+            <a:off x="0" y="-3324"/>
+            <a:ext cx="12192000" cy="6861324"/>
+          </a:xfrm>
+          <a:prstGeom prst="rect">
+            <a:avLst/>
+          </a:prstGeom>
+          <a:solidFill>
+            <a:srgbClr val="7F7F7F"/>
+          </a:solidFill>
+          <a:ln>
+            <a:noFill/>
+          </a:ln>
+        </p:spPr>
+        <p:style>
+          <a:lnRef idx="2">
+            <a:schemeClr val="accent1">
+              <a:shade val="50000"/>
+            </a:schemeClr>
+          </a:lnRef>
+          <a:fillRef idx="1">
+            <a:schemeClr val="accent1"/>
+          </a:fillRef>
+          <a:effectRef idx="0">
+            <a:schemeClr val="accent1"/>
+          </a:effectRef>
+          <a:fontRef idx="minor">
+            <a:schemeClr val="lt1"/>
+          </a:fontRef>
+        </p:style>
+        <p:txBody>
+          <a:bodyPr rtlCol="0" anchor="ctr"/>
+          <a:lstStyle/>
+          <a:p>
+            <a:pPr marL="0" marR="0" lvl="0" indent="0" algn="ctr" defTabSz="914400" rtl="0" eaLnBrk="1" fontAlgn="auto" latinLnBrk="0" hangingPunct="1">
+              <a:lnSpc>
+                <a:spcPct val="100000"/>
+              </a:lnSpc>
+              <a:spcBef>
+                <a:spcPts val="0"/>
+              </a:spcBef>
+              <a:spcAft>
+                <a:spcPts val="0"/>
+              </a:spcAft>
+              <a:buClrTx/>
+              <a:buSzTx/>
+              <a:buFontTx/>
+              <a:buNone/>
+              <a:tabLst/>
+              <a:defRPr/>
+            </a:pPr>
+            <a:endParaRPr kumimoji="0" lang="en-US" sz="1800" b="0" i="0" u="none" strike="noStrike" kern="1200" cap="none" spc="0" normalizeH="0" baseline="0" noProof="0">
+              <a:ln>
+                <a:noFill/>
+              </a:ln>
+              <a:solidFill>
+                <a:prstClr val="white"/>
+              </a:solidFill>
+              <a:effectLst/>
+              <a:uLnTx/>
+              <a:uFillTx/>
+              <a:latin typeface="Calibri" panose="020F0502020204030204"/>
+              <a:ea typeface="+mn-ea"/>
+              <a:cs typeface="+mn-cs"/>
+            </a:endParaRPr>
+          </a:p>
+        </p:txBody>
+      </p:sp>
+      <p:sp>
+        <p:nvSpPr>
+          <p:cNvPr id="9" name="Freeform 3">
+            <a:extLst>
+              <a:ext uri="{FF2B5EF4-FFF2-40B4-BE49-F238E27FC236}">
+                <a16:creationId xmlns:a16="http://schemas.microsoft.com/office/drawing/2014/main" id="{AD182BA8-54AD-4D9F-8264-B0FA8BB47D7C}"/>
+              </a:ext>
+              <a:ext uri="{C183D7F6-B498-43B3-948B-1728B52AA6E4}">
+                <adec:decorative xmlns:adec="http://schemas.microsoft.com/office/drawing/2017/decorative" val="1"/>
+              </a:ext>
+            </a:extLst>
+          </p:cNvPr>
+          <p:cNvSpPr>
+            <a:spLocks noGrp="1" noRot="1" noChangeAspect="1" noMove="1" noResize="1" noEditPoints="1" noAdjustHandles="1" noChangeArrowheads="1" noChangeShapeType="1" noTextEdit="1"/>
+          </p:cNvSpPr>
+          <p:nvPr>
+            <p:extLst>
+              <p:ext uri="{386F3935-93C4-4BCD-93E2-E3B085C9AB24}">
+                <p16:designElem xmlns:p16="http://schemas.microsoft.com/office/powerpoint/2015/main" val="1"/>
+              </p:ext>
+            </p:extLst>
+          </p:nvPr>
+        </p:nvSpPr>
+        <p:spPr>
+          <a:xfrm flipV="1">
+            <a:off x="1246925" y="-479"/>
+            <a:ext cx="9468701" cy="6858478"/>
+          </a:xfrm>
+          <a:custGeom>
+            <a:avLst/>
+            <a:gdLst>
+              <a:gd name="connsiteX0" fmla="*/ 0 w 8078051"/>
+              <a:gd name="connsiteY0" fmla="*/ 0 h 5829300"/>
+              <a:gd name="connsiteX1" fmla="*/ 4453793 w 8078051"/>
+              <a:gd name="connsiteY1" fmla="*/ 0 h 5829300"/>
+              <a:gd name="connsiteX2" fmla="*/ 5363426 w 8078051"/>
+              <a:gd name="connsiteY2" fmla="*/ 0 h 5829300"/>
+              <a:gd name="connsiteX3" fmla="*/ 5368184 w 8078051"/>
+              <a:gd name="connsiteY3" fmla="*/ 0 h 5829300"/>
+              <a:gd name="connsiteX4" fmla="*/ 8078051 w 8078051"/>
+              <a:gd name="connsiteY4" fmla="*/ 5829300 h 5829300"/>
+              <a:gd name="connsiteX5" fmla="*/ 1743926 w 8078051"/>
+              <a:gd name="connsiteY5" fmla="*/ 5829300 h 5829300"/>
+              <a:gd name="connsiteX6" fmla="*/ 1744148 w 8078051"/>
+              <a:gd name="connsiteY6" fmla="*/ 5828822 h 5829300"/>
+              <a:gd name="connsiteX7" fmla="*/ 0 w 8078051"/>
+              <a:gd name="connsiteY7" fmla="*/ 5828822 h 5829300"/>
+            </a:gdLst>
+            <a:ahLst/>
+            <a:cxnLst>
+              <a:cxn ang="0">
+                <a:pos x="connsiteX0" y="connsiteY0"/>
+              </a:cxn>
+              <a:cxn ang="0">
+                <a:pos x="connsiteX1" y="connsiteY1"/>
+              </a:cxn>
+              <a:cxn ang="0">
+                <a:pos x="connsiteX2" y="connsiteY2"/>
+              </a:cxn>
+              <a:cxn ang="0">
+                <a:pos x="connsiteX3" y="connsiteY3"/>
+              </a:cxn>
+              <a:cxn ang="0">
+                <a:pos x="connsiteX4" y="connsiteY4"/>
+              </a:cxn>
+              <a:cxn ang="0">
+                <a:pos x="connsiteX5" y="connsiteY5"/>
+              </a:cxn>
+              <a:cxn ang="0">
+                <a:pos x="connsiteX6" y="connsiteY6"/>
+              </a:cxn>
+              <a:cxn ang="0">
+                <a:pos x="connsiteX7" y="connsiteY7"/>
+              </a:cxn>
+            </a:cxnLst>
+            <a:rect l="l" t="t" r="r" b="b"/>
+            <a:pathLst>
+              <a:path w="8078051" h="5829300">
+                <a:moveTo>
+                  <a:pt x="0" y="0"/>
+                </a:moveTo>
+                <a:lnTo>
+                  <a:pt x="4453793" y="0"/>
+                </a:lnTo>
+                <a:lnTo>
+                  <a:pt x="5363426" y="0"/>
+                </a:lnTo>
+                <a:lnTo>
+                  <a:pt x="5368184" y="0"/>
+                </a:lnTo>
+                <a:lnTo>
+                  <a:pt x="8078051" y="5829300"/>
+                </a:lnTo>
+                <a:lnTo>
+                  <a:pt x="1743926" y="5829300"/>
+                </a:lnTo>
+                <a:lnTo>
+                  <a:pt x="1744148" y="5828822"/>
+                </a:lnTo>
+                <a:lnTo>
+                  <a:pt x="0" y="5828822"/>
+                </a:lnTo>
+                <a:close/>
+              </a:path>
+            </a:pathLst>
+          </a:custGeom>
+          <a:solidFill>
+            <a:schemeClr val="bg1">
+              <a:lumMod val="85000"/>
+              <a:lumOff val="15000"/>
+              <a:alpha val="70000"/>
+            </a:schemeClr>
+          </a:solidFill>
+          <a:ln>
+            <a:noFill/>
+          </a:ln>
+        </p:spPr>
+        <p:style>
+          <a:lnRef idx="2">
+            <a:schemeClr val="accent1">
+              <a:shade val="50000"/>
+            </a:schemeClr>
+          </a:lnRef>
+          <a:fillRef idx="1">
+            <a:schemeClr val="accent1"/>
+          </a:fillRef>
+          <a:effectRef idx="0">
+            <a:schemeClr val="accent1"/>
+          </a:effectRef>
+          <a:fontRef idx="minor">
+            <a:schemeClr val="lt1"/>
+          </a:fontRef>
+        </p:style>
+        <p:txBody>
+          <a:bodyPr rtlCol="0" anchor="ctr"/>
+          <a:lstStyle/>
+          <a:p>
+            <a:pPr marL="0" marR="0" lvl="0" indent="0" algn="ctr" defTabSz="914400" rtl="0" eaLnBrk="1" fontAlgn="auto" latinLnBrk="0" hangingPunct="1">
+              <a:lnSpc>
+                <a:spcPct val="100000"/>
+              </a:lnSpc>
+              <a:spcBef>
+                <a:spcPts val="0"/>
+              </a:spcBef>
+              <a:spcAft>
+                <a:spcPts val="0"/>
+              </a:spcAft>
+              <a:buClrTx/>
+              <a:buSzTx/>
+              <a:buFontTx/>
+              <a:buNone/>
+              <a:tabLst/>
+              <a:defRPr/>
+            </a:pPr>
+            <a:endParaRPr kumimoji="0" lang="en-US" sz="1800" b="0" i="0" u="none" strike="noStrike" kern="1200" cap="none" spc="0" normalizeH="0" baseline="0" noProof="0">
+              <a:ln>
+                <a:noFill/>
+              </a:ln>
+              <a:solidFill>
+                <a:prstClr val="white"/>
+              </a:solidFill>
+              <a:effectLst/>
+              <a:uLnTx/>
+              <a:uFillTx/>
+              <a:latin typeface="Calibri" panose="020F0502020204030204"/>
+              <a:ea typeface="+mn-ea"/>
+              <a:cs typeface="+mn-cs"/>
+            </a:endParaRPr>
+          </a:p>
+        </p:txBody>
+      </p:sp>
+      <p:sp>
+        <p:nvSpPr>
+          <p:cNvPr id="11" name="Freeform 16">
+            <a:extLst>
+              <a:ext uri="{FF2B5EF4-FFF2-40B4-BE49-F238E27FC236}">
+                <a16:creationId xmlns:a16="http://schemas.microsoft.com/office/drawing/2014/main" id="{4ED83379-0499-45E1-AB78-6AA230F96442}"/>
+              </a:ext>
+              <a:ext uri="{C183D7F6-B498-43B3-948B-1728B52AA6E4}">
+                <adec:decorative xmlns:adec="http://schemas.microsoft.com/office/drawing/2017/decorative" val="1"/>
+              </a:ext>
+            </a:extLst>
+          </p:cNvPr>
+          <p:cNvSpPr>
+            <a:spLocks noGrp="1" noRot="1" noChangeAspect="1" noMove="1" noResize="1" noEditPoints="1" noAdjustHandles="1" noChangeArrowheads="1" noChangeShapeType="1" noTextEdit="1"/>
+          </p:cNvSpPr>
+          <p:nvPr>
+            <p:extLst>
+              <p:ext uri="{386F3935-93C4-4BCD-93E2-E3B085C9AB24}">
+                <p16:designElem xmlns:p16="http://schemas.microsoft.com/office/powerpoint/2015/main" val="1"/>
+              </p:ext>
+            </p:extLst>
+          </p:nvPr>
+        </p:nvSpPr>
+        <p:spPr>
+          <a:xfrm flipV="1">
+            <a:off x="-1" y="-479"/>
+            <a:ext cx="9324977" cy="6858479"/>
+          </a:xfrm>
+          <a:custGeom>
+            <a:avLst/>
+            <a:gdLst>
+              <a:gd name="connsiteX0" fmla="*/ 1246925 w 9324977"/>
+              <a:gd name="connsiteY0" fmla="*/ 0 h 6858479"/>
+              <a:gd name="connsiteX1" fmla="*/ 5076797 w 9324977"/>
+              <a:gd name="connsiteY1" fmla="*/ 0 h 6858479"/>
+              <a:gd name="connsiteX2" fmla="*/ 6143025 w 9324977"/>
+              <a:gd name="connsiteY2" fmla="*/ 0 h 6858479"/>
+              <a:gd name="connsiteX3" fmla="*/ 6148602 w 9324977"/>
+              <a:gd name="connsiteY3" fmla="*/ 0 h 6858479"/>
+              <a:gd name="connsiteX4" fmla="*/ 9324977 w 9324977"/>
+              <a:gd name="connsiteY4" fmla="*/ 6858478 h 6858479"/>
+              <a:gd name="connsiteX5" fmla="*/ 3359025 w 9324977"/>
+              <a:gd name="connsiteY5" fmla="*/ 6858478 h 6858479"/>
+              <a:gd name="connsiteX6" fmla="*/ 3359025 w 9324977"/>
+              <a:gd name="connsiteY6" fmla="*/ 6858479 h 6858479"/>
+              <a:gd name="connsiteX7" fmla="*/ 0 w 9324977"/>
+              <a:gd name="connsiteY7" fmla="*/ 6858479 h 6858479"/>
+              <a:gd name="connsiteX8" fmla="*/ 0 w 9324977"/>
+              <a:gd name="connsiteY8" fmla="*/ 479 h 6858479"/>
+              <a:gd name="connsiteX9" fmla="*/ 1246925 w 9324977"/>
+              <a:gd name="connsiteY9" fmla="*/ 479 h 6858479"/>
+            </a:gdLst>
+            <a:ahLst/>
+            <a:cxnLst>
+              <a:cxn ang="0">
+                <a:pos x="connsiteX0" y="connsiteY0"/>
+              </a:cxn>
+              <a:cxn ang="0">
+                <a:pos x="connsiteX1" y="connsiteY1"/>
+              </a:cxn>
+              <a:cxn ang="0">
+                <a:pos x="connsiteX2" y="connsiteY2"/>
+              </a:cxn>
+              <a:cxn ang="0">
+                <a:pos x="connsiteX3" y="connsiteY3"/>
+              </a:cxn>
+              <a:cxn ang="0">
+                <a:pos x="connsiteX4" y="connsiteY4"/>
+              </a:cxn>
+              <a:cxn ang="0">
+                <a:pos x="connsiteX5" y="connsiteY5"/>
+              </a:cxn>
+              <a:cxn ang="0">
+                <a:pos x="connsiteX6" y="connsiteY6"/>
+              </a:cxn>
+              <a:cxn ang="0">
+                <a:pos x="connsiteX7" y="connsiteY7"/>
+              </a:cxn>
+              <a:cxn ang="0">
+                <a:pos x="connsiteX8" y="connsiteY8"/>
+              </a:cxn>
+              <a:cxn ang="0">
+                <a:pos x="connsiteX9" y="connsiteY9"/>
+              </a:cxn>
+            </a:cxnLst>
+            <a:rect l="l" t="t" r="r" b="b"/>
+            <a:pathLst>
+              <a:path w="9324977" h="6858479">
+                <a:moveTo>
+                  <a:pt x="1246925" y="0"/>
+                </a:moveTo>
+                <a:lnTo>
+                  <a:pt x="5076797" y="0"/>
+                </a:lnTo>
+                <a:lnTo>
+                  <a:pt x="6143025" y="0"/>
+                </a:lnTo>
+                <a:lnTo>
+                  <a:pt x="6148602" y="0"/>
+                </a:lnTo>
+                <a:lnTo>
+                  <a:pt x="9324977" y="6858478"/>
+                </a:lnTo>
+                <a:lnTo>
+                  <a:pt x="3359025" y="6858478"/>
+                </a:lnTo>
+                <a:lnTo>
+                  <a:pt x="3359025" y="6858479"/>
+                </a:lnTo>
+                <a:lnTo>
+                  <a:pt x="0" y="6858479"/>
+                </a:lnTo>
+                <a:lnTo>
+                  <a:pt x="0" y="479"/>
+                </a:lnTo>
+                <a:lnTo>
+                  <a:pt x="1246925" y="479"/>
+                </a:lnTo>
+                <a:close/>
+              </a:path>
+            </a:pathLst>
+          </a:custGeom>
+          <a:solidFill>
+            <a:schemeClr val="bg1">
+              <a:lumMod val="85000"/>
+              <a:lumOff val="15000"/>
+            </a:schemeClr>
+          </a:solidFill>
+          <a:ln>
+            <a:noFill/>
+          </a:ln>
+        </p:spPr>
+        <p:style>
+          <a:lnRef idx="2">
+            <a:schemeClr val="accent1">
+              <a:shade val="50000"/>
+            </a:schemeClr>
+          </a:lnRef>
+          <a:fillRef idx="1">
+            <a:schemeClr val="accent1"/>
+          </a:fillRef>
+          <a:effectRef idx="0">
+            <a:schemeClr val="accent1"/>
+          </a:effectRef>
+          <a:fontRef idx="minor">
+            <a:schemeClr val="lt1"/>
+          </a:fontRef>
+        </p:style>
+        <p:txBody>
+          <a:bodyPr rtlCol="0" anchor="ctr"/>
+          <a:lstStyle/>
+          <a:p>
+            <a:pPr marL="0" marR="0" lvl="0" indent="0" algn="ctr" defTabSz="914400" rtl="0" eaLnBrk="1" fontAlgn="auto" latinLnBrk="0" hangingPunct="1">
+              <a:lnSpc>
+                <a:spcPct val="100000"/>
+              </a:lnSpc>
+              <a:spcBef>
+                <a:spcPts val="0"/>
+              </a:spcBef>
+              <a:spcAft>
+                <a:spcPts val="0"/>
+              </a:spcAft>
+              <a:buClrTx/>
+              <a:buSzTx/>
+              <a:buFontTx/>
+              <a:buNone/>
+              <a:tabLst/>
+              <a:defRPr/>
+            </a:pPr>
+            <a:endParaRPr kumimoji="0" lang="en-US" sz="1800" b="0" i="0" u="none" strike="noStrike" kern="1200" cap="none" spc="0" normalizeH="0" baseline="0" noProof="0">
+              <a:ln>
+                <a:noFill/>
+              </a:ln>
+              <a:solidFill>
+                <a:prstClr val="white"/>
+              </a:solidFill>
+              <a:effectLst/>
+              <a:uLnTx/>
+              <a:uFillTx/>
+              <a:latin typeface="Calibri" panose="020F0502020204030204"/>
+              <a:ea typeface="+mn-ea"/>
+              <a:cs typeface="+mn-cs"/>
+            </a:endParaRPr>
+          </a:p>
+        </p:txBody>
+      </p:sp>
+      <p:sp>
+        <p:nvSpPr>
+          <p:cNvPr id="2" name="Title 1">
+            <a:extLst>
+              <a:ext uri="{FF2B5EF4-FFF2-40B4-BE49-F238E27FC236}">
+                <a16:creationId xmlns:a16="http://schemas.microsoft.com/office/drawing/2014/main" id="{8DD2F82F-2D4B-EF17-878D-9E7DA4B74273}"/>
+              </a:ext>
+            </a:extLst>
+          </p:cNvPr>
+          <p:cNvSpPr>
+            <a:spLocks noGrp="1"/>
+          </p:cNvSpPr>
+          <p:nvPr>
+            <p:ph type="ctrTitle"/>
+          </p:nvPr>
+        </p:nvSpPr>
+        <p:spPr>
+          <a:xfrm>
+            <a:off x="804672" y="962246"/>
+            <a:ext cx="6437700" cy="2611967"/>
+          </a:xfrm>
+        </p:spPr>
+        <p:txBody>
+          <a:bodyPr anchor="b">
+            <a:normAutofit/>
+          </a:bodyPr>
+          <a:lstStyle/>
+          <a:p>
+            <a:pPr algn="l"/>
+            <a:r>
+              <a:rPr lang="en-US" sz="5400" dirty="0"/>
+              <a:t>Thank you</a:t>
+            </a:r>
+          </a:p>
+        </p:txBody>
+      </p:sp>
+    </p:spTree>
+    <p:extLst>
+      <p:ext uri="{BB962C8B-B14F-4D97-AF65-F5344CB8AC3E}">
+        <p14:creationId xmlns:p14="http://schemas.microsoft.com/office/powerpoint/2010/main" val="988548822"/>
       </p:ext>
     </p:extLst>
   </p:cSld>
@@ -11627,6 +13078,1212 @@
     <p:extLst>
       <p:ext uri="{BB962C8B-B14F-4D97-AF65-F5344CB8AC3E}">
         <p14:creationId xmlns:p14="http://schemas.microsoft.com/office/powerpoint/2010/main" val="1996314066"/>
+      </p:ext>
+    </p:extLst>
+  </p:cSld>
+  <p:clrMapOvr>
+    <a:masterClrMapping/>
+  </p:clrMapOvr>
+</p:sld>
+</file>
+
+<file path=ppt/slides/slide9.xml><?xml version="1.0" encoding="utf-8"?>
+<p:sld xmlns:a="http://schemas.openxmlformats.org/drawingml/2006/main" xmlns:r="http://schemas.openxmlformats.org/officeDocument/2006/relationships" xmlns:p="http://schemas.openxmlformats.org/presentationml/2006/main">
+  <p:cSld>
+    <p:bg>
+      <p:bgPr>
+        <a:solidFill>
+          <a:schemeClr val="bg1"/>
+        </a:solidFill>
+        <a:effectLst/>
+      </p:bgPr>
+    </p:bg>
+    <p:spTree>
+      <p:nvGrpSpPr>
+        <p:cNvPr id="1" name=""/>
+        <p:cNvGrpSpPr/>
+        <p:nvPr/>
+      </p:nvGrpSpPr>
+      <p:grpSpPr>
+        <a:xfrm>
+          <a:off x="0" y="0"/>
+          <a:ext cx="0" cy="0"/>
+          <a:chOff x="0" y="0"/>
+          <a:chExt cx="0" cy="0"/>
+        </a:xfrm>
+      </p:grpSpPr>
+      <p:sp useBgFill="1">
+        <p:nvSpPr>
+          <p:cNvPr id="15" name="Rectangle 14">
+            <a:extLst>
+              <a:ext uri="{FF2B5EF4-FFF2-40B4-BE49-F238E27FC236}">
+                <a16:creationId xmlns:a16="http://schemas.microsoft.com/office/drawing/2014/main" id="{17718681-A12E-49D6-9925-DD7C68176D61}"/>
+              </a:ext>
+              <a:ext uri="{C183D7F6-B498-43B3-948B-1728B52AA6E4}">
+                <adec:decorative xmlns:adec="http://schemas.microsoft.com/office/drawing/2017/decorative" val="1"/>
+              </a:ext>
+            </a:extLst>
+          </p:cNvPr>
+          <p:cNvSpPr>
+            <a:spLocks noGrp="1" noRot="1" noChangeAspect="1" noMove="1" noResize="1" noEditPoints="1" noAdjustHandles="1" noChangeArrowheads="1" noChangeShapeType="1" noTextEdit="1"/>
+          </p:cNvSpPr>
+          <p:nvPr>
+            <p:extLst>
+              <p:ext uri="{386F3935-93C4-4BCD-93E2-E3B085C9AB24}">
+                <p16:designElem xmlns:p16="http://schemas.microsoft.com/office/powerpoint/2015/main" val="1"/>
+              </p:ext>
+            </p:extLst>
+          </p:nvPr>
+        </p:nvSpPr>
+        <p:spPr>
+          <a:xfrm>
+            <a:off x="0" y="0"/>
+            <a:ext cx="12188952" cy="6858000"/>
+          </a:xfrm>
+          <a:prstGeom prst="rect">
+            <a:avLst/>
+          </a:prstGeom>
+          <a:ln>
+            <a:noFill/>
+          </a:ln>
+        </p:spPr>
+        <p:style>
+          <a:lnRef idx="2">
+            <a:schemeClr val="accent1">
+              <a:shade val="50000"/>
+            </a:schemeClr>
+          </a:lnRef>
+          <a:fillRef idx="1">
+            <a:schemeClr val="accent1"/>
+          </a:fillRef>
+          <a:effectRef idx="0">
+            <a:schemeClr val="accent1"/>
+          </a:effectRef>
+          <a:fontRef idx="minor">
+            <a:schemeClr val="lt1"/>
+          </a:fontRef>
+        </p:style>
+        <p:txBody>
+          <a:bodyPr rtlCol="0" anchor="ctr"/>
+          <a:lstStyle/>
+          <a:p>
+            <a:pPr marL="0" marR="0" lvl="0" indent="0" algn="ctr" defTabSz="914400" rtl="0" eaLnBrk="1" fontAlgn="auto" latinLnBrk="0" hangingPunct="1">
+              <a:lnSpc>
+                <a:spcPct val="100000"/>
+              </a:lnSpc>
+              <a:spcBef>
+                <a:spcPts val="0"/>
+              </a:spcBef>
+              <a:spcAft>
+                <a:spcPts val="0"/>
+              </a:spcAft>
+              <a:buClrTx/>
+              <a:buSzTx/>
+              <a:buFontTx/>
+              <a:buNone/>
+              <a:tabLst/>
+              <a:defRPr/>
+            </a:pPr>
+            <a:endParaRPr kumimoji="0" lang="en-US" sz="1800" b="0" i="0" u="none" strike="noStrike" kern="1200" cap="none" spc="0" normalizeH="0" baseline="0" noProof="0">
+              <a:ln>
+                <a:noFill/>
+              </a:ln>
+              <a:solidFill>
+                <a:prstClr val="white"/>
+              </a:solidFill>
+              <a:effectLst/>
+              <a:uLnTx/>
+              <a:uFillTx/>
+              <a:latin typeface="Calibri" panose="020F0502020204030204"/>
+              <a:ea typeface="+mn-ea"/>
+              <a:cs typeface="+mn-cs"/>
+            </a:endParaRPr>
+          </a:p>
+        </p:txBody>
+      </p:sp>
+      <p:sp>
+        <p:nvSpPr>
+          <p:cNvPr id="17" name="Freeform: Shape 16">
+            <a:extLst>
+              <a:ext uri="{FF2B5EF4-FFF2-40B4-BE49-F238E27FC236}">
+                <a16:creationId xmlns:a16="http://schemas.microsoft.com/office/drawing/2014/main" id="{FBD77573-9EF2-4C35-8285-A1CF6FBB0EA5}"/>
+              </a:ext>
+              <a:ext uri="{C183D7F6-B498-43B3-948B-1728B52AA6E4}">
+                <adec:decorative xmlns:adec="http://schemas.microsoft.com/office/drawing/2017/decorative" val="1"/>
+              </a:ext>
+            </a:extLst>
+          </p:cNvPr>
+          <p:cNvSpPr>
+            <a:spLocks noGrp="1" noRot="1" noChangeAspect="1" noMove="1" noResize="1" noEditPoints="1" noAdjustHandles="1" noChangeArrowheads="1" noChangeShapeType="1" noTextEdit="1"/>
+          </p:cNvSpPr>
+          <p:nvPr>
+            <p:extLst>
+              <p:ext uri="{386F3935-93C4-4BCD-93E2-E3B085C9AB24}">
+                <p16:designElem xmlns:p16="http://schemas.microsoft.com/office/powerpoint/2015/main" val="1"/>
+              </p:ext>
+            </p:extLst>
+          </p:nvPr>
+        </p:nvSpPr>
+        <p:spPr>
+          <a:xfrm flipH="1">
+            <a:off x="1" y="0"/>
+            <a:ext cx="5511704" cy="6858000"/>
+          </a:xfrm>
+          <a:custGeom>
+            <a:avLst/>
+            <a:gdLst>
+              <a:gd name="connsiteX0" fmla="*/ 5511704 w 5511704"/>
+              <a:gd name="connsiteY0" fmla="*/ 0 h 6886576"/>
+              <a:gd name="connsiteX1" fmla="*/ 1008599 w 5511704"/>
+              <a:gd name="connsiteY1" fmla="*/ 0 h 6886576"/>
+              <a:gd name="connsiteX2" fmla="*/ 1310975 w 5511704"/>
+              <a:gd name="connsiteY2" fmla="*/ 110728 h 6886576"/>
+              <a:gd name="connsiteX3" fmla="*/ 1267362 w 5511704"/>
+              <a:gd name="connsiteY3" fmla="*/ 135731 h 6886576"/>
+              <a:gd name="connsiteX4" fmla="*/ 1005692 w 5511704"/>
+              <a:gd name="connsiteY4" fmla="*/ 71437 h 6886576"/>
+              <a:gd name="connsiteX5" fmla="*/ 953358 w 5511704"/>
+              <a:gd name="connsiteY5" fmla="*/ 89297 h 6886576"/>
+              <a:gd name="connsiteX6" fmla="*/ 979525 w 5511704"/>
+              <a:gd name="connsiteY6" fmla="*/ 164307 h 6886576"/>
+              <a:gd name="connsiteX7" fmla="*/ 1092915 w 5511704"/>
+              <a:gd name="connsiteY7" fmla="*/ 192882 h 6886576"/>
+              <a:gd name="connsiteX8" fmla="*/ 1270270 w 5511704"/>
+              <a:gd name="connsiteY8" fmla="*/ 375047 h 6886576"/>
+              <a:gd name="connsiteX9" fmla="*/ 1002784 w 5511704"/>
+              <a:gd name="connsiteY9" fmla="*/ 353615 h 6886576"/>
+              <a:gd name="connsiteX10" fmla="*/ 956265 w 5511704"/>
+              <a:gd name="connsiteY10" fmla="*/ 396479 h 6886576"/>
+              <a:gd name="connsiteX11" fmla="*/ 938820 w 5511704"/>
+              <a:gd name="connsiteY11" fmla="*/ 453629 h 6886576"/>
+              <a:gd name="connsiteX12" fmla="*/ 860319 w 5511704"/>
+              <a:gd name="connsiteY12" fmla="*/ 360759 h 6886576"/>
+              <a:gd name="connsiteX13" fmla="*/ 793447 w 5511704"/>
+              <a:gd name="connsiteY13" fmla="*/ 335757 h 6886576"/>
+              <a:gd name="connsiteX14" fmla="*/ 773095 w 5511704"/>
+              <a:gd name="connsiteY14" fmla="*/ 417910 h 6886576"/>
+              <a:gd name="connsiteX15" fmla="*/ 834151 w 5511704"/>
+              <a:gd name="connsiteY15" fmla="*/ 507206 h 6886576"/>
+              <a:gd name="connsiteX16" fmla="*/ 996969 w 5511704"/>
+              <a:gd name="connsiteY16" fmla="*/ 560785 h 6886576"/>
+              <a:gd name="connsiteX17" fmla="*/ 822522 w 5511704"/>
+              <a:gd name="connsiteY17" fmla="*/ 560785 h 6886576"/>
+              <a:gd name="connsiteX18" fmla="*/ 621908 w 5511704"/>
+              <a:gd name="connsiteY18" fmla="*/ 525066 h 6886576"/>
+              <a:gd name="connsiteX19" fmla="*/ 409664 w 5511704"/>
+              <a:gd name="connsiteY19" fmla="*/ 535781 h 6886576"/>
+              <a:gd name="connsiteX20" fmla="*/ 209049 w 5511704"/>
+              <a:gd name="connsiteY20" fmla="*/ 464344 h 6886576"/>
+              <a:gd name="connsiteX21" fmla="*/ 5527 w 5511704"/>
+              <a:gd name="connsiteY21" fmla="*/ 467916 h 6886576"/>
+              <a:gd name="connsiteX22" fmla="*/ 906838 w 5511704"/>
+              <a:gd name="connsiteY22" fmla="*/ 914400 h 6886576"/>
+              <a:gd name="connsiteX23" fmla="*/ 863226 w 5511704"/>
+              <a:gd name="connsiteY23" fmla="*/ 925116 h 6886576"/>
+              <a:gd name="connsiteX24" fmla="*/ 805077 w 5511704"/>
+              <a:gd name="connsiteY24" fmla="*/ 953691 h 6886576"/>
+              <a:gd name="connsiteX25" fmla="*/ 848689 w 5511704"/>
+              <a:gd name="connsiteY25" fmla="*/ 1010841 h 6886576"/>
+              <a:gd name="connsiteX26" fmla="*/ 1084193 w 5511704"/>
+              <a:gd name="connsiteY26" fmla="*/ 1117997 h 6886576"/>
+              <a:gd name="connsiteX27" fmla="*/ 1142342 w 5511704"/>
+              <a:gd name="connsiteY27" fmla="*/ 1225153 h 6886576"/>
+              <a:gd name="connsiteX28" fmla="*/ 1069655 w 5511704"/>
+              <a:gd name="connsiteY28" fmla="*/ 1214438 h 6886576"/>
+              <a:gd name="connsiteX29" fmla="*/ 1005692 w 5511704"/>
+              <a:gd name="connsiteY29" fmla="*/ 1235869 h 6886576"/>
+              <a:gd name="connsiteX30" fmla="*/ 1031858 w 5511704"/>
+              <a:gd name="connsiteY30" fmla="*/ 1371600 h 6886576"/>
+              <a:gd name="connsiteX31" fmla="*/ 1366216 w 5511704"/>
+              <a:gd name="connsiteY31" fmla="*/ 1546622 h 6886576"/>
+              <a:gd name="connsiteX32" fmla="*/ 1395290 w 5511704"/>
+              <a:gd name="connsiteY32" fmla="*/ 1603772 h 6886576"/>
+              <a:gd name="connsiteX33" fmla="*/ 1354586 w 5511704"/>
+              <a:gd name="connsiteY33" fmla="*/ 1643063 h 6886576"/>
+              <a:gd name="connsiteX34" fmla="*/ 1247011 w 5511704"/>
+              <a:gd name="connsiteY34" fmla="*/ 1664494 h 6886576"/>
+              <a:gd name="connsiteX35" fmla="*/ 1398198 w 5511704"/>
+              <a:gd name="connsiteY35" fmla="*/ 1857375 h 6886576"/>
+              <a:gd name="connsiteX36" fmla="*/ 1453440 w 5511704"/>
+              <a:gd name="connsiteY36" fmla="*/ 1910954 h 6886576"/>
+              <a:gd name="connsiteX37" fmla="*/ 1549386 w 5511704"/>
+              <a:gd name="connsiteY37" fmla="*/ 1993106 h 6886576"/>
+              <a:gd name="connsiteX38" fmla="*/ 1549386 w 5511704"/>
+              <a:gd name="connsiteY38" fmla="*/ 2021681 h 6886576"/>
+              <a:gd name="connsiteX39" fmla="*/ 1421458 w 5511704"/>
+              <a:gd name="connsiteY39" fmla="*/ 2110978 h 6886576"/>
+              <a:gd name="connsiteX40" fmla="*/ 1188861 w 5511704"/>
+              <a:gd name="connsiteY40" fmla="*/ 2085976 h 6886576"/>
+              <a:gd name="connsiteX41" fmla="*/ 1531941 w 5511704"/>
+              <a:gd name="connsiteY41" fmla="*/ 2218135 h 6886576"/>
+              <a:gd name="connsiteX42" fmla="*/ 421293 w 5511704"/>
+              <a:gd name="connsiteY42" fmla="*/ 1900238 h 6886576"/>
+              <a:gd name="connsiteX43" fmla="*/ 491072 w 5511704"/>
+              <a:gd name="connsiteY43" fmla="*/ 1982391 h 6886576"/>
+              <a:gd name="connsiteX44" fmla="*/ 880671 w 5511704"/>
+              <a:gd name="connsiteY44" fmla="*/ 2200276 h 6886576"/>
+              <a:gd name="connsiteX45" fmla="*/ 991154 w 5511704"/>
+              <a:gd name="connsiteY45" fmla="*/ 2336007 h 6886576"/>
+              <a:gd name="connsiteX46" fmla="*/ 1107453 w 5511704"/>
+              <a:gd name="connsiteY46" fmla="*/ 2411016 h 6886576"/>
+              <a:gd name="connsiteX47" fmla="*/ 1270270 w 5511704"/>
+              <a:gd name="connsiteY47" fmla="*/ 2411016 h 6886576"/>
+              <a:gd name="connsiteX48" fmla="*/ 1386568 w 5511704"/>
+              <a:gd name="connsiteY48" fmla="*/ 2528889 h 6886576"/>
+              <a:gd name="connsiteX49" fmla="*/ 1267362 w 5511704"/>
+              <a:gd name="connsiteY49" fmla="*/ 2553891 h 6886576"/>
+              <a:gd name="connsiteX50" fmla="*/ 1127805 w 5511704"/>
+              <a:gd name="connsiteY50" fmla="*/ 2536032 h 6886576"/>
+              <a:gd name="connsiteX51" fmla="*/ 970802 w 5511704"/>
+              <a:gd name="connsiteY51" fmla="*/ 2575322 h 6886576"/>
+              <a:gd name="connsiteX52" fmla="*/ 825429 w 5511704"/>
+              <a:gd name="connsiteY52" fmla="*/ 2543176 h 6886576"/>
+              <a:gd name="connsiteX53" fmla="*/ 650982 w 5511704"/>
+              <a:gd name="connsiteY53" fmla="*/ 2564607 h 6886576"/>
+              <a:gd name="connsiteX54" fmla="*/ 595740 w 5511704"/>
+              <a:gd name="connsiteY54" fmla="*/ 2703909 h 6886576"/>
+              <a:gd name="connsiteX55" fmla="*/ 578296 w 5511704"/>
+              <a:gd name="connsiteY55" fmla="*/ 2714626 h 6886576"/>
+              <a:gd name="connsiteX56" fmla="*/ 255568 w 5511704"/>
+              <a:gd name="connsiteY56" fmla="*/ 2936081 h 6886576"/>
+              <a:gd name="connsiteX57" fmla="*/ 165437 w 5511704"/>
+              <a:gd name="connsiteY57" fmla="*/ 2953941 h 6886576"/>
+              <a:gd name="connsiteX58" fmla="*/ 697501 w 5511704"/>
+              <a:gd name="connsiteY58" fmla="*/ 3343275 h 6886576"/>
+              <a:gd name="connsiteX59" fmla="*/ 339884 w 5511704"/>
+              <a:gd name="connsiteY59" fmla="*/ 3243263 h 6886576"/>
+              <a:gd name="connsiteX60" fmla="*/ 290458 w 5511704"/>
+              <a:gd name="connsiteY60" fmla="*/ 3407569 h 6886576"/>
+              <a:gd name="connsiteX61" fmla="*/ 459090 w 5511704"/>
+              <a:gd name="connsiteY61" fmla="*/ 3554016 h 6886576"/>
+              <a:gd name="connsiteX62" fmla="*/ 520147 w 5511704"/>
+              <a:gd name="connsiteY62" fmla="*/ 3843338 h 6886576"/>
+              <a:gd name="connsiteX63" fmla="*/ 491072 w 5511704"/>
+              <a:gd name="connsiteY63" fmla="*/ 4107657 h 6886576"/>
+              <a:gd name="connsiteX64" fmla="*/ 418386 w 5511704"/>
+              <a:gd name="connsiteY64" fmla="*/ 4189810 h 6886576"/>
+              <a:gd name="connsiteX65" fmla="*/ 313718 w 5511704"/>
+              <a:gd name="connsiteY65" fmla="*/ 4339829 h 6886576"/>
+              <a:gd name="connsiteX66" fmla="*/ 249753 w 5511704"/>
+              <a:gd name="connsiteY66" fmla="*/ 4432698 h 6886576"/>
+              <a:gd name="connsiteX67" fmla="*/ 25879 w 5511704"/>
+              <a:gd name="connsiteY67" fmla="*/ 4396979 h 6886576"/>
+              <a:gd name="connsiteX68" fmla="*/ 325347 w 5511704"/>
+              <a:gd name="connsiteY68" fmla="*/ 4632722 h 6886576"/>
+              <a:gd name="connsiteX69" fmla="*/ 84029 w 5511704"/>
+              <a:gd name="connsiteY69" fmla="*/ 4604147 h 6886576"/>
+              <a:gd name="connsiteX70" fmla="*/ 5527 w 5511704"/>
+              <a:gd name="connsiteY70" fmla="*/ 4622007 h 6886576"/>
+              <a:gd name="connsiteX71" fmla="*/ 49139 w 5511704"/>
+              <a:gd name="connsiteY71" fmla="*/ 4697016 h 6886576"/>
+              <a:gd name="connsiteX72" fmla="*/ 226494 w 5511704"/>
+              <a:gd name="connsiteY72" fmla="*/ 4825604 h 6886576"/>
+              <a:gd name="connsiteX73" fmla="*/ 592833 w 5511704"/>
+              <a:gd name="connsiteY73" fmla="*/ 5175647 h 6886576"/>
+              <a:gd name="connsiteX74" fmla="*/ 238123 w 5511704"/>
+              <a:gd name="connsiteY74" fmla="*/ 5014913 h 6886576"/>
+              <a:gd name="connsiteX75" fmla="*/ 610278 w 5511704"/>
+              <a:gd name="connsiteY75" fmla="*/ 5375673 h 6886576"/>
+              <a:gd name="connsiteX76" fmla="*/ 691686 w 5511704"/>
+              <a:gd name="connsiteY76" fmla="*/ 5497116 h 6886576"/>
+              <a:gd name="connsiteX77" fmla="*/ 860319 w 5511704"/>
+              <a:gd name="connsiteY77" fmla="*/ 5793582 h 6886576"/>
+              <a:gd name="connsiteX78" fmla="*/ 851597 w 5511704"/>
+              <a:gd name="connsiteY78" fmla="*/ 5825729 h 6886576"/>
+              <a:gd name="connsiteX79" fmla="*/ 659704 w 5511704"/>
+              <a:gd name="connsiteY79" fmla="*/ 5779295 h 6886576"/>
+              <a:gd name="connsiteX80" fmla="*/ 909746 w 5511704"/>
+              <a:gd name="connsiteY80" fmla="*/ 6029326 h 6886576"/>
+              <a:gd name="connsiteX81" fmla="*/ 1168509 w 5511704"/>
+              <a:gd name="connsiteY81" fmla="*/ 6222207 h 6886576"/>
+              <a:gd name="connsiteX82" fmla="*/ 985339 w 5511704"/>
+              <a:gd name="connsiteY82" fmla="*/ 6193632 h 6886576"/>
+              <a:gd name="connsiteX83" fmla="*/ 732391 w 5511704"/>
+              <a:gd name="connsiteY83" fmla="*/ 6082904 h 6886576"/>
+              <a:gd name="connsiteX84" fmla="*/ 645167 w 5511704"/>
+              <a:gd name="connsiteY84" fmla="*/ 6125766 h 6886576"/>
+              <a:gd name="connsiteX85" fmla="*/ 883579 w 5511704"/>
+              <a:gd name="connsiteY85" fmla="*/ 6307932 h 6886576"/>
+              <a:gd name="connsiteX86" fmla="*/ 1020229 w 5511704"/>
+              <a:gd name="connsiteY86" fmla="*/ 6393657 h 6886576"/>
+              <a:gd name="connsiteX87" fmla="*/ 1075471 w 5511704"/>
+              <a:gd name="connsiteY87" fmla="*/ 6457950 h 6886576"/>
+              <a:gd name="connsiteX88" fmla="*/ 1232473 w 5511704"/>
+              <a:gd name="connsiteY88" fmla="*/ 6686551 h 6886576"/>
+              <a:gd name="connsiteX89" fmla="*/ 1592997 w 5511704"/>
+              <a:gd name="connsiteY89" fmla="*/ 6886576 h 6886576"/>
+              <a:gd name="connsiteX90" fmla="*/ 5511704 w 5511704"/>
+              <a:gd name="connsiteY90" fmla="*/ 6886576 h 6886576"/>
+            </a:gdLst>
+            <a:ahLst/>
+            <a:cxnLst>
+              <a:cxn ang="0">
+                <a:pos x="connsiteX0" y="connsiteY0"/>
+              </a:cxn>
+              <a:cxn ang="0">
+                <a:pos x="connsiteX1" y="connsiteY1"/>
+              </a:cxn>
+              <a:cxn ang="0">
+                <a:pos x="connsiteX2" y="connsiteY2"/>
+              </a:cxn>
+              <a:cxn ang="0">
+                <a:pos x="connsiteX3" y="connsiteY3"/>
+              </a:cxn>
+              <a:cxn ang="0">
+                <a:pos x="connsiteX4" y="connsiteY4"/>
+              </a:cxn>
+              <a:cxn ang="0">
+                <a:pos x="connsiteX5" y="connsiteY5"/>
+              </a:cxn>
+              <a:cxn ang="0">
+                <a:pos x="connsiteX6" y="connsiteY6"/>
+              </a:cxn>
+              <a:cxn ang="0">
+                <a:pos x="connsiteX7" y="connsiteY7"/>
+              </a:cxn>
+              <a:cxn ang="0">
+                <a:pos x="connsiteX8" y="connsiteY8"/>
+              </a:cxn>
+              <a:cxn ang="0">
+                <a:pos x="connsiteX9" y="connsiteY9"/>
+              </a:cxn>
+              <a:cxn ang="0">
+                <a:pos x="connsiteX10" y="connsiteY10"/>
+              </a:cxn>
+              <a:cxn ang="0">
+                <a:pos x="connsiteX11" y="connsiteY11"/>
+              </a:cxn>
+              <a:cxn ang="0">
+                <a:pos x="connsiteX12" y="connsiteY12"/>
+              </a:cxn>
+              <a:cxn ang="0">
+                <a:pos x="connsiteX13" y="connsiteY13"/>
+              </a:cxn>
+              <a:cxn ang="0">
+                <a:pos x="connsiteX14" y="connsiteY14"/>
+              </a:cxn>
+              <a:cxn ang="0">
+                <a:pos x="connsiteX15" y="connsiteY15"/>
+              </a:cxn>
+              <a:cxn ang="0">
+                <a:pos x="connsiteX16" y="connsiteY16"/>
+              </a:cxn>
+              <a:cxn ang="0">
+                <a:pos x="connsiteX17" y="connsiteY17"/>
+              </a:cxn>
+              <a:cxn ang="0">
+                <a:pos x="connsiteX18" y="connsiteY18"/>
+              </a:cxn>
+              <a:cxn ang="0">
+                <a:pos x="connsiteX19" y="connsiteY19"/>
+              </a:cxn>
+              <a:cxn ang="0">
+                <a:pos x="connsiteX20" y="connsiteY20"/>
+              </a:cxn>
+              <a:cxn ang="0">
+                <a:pos x="connsiteX21" y="connsiteY21"/>
+              </a:cxn>
+              <a:cxn ang="0">
+                <a:pos x="connsiteX22" y="connsiteY22"/>
+              </a:cxn>
+              <a:cxn ang="0">
+                <a:pos x="connsiteX23" y="connsiteY23"/>
+              </a:cxn>
+              <a:cxn ang="0">
+                <a:pos x="connsiteX24" y="connsiteY24"/>
+              </a:cxn>
+              <a:cxn ang="0">
+                <a:pos x="connsiteX25" y="connsiteY25"/>
+              </a:cxn>
+              <a:cxn ang="0">
+                <a:pos x="connsiteX26" y="connsiteY26"/>
+              </a:cxn>
+              <a:cxn ang="0">
+                <a:pos x="connsiteX27" y="connsiteY27"/>
+              </a:cxn>
+              <a:cxn ang="0">
+                <a:pos x="connsiteX28" y="connsiteY28"/>
+              </a:cxn>
+              <a:cxn ang="0">
+                <a:pos x="connsiteX29" y="connsiteY29"/>
+              </a:cxn>
+              <a:cxn ang="0">
+                <a:pos x="connsiteX30" y="connsiteY30"/>
+              </a:cxn>
+              <a:cxn ang="0">
+                <a:pos x="connsiteX31" y="connsiteY31"/>
+              </a:cxn>
+              <a:cxn ang="0">
+                <a:pos x="connsiteX32" y="connsiteY32"/>
+              </a:cxn>
+              <a:cxn ang="0">
+                <a:pos x="connsiteX33" y="connsiteY33"/>
+              </a:cxn>
+              <a:cxn ang="0">
+                <a:pos x="connsiteX34" y="connsiteY34"/>
+              </a:cxn>
+              <a:cxn ang="0">
+                <a:pos x="connsiteX35" y="connsiteY35"/>
+              </a:cxn>
+              <a:cxn ang="0">
+                <a:pos x="connsiteX36" y="connsiteY36"/>
+              </a:cxn>
+              <a:cxn ang="0">
+                <a:pos x="connsiteX37" y="connsiteY37"/>
+              </a:cxn>
+              <a:cxn ang="0">
+                <a:pos x="connsiteX38" y="connsiteY38"/>
+              </a:cxn>
+              <a:cxn ang="0">
+                <a:pos x="connsiteX39" y="connsiteY39"/>
+              </a:cxn>
+              <a:cxn ang="0">
+                <a:pos x="connsiteX40" y="connsiteY40"/>
+              </a:cxn>
+              <a:cxn ang="0">
+                <a:pos x="connsiteX41" y="connsiteY41"/>
+              </a:cxn>
+              <a:cxn ang="0">
+                <a:pos x="connsiteX42" y="connsiteY42"/>
+              </a:cxn>
+              <a:cxn ang="0">
+                <a:pos x="connsiteX43" y="connsiteY43"/>
+              </a:cxn>
+              <a:cxn ang="0">
+                <a:pos x="connsiteX44" y="connsiteY44"/>
+              </a:cxn>
+              <a:cxn ang="0">
+                <a:pos x="connsiteX45" y="connsiteY45"/>
+              </a:cxn>
+              <a:cxn ang="0">
+                <a:pos x="connsiteX46" y="connsiteY46"/>
+              </a:cxn>
+              <a:cxn ang="0">
+                <a:pos x="connsiteX47" y="connsiteY47"/>
+              </a:cxn>
+              <a:cxn ang="0">
+                <a:pos x="connsiteX48" y="connsiteY48"/>
+              </a:cxn>
+              <a:cxn ang="0">
+                <a:pos x="connsiteX49" y="connsiteY49"/>
+              </a:cxn>
+              <a:cxn ang="0">
+                <a:pos x="connsiteX50" y="connsiteY50"/>
+              </a:cxn>
+              <a:cxn ang="0">
+                <a:pos x="connsiteX51" y="connsiteY51"/>
+              </a:cxn>
+              <a:cxn ang="0">
+                <a:pos x="connsiteX52" y="connsiteY52"/>
+              </a:cxn>
+              <a:cxn ang="0">
+                <a:pos x="connsiteX53" y="connsiteY53"/>
+              </a:cxn>
+              <a:cxn ang="0">
+                <a:pos x="connsiteX54" y="connsiteY54"/>
+              </a:cxn>
+              <a:cxn ang="0">
+                <a:pos x="connsiteX55" y="connsiteY55"/>
+              </a:cxn>
+              <a:cxn ang="0">
+                <a:pos x="connsiteX56" y="connsiteY56"/>
+              </a:cxn>
+              <a:cxn ang="0">
+                <a:pos x="connsiteX57" y="connsiteY57"/>
+              </a:cxn>
+              <a:cxn ang="0">
+                <a:pos x="connsiteX58" y="connsiteY58"/>
+              </a:cxn>
+              <a:cxn ang="0">
+                <a:pos x="connsiteX59" y="connsiteY59"/>
+              </a:cxn>
+              <a:cxn ang="0">
+                <a:pos x="connsiteX60" y="connsiteY60"/>
+              </a:cxn>
+              <a:cxn ang="0">
+                <a:pos x="connsiteX61" y="connsiteY61"/>
+              </a:cxn>
+              <a:cxn ang="0">
+                <a:pos x="connsiteX62" y="connsiteY62"/>
+              </a:cxn>
+              <a:cxn ang="0">
+                <a:pos x="connsiteX63" y="connsiteY63"/>
+              </a:cxn>
+              <a:cxn ang="0">
+                <a:pos x="connsiteX64" y="connsiteY64"/>
+              </a:cxn>
+              <a:cxn ang="0">
+                <a:pos x="connsiteX65" y="connsiteY65"/>
+              </a:cxn>
+              <a:cxn ang="0">
+                <a:pos x="connsiteX66" y="connsiteY66"/>
+              </a:cxn>
+              <a:cxn ang="0">
+                <a:pos x="connsiteX67" y="connsiteY67"/>
+              </a:cxn>
+              <a:cxn ang="0">
+                <a:pos x="connsiteX68" y="connsiteY68"/>
+              </a:cxn>
+              <a:cxn ang="0">
+                <a:pos x="connsiteX69" y="connsiteY69"/>
+              </a:cxn>
+              <a:cxn ang="0">
+                <a:pos x="connsiteX70" y="connsiteY70"/>
+              </a:cxn>
+              <a:cxn ang="0">
+                <a:pos x="connsiteX71" y="connsiteY71"/>
+              </a:cxn>
+              <a:cxn ang="0">
+                <a:pos x="connsiteX72" y="connsiteY72"/>
+              </a:cxn>
+              <a:cxn ang="0">
+                <a:pos x="connsiteX73" y="connsiteY73"/>
+              </a:cxn>
+              <a:cxn ang="0">
+                <a:pos x="connsiteX74" y="connsiteY74"/>
+              </a:cxn>
+              <a:cxn ang="0">
+                <a:pos x="connsiteX75" y="connsiteY75"/>
+              </a:cxn>
+              <a:cxn ang="0">
+                <a:pos x="connsiteX76" y="connsiteY76"/>
+              </a:cxn>
+              <a:cxn ang="0">
+                <a:pos x="connsiteX77" y="connsiteY77"/>
+              </a:cxn>
+              <a:cxn ang="0">
+                <a:pos x="connsiteX78" y="connsiteY78"/>
+              </a:cxn>
+              <a:cxn ang="0">
+                <a:pos x="connsiteX79" y="connsiteY79"/>
+              </a:cxn>
+              <a:cxn ang="0">
+                <a:pos x="connsiteX80" y="connsiteY80"/>
+              </a:cxn>
+              <a:cxn ang="0">
+                <a:pos x="connsiteX81" y="connsiteY81"/>
+              </a:cxn>
+              <a:cxn ang="0">
+                <a:pos x="connsiteX82" y="connsiteY82"/>
+              </a:cxn>
+              <a:cxn ang="0">
+                <a:pos x="connsiteX83" y="connsiteY83"/>
+              </a:cxn>
+              <a:cxn ang="0">
+                <a:pos x="connsiteX84" y="connsiteY84"/>
+              </a:cxn>
+              <a:cxn ang="0">
+                <a:pos x="connsiteX85" y="connsiteY85"/>
+              </a:cxn>
+              <a:cxn ang="0">
+                <a:pos x="connsiteX86" y="connsiteY86"/>
+              </a:cxn>
+              <a:cxn ang="0">
+                <a:pos x="connsiteX87" y="connsiteY87"/>
+              </a:cxn>
+              <a:cxn ang="0">
+                <a:pos x="connsiteX88" y="connsiteY88"/>
+              </a:cxn>
+              <a:cxn ang="0">
+                <a:pos x="connsiteX89" y="connsiteY89"/>
+              </a:cxn>
+              <a:cxn ang="0">
+                <a:pos x="connsiteX90" y="connsiteY90"/>
+              </a:cxn>
+            </a:cxnLst>
+            <a:rect l="l" t="t" r="r" b="b"/>
+            <a:pathLst>
+              <a:path w="5511704" h="6886576">
+                <a:moveTo>
+                  <a:pt x="5511704" y="0"/>
+                </a:moveTo>
+                <a:lnTo>
+                  <a:pt x="1008599" y="0"/>
+                </a:lnTo>
+                <a:cubicBezTo>
+                  <a:pt x="1110360" y="35719"/>
+                  <a:pt x="1209214" y="78581"/>
+                  <a:pt x="1310975" y="110728"/>
+                </a:cubicBezTo>
+                <a:cubicBezTo>
+                  <a:pt x="1296437" y="146447"/>
+                  <a:pt x="1281900" y="139303"/>
+                  <a:pt x="1267362" y="135731"/>
+                </a:cubicBezTo>
+                <a:cubicBezTo>
+                  <a:pt x="1180139" y="121445"/>
+                  <a:pt x="1090008" y="110728"/>
+                  <a:pt x="1005692" y="71437"/>
+                </a:cubicBezTo>
+                <a:cubicBezTo>
+                  <a:pt x="985339" y="64294"/>
+                  <a:pt x="962080" y="64294"/>
+                  <a:pt x="953358" y="89297"/>
+                </a:cubicBezTo>
+                <a:cubicBezTo>
+                  <a:pt x="938820" y="125016"/>
+                  <a:pt x="959172" y="146447"/>
+                  <a:pt x="979525" y="164307"/>
+                </a:cubicBezTo>
+                <a:cubicBezTo>
+                  <a:pt x="1014414" y="196453"/>
+                  <a:pt x="1055118" y="189310"/>
+                  <a:pt x="1092915" y="192882"/>
+                </a:cubicBezTo>
+                <a:cubicBezTo>
+                  <a:pt x="1197583" y="210741"/>
+                  <a:pt x="1247011" y="260747"/>
+                  <a:pt x="1270270" y="375047"/>
+                </a:cubicBezTo>
+                <a:cubicBezTo>
+                  <a:pt x="1180139" y="328613"/>
+                  <a:pt x="1090008" y="385763"/>
+                  <a:pt x="1002784" y="353615"/>
+                </a:cubicBezTo>
+                <a:cubicBezTo>
+                  <a:pt x="979525" y="346472"/>
+                  <a:pt x="944635" y="357188"/>
+                  <a:pt x="956265" y="396479"/>
+                </a:cubicBezTo>
+                <a:cubicBezTo>
+                  <a:pt x="967894" y="432198"/>
+                  <a:pt x="1005692" y="460772"/>
+                  <a:pt x="938820" y="453629"/>
+                </a:cubicBezTo>
+                <a:cubicBezTo>
+                  <a:pt x="889393" y="450056"/>
+                  <a:pt x="874856" y="407194"/>
+                  <a:pt x="860319" y="360759"/>
+                </a:cubicBezTo>
+                <a:cubicBezTo>
+                  <a:pt x="848689" y="335757"/>
+                  <a:pt x="816707" y="321469"/>
+                  <a:pt x="793447" y="335757"/>
+                </a:cubicBezTo>
+                <a:cubicBezTo>
+                  <a:pt x="764373" y="350044"/>
+                  <a:pt x="773095" y="389335"/>
+                  <a:pt x="773095" y="417910"/>
+                </a:cubicBezTo>
+                <a:cubicBezTo>
+                  <a:pt x="770187" y="471488"/>
+                  <a:pt x="793447" y="496491"/>
+                  <a:pt x="834151" y="507206"/>
+                </a:cubicBezTo>
+                <a:cubicBezTo>
+                  <a:pt x="883579" y="521494"/>
+                  <a:pt x="933005" y="539354"/>
+                  <a:pt x="996969" y="560785"/>
+                </a:cubicBezTo>
+                <a:cubicBezTo>
+                  <a:pt x="927190" y="596503"/>
+                  <a:pt x="874856" y="589360"/>
+                  <a:pt x="822522" y="560785"/>
+                </a:cubicBezTo>
+                <a:cubicBezTo>
+                  <a:pt x="758558" y="528637"/>
+                  <a:pt x="674242" y="485775"/>
+                  <a:pt x="621908" y="525066"/>
+                </a:cubicBezTo>
+                <a:cubicBezTo>
+                  <a:pt x="543407" y="582216"/>
+                  <a:pt x="479443" y="546497"/>
+                  <a:pt x="409664" y="535781"/>
+                </a:cubicBezTo>
+                <a:cubicBezTo>
+                  <a:pt x="264290" y="514350"/>
+                  <a:pt x="354422" y="482204"/>
+                  <a:pt x="209049" y="464344"/>
+                </a:cubicBezTo>
+                <a:cubicBezTo>
+                  <a:pt x="150900" y="457200"/>
+                  <a:pt x="89843" y="428625"/>
+                  <a:pt x="5527" y="467916"/>
+                </a:cubicBezTo>
+                <a:cubicBezTo>
+                  <a:pt x="386404" y="675085"/>
+                  <a:pt x="566666" y="660797"/>
+                  <a:pt x="906838" y="914400"/>
+                </a:cubicBezTo>
+                <a:cubicBezTo>
+                  <a:pt x="892301" y="939404"/>
+                  <a:pt x="877764" y="928688"/>
+                  <a:pt x="863226" y="925116"/>
+                </a:cubicBezTo>
+                <a:cubicBezTo>
+                  <a:pt x="839967" y="921544"/>
+                  <a:pt x="810892" y="907256"/>
+                  <a:pt x="805077" y="953691"/>
+                </a:cubicBezTo>
+                <a:cubicBezTo>
+                  <a:pt x="802169" y="989410"/>
+                  <a:pt x="819615" y="1007269"/>
+                  <a:pt x="848689" y="1010841"/>
+                </a:cubicBezTo>
+                <a:cubicBezTo>
+                  <a:pt x="933005" y="1025129"/>
+                  <a:pt x="1008599" y="1075135"/>
+                  <a:pt x="1084193" y="1117997"/>
+                </a:cubicBezTo>
+                <a:cubicBezTo>
+                  <a:pt x="1119082" y="1135857"/>
+                  <a:pt x="1156879" y="1160860"/>
+                  <a:pt x="1142342" y="1225153"/>
+                </a:cubicBezTo>
+                <a:cubicBezTo>
+                  <a:pt x="1113268" y="1243013"/>
+                  <a:pt x="1092915" y="1218009"/>
+                  <a:pt x="1069655" y="1214438"/>
+                </a:cubicBezTo>
+                <a:cubicBezTo>
+                  <a:pt x="1046396" y="1210866"/>
+                  <a:pt x="991154" y="1225153"/>
+                  <a:pt x="1005692" y="1235869"/>
+                </a:cubicBezTo>
+                <a:cubicBezTo>
+                  <a:pt x="1072563" y="1275159"/>
+                  <a:pt x="950450" y="1371600"/>
+                  <a:pt x="1031858" y="1371600"/>
+                </a:cubicBezTo>
+                <a:cubicBezTo>
+                  <a:pt x="1165601" y="1371600"/>
+                  <a:pt x="1238288" y="1543050"/>
+                  <a:pt x="1366216" y="1546622"/>
+                </a:cubicBezTo>
+                <a:cubicBezTo>
+                  <a:pt x="1386568" y="1546622"/>
+                  <a:pt x="1395290" y="1578770"/>
+                  <a:pt x="1395290" y="1603772"/>
+                </a:cubicBezTo>
+                <a:cubicBezTo>
+                  <a:pt x="1395290" y="1635920"/>
+                  <a:pt x="1374939" y="1639491"/>
+                  <a:pt x="1354586" y="1643063"/>
+                </a:cubicBezTo>
+                <a:cubicBezTo>
+                  <a:pt x="1322604" y="1646635"/>
+                  <a:pt x="1287715" y="1603772"/>
+                  <a:pt x="1247011" y="1664494"/>
+                </a:cubicBezTo>
+                <a:cubicBezTo>
+                  <a:pt x="1322604" y="1700213"/>
+                  <a:pt x="1401105" y="1735932"/>
+                  <a:pt x="1398198" y="1857375"/>
+                </a:cubicBezTo>
+                <a:cubicBezTo>
+                  <a:pt x="1398198" y="1889523"/>
+                  <a:pt x="1430180" y="1903810"/>
+                  <a:pt x="1453440" y="1910954"/>
+                </a:cubicBezTo>
+                <a:cubicBezTo>
+                  <a:pt x="1494144" y="1925241"/>
+                  <a:pt x="1526126" y="1946673"/>
+                  <a:pt x="1549386" y="1993106"/>
+                </a:cubicBezTo>
+                <a:cubicBezTo>
+                  <a:pt x="1549386" y="2003822"/>
+                  <a:pt x="1549386" y="2010966"/>
+                  <a:pt x="1549386" y="2021681"/>
+                </a:cubicBezTo>
+                <a:cubicBezTo>
+                  <a:pt x="1543571" y="2132410"/>
+                  <a:pt x="1485422" y="2128838"/>
+                  <a:pt x="1421458" y="2110978"/>
+                </a:cubicBezTo>
+                <a:cubicBezTo>
+                  <a:pt x="1345864" y="2089547"/>
+                  <a:pt x="1270270" y="2046685"/>
+                  <a:pt x="1188861" y="2085976"/>
+                </a:cubicBezTo>
+                <a:cubicBezTo>
+                  <a:pt x="1302252" y="2139554"/>
+                  <a:pt x="1427272" y="2143126"/>
+                  <a:pt x="1531941" y="2218135"/>
+                </a:cubicBezTo>
+                <a:cubicBezTo>
+                  <a:pt x="1142342" y="2232422"/>
+                  <a:pt x="799262" y="1993106"/>
+                  <a:pt x="421293" y="1900238"/>
+                </a:cubicBezTo>
+                <a:cubicBezTo>
+                  <a:pt x="432923" y="1960960"/>
+                  <a:pt x="464905" y="1975247"/>
+                  <a:pt x="491072" y="1982391"/>
+                </a:cubicBezTo>
+                <a:cubicBezTo>
+                  <a:pt x="630630" y="2028825"/>
+                  <a:pt x="752743" y="2121695"/>
+                  <a:pt x="880671" y="2200276"/>
+                </a:cubicBezTo>
+                <a:cubicBezTo>
+                  <a:pt x="933005" y="2232422"/>
+                  <a:pt x="970802" y="2268142"/>
+                  <a:pt x="991154" y="2336007"/>
+                </a:cubicBezTo>
+                <a:cubicBezTo>
+                  <a:pt x="1008599" y="2400300"/>
+                  <a:pt x="1043489" y="2428875"/>
+                  <a:pt x="1107453" y="2411016"/>
+                </a:cubicBezTo>
+                <a:cubicBezTo>
+                  <a:pt x="1159787" y="2396729"/>
+                  <a:pt x="1215029" y="2403873"/>
+                  <a:pt x="1270270" y="2411016"/>
+                </a:cubicBezTo>
+                <a:cubicBezTo>
+                  <a:pt x="1331326" y="2418160"/>
+                  <a:pt x="1401105" y="2489597"/>
+                  <a:pt x="1386568" y="2528889"/>
+                </a:cubicBezTo>
+                <a:cubicBezTo>
+                  <a:pt x="1357494" y="2593182"/>
+                  <a:pt x="1308067" y="2561035"/>
+                  <a:pt x="1267362" y="2553891"/>
+                </a:cubicBezTo>
+                <a:cubicBezTo>
+                  <a:pt x="1217936" y="2546748"/>
+                  <a:pt x="1127805" y="2528889"/>
+                  <a:pt x="1127805" y="2536032"/>
+                </a:cubicBezTo>
+                <a:cubicBezTo>
+                  <a:pt x="1095822" y="2696766"/>
+                  <a:pt x="1023136" y="2575322"/>
+                  <a:pt x="970802" y="2575322"/>
+                </a:cubicBezTo>
+                <a:cubicBezTo>
+                  <a:pt x="921375" y="2575322"/>
+                  <a:pt x="871949" y="2557463"/>
+                  <a:pt x="825429" y="2543176"/>
+                </a:cubicBezTo>
+                <a:cubicBezTo>
+                  <a:pt x="764373" y="2525316"/>
+                  <a:pt x="709132" y="2557463"/>
+                  <a:pt x="650982" y="2564607"/>
+                </a:cubicBezTo>
+                <a:cubicBezTo>
+                  <a:pt x="598648" y="2571751"/>
+                  <a:pt x="627722" y="2664620"/>
+                  <a:pt x="595740" y="2703909"/>
+                </a:cubicBezTo>
+                <a:cubicBezTo>
+                  <a:pt x="589926" y="2714626"/>
+                  <a:pt x="584111" y="2714626"/>
+                  <a:pt x="578296" y="2714626"/>
+                </a:cubicBezTo>
+                <a:cubicBezTo>
+                  <a:pt x="560851" y="2993232"/>
+                  <a:pt x="255568" y="2925366"/>
+                  <a:pt x="255568" y="2936081"/>
+                </a:cubicBezTo>
+                <a:cubicBezTo>
+                  <a:pt x="229401" y="2953941"/>
+                  <a:pt x="197419" y="2911079"/>
+                  <a:pt x="165437" y="2953941"/>
+                </a:cubicBezTo>
+                <a:cubicBezTo>
+                  <a:pt x="302087" y="3150394"/>
+                  <a:pt x="511425" y="3196828"/>
+                  <a:pt x="697501" y="3343275"/>
+                </a:cubicBezTo>
+                <a:cubicBezTo>
+                  <a:pt x="543407" y="3393282"/>
+                  <a:pt x="453275" y="3221832"/>
+                  <a:pt x="339884" y="3243263"/>
+                </a:cubicBezTo>
+                <a:cubicBezTo>
+                  <a:pt x="284643" y="3296842"/>
+                  <a:pt x="450368" y="3382566"/>
+                  <a:pt x="290458" y="3407569"/>
+                </a:cubicBezTo>
+                <a:cubicBezTo>
+                  <a:pt x="360236" y="3454004"/>
+                  <a:pt x="409664" y="3500439"/>
+                  <a:pt x="459090" y="3554016"/>
+                </a:cubicBezTo>
+                <a:cubicBezTo>
+                  <a:pt x="543407" y="3650457"/>
+                  <a:pt x="560851" y="3714751"/>
+                  <a:pt x="520147" y="3843338"/>
+                </a:cubicBezTo>
+                <a:cubicBezTo>
+                  <a:pt x="493979" y="3929063"/>
+                  <a:pt x="456183" y="4007645"/>
+                  <a:pt x="491072" y="4107657"/>
+                </a:cubicBezTo>
+                <a:cubicBezTo>
+                  <a:pt x="514332" y="4175522"/>
+                  <a:pt x="505609" y="4221957"/>
+                  <a:pt x="418386" y="4189810"/>
+                </a:cubicBezTo>
+                <a:cubicBezTo>
+                  <a:pt x="325347" y="4157663"/>
+                  <a:pt x="290458" y="4218386"/>
+                  <a:pt x="313718" y="4339829"/>
+                </a:cubicBezTo>
+                <a:cubicBezTo>
+                  <a:pt x="328254" y="4418410"/>
+                  <a:pt x="313718" y="4443413"/>
+                  <a:pt x="249753" y="4432698"/>
+                </a:cubicBezTo>
+                <a:cubicBezTo>
+                  <a:pt x="179975" y="4421982"/>
+                  <a:pt x="113103" y="4371976"/>
+                  <a:pt x="25879" y="4396979"/>
+                </a:cubicBezTo>
+                <a:cubicBezTo>
+                  <a:pt x="95658" y="4539854"/>
+                  <a:pt x="243939" y="4496991"/>
+                  <a:pt x="325347" y="4632722"/>
+                </a:cubicBezTo>
+                <a:cubicBezTo>
+                  <a:pt x="229401" y="4632722"/>
+                  <a:pt x="153807" y="4632722"/>
+                  <a:pt x="84029" y="4604147"/>
+                </a:cubicBezTo>
+                <a:cubicBezTo>
+                  <a:pt x="54954" y="4593433"/>
+                  <a:pt x="22972" y="4579145"/>
+                  <a:pt x="5527" y="4622007"/>
+                </a:cubicBezTo>
+                <a:cubicBezTo>
+                  <a:pt x="-14826" y="4672014"/>
+                  <a:pt x="25879" y="4689872"/>
+                  <a:pt x="49139" y="4697016"/>
+                </a:cubicBezTo>
+                <a:cubicBezTo>
+                  <a:pt x="116011" y="4722019"/>
+                  <a:pt x="168344" y="4779170"/>
+                  <a:pt x="226494" y="4825604"/>
+                </a:cubicBezTo>
+                <a:cubicBezTo>
+                  <a:pt x="351514" y="4925616"/>
+                  <a:pt x="488165" y="5011341"/>
+                  <a:pt x="592833" y="5175647"/>
+                </a:cubicBezTo>
+                <a:cubicBezTo>
+                  <a:pt x="461997" y="5132785"/>
+                  <a:pt x="363144" y="5032772"/>
+                  <a:pt x="238123" y="5014913"/>
+                </a:cubicBezTo>
+                <a:cubicBezTo>
+                  <a:pt x="345700" y="5164932"/>
+                  <a:pt x="482350" y="5264944"/>
+                  <a:pt x="610278" y="5375673"/>
+                </a:cubicBezTo>
+                <a:cubicBezTo>
+                  <a:pt x="648075" y="5407819"/>
+                  <a:pt x="685872" y="5429250"/>
+                  <a:pt x="691686" y="5497116"/>
+                </a:cubicBezTo>
+                <a:cubicBezTo>
+                  <a:pt x="709132" y="5629276"/>
+                  <a:pt x="755650" y="5736432"/>
+                  <a:pt x="860319" y="5793582"/>
+                </a:cubicBezTo>
+                <a:cubicBezTo>
+                  <a:pt x="860319" y="5793582"/>
+                  <a:pt x="854504" y="5815013"/>
+                  <a:pt x="851597" y="5825729"/>
+                </a:cubicBezTo>
+                <a:cubicBezTo>
+                  <a:pt x="787632" y="5829301"/>
+                  <a:pt x="738206" y="5750720"/>
+                  <a:pt x="659704" y="5779295"/>
+                </a:cubicBezTo>
+                <a:cubicBezTo>
+                  <a:pt x="738206" y="5886451"/>
+                  <a:pt x="802169" y="5979319"/>
+                  <a:pt x="909746" y="6029326"/>
+                </a:cubicBezTo>
+                <a:cubicBezTo>
+                  <a:pt x="996969" y="6068616"/>
+                  <a:pt x="1104545" y="6093620"/>
+                  <a:pt x="1168509" y="6222207"/>
+                </a:cubicBezTo>
+                <a:cubicBezTo>
+                  <a:pt x="1095822" y="6247210"/>
+                  <a:pt x="1040581" y="6215063"/>
+                  <a:pt x="985339" y="6193632"/>
+                </a:cubicBezTo>
+                <a:cubicBezTo>
+                  <a:pt x="901023" y="6157913"/>
+                  <a:pt x="816707" y="6118623"/>
+                  <a:pt x="732391" y="6082904"/>
+                </a:cubicBezTo>
+                <a:cubicBezTo>
+                  <a:pt x="700408" y="6068616"/>
+                  <a:pt x="665519" y="6061472"/>
+                  <a:pt x="645167" y="6125766"/>
+                </a:cubicBezTo>
+                <a:cubicBezTo>
+                  <a:pt x="752743" y="6140053"/>
+                  <a:pt x="816707" y="6225779"/>
+                  <a:pt x="883579" y="6307932"/>
+                </a:cubicBezTo>
+                <a:cubicBezTo>
+                  <a:pt x="921375" y="6354366"/>
+                  <a:pt x="953358" y="6415088"/>
+                  <a:pt x="1020229" y="6393657"/>
+                </a:cubicBezTo>
+                <a:cubicBezTo>
+                  <a:pt x="1055118" y="6382942"/>
+                  <a:pt x="1078378" y="6415088"/>
+                  <a:pt x="1075471" y="6457950"/>
+                </a:cubicBezTo>
+                <a:cubicBezTo>
+                  <a:pt x="1060933" y="6607970"/>
+                  <a:pt x="1145250" y="6657976"/>
+                  <a:pt x="1232473" y="6686551"/>
+                </a:cubicBezTo>
+                <a:cubicBezTo>
+                  <a:pt x="1360401" y="6729413"/>
+                  <a:pt x="1473792" y="6815138"/>
+                  <a:pt x="1592997" y="6886576"/>
+                </a:cubicBezTo>
+                <a:lnTo>
+                  <a:pt x="5511704" y="6886576"/>
+                </a:lnTo>
+                <a:close/>
+              </a:path>
+            </a:pathLst>
+          </a:custGeom>
+          <a:solidFill>
+            <a:schemeClr val="bg2">
+              <a:alpha val="50000"/>
+            </a:schemeClr>
+          </a:solidFill>
+          <a:ln w="32707" cap="flat">
+            <a:noFill/>
+            <a:prstDash val="solid"/>
+            <a:miter/>
+          </a:ln>
+        </p:spPr>
+        <p:txBody>
+          <a:bodyPr rtlCol="0" anchor="ctr"/>
+          <a:lstStyle/>
+          <a:p>
+            <a:pPr marL="0" marR="0" lvl="0" indent="0" algn="l" defTabSz="914400" rtl="0" eaLnBrk="1" fontAlgn="auto" latinLnBrk="0" hangingPunct="1">
+              <a:lnSpc>
+                <a:spcPct val="100000"/>
+              </a:lnSpc>
+              <a:spcBef>
+                <a:spcPts val="0"/>
+              </a:spcBef>
+              <a:spcAft>
+                <a:spcPts val="0"/>
+              </a:spcAft>
+              <a:buClrTx/>
+              <a:buSzTx/>
+              <a:buFontTx/>
+              <a:buNone/>
+              <a:tabLst/>
+              <a:defRPr/>
+            </a:pPr>
+            <a:endParaRPr kumimoji="0" lang="en-US" sz="1800" b="0" i="0" u="none" strike="noStrike" kern="1200" cap="none" spc="0" normalizeH="0" baseline="0" noProof="0" dirty="0">
+              <a:ln>
+                <a:noFill/>
+              </a:ln>
+              <a:solidFill>
+                <a:prstClr val="black"/>
+              </a:solidFill>
+              <a:effectLst/>
+              <a:uLnTx/>
+              <a:uFillTx/>
+              <a:latin typeface="Calibri" panose="020F0502020204030204"/>
+              <a:ea typeface="+mn-ea"/>
+              <a:cs typeface="+mn-cs"/>
+            </a:endParaRPr>
+          </a:p>
+        </p:txBody>
+      </p:sp>
+      <p:sp>
+        <p:nvSpPr>
+          <p:cNvPr id="2" name="Title 1">
+            <a:extLst>
+              <a:ext uri="{FF2B5EF4-FFF2-40B4-BE49-F238E27FC236}">
+                <a16:creationId xmlns:a16="http://schemas.microsoft.com/office/drawing/2014/main" id="{87B3A4BB-80AE-06AF-D368-7889B2E3B7FC}"/>
+              </a:ext>
+            </a:extLst>
+          </p:cNvPr>
+          <p:cNvSpPr>
+            <a:spLocks noGrp="1"/>
+          </p:cNvSpPr>
+          <p:nvPr>
+            <p:ph type="title"/>
+          </p:nvPr>
+        </p:nvSpPr>
+        <p:spPr>
+          <a:xfrm>
+            <a:off x="838200" y="713312"/>
+            <a:ext cx="4038600" cy="5431376"/>
+          </a:xfrm>
+        </p:spPr>
+        <p:txBody>
+          <a:bodyPr>
+            <a:normAutofit/>
+          </a:bodyPr>
+          <a:lstStyle/>
+          <a:p>
+            <a:r>
+              <a:rPr lang="en-US" dirty="0"/>
+              <a:t>Potential Gaps</a:t>
+            </a:r>
+          </a:p>
+        </p:txBody>
+      </p:sp>
+      <p:sp>
+        <p:nvSpPr>
+          <p:cNvPr id="3" name="Content Placeholder 2">
+            <a:extLst>
+              <a:ext uri="{FF2B5EF4-FFF2-40B4-BE49-F238E27FC236}">
+                <a16:creationId xmlns:a16="http://schemas.microsoft.com/office/drawing/2014/main" id="{82F27881-1536-A368-3D83-F0B2B1437929}"/>
+              </a:ext>
+            </a:extLst>
+          </p:cNvPr>
+          <p:cNvSpPr>
+            <a:spLocks noGrp="1"/>
+          </p:cNvSpPr>
+          <p:nvPr>
+            <p:ph idx="1"/>
+          </p:nvPr>
+        </p:nvSpPr>
+        <p:spPr>
+          <a:xfrm>
+            <a:off x="6095999" y="713313"/>
+            <a:ext cx="5257801" cy="5431376"/>
+          </a:xfrm>
+        </p:spPr>
+        <p:txBody>
+          <a:bodyPr anchor="ctr">
+            <a:normAutofit/>
+          </a:bodyPr>
+          <a:lstStyle/>
+          <a:p>
+            <a:r>
+              <a:rPr lang="en-US" sz="2000" dirty="0"/>
+              <a:t>All the documents and studies I found made general statements on these topics</a:t>
+            </a:r>
+          </a:p>
+          <a:p>
+            <a:endParaRPr lang="en-US" sz="2000" dirty="0"/>
+          </a:p>
+          <a:p>
+            <a:r>
+              <a:rPr lang="en-US" sz="2000" dirty="0"/>
+              <a:t>The research was originally done without looking specifically at the topics in </a:t>
+            </a:r>
+            <a:r>
+              <a:rPr lang="en-US" sz="2000" dirty="0" err="1"/>
+              <a:t>tadem</a:t>
+            </a:r>
+            <a:endParaRPr lang="en-US" sz="2000" dirty="0"/>
+          </a:p>
+        </p:txBody>
+      </p:sp>
+    </p:spTree>
+    <p:extLst>
+      <p:ext uri="{BB962C8B-B14F-4D97-AF65-F5344CB8AC3E}">
+        <p14:creationId xmlns:p14="http://schemas.microsoft.com/office/powerpoint/2010/main" val="2811883436"/>
       </p:ext>
     </p:extLst>
   </p:cSld>

</xml_diff>